<commit_message>
Work in progress: Course Intro lecture
</commit_message>
<xml_diff>
--- a/2010/lectures/0. Course Introduction.pptx
+++ b/2010/lectures/0. Course Introduction.pptx
@@ -5,10 +5,10 @@
     <p:sldMasterId id="2147483704" r:id="rId1"/>
   </p:sldMasterIdLst>
   <p:notesMasterIdLst>
-    <p:notesMasterId r:id="rId26"/>
+    <p:notesMasterId r:id="rId21"/>
   </p:notesMasterIdLst>
   <p:handoutMasterIdLst>
-    <p:handoutMasterId r:id="rId27"/>
+    <p:handoutMasterId r:id="rId22"/>
   </p:handoutMasterIdLst>
   <p:sldIdLst>
     <p:sldId id="320" r:id="rId2"/>
@@ -22,19 +22,14 @@
     <p:sldId id="349" r:id="rId10"/>
     <p:sldId id="328" r:id="rId11"/>
     <p:sldId id="329" r:id="rId12"/>
-    <p:sldId id="330" r:id="rId13"/>
-    <p:sldId id="331" r:id="rId14"/>
-    <p:sldId id="332" r:id="rId15"/>
-    <p:sldId id="333" r:id="rId16"/>
-    <p:sldId id="334" r:id="rId17"/>
-    <p:sldId id="335" r:id="rId18"/>
-    <p:sldId id="339" r:id="rId19"/>
-    <p:sldId id="340" r:id="rId20"/>
-    <p:sldId id="350" r:id="rId21"/>
-    <p:sldId id="343" r:id="rId22"/>
-    <p:sldId id="344" r:id="rId23"/>
-    <p:sldId id="345" r:id="rId24"/>
-    <p:sldId id="346" r:id="rId25"/>
+    <p:sldId id="332" r:id="rId13"/>
+    <p:sldId id="339" r:id="rId14"/>
+    <p:sldId id="340" r:id="rId15"/>
+    <p:sldId id="350" r:id="rId16"/>
+    <p:sldId id="343" r:id="rId17"/>
+    <p:sldId id="344" r:id="rId18"/>
+    <p:sldId id="345" r:id="rId19"/>
+    <p:sldId id="346" r:id="rId20"/>
   </p:sldIdLst>
   <p:sldSz cx="9144000" cy="6858000" type="screen4x3"/>
   <p:notesSz cx="6881813" cy="9296400"/>
@@ -5888,8 +5883,13 @@
             </a:pPr>
             <a:r>
               <a:rPr lang="en-US" dirty="0" smtClean="0"/>
-              <a:t>Svetlin Nakov</a:t>
-            </a:r>
+              <a:t>Svetlin </a:t>
+            </a:r>
+            <a:r>
+              <a:rPr lang="en-US" dirty="0" smtClean="0"/>
+              <a:t>Nakov, PhD</a:t>
+            </a:r>
+            <a:endParaRPr lang="en-US" dirty="0" smtClean="0"/>
           </a:p>
           <a:p>
             <a:pPr lvl="1">
@@ -6291,7 +6291,7 @@
           <a:p>
             <a:r>
               <a:rPr lang="en-US" dirty="0" smtClean="0"/>
-              <a:t>Trainers Team (2)</a:t>
+              <a:t>Trainers Team (4)</a:t>
             </a:r>
             <a:endParaRPr lang="en-US" dirty="0"/>
           </a:p>
@@ -6324,7 +6324,7 @@
             </a:pPr>
             <a:r>
               <a:rPr lang="en-US" dirty="0" smtClean="0"/>
-              <a:t>Mihail Stoynov</a:t>
+              <a:t>Ventsislav Popov</a:t>
             </a:r>
           </a:p>
           <a:p>
@@ -6335,13 +6335,13 @@
             </a:pPr>
             <a:r>
               <a:rPr lang="en-US" dirty="0" smtClean="0"/>
-              <a:t>Technical Lead,	 	         Materna Bulgaria, </a:t>
+              <a:t>Developer,		 	         Crossroad,		 </a:t>
             </a:r>
             <a:r>
               <a:rPr lang="en-US" dirty="0" smtClean="0">
                 <a:hlinkClick r:id="rId2"/>
               </a:rPr>
-              <a:t>www.materna.com</a:t>
+              <a:t>www.crossroad.bg</a:t>
             </a:r>
             <a:endParaRPr lang="en-US" dirty="0" smtClean="0"/>
           </a:p>
@@ -6371,690 +6371,6 @@
                 <a:defRPr/>
               </a:pPr>
               <a:t>12</a:t>
-            </a:fld>
-            <a:endParaRPr lang="en-US" dirty="0"/>
-          </a:p>
-        </p:txBody>
-      </p:sp>
-      <p:sp>
-        <p:nvSpPr>
-          <p:cNvPr id="8" name="Rectangle 7"/>
-          <p:cNvSpPr/>
-          <p:nvPr/>
-        </p:nvSpPr>
-        <p:spPr>
-          <a:xfrm>
-            <a:off x="228600" y="3429000"/>
-            <a:ext cx="8610600" cy="1272143"/>
-          </a:xfrm>
-          <a:prstGeom prst="rect">
-            <a:avLst/>
-          </a:prstGeom>
-        </p:spPr>
-        <p:txBody>
-          <a:bodyPr wrap="square">
-            <a:spAutoFit/>
-          </a:bodyPr>
-          <a:lstStyle/>
-          <a:p>
-            <a:pPr marL="630238" lvl="1" indent="-273050">
-              <a:lnSpc>
-                <a:spcPts val="4000"/>
-              </a:lnSpc>
-              <a:spcBef>
-                <a:spcPts val="600"/>
-              </a:spcBef>
-              <a:spcAft>
-                <a:spcPts val="600"/>
-              </a:spcAft>
-              <a:buClr>
-                <a:srgbClr val="8FD600"/>
-              </a:buClr>
-              <a:buFont typeface="Wingdings 2" pitchFamily="18" charset="2"/>
-              <a:buChar char=""/>
-            </a:pPr>
-            <a:r>
-              <a:rPr lang="en-US" sz="3000" b="1" dirty="0" smtClean="0">
-                <a:solidFill>
-                  <a:srgbClr val="CCFF66">
-                    <a:lumMod val="40000"/>
-                    <a:lumOff val="60000"/>
-                  </a:srgbClr>
-                </a:solidFill>
-                <a:effectLst>
-                  <a:outerShdw blurRad="38100" dist="38100" dir="2700000" algn="tl">
-                    <a:srgbClr val="000000">
-                      <a:alpha val="43137"/>
-                    </a:srgbClr>
-                  </a:outerShdw>
-                </a:effectLst>
-                <a:latin typeface="Corbel"/>
-              </a:rPr>
-              <a:t>E-mail: </a:t>
-            </a:r>
-            <a:r>
-              <a:rPr lang="en-US" sz="3000" b="1" noProof="1" smtClean="0">
-                <a:solidFill>
-                  <a:srgbClr val="CCFF66">
-                    <a:lumMod val="40000"/>
-                    <a:lumOff val="60000"/>
-                  </a:srgbClr>
-                </a:solidFill>
-                <a:effectLst>
-                  <a:outerShdw blurRad="38100" dist="38100" dir="2700000" algn="tl">
-                    <a:srgbClr val="000000">
-                      <a:alpha val="43137"/>
-                    </a:srgbClr>
-                  </a:outerShdw>
-                </a:effectLst>
-                <a:latin typeface="Corbel"/>
-              </a:rPr>
-              <a:t>mihail </a:t>
-            </a:r>
-            <a:r>
-              <a:rPr lang="en-US" sz="3000" b="1" dirty="0" smtClean="0">
-                <a:solidFill>
-                  <a:srgbClr val="CCFF66">
-                    <a:lumMod val="40000"/>
-                    <a:lumOff val="60000"/>
-                  </a:srgbClr>
-                </a:solidFill>
-                <a:effectLst>
-                  <a:outerShdw blurRad="38100" dist="38100" dir="2700000" algn="tl">
-                    <a:srgbClr val="000000">
-                      <a:alpha val="43137"/>
-                    </a:srgbClr>
-                  </a:outerShdw>
-                </a:effectLst>
-                <a:latin typeface="Corbel"/>
-              </a:rPr>
-              <a:t>[at] stoynov.com</a:t>
-            </a:r>
-          </a:p>
-          <a:p>
-            <a:pPr marL="630238" lvl="1" indent="-273050">
-              <a:lnSpc>
-                <a:spcPts val="4000"/>
-              </a:lnSpc>
-              <a:spcBef>
-                <a:spcPts val="600"/>
-              </a:spcBef>
-              <a:spcAft>
-                <a:spcPts val="600"/>
-              </a:spcAft>
-              <a:buClr>
-                <a:srgbClr val="8FD600"/>
-              </a:buClr>
-              <a:buFont typeface="Wingdings 2" pitchFamily="18" charset="2"/>
-              <a:buChar char=""/>
-            </a:pPr>
-            <a:r>
-              <a:rPr lang="en-US" sz="3000" b="1" noProof="1" smtClean="0">
-                <a:solidFill>
-                  <a:srgbClr val="CCFF66">
-                    <a:lumMod val="40000"/>
-                    <a:lumOff val="60000"/>
-                  </a:srgbClr>
-                </a:solidFill>
-                <a:effectLst>
-                  <a:outerShdw blurRad="38100" dist="38100" dir="2700000" algn="tl">
-                    <a:srgbClr val="000000">
-                      <a:alpha val="43137"/>
-                    </a:srgbClr>
-                  </a:outerShdw>
-                </a:effectLst>
-                <a:latin typeface="Corbel"/>
-              </a:rPr>
-              <a:t>Blog: </a:t>
-            </a:r>
-            <a:r>
-              <a:rPr lang="en-US" sz="3000" b="1" noProof="1" smtClean="0">
-                <a:solidFill>
-                  <a:srgbClr val="CCFF66">
-                    <a:lumMod val="40000"/>
-                    <a:lumOff val="60000"/>
-                  </a:srgbClr>
-                </a:solidFill>
-                <a:effectLst>
-                  <a:outerShdw blurRad="38100" dist="38100" dir="2700000" algn="tl">
-                    <a:srgbClr val="000000">
-                      <a:alpha val="43137"/>
-                    </a:srgbClr>
-                  </a:outerShdw>
-                </a:effectLst>
-                <a:latin typeface="Corbel"/>
-                <a:hlinkClick r:id="rId3"/>
-              </a:rPr>
-              <a:t>http://mihail.stoynov.com/blog/</a:t>
-            </a:r>
-            <a:endParaRPr lang="en-US" sz="3000" b="1" dirty="0">
-              <a:solidFill>
-                <a:srgbClr val="CCFF66">
-                  <a:lumMod val="40000"/>
-                  <a:lumOff val="60000"/>
-                </a:srgbClr>
-              </a:solidFill>
-              <a:effectLst>
-                <a:outerShdw blurRad="38100" dist="38100" dir="2700000" algn="tl">
-                  <a:srgbClr val="000000">
-                    <a:alpha val="43137"/>
-                  </a:srgbClr>
-                </a:outerShdw>
-              </a:effectLst>
-              <a:latin typeface="Corbel"/>
-            </a:endParaRPr>
-          </a:p>
-        </p:txBody>
-      </p:sp>
-      <p:pic>
-        <p:nvPicPr>
-          <p:cNvPr id="6" name="Picture 4" descr="Mihail-Stoynov"/>
-          <p:cNvPicPr>
-            <a:picLocks noChangeAspect="1" noChangeArrowheads="1"/>
-          </p:cNvPicPr>
-          <p:nvPr/>
-        </p:nvPicPr>
-        <p:blipFill>
-          <a:blip r:embed="rId4" cstate="print">
-            <a:lum/>
-          </a:blip>
-          <a:srcRect/>
-          <a:stretch>
-            <a:fillRect/>
-          </a:stretch>
-        </p:blipFill>
-        <p:spPr bwMode="auto">
-          <a:xfrm>
-            <a:off x="6829426" y="1219199"/>
-            <a:ext cx="1476374" cy="1970981"/>
-          </a:xfrm>
-          <a:prstGeom prst="rect">
-            <a:avLst/>
-          </a:prstGeom>
-          <a:noFill/>
-          <a:ln w="3175">
-            <a:solidFill>
-              <a:schemeClr val="accent5">
-                <a:lumMod val="75000"/>
-              </a:schemeClr>
-            </a:solidFill>
-            <a:miter lim="800000"/>
-            <a:headEnd/>
-            <a:tailEnd/>
-          </a:ln>
-        </p:spPr>
-      </p:pic>
-    </p:spTree>
-  </p:cSld>
-  <p:clrMapOvr>
-    <a:masterClrMapping/>
-  </p:clrMapOvr>
-  <p:timing>
-    <p:tnLst>
-      <p:par>
-        <p:cTn id="1" dur="indefinite" restart="never" nodeType="tmRoot"/>
-      </p:par>
-    </p:tnLst>
-  </p:timing>
-</p:sld>
-</file>
-
-<file path=ppt/slides/slide13.xml><?xml version="1.0" encoding="utf-8"?>
-<p:sld xmlns:a="http://schemas.openxmlformats.org/drawingml/2006/main" xmlns:r="http://schemas.openxmlformats.org/officeDocument/2006/relationships" xmlns:p="http://schemas.openxmlformats.org/presentationml/2006/main">
-  <p:cSld>
-    <p:spTree>
-      <p:nvGrpSpPr>
-        <p:cNvPr id="1" name=""/>
-        <p:cNvGrpSpPr/>
-        <p:nvPr/>
-      </p:nvGrpSpPr>
-      <p:grpSpPr>
-        <a:xfrm>
-          <a:off x="0" y="0"/>
-          <a:ext cx="0" cy="0"/>
-          <a:chOff x="0" y="0"/>
-          <a:chExt cx="0" cy="0"/>
-        </a:xfrm>
-      </p:grpSpPr>
-      <p:sp>
-        <p:nvSpPr>
-          <p:cNvPr id="4" name="Title 3"/>
-          <p:cNvSpPr>
-            <a:spLocks noGrp="1"/>
-          </p:cNvSpPr>
-          <p:nvPr>
-            <p:ph type="title"/>
-          </p:nvPr>
-        </p:nvSpPr>
-        <p:spPr/>
-        <p:txBody>
-          <a:bodyPr/>
-          <a:lstStyle/>
-          <a:p>
-            <a:r>
-              <a:rPr lang="en-US" dirty="0" smtClean="0"/>
-              <a:t>Trainers Team (3)</a:t>
-            </a:r>
-            <a:endParaRPr lang="en-US" dirty="0"/>
-          </a:p>
-        </p:txBody>
-      </p:sp>
-      <p:sp>
-        <p:nvSpPr>
-          <p:cNvPr id="5" name="Content Placeholder 4"/>
-          <p:cNvSpPr>
-            <a:spLocks noGrp="1"/>
-          </p:cNvSpPr>
-          <p:nvPr>
-            <p:ph idx="1"/>
-          </p:nvPr>
-        </p:nvSpPr>
-        <p:spPr>
-          <a:xfrm>
-            <a:off x="228600" y="1066800"/>
-            <a:ext cx="6477000" cy="2438400"/>
-          </a:xfrm>
-        </p:spPr>
-        <p:txBody>
-          <a:bodyPr/>
-          <a:lstStyle/>
-          <a:p>
-            <a:pPr>
-              <a:lnSpc>
-                <a:spcPts val="4000"/>
-              </a:lnSpc>
-            </a:pPr>
-            <a:r>
-              <a:rPr lang="en-US" dirty="0" smtClean="0"/>
-              <a:t>Branislav Abadjimarinov</a:t>
-            </a:r>
-          </a:p>
-          <a:p>
-            <a:pPr lvl="1">
-              <a:lnSpc>
-                <a:spcPts val="4000"/>
-              </a:lnSpc>
-            </a:pPr>
-            <a:r>
-              <a:rPr lang="en-US" dirty="0" smtClean="0"/>
-              <a:t>Senior .NET Developer, 	         ProPeople, </a:t>
-            </a:r>
-            <a:r>
-              <a:rPr lang="en-US" dirty="0" smtClean="0">
-                <a:hlinkClick r:id="rId2"/>
-              </a:rPr>
-              <a:t>www.propeople.dk</a:t>
-            </a:r>
-            <a:endParaRPr lang="en-US" dirty="0" smtClean="0"/>
-          </a:p>
-        </p:txBody>
-      </p:sp>
-      <p:sp>
-        <p:nvSpPr>
-          <p:cNvPr id="9" name="Slide Number Placeholder 3"/>
-          <p:cNvSpPr>
-            <a:spLocks noGrp="1"/>
-          </p:cNvSpPr>
-          <p:nvPr>
-            <p:ph type="sldNum" sz="quarter" idx="10"/>
-          </p:nvPr>
-        </p:nvSpPr>
-        <p:spPr/>
-        <p:txBody>
-          <a:bodyPr/>
-          <a:lstStyle/>
-          <a:p>
-            <a:pPr>
-              <a:defRPr/>
-            </a:pPr>
-            <a:fld id="{58452FF4-89E3-4D1B-9927-2DBDC00E58D7}" type="slidenum">
-              <a:rPr lang="en-US" smtClean="0"/>
-              <a:pPr>
-                <a:defRPr/>
-              </a:pPr>
-              <a:t>13</a:t>
-            </a:fld>
-            <a:endParaRPr lang="en-US" dirty="0"/>
-          </a:p>
-        </p:txBody>
-      </p:sp>
-      <p:sp>
-        <p:nvSpPr>
-          <p:cNvPr id="8" name="Rectangle 7"/>
-          <p:cNvSpPr/>
-          <p:nvPr/>
-        </p:nvSpPr>
-        <p:spPr>
-          <a:xfrm>
-            <a:off x="228600" y="3429000"/>
-            <a:ext cx="8610600" cy="1272143"/>
-          </a:xfrm>
-          <a:prstGeom prst="rect">
-            <a:avLst/>
-          </a:prstGeom>
-        </p:spPr>
-        <p:txBody>
-          <a:bodyPr wrap="square">
-            <a:spAutoFit/>
-          </a:bodyPr>
-          <a:lstStyle/>
-          <a:p>
-            <a:pPr marL="630238" lvl="1" indent="-273050">
-              <a:lnSpc>
-                <a:spcPts val="4000"/>
-              </a:lnSpc>
-              <a:spcBef>
-                <a:spcPts val="600"/>
-              </a:spcBef>
-              <a:spcAft>
-                <a:spcPts val="600"/>
-              </a:spcAft>
-              <a:buClr>
-                <a:srgbClr val="8FD600"/>
-              </a:buClr>
-              <a:buFont typeface="Wingdings 2" pitchFamily="18" charset="2"/>
-              <a:buChar char=""/>
-            </a:pPr>
-            <a:r>
-              <a:rPr lang="en-US" sz="3000" b="1" dirty="0" smtClean="0">
-                <a:solidFill>
-                  <a:srgbClr val="CCFF66">
-                    <a:lumMod val="40000"/>
-                    <a:lumOff val="60000"/>
-                  </a:srgbClr>
-                </a:solidFill>
-                <a:effectLst>
-                  <a:outerShdw blurRad="38100" dist="38100" dir="2700000" algn="tl">
-                    <a:srgbClr val="000000">
-                      <a:alpha val="43137"/>
-                    </a:srgbClr>
-                  </a:outerShdw>
-                </a:effectLst>
-                <a:latin typeface="Corbel"/>
-              </a:rPr>
-              <a:t>E-mail: </a:t>
-            </a:r>
-            <a:r>
-              <a:rPr lang="en-US" sz="3000" b="1" noProof="1" smtClean="0">
-                <a:solidFill>
-                  <a:srgbClr val="CCFF66">
-                    <a:lumMod val="40000"/>
-                    <a:lumOff val="60000"/>
-                  </a:srgbClr>
-                </a:solidFill>
-                <a:effectLst>
-                  <a:outerShdw blurRad="38100" dist="38100" dir="2700000" algn="tl">
-                    <a:srgbClr val="000000">
-                      <a:alpha val="43137"/>
-                    </a:srgbClr>
-                  </a:outerShdw>
-                </a:effectLst>
-                <a:latin typeface="Corbel"/>
-              </a:rPr>
-              <a:t>brannislav </a:t>
-            </a:r>
-            <a:r>
-              <a:rPr lang="en-US" sz="3000" b="1" dirty="0" smtClean="0">
-                <a:solidFill>
-                  <a:srgbClr val="CCFF66">
-                    <a:lumMod val="40000"/>
-                    <a:lumOff val="60000"/>
-                  </a:srgbClr>
-                </a:solidFill>
-                <a:effectLst>
-                  <a:outerShdw blurRad="38100" dist="38100" dir="2700000" algn="tl">
-                    <a:srgbClr val="000000">
-                      <a:alpha val="43137"/>
-                    </a:srgbClr>
-                  </a:outerShdw>
-                </a:effectLst>
-                <a:latin typeface="Corbel"/>
-              </a:rPr>
-              <a:t>[at] gmail.com</a:t>
-            </a:r>
-          </a:p>
-          <a:p>
-            <a:pPr marL="630238" lvl="1" indent="-273050">
-              <a:lnSpc>
-                <a:spcPts val="4000"/>
-              </a:lnSpc>
-              <a:spcBef>
-                <a:spcPts val="600"/>
-              </a:spcBef>
-              <a:spcAft>
-                <a:spcPts val="600"/>
-              </a:spcAft>
-              <a:buClr>
-                <a:srgbClr val="8FD600"/>
-              </a:buClr>
-              <a:buFont typeface="Wingdings 2" pitchFamily="18" charset="2"/>
-              <a:buChar char=""/>
-            </a:pPr>
-            <a:r>
-              <a:rPr lang="en-US" sz="3000" b="1" noProof="1" smtClean="0">
-                <a:solidFill>
-                  <a:srgbClr val="CCFF66">
-                    <a:lumMod val="40000"/>
-                    <a:lumOff val="60000"/>
-                  </a:srgbClr>
-                </a:solidFill>
-                <a:effectLst>
-                  <a:outerShdw blurRad="38100" dist="38100" dir="2700000" algn="tl">
-                    <a:srgbClr val="000000">
-                      <a:alpha val="43137"/>
-                    </a:srgbClr>
-                  </a:outerShdw>
-                </a:effectLst>
-                <a:latin typeface="Corbel"/>
-              </a:rPr>
-              <a:t>Blog: </a:t>
-            </a:r>
-            <a:r>
-              <a:rPr lang="en-US" sz="3000" b="1" noProof="1" smtClean="0">
-                <a:solidFill>
-                  <a:srgbClr val="CCFF66">
-                    <a:lumMod val="40000"/>
-                    <a:lumOff val="60000"/>
-                  </a:srgbClr>
-                </a:solidFill>
-                <a:effectLst>
-                  <a:outerShdw blurRad="38100" dist="38100" dir="2700000" algn="tl">
-                    <a:srgbClr val="000000">
-                      <a:alpha val="43137"/>
-                    </a:srgbClr>
-                  </a:outerShdw>
-                </a:effectLst>
-                <a:latin typeface="Corbel"/>
-                <a:hlinkClick r:id="rId3"/>
-              </a:rPr>
-              <a:t>http://abadjimarinov.net</a:t>
-            </a:r>
-            <a:endParaRPr lang="en-US" sz="3000" b="1" dirty="0">
-              <a:solidFill>
-                <a:srgbClr val="CCFF66">
-                  <a:lumMod val="40000"/>
-                  <a:lumOff val="60000"/>
-                </a:srgbClr>
-              </a:solidFill>
-              <a:effectLst>
-                <a:outerShdw blurRad="38100" dist="38100" dir="2700000" algn="tl">
-                  <a:srgbClr val="000000">
-                    <a:alpha val="43137"/>
-                  </a:srgbClr>
-                </a:outerShdw>
-              </a:effectLst>
-              <a:latin typeface="Corbel"/>
-            </a:endParaRPr>
-          </a:p>
-        </p:txBody>
-      </p:sp>
-      <p:pic>
-        <p:nvPicPr>
-          <p:cNvPr id="1026" name="Picture 2" descr="C:\Users\nakov\AppData\Local\Temp\1\_TS57E3.tmp\_TS4E.tmp\Branislav Abadjimarinov.jpg"/>
-          <p:cNvPicPr>
-            <a:picLocks noChangeAspect="1" noChangeArrowheads="1"/>
-          </p:cNvPicPr>
-          <p:nvPr/>
-        </p:nvPicPr>
-        <p:blipFill>
-          <a:blip r:embed="rId4" cstate="print">
-            <a:lum bright="20000" contrast="10000"/>
-          </a:blip>
-          <a:srcRect b="11599"/>
-          <a:stretch>
-            <a:fillRect/>
-          </a:stretch>
-        </p:blipFill>
-        <p:spPr bwMode="auto">
-          <a:xfrm>
-            <a:off x="6761703" y="1229247"/>
-            <a:ext cx="1658815" cy="1967345"/>
-          </a:xfrm>
-          <a:prstGeom prst="rect">
-            <a:avLst/>
-          </a:prstGeom>
-          <a:noFill/>
-          <a:ln w="3175">
-            <a:solidFill>
-              <a:schemeClr val="accent5">
-                <a:lumMod val="75000"/>
-              </a:schemeClr>
-            </a:solidFill>
-            <a:miter lim="800000"/>
-            <a:headEnd/>
-            <a:tailEnd/>
-          </a:ln>
-        </p:spPr>
-      </p:pic>
-    </p:spTree>
-  </p:cSld>
-  <p:clrMapOvr>
-    <a:masterClrMapping/>
-  </p:clrMapOvr>
-  <p:timing>
-    <p:tnLst>
-      <p:par>
-        <p:cTn id="1" dur="indefinite" restart="never" nodeType="tmRoot"/>
-      </p:par>
-    </p:tnLst>
-  </p:timing>
-</p:sld>
-</file>
-
-<file path=ppt/slides/slide14.xml><?xml version="1.0" encoding="utf-8"?>
-<p:sld xmlns:a="http://schemas.openxmlformats.org/drawingml/2006/main" xmlns:r="http://schemas.openxmlformats.org/officeDocument/2006/relationships" xmlns:p="http://schemas.openxmlformats.org/presentationml/2006/main">
-  <p:cSld>
-    <p:spTree>
-      <p:nvGrpSpPr>
-        <p:cNvPr id="1" name=""/>
-        <p:cNvGrpSpPr/>
-        <p:nvPr/>
-      </p:nvGrpSpPr>
-      <p:grpSpPr>
-        <a:xfrm>
-          <a:off x="0" y="0"/>
-          <a:ext cx="0" cy="0"/>
-          <a:chOff x="0" y="0"/>
-          <a:chExt cx="0" cy="0"/>
-        </a:xfrm>
-      </p:grpSpPr>
-      <p:sp>
-        <p:nvSpPr>
-          <p:cNvPr id="4" name="Title 3"/>
-          <p:cNvSpPr>
-            <a:spLocks noGrp="1"/>
-          </p:cNvSpPr>
-          <p:nvPr>
-            <p:ph type="title"/>
-          </p:nvPr>
-        </p:nvSpPr>
-        <p:spPr/>
-        <p:txBody>
-          <a:bodyPr/>
-          <a:lstStyle/>
-          <a:p>
-            <a:r>
-              <a:rPr lang="en-US" dirty="0" smtClean="0"/>
-              <a:t>Trainers Team (4)</a:t>
-            </a:r>
-            <a:endParaRPr lang="en-US" dirty="0"/>
-          </a:p>
-        </p:txBody>
-      </p:sp>
-      <p:sp>
-        <p:nvSpPr>
-          <p:cNvPr id="5" name="Content Placeholder 4"/>
-          <p:cNvSpPr>
-            <a:spLocks noGrp="1"/>
-          </p:cNvSpPr>
-          <p:nvPr>
-            <p:ph idx="1"/>
-          </p:nvPr>
-        </p:nvSpPr>
-        <p:spPr>
-          <a:xfrm>
-            <a:off x="228600" y="1066800"/>
-            <a:ext cx="6477000" cy="2438400"/>
-          </a:xfrm>
-        </p:spPr>
-        <p:txBody>
-          <a:bodyPr/>
-          <a:lstStyle/>
-          <a:p>
-            <a:pPr>
-              <a:lnSpc>
-                <a:spcPts val="4000"/>
-              </a:lnSpc>
-            </a:pPr>
-            <a:r>
-              <a:rPr lang="en-US" dirty="0" smtClean="0"/>
-              <a:t>Ventsislav Popov</a:t>
-            </a:r>
-          </a:p>
-          <a:p>
-            <a:pPr lvl="1">
-              <a:lnSpc>
-                <a:spcPts val="4000"/>
-              </a:lnSpc>
-            </a:pPr>
-            <a:r>
-              <a:rPr lang="en-US" dirty="0" smtClean="0"/>
-              <a:t>Developer,		 	         Crossroad,		 </a:t>
-            </a:r>
-            <a:r>
-              <a:rPr lang="en-US" dirty="0" smtClean="0">
-                <a:hlinkClick r:id="rId2"/>
-              </a:rPr>
-              <a:t>www.crossroad.bg</a:t>
-            </a:r>
-            <a:endParaRPr lang="en-US" dirty="0" smtClean="0"/>
-          </a:p>
-        </p:txBody>
-      </p:sp>
-      <p:sp>
-        <p:nvSpPr>
-          <p:cNvPr id="7" name="Slide Number Placeholder 3"/>
-          <p:cNvSpPr>
-            <a:spLocks noGrp="1"/>
-          </p:cNvSpPr>
-          <p:nvPr>
-            <p:ph type="sldNum" sz="quarter" idx="10"/>
-          </p:nvPr>
-        </p:nvSpPr>
-        <p:spPr/>
-        <p:txBody>
-          <a:bodyPr/>
-          <a:lstStyle/>
-          <a:p>
-            <a:pPr>
-              <a:defRPr/>
-            </a:pPr>
-            <a:fld id="{58452FF4-89E3-4D1B-9927-2DBDC00E58D7}" type="slidenum">
-              <a:rPr lang="en-US" smtClean="0"/>
-              <a:pPr>
-                <a:defRPr/>
-              </a:pPr>
-              <a:t>14</a:t>
             </a:fld>
             <a:endParaRPr lang="en-US" dirty="0"/>
           </a:p>
@@ -7210,1052 +6526,7 @@
 </p:sld>
 </file>
 
-<file path=ppt/slides/slide15.xml><?xml version="1.0" encoding="utf-8"?>
-<p:sld xmlns:a="http://schemas.openxmlformats.org/drawingml/2006/main" xmlns:r="http://schemas.openxmlformats.org/officeDocument/2006/relationships" xmlns:p="http://schemas.openxmlformats.org/presentationml/2006/main">
-  <p:cSld>
-    <p:spTree>
-      <p:nvGrpSpPr>
-        <p:cNvPr id="1" name=""/>
-        <p:cNvGrpSpPr/>
-        <p:nvPr/>
-      </p:nvGrpSpPr>
-      <p:grpSpPr>
-        <a:xfrm>
-          <a:off x="0" y="0"/>
-          <a:ext cx="0" cy="0"/>
-          <a:chOff x="0" y="0"/>
-          <a:chExt cx="0" cy="0"/>
-        </a:xfrm>
-      </p:grpSpPr>
-      <p:sp>
-        <p:nvSpPr>
-          <p:cNvPr id="4" name="Title 3"/>
-          <p:cNvSpPr>
-            <a:spLocks noGrp="1"/>
-          </p:cNvSpPr>
-          <p:nvPr>
-            <p:ph type="title"/>
-          </p:nvPr>
-        </p:nvSpPr>
-        <p:spPr/>
-        <p:txBody>
-          <a:bodyPr/>
-          <a:lstStyle/>
-          <a:p>
-            <a:r>
-              <a:rPr lang="en-US" dirty="0" smtClean="0"/>
-              <a:t>Trainers Team (5)</a:t>
-            </a:r>
-            <a:endParaRPr lang="en-US" dirty="0"/>
-          </a:p>
-        </p:txBody>
-      </p:sp>
-      <p:sp>
-        <p:nvSpPr>
-          <p:cNvPr id="5" name="Content Placeholder 4"/>
-          <p:cNvSpPr>
-            <a:spLocks noGrp="1"/>
-          </p:cNvSpPr>
-          <p:nvPr>
-            <p:ph idx="1"/>
-          </p:nvPr>
-        </p:nvSpPr>
-        <p:spPr>
-          <a:xfrm>
-            <a:off x="228600" y="1066800"/>
-            <a:ext cx="6477000" cy="2438400"/>
-          </a:xfrm>
-        </p:spPr>
-        <p:txBody>
-          <a:bodyPr/>
-          <a:lstStyle/>
-          <a:p>
-            <a:pPr>
-              <a:lnSpc>
-                <a:spcPts val="4000"/>
-              </a:lnSpc>
-            </a:pPr>
-            <a:r>
-              <a:rPr lang="en-US" dirty="0" smtClean="0"/>
-              <a:t>Ivaylo Bratoev</a:t>
-            </a:r>
-          </a:p>
-          <a:p>
-            <a:pPr lvl="1">
-              <a:lnSpc>
-                <a:spcPts val="4000"/>
-              </a:lnSpc>
-            </a:pPr>
-            <a:r>
-              <a:rPr lang="en-US" dirty="0" smtClean="0"/>
-              <a:t>Software engineer, 	         Telerik Corporation, </a:t>
-            </a:r>
-            <a:r>
-              <a:rPr lang="en-US" dirty="0" smtClean="0">
-                <a:hlinkClick r:id="rId2"/>
-              </a:rPr>
-              <a:t>www.telerik.com</a:t>
-            </a:r>
-            <a:endParaRPr lang="en-US" dirty="0" smtClean="0"/>
-          </a:p>
-        </p:txBody>
-      </p:sp>
-      <p:sp>
-        <p:nvSpPr>
-          <p:cNvPr id="6" name="Slide Number Placeholder 3"/>
-          <p:cNvSpPr>
-            <a:spLocks noGrp="1"/>
-          </p:cNvSpPr>
-          <p:nvPr>
-            <p:ph type="sldNum" sz="quarter" idx="10"/>
-          </p:nvPr>
-        </p:nvSpPr>
-        <p:spPr/>
-        <p:txBody>
-          <a:bodyPr/>
-          <a:lstStyle/>
-          <a:p>
-            <a:pPr>
-              <a:defRPr/>
-            </a:pPr>
-            <a:fld id="{58452FF4-89E3-4D1B-9927-2DBDC00E58D7}" type="slidenum">
-              <a:rPr lang="en-US" smtClean="0"/>
-              <a:pPr>
-                <a:defRPr/>
-              </a:pPr>
-              <a:t>15</a:t>
-            </a:fld>
-            <a:endParaRPr lang="en-US" dirty="0"/>
-          </a:p>
-        </p:txBody>
-      </p:sp>
-      <p:sp>
-        <p:nvSpPr>
-          <p:cNvPr id="8" name="Rectangle 7"/>
-          <p:cNvSpPr/>
-          <p:nvPr/>
-        </p:nvSpPr>
-        <p:spPr>
-          <a:xfrm>
-            <a:off x="228600" y="3429000"/>
-            <a:ext cx="8610600" cy="1272143"/>
-          </a:xfrm>
-          <a:prstGeom prst="rect">
-            <a:avLst/>
-          </a:prstGeom>
-        </p:spPr>
-        <p:txBody>
-          <a:bodyPr wrap="square">
-            <a:spAutoFit/>
-          </a:bodyPr>
-          <a:lstStyle/>
-          <a:p>
-            <a:pPr marL="630238" lvl="1" indent="-273050">
-              <a:lnSpc>
-                <a:spcPts val="4000"/>
-              </a:lnSpc>
-              <a:spcBef>
-                <a:spcPts val="600"/>
-              </a:spcBef>
-              <a:spcAft>
-                <a:spcPts val="600"/>
-              </a:spcAft>
-              <a:buClr>
-                <a:srgbClr val="8FD600"/>
-              </a:buClr>
-              <a:buFont typeface="Wingdings 2" pitchFamily="18" charset="2"/>
-              <a:buChar char=""/>
-            </a:pPr>
-            <a:r>
-              <a:rPr lang="en-US" sz="3000" b="1" dirty="0" smtClean="0">
-                <a:solidFill>
-                  <a:srgbClr val="CCFF66">
-                    <a:lumMod val="40000"/>
-                    <a:lumOff val="60000"/>
-                  </a:srgbClr>
-                </a:solidFill>
-                <a:effectLst>
-                  <a:outerShdw blurRad="38100" dist="38100" dir="2700000" algn="tl">
-                    <a:srgbClr val="000000">
-                      <a:alpha val="43137"/>
-                    </a:srgbClr>
-                  </a:outerShdw>
-                </a:effectLst>
-                <a:latin typeface="Corbel"/>
-              </a:rPr>
-              <a:t>E-mail: </a:t>
-            </a:r>
-            <a:r>
-              <a:rPr lang="en-US" sz="3000" b="1" noProof="1" smtClean="0">
-                <a:solidFill>
-                  <a:srgbClr val="CCFF66">
-                    <a:lumMod val="40000"/>
-                    <a:lumOff val="60000"/>
-                  </a:srgbClr>
-                </a:solidFill>
-                <a:effectLst>
-                  <a:outerShdw blurRad="38100" dist="38100" dir="2700000" algn="tl">
-                    <a:srgbClr val="000000">
-                      <a:alpha val="43137"/>
-                    </a:srgbClr>
-                  </a:outerShdw>
-                </a:effectLst>
-                <a:latin typeface="Corbel"/>
-              </a:rPr>
-              <a:t>ivaylo.bratoev </a:t>
-            </a:r>
-            <a:r>
-              <a:rPr lang="en-US" sz="3000" b="1" dirty="0" smtClean="0">
-                <a:solidFill>
-                  <a:srgbClr val="CCFF66">
-                    <a:lumMod val="40000"/>
-                    <a:lumOff val="60000"/>
-                  </a:srgbClr>
-                </a:solidFill>
-                <a:effectLst>
-                  <a:outerShdw blurRad="38100" dist="38100" dir="2700000" algn="tl">
-                    <a:srgbClr val="000000">
-                      <a:alpha val="43137"/>
-                    </a:srgbClr>
-                  </a:outerShdw>
-                </a:effectLst>
-                <a:latin typeface="Corbel"/>
-              </a:rPr>
-              <a:t>[at] telerik.com</a:t>
-            </a:r>
-          </a:p>
-          <a:p>
-            <a:pPr marL="630238" lvl="1" indent="-273050">
-              <a:lnSpc>
-                <a:spcPts val="4000"/>
-              </a:lnSpc>
-              <a:spcBef>
-                <a:spcPts val="600"/>
-              </a:spcBef>
-              <a:spcAft>
-                <a:spcPts val="600"/>
-              </a:spcAft>
-              <a:buClr>
-                <a:srgbClr val="8FD600"/>
-              </a:buClr>
-              <a:buFont typeface="Wingdings 2" pitchFamily="18" charset="2"/>
-              <a:buChar char=""/>
-            </a:pPr>
-            <a:r>
-              <a:rPr lang="en-US" sz="3000" b="1" noProof="1" smtClean="0">
-                <a:solidFill>
-                  <a:srgbClr val="CCFF66">
-                    <a:lumMod val="40000"/>
-                    <a:lumOff val="60000"/>
-                  </a:srgbClr>
-                </a:solidFill>
-                <a:effectLst>
-                  <a:outerShdw blurRad="38100" dist="38100" dir="2700000" algn="tl">
-                    <a:srgbClr val="000000">
-                      <a:alpha val="43137"/>
-                    </a:srgbClr>
-                  </a:outerShdw>
-                </a:effectLst>
-                <a:latin typeface="Corbel"/>
-              </a:rPr>
-              <a:t>Blog: </a:t>
-            </a:r>
-            <a:r>
-              <a:rPr lang="en-US" sz="3000" b="1" noProof="1" smtClean="0">
-                <a:solidFill>
-                  <a:srgbClr val="CCFF66">
-                    <a:lumMod val="40000"/>
-                    <a:lumOff val="60000"/>
-                  </a:srgbClr>
-                </a:solidFill>
-                <a:effectLst>
-                  <a:outerShdw blurRad="38100" dist="38100" dir="2700000" algn="tl">
-                    <a:srgbClr val="000000">
-                      <a:alpha val="43137"/>
-                    </a:srgbClr>
-                  </a:outerShdw>
-                </a:effectLst>
-                <a:latin typeface="Corbel"/>
-                <a:hlinkClick r:id="rId3"/>
-              </a:rPr>
-              <a:t>http://blogs.telerik.com/ivaylobratoev/</a:t>
-            </a:r>
-            <a:r>
-              <a:rPr lang="en-US" sz="3000" b="1" noProof="1" smtClean="0">
-                <a:solidFill>
-                  <a:srgbClr val="CCFF66">
-                    <a:lumMod val="40000"/>
-                    <a:lumOff val="60000"/>
-                  </a:srgbClr>
-                </a:solidFill>
-                <a:effectLst>
-                  <a:outerShdw blurRad="38100" dist="38100" dir="2700000" algn="tl">
-                    <a:srgbClr val="000000">
-                      <a:alpha val="43137"/>
-                    </a:srgbClr>
-                  </a:outerShdw>
-                </a:effectLst>
-                <a:latin typeface="Corbel"/>
-              </a:rPr>
-              <a:t> </a:t>
-            </a:r>
-            <a:endParaRPr lang="en-US" sz="3000" b="1" dirty="0">
-              <a:solidFill>
-                <a:srgbClr val="CCFF66">
-                  <a:lumMod val="40000"/>
-                  <a:lumOff val="60000"/>
-                </a:srgbClr>
-              </a:solidFill>
-              <a:effectLst>
-                <a:outerShdw blurRad="38100" dist="38100" dir="2700000" algn="tl">
-                  <a:srgbClr val="000000">
-                    <a:alpha val="43137"/>
-                  </a:srgbClr>
-                </a:outerShdw>
-              </a:effectLst>
-              <a:latin typeface="Corbel"/>
-            </a:endParaRPr>
-          </a:p>
-        </p:txBody>
-      </p:sp>
-      <p:pic>
-        <p:nvPicPr>
-          <p:cNvPr id="26626" name="Picture 2" descr="http://corporate.telerik.com/Images/CorporateDirectory/Ivaylo%20Bratoev.JPG"/>
-          <p:cNvPicPr>
-            <a:picLocks noChangeAspect="1" noChangeArrowheads="1"/>
-          </p:cNvPicPr>
-          <p:nvPr/>
-        </p:nvPicPr>
-        <p:blipFill>
-          <a:blip r:embed="rId4" cstate="print">
-            <a:lum contrast="10000"/>
-          </a:blip>
-          <a:srcRect r="1923" b="962"/>
-          <a:stretch>
-            <a:fillRect/>
-          </a:stretch>
-        </p:blipFill>
-        <p:spPr bwMode="auto">
-          <a:xfrm>
-            <a:off x="6819900" y="1219200"/>
-            <a:ext cx="1485900" cy="2000624"/>
-          </a:xfrm>
-          <a:prstGeom prst="rect">
-            <a:avLst/>
-          </a:prstGeom>
-          <a:noFill/>
-          <a:ln w="3175">
-            <a:solidFill>
-              <a:schemeClr val="accent5">
-                <a:lumMod val="75000"/>
-              </a:schemeClr>
-            </a:solidFill>
-            <a:miter lim="800000"/>
-            <a:headEnd/>
-            <a:tailEnd/>
-          </a:ln>
-        </p:spPr>
-      </p:pic>
-    </p:spTree>
-  </p:cSld>
-  <p:clrMapOvr>
-    <a:masterClrMapping/>
-  </p:clrMapOvr>
-  <p:timing>
-    <p:tnLst>
-      <p:par>
-        <p:cTn id="1" dur="indefinite" restart="never" nodeType="tmRoot"/>
-      </p:par>
-    </p:tnLst>
-  </p:timing>
-</p:sld>
-</file>
-
-<file path=ppt/slides/slide16.xml><?xml version="1.0" encoding="utf-8"?>
-<p:sld xmlns:a="http://schemas.openxmlformats.org/drawingml/2006/main" xmlns:r="http://schemas.openxmlformats.org/officeDocument/2006/relationships" xmlns:p="http://schemas.openxmlformats.org/presentationml/2006/main">
-  <p:cSld>
-    <p:spTree>
-      <p:nvGrpSpPr>
-        <p:cNvPr id="1" name=""/>
-        <p:cNvGrpSpPr/>
-        <p:nvPr/>
-      </p:nvGrpSpPr>
-      <p:grpSpPr>
-        <a:xfrm>
-          <a:off x="0" y="0"/>
-          <a:ext cx="0" cy="0"/>
-          <a:chOff x="0" y="0"/>
-          <a:chExt cx="0" cy="0"/>
-        </a:xfrm>
-      </p:grpSpPr>
-      <p:sp>
-        <p:nvSpPr>
-          <p:cNvPr id="4" name="Title 3"/>
-          <p:cNvSpPr>
-            <a:spLocks noGrp="1"/>
-          </p:cNvSpPr>
-          <p:nvPr>
-            <p:ph type="title"/>
-          </p:nvPr>
-        </p:nvSpPr>
-        <p:spPr/>
-        <p:txBody>
-          <a:bodyPr/>
-          <a:lstStyle/>
-          <a:p>
-            <a:r>
-              <a:rPr lang="en-US" dirty="0" smtClean="0"/>
-              <a:t>Trainers Team (6)</a:t>
-            </a:r>
-            <a:endParaRPr lang="en-US" dirty="0"/>
-          </a:p>
-        </p:txBody>
-      </p:sp>
-      <p:sp>
-        <p:nvSpPr>
-          <p:cNvPr id="5" name="Content Placeholder 4"/>
-          <p:cNvSpPr>
-            <a:spLocks noGrp="1"/>
-          </p:cNvSpPr>
-          <p:nvPr>
-            <p:ph idx="1"/>
-          </p:nvPr>
-        </p:nvSpPr>
-        <p:spPr>
-          <a:xfrm>
-            <a:off x="228600" y="1066800"/>
-            <a:ext cx="6477000" cy="2438400"/>
-          </a:xfrm>
-        </p:spPr>
-        <p:txBody>
-          <a:bodyPr/>
-          <a:lstStyle/>
-          <a:p>
-            <a:pPr>
-              <a:lnSpc>
-                <a:spcPts val="4000"/>
-              </a:lnSpc>
-            </a:pPr>
-            <a:r>
-              <a:rPr lang="en-US" dirty="0" smtClean="0"/>
-              <a:t>Svetlin Ralchev</a:t>
-            </a:r>
-          </a:p>
-          <a:p>
-            <a:pPr lvl="1">
-              <a:lnSpc>
-                <a:spcPts val="4000"/>
-              </a:lnSpc>
-            </a:pPr>
-            <a:r>
-              <a:rPr lang="en-US" dirty="0" smtClean="0"/>
-              <a:t>Software engineer, 	         Telerik Corporation, </a:t>
-            </a:r>
-            <a:r>
-              <a:rPr lang="en-US" dirty="0" smtClean="0">
-                <a:hlinkClick r:id="rId2"/>
-              </a:rPr>
-              <a:t>www.telerik.com</a:t>
-            </a:r>
-            <a:endParaRPr lang="en-US" dirty="0" smtClean="0"/>
-          </a:p>
-        </p:txBody>
-      </p:sp>
-      <p:sp>
-        <p:nvSpPr>
-          <p:cNvPr id="7" name="Slide Number Placeholder 3"/>
-          <p:cNvSpPr>
-            <a:spLocks noGrp="1"/>
-          </p:cNvSpPr>
-          <p:nvPr>
-            <p:ph type="sldNum" sz="quarter" idx="10"/>
-          </p:nvPr>
-        </p:nvSpPr>
-        <p:spPr/>
-        <p:txBody>
-          <a:bodyPr/>
-          <a:lstStyle/>
-          <a:p>
-            <a:pPr>
-              <a:defRPr/>
-            </a:pPr>
-            <a:fld id="{58452FF4-89E3-4D1B-9927-2DBDC00E58D7}" type="slidenum">
-              <a:rPr lang="en-US" smtClean="0"/>
-              <a:pPr>
-                <a:defRPr/>
-              </a:pPr>
-              <a:t>16</a:t>
-            </a:fld>
-            <a:endParaRPr lang="en-US" dirty="0"/>
-          </a:p>
-        </p:txBody>
-      </p:sp>
-      <p:sp>
-        <p:nvSpPr>
-          <p:cNvPr id="8" name="Rectangle 7"/>
-          <p:cNvSpPr/>
-          <p:nvPr/>
-        </p:nvSpPr>
-        <p:spPr>
-          <a:xfrm>
-            <a:off x="228600" y="3429000"/>
-            <a:ext cx="8610600" cy="1272143"/>
-          </a:xfrm>
-          <a:prstGeom prst="rect">
-            <a:avLst/>
-          </a:prstGeom>
-        </p:spPr>
-        <p:txBody>
-          <a:bodyPr wrap="square">
-            <a:spAutoFit/>
-          </a:bodyPr>
-          <a:lstStyle/>
-          <a:p>
-            <a:pPr marL="630238" lvl="1" indent="-273050">
-              <a:lnSpc>
-                <a:spcPts val="4000"/>
-              </a:lnSpc>
-              <a:spcBef>
-                <a:spcPts val="600"/>
-              </a:spcBef>
-              <a:spcAft>
-                <a:spcPts val="600"/>
-              </a:spcAft>
-              <a:buClr>
-                <a:srgbClr val="8FD600"/>
-              </a:buClr>
-              <a:buFont typeface="Wingdings 2" pitchFamily="18" charset="2"/>
-              <a:buChar char=""/>
-            </a:pPr>
-            <a:r>
-              <a:rPr lang="en-US" sz="3000" b="1" dirty="0" smtClean="0">
-                <a:solidFill>
-                  <a:srgbClr val="CCFF66">
-                    <a:lumMod val="40000"/>
-                    <a:lumOff val="60000"/>
-                  </a:srgbClr>
-                </a:solidFill>
-                <a:effectLst>
-                  <a:outerShdw blurRad="38100" dist="38100" dir="2700000" algn="tl">
-                    <a:srgbClr val="000000">
-                      <a:alpha val="43137"/>
-                    </a:srgbClr>
-                  </a:outerShdw>
-                </a:effectLst>
-                <a:latin typeface="Corbel"/>
-              </a:rPr>
-              <a:t>E-mail: </a:t>
-            </a:r>
-            <a:r>
-              <a:rPr lang="en-US" sz="3000" b="1" noProof="1" smtClean="0">
-                <a:solidFill>
-                  <a:srgbClr val="CCFF66">
-                    <a:lumMod val="40000"/>
-                    <a:lumOff val="60000"/>
-                  </a:srgbClr>
-                </a:solidFill>
-                <a:effectLst>
-                  <a:outerShdw blurRad="38100" dist="38100" dir="2700000" algn="tl">
-                    <a:srgbClr val="000000">
-                      <a:alpha val="43137"/>
-                    </a:srgbClr>
-                  </a:outerShdw>
-                </a:effectLst>
-                <a:latin typeface="Corbel"/>
-              </a:rPr>
-              <a:t>svetlin.ralchev </a:t>
-            </a:r>
-            <a:r>
-              <a:rPr lang="en-US" sz="3000" b="1" dirty="0" smtClean="0">
-                <a:solidFill>
-                  <a:srgbClr val="CCFF66">
-                    <a:lumMod val="40000"/>
-                    <a:lumOff val="60000"/>
-                  </a:srgbClr>
-                </a:solidFill>
-                <a:effectLst>
-                  <a:outerShdw blurRad="38100" dist="38100" dir="2700000" algn="tl">
-                    <a:srgbClr val="000000">
-                      <a:alpha val="43137"/>
-                    </a:srgbClr>
-                  </a:outerShdw>
-                </a:effectLst>
-                <a:latin typeface="Corbel"/>
-              </a:rPr>
-              <a:t>[at] telerik.com</a:t>
-            </a:r>
-          </a:p>
-          <a:p>
-            <a:pPr marL="630238" lvl="1" indent="-273050">
-              <a:lnSpc>
-                <a:spcPts val="4000"/>
-              </a:lnSpc>
-              <a:spcBef>
-                <a:spcPts val="600"/>
-              </a:spcBef>
-              <a:spcAft>
-                <a:spcPts val="600"/>
-              </a:spcAft>
-              <a:buClr>
-                <a:srgbClr val="8FD600"/>
-              </a:buClr>
-              <a:buFont typeface="Wingdings 2" pitchFamily="18" charset="2"/>
-              <a:buChar char=""/>
-            </a:pPr>
-            <a:r>
-              <a:rPr lang="en-US" sz="3000" b="1" noProof="1" smtClean="0">
-                <a:solidFill>
-                  <a:srgbClr val="CCFF66">
-                    <a:lumMod val="40000"/>
-                    <a:lumOff val="60000"/>
-                  </a:srgbClr>
-                </a:solidFill>
-                <a:effectLst>
-                  <a:outerShdw blurRad="38100" dist="38100" dir="2700000" algn="tl">
-                    <a:srgbClr val="000000">
-                      <a:alpha val="43137"/>
-                    </a:srgbClr>
-                  </a:outerShdw>
-                </a:effectLst>
-                <a:latin typeface="Corbel"/>
-              </a:rPr>
-              <a:t>Blog: </a:t>
-            </a:r>
-            <a:r>
-              <a:rPr lang="en-US" sz="3000" b="1" noProof="1" smtClean="0">
-                <a:solidFill>
-                  <a:srgbClr val="CCFF66">
-                    <a:lumMod val="40000"/>
-                    <a:lumOff val="60000"/>
-                  </a:srgbClr>
-                </a:solidFill>
-                <a:effectLst>
-                  <a:outerShdw blurRad="38100" dist="38100" dir="2700000" algn="tl">
-                    <a:srgbClr val="000000">
-                      <a:alpha val="43137"/>
-                    </a:srgbClr>
-                  </a:outerShdw>
-                </a:effectLst>
-                <a:latin typeface="Corbel"/>
-                <a:hlinkClick r:id="rId3"/>
-              </a:rPr>
-              <a:t>http://blog.ralch.com</a:t>
-            </a:r>
-            <a:endParaRPr lang="en-US" sz="3000" b="1" dirty="0">
-              <a:solidFill>
-                <a:srgbClr val="CCFF66">
-                  <a:lumMod val="40000"/>
-                  <a:lumOff val="60000"/>
-                </a:srgbClr>
-              </a:solidFill>
-              <a:effectLst>
-                <a:outerShdw blurRad="38100" dist="38100" dir="2700000" algn="tl">
-                  <a:srgbClr val="000000">
-                    <a:alpha val="43137"/>
-                  </a:srgbClr>
-                </a:outerShdw>
-              </a:effectLst>
-              <a:latin typeface="Corbel"/>
-            </a:endParaRPr>
-          </a:p>
-        </p:txBody>
-      </p:sp>
-      <p:pic>
-        <p:nvPicPr>
-          <p:cNvPr id="6" name="Picture 4" descr="C:\Users\9680\Desktop\SvetlinRalchev.jpg"/>
-          <p:cNvPicPr>
-            <a:picLocks noChangeAspect="1" noChangeArrowheads="1"/>
-          </p:cNvPicPr>
-          <p:nvPr/>
-        </p:nvPicPr>
-        <p:blipFill>
-          <a:blip r:embed="rId4" cstate="print">
-            <a:lum bright="20000" contrast="30000"/>
-          </a:blip>
-          <a:srcRect/>
-          <a:stretch>
-            <a:fillRect/>
-          </a:stretch>
-        </p:blipFill>
-        <p:spPr bwMode="auto">
-          <a:xfrm>
-            <a:off x="6826100" y="1219199"/>
-            <a:ext cx="1499193" cy="2007073"/>
-          </a:xfrm>
-          <a:prstGeom prst="rect">
-            <a:avLst/>
-          </a:prstGeom>
-          <a:noFill/>
-          <a:ln w="3175">
-            <a:solidFill>
-              <a:schemeClr val="accent5">
-                <a:lumMod val="75000"/>
-              </a:schemeClr>
-            </a:solidFill>
-            <a:miter lim="800000"/>
-            <a:headEnd/>
-            <a:tailEnd/>
-          </a:ln>
-        </p:spPr>
-      </p:pic>
-    </p:spTree>
-  </p:cSld>
-  <p:clrMapOvr>
-    <a:masterClrMapping/>
-  </p:clrMapOvr>
-  <p:timing>
-    <p:tnLst>
-      <p:par>
-        <p:cTn id="1" dur="indefinite" restart="never" nodeType="tmRoot"/>
-      </p:par>
-    </p:tnLst>
-  </p:timing>
-</p:sld>
-</file>
-
-<file path=ppt/slides/slide17.xml><?xml version="1.0" encoding="utf-8"?>
-<p:sld xmlns:a="http://schemas.openxmlformats.org/drawingml/2006/main" xmlns:r="http://schemas.openxmlformats.org/officeDocument/2006/relationships" xmlns:p="http://schemas.openxmlformats.org/presentationml/2006/main">
-  <p:cSld>
-    <p:spTree>
-      <p:nvGrpSpPr>
-        <p:cNvPr id="1" name=""/>
-        <p:cNvGrpSpPr/>
-        <p:nvPr/>
-      </p:nvGrpSpPr>
-      <p:grpSpPr>
-        <a:xfrm>
-          <a:off x="0" y="0"/>
-          <a:ext cx="0" cy="0"/>
-          <a:chOff x="0" y="0"/>
-          <a:chExt cx="0" cy="0"/>
-        </a:xfrm>
-      </p:grpSpPr>
-      <p:sp>
-        <p:nvSpPr>
-          <p:cNvPr id="4" name="Title 3"/>
-          <p:cNvSpPr>
-            <a:spLocks noGrp="1"/>
-          </p:cNvSpPr>
-          <p:nvPr>
-            <p:ph type="title"/>
-          </p:nvPr>
-        </p:nvSpPr>
-        <p:spPr/>
-        <p:txBody>
-          <a:bodyPr/>
-          <a:lstStyle/>
-          <a:p>
-            <a:r>
-              <a:rPr lang="en-US" dirty="0" smtClean="0"/>
-              <a:t>Trainers Team (7)</a:t>
-            </a:r>
-            <a:endParaRPr lang="en-US" dirty="0"/>
-          </a:p>
-        </p:txBody>
-      </p:sp>
-      <p:sp>
-        <p:nvSpPr>
-          <p:cNvPr id="5" name="Content Placeholder 4"/>
-          <p:cNvSpPr>
-            <a:spLocks noGrp="1"/>
-          </p:cNvSpPr>
-          <p:nvPr>
-            <p:ph idx="1"/>
-          </p:nvPr>
-        </p:nvSpPr>
-        <p:spPr>
-          <a:xfrm>
-            <a:off x="228600" y="1066800"/>
-            <a:ext cx="6477000" cy="2438400"/>
-          </a:xfrm>
-        </p:spPr>
-        <p:txBody>
-          <a:bodyPr/>
-          <a:lstStyle/>
-          <a:p>
-            <a:pPr>
-              <a:lnSpc>
-                <a:spcPts val="4000"/>
-              </a:lnSpc>
-            </a:pPr>
-            <a:r>
-              <a:rPr lang="en-US" dirty="0" smtClean="0"/>
-              <a:t>Ivaylo Hristov</a:t>
-            </a:r>
-          </a:p>
-          <a:p>
-            <a:pPr lvl="1">
-              <a:lnSpc>
-                <a:spcPts val="4000"/>
-              </a:lnSpc>
-            </a:pPr>
-            <a:r>
-              <a:rPr lang="en-US" dirty="0" smtClean="0"/>
-              <a:t>Managing partner, 		 Komfo Bulgaria,		 </a:t>
-            </a:r>
-            <a:r>
-              <a:rPr lang="en-US" dirty="0" smtClean="0">
-                <a:hlinkClick r:id="rId2"/>
-              </a:rPr>
-              <a:t>www.komfo.bg</a:t>
-            </a:r>
-            <a:endParaRPr lang="en-US" dirty="0" smtClean="0"/>
-          </a:p>
-        </p:txBody>
-      </p:sp>
-      <p:sp>
-        <p:nvSpPr>
-          <p:cNvPr id="7" name="Slide Number Placeholder 3"/>
-          <p:cNvSpPr>
-            <a:spLocks noGrp="1"/>
-          </p:cNvSpPr>
-          <p:nvPr>
-            <p:ph type="sldNum" sz="quarter" idx="10"/>
-          </p:nvPr>
-        </p:nvSpPr>
-        <p:spPr/>
-        <p:txBody>
-          <a:bodyPr/>
-          <a:lstStyle/>
-          <a:p>
-            <a:pPr>
-              <a:defRPr/>
-            </a:pPr>
-            <a:fld id="{58452FF4-89E3-4D1B-9927-2DBDC00E58D7}" type="slidenum">
-              <a:rPr lang="en-US" smtClean="0"/>
-              <a:pPr>
-                <a:defRPr/>
-              </a:pPr>
-              <a:t>17</a:t>
-            </a:fld>
-            <a:endParaRPr lang="en-US" dirty="0"/>
-          </a:p>
-        </p:txBody>
-      </p:sp>
-      <p:sp>
-        <p:nvSpPr>
-          <p:cNvPr id="8" name="Rectangle 7"/>
-          <p:cNvSpPr/>
-          <p:nvPr/>
-        </p:nvSpPr>
-        <p:spPr>
-          <a:xfrm>
-            <a:off x="228600" y="3429000"/>
-            <a:ext cx="8610600" cy="1272143"/>
-          </a:xfrm>
-          <a:prstGeom prst="rect">
-            <a:avLst/>
-          </a:prstGeom>
-        </p:spPr>
-        <p:txBody>
-          <a:bodyPr wrap="square">
-            <a:spAutoFit/>
-          </a:bodyPr>
-          <a:lstStyle/>
-          <a:p>
-            <a:pPr marL="630238" lvl="1" indent="-273050">
-              <a:lnSpc>
-                <a:spcPts val="4000"/>
-              </a:lnSpc>
-              <a:spcBef>
-                <a:spcPts val="600"/>
-              </a:spcBef>
-              <a:spcAft>
-                <a:spcPts val="600"/>
-              </a:spcAft>
-              <a:buClr>
-                <a:srgbClr val="8FD600"/>
-              </a:buClr>
-              <a:buFont typeface="Wingdings 2" pitchFamily="18" charset="2"/>
-              <a:buChar char=""/>
-            </a:pPr>
-            <a:r>
-              <a:rPr lang="en-US" sz="3000" b="1" dirty="0" smtClean="0">
-                <a:solidFill>
-                  <a:srgbClr val="CCFF66">
-                    <a:lumMod val="40000"/>
-                    <a:lumOff val="60000"/>
-                  </a:srgbClr>
-                </a:solidFill>
-                <a:effectLst>
-                  <a:outerShdw blurRad="38100" dist="38100" dir="2700000" algn="tl">
-                    <a:srgbClr val="000000">
-                      <a:alpha val="43137"/>
-                    </a:srgbClr>
-                  </a:outerShdw>
-                </a:effectLst>
-                <a:latin typeface="Corbel"/>
-              </a:rPr>
-              <a:t>E-mail: </a:t>
-            </a:r>
-            <a:r>
-              <a:rPr lang="en-US" sz="3000" b="1" noProof="1" smtClean="0">
-                <a:solidFill>
-                  <a:srgbClr val="CCFF66">
-                    <a:lumMod val="40000"/>
-                    <a:lumOff val="60000"/>
-                  </a:srgbClr>
-                </a:solidFill>
-                <a:effectLst>
-                  <a:outerShdw blurRad="38100" dist="38100" dir="2700000" algn="tl">
-                    <a:srgbClr val="000000">
-                      <a:alpha val="43137"/>
-                    </a:srgbClr>
-                  </a:outerShdw>
-                </a:effectLst>
-                <a:latin typeface="Corbel"/>
-              </a:rPr>
-              <a:t>mail </a:t>
-            </a:r>
-            <a:r>
-              <a:rPr lang="en-US" sz="3000" b="1" dirty="0" smtClean="0">
-                <a:solidFill>
-                  <a:srgbClr val="CCFF66">
-                    <a:lumMod val="40000"/>
-                    <a:lumOff val="60000"/>
-                  </a:srgbClr>
-                </a:solidFill>
-                <a:effectLst>
-                  <a:outerShdw blurRad="38100" dist="38100" dir="2700000" algn="tl">
-                    <a:srgbClr val="000000">
-                      <a:alpha val="43137"/>
-                    </a:srgbClr>
-                  </a:outerShdw>
-                </a:effectLst>
-                <a:latin typeface="Corbel"/>
-              </a:rPr>
-              <a:t>[at] ivaylo-hristov.net</a:t>
-            </a:r>
-          </a:p>
-          <a:p>
-            <a:pPr marL="630238" lvl="1" indent="-273050">
-              <a:lnSpc>
-                <a:spcPts val="4000"/>
-              </a:lnSpc>
-              <a:spcBef>
-                <a:spcPts val="600"/>
-              </a:spcBef>
-              <a:spcAft>
-                <a:spcPts val="600"/>
-              </a:spcAft>
-              <a:buClr>
-                <a:srgbClr val="8FD600"/>
-              </a:buClr>
-              <a:buFont typeface="Wingdings 2" pitchFamily="18" charset="2"/>
-              <a:buChar char=""/>
-            </a:pPr>
-            <a:r>
-              <a:rPr lang="en-US" sz="3000" b="1" noProof="1" smtClean="0">
-                <a:solidFill>
-                  <a:srgbClr val="CCFF66">
-                    <a:lumMod val="40000"/>
-                    <a:lumOff val="60000"/>
-                  </a:srgbClr>
-                </a:solidFill>
-                <a:effectLst>
-                  <a:outerShdw blurRad="38100" dist="38100" dir="2700000" algn="tl">
-                    <a:srgbClr val="000000">
-                      <a:alpha val="43137"/>
-                    </a:srgbClr>
-                  </a:outerShdw>
-                </a:effectLst>
-                <a:latin typeface="Corbel"/>
-              </a:rPr>
-              <a:t>Blog: </a:t>
-            </a:r>
-            <a:r>
-              <a:rPr lang="en-US" sz="3000" b="1" noProof="1" smtClean="0">
-                <a:solidFill>
-                  <a:srgbClr val="CCFF66">
-                    <a:lumMod val="40000"/>
-                    <a:lumOff val="60000"/>
-                  </a:srgbClr>
-                </a:solidFill>
-                <a:effectLst>
-                  <a:outerShdw blurRad="38100" dist="38100" dir="2700000" algn="tl">
-                    <a:srgbClr val="000000">
-                      <a:alpha val="43137"/>
-                    </a:srgbClr>
-                  </a:outerShdw>
-                </a:effectLst>
-                <a:latin typeface="Corbel"/>
-                <a:hlinkClick r:id="rId3"/>
-              </a:rPr>
-              <a:t>http://ivaylo-hristov.net</a:t>
-            </a:r>
-            <a:endParaRPr lang="en-US" sz="3000" b="1" dirty="0">
-              <a:solidFill>
-                <a:srgbClr val="CCFF66">
-                  <a:lumMod val="40000"/>
-                  <a:lumOff val="60000"/>
-                </a:srgbClr>
-              </a:solidFill>
-              <a:effectLst>
-                <a:outerShdw blurRad="38100" dist="38100" dir="2700000" algn="tl">
-                  <a:srgbClr val="000000">
-                    <a:alpha val="43137"/>
-                  </a:srgbClr>
-                </a:outerShdw>
-              </a:effectLst>
-              <a:latin typeface="Corbel"/>
-            </a:endParaRPr>
-          </a:p>
-        </p:txBody>
-      </p:sp>
-      <p:pic>
-        <p:nvPicPr>
-          <p:cNvPr id="6" name="Picture 4" descr="Ivaylo-Hristov"/>
-          <p:cNvPicPr>
-            <a:picLocks noChangeAspect="1" noChangeArrowheads="1"/>
-          </p:cNvPicPr>
-          <p:nvPr/>
-        </p:nvPicPr>
-        <p:blipFill>
-          <a:blip r:embed="rId4" cstate="print">
-            <a:lum bright="-10000" contrast="20000"/>
-          </a:blip>
-          <a:srcRect/>
-          <a:stretch>
-            <a:fillRect/>
-          </a:stretch>
-        </p:blipFill>
-        <p:spPr bwMode="auto">
-          <a:xfrm>
-            <a:off x="6814658" y="1219200"/>
-            <a:ext cx="1619250" cy="2036763"/>
-          </a:xfrm>
-          <a:prstGeom prst="rect">
-            <a:avLst/>
-          </a:prstGeom>
-          <a:noFill/>
-          <a:ln w="3175">
-            <a:solidFill>
-              <a:schemeClr val="accent5">
-                <a:lumMod val="75000"/>
-              </a:schemeClr>
-            </a:solidFill>
-            <a:miter lim="800000"/>
-            <a:headEnd/>
-            <a:tailEnd/>
-          </a:ln>
-        </p:spPr>
-      </p:pic>
-    </p:spTree>
-  </p:cSld>
-  <p:clrMapOvr>
-    <a:masterClrMapping/>
-  </p:clrMapOvr>
-  <p:timing>
-    <p:tnLst>
-      <p:par>
-        <p:cTn id="1" dur="indefinite" restart="never" nodeType="tmRoot"/>
-      </p:par>
-    </p:tnLst>
-  </p:timing>
-</p:sld>
-</file>
-
-<file path=ppt/slides/slide18.xml><?xml version="1.0" encoding="utf-8"?>
+<file path=ppt/slides/slide13.xml><?xml version="1.0" encoding="utf-8"?>
 <p:sld xmlns:a="http://schemas.openxmlformats.org/drawingml/2006/main" xmlns:r="http://schemas.openxmlformats.org/officeDocument/2006/relationships" xmlns:p="http://schemas.openxmlformats.org/presentationml/2006/main">
   <p:cSld>
     <p:spTree>
@@ -8409,7 +6680,7 @@
 </p:sld>
 </file>
 
-<file path=ppt/slides/slide19.xml><?xml version="1.0" encoding="utf-8"?>
+<file path=ppt/slides/slide14.xml><?xml version="1.0" encoding="utf-8"?>
 <p:sld xmlns:a="http://schemas.openxmlformats.org/drawingml/2006/main" xmlns:r="http://schemas.openxmlformats.org/officeDocument/2006/relationships" xmlns:p="http://schemas.openxmlformats.org/presentationml/2006/main">
   <p:cSld>
     <p:spTree>
@@ -8577,7 +6848,7 @@
               <a:pPr>
                 <a:defRPr/>
               </a:pPr>
-              <a:t>19</a:t>
+              <a:t>14</a:t>
             </a:fld>
             <a:endParaRPr lang="en-US" dirty="0"/>
           </a:p>
@@ -8634,7 +6905,7 @@
 </p:sld>
 </file>
 
-<file path=ppt/slides/slide2.xml><?xml version="1.0" encoding="utf-8"?>
+<file path=ppt/slides/slide15.xml><?xml version="1.0" encoding="utf-8"?>
 <p:sld xmlns:a="http://schemas.openxmlformats.org/drawingml/2006/main" xmlns:r="http://schemas.openxmlformats.org/officeDocument/2006/relationships" xmlns:p="http://schemas.openxmlformats.org/presentationml/2006/main">
   <p:cSld>
     <p:spTree>
@@ -8668,201 +6939,6 @@
           <a:p>
             <a:r>
               <a:rPr lang="en-US" dirty="0" smtClean="0"/>
-              <a:t>About the Course</a:t>
-            </a:r>
-            <a:endParaRPr lang="en-US" dirty="0"/>
-          </a:p>
-        </p:txBody>
-      </p:sp>
-      <p:sp>
-        <p:nvSpPr>
-          <p:cNvPr id="3" name="Content Placeholder 2"/>
-          <p:cNvSpPr>
-            <a:spLocks noGrp="1"/>
-          </p:cNvSpPr>
-          <p:nvPr>
-            <p:ph idx="1"/>
-          </p:nvPr>
-        </p:nvSpPr>
-        <p:spPr/>
-        <p:txBody>
-          <a:bodyPr/>
-          <a:lstStyle/>
-          <a:p>
-            <a:pPr>
-              <a:lnSpc>
-                <a:spcPct val="120000"/>
-              </a:lnSpc>
-            </a:pPr>
-            <a:r>
-              <a:rPr lang="en-US" sz="3000" dirty="0" smtClean="0"/>
-              <a:t>Web Applications Development with .NET Framework and ASP.NET objectives</a:t>
-            </a:r>
-          </a:p>
-          <a:p>
-            <a:pPr lvl="1">
-              <a:lnSpc>
-                <a:spcPct val="120000"/>
-              </a:lnSpc>
-            </a:pPr>
-            <a:r>
-              <a:rPr lang="en-US" sz="2800" dirty="0" smtClean="0"/>
-              <a:t>Provides basic skills for development of dynamic data-driven ASP.NET Web applications</a:t>
-            </a:r>
-          </a:p>
-          <a:p>
-            <a:pPr lvl="1">
-              <a:lnSpc>
-                <a:spcPct val="120000"/>
-              </a:lnSpc>
-            </a:pPr>
-            <a:r>
-              <a:rPr lang="en-US" sz="2800" dirty="0" smtClean="0"/>
-              <a:t>C# language fundamentals</a:t>
-            </a:r>
-          </a:p>
-          <a:p>
-            <a:pPr lvl="1">
-              <a:lnSpc>
-                <a:spcPct val="120000"/>
-              </a:lnSpc>
-            </a:pPr>
-            <a:r>
-              <a:rPr lang="en-US" sz="2800" dirty="0" smtClean="0"/>
-              <a:t>Databases and SQL Server</a:t>
-            </a:r>
-          </a:p>
-          <a:p>
-            <a:pPr lvl="1">
-              <a:lnSpc>
-                <a:spcPct val="120000"/>
-              </a:lnSpc>
-            </a:pPr>
-            <a:r>
-              <a:rPr lang="en-US" sz="2800" dirty="0" smtClean="0"/>
-              <a:t>LINQ and LINQ-to-SQL</a:t>
-            </a:r>
-          </a:p>
-          <a:p>
-            <a:pPr lvl="1">
-              <a:lnSpc>
-                <a:spcPct val="120000"/>
-              </a:lnSpc>
-            </a:pPr>
-            <a:r>
-              <a:rPr lang="en-US" sz="2800" dirty="0" smtClean="0"/>
-              <a:t>ASP.NET and AJAX</a:t>
-            </a:r>
-            <a:endParaRPr lang="en-US" sz="2800" dirty="0" smtClean="0"/>
-          </a:p>
-        </p:txBody>
-      </p:sp>
-      <p:sp>
-        <p:nvSpPr>
-          <p:cNvPr id="4" name="Slide Number Placeholder 3"/>
-          <p:cNvSpPr>
-            <a:spLocks noGrp="1"/>
-          </p:cNvSpPr>
-          <p:nvPr>
-            <p:ph type="sldNum" sz="quarter" idx="10"/>
-          </p:nvPr>
-        </p:nvSpPr>
-        <p:spPr/>
-        <p:txBody>
-          <a:bodyPr/>
-          <a:lstStyle/>
-          <a:p>
-            <a:pPr>
-              <a:defRPr/>
-            </a:pPr>
-            <a:fld id="{58452FF4-89E3-4D1B-9927-2DBDC00E58D7}" type="slidenum">
-              <a:rPr lang="en-US" smtClean="0"/>
-              <a:pPr>
-                <a:defRPr/>
-              </a:pPr>
-              <a:t>2</a:t>
-            </a:fld>
-            <a:endParaRPr lang="en-US" dirty="0"/>
-          </a:p>
-        </p:txBody>
-      </p:sp>
-      <p:pic>
-        <p:nvPicPr>
-          <p:cNvPr id="25604" name="Picture 4" descr="http://www.artegraficas.com.br/img/web_sites/web_sites.jpg"/>
-          <p:cNvPicPr>
-            <a:picLocks noChangeAspect="1" noChangeArrowheads="1"/>
-          </p:cNvPicPr>
-          <p:nvPr/>
-        </p:nvPicPr>
-        <p:blipFill>
-          <a:blip r:embed="rId2" cstate="print"/>
-          <a:srcRect t="5517" b="3448"/>
-          <a:stretch>
-            <a:fillRect/>
-          </a:stretch>
-        </p:blipFill>
-        <p:spPr bwMode="auto">
-          <a:xfrm>
-            <a:off x="5562600" y="3886200"/>
-            <a:ext cx="2950185" cy="2362200"/>
-          </a:xfrm>
-          <a:prstGeom prst="roundRect">
-            <a:avLst>
-              <a:gd name="adj" fmla="val 8046"/>
-            </a:avLst>
-          </a:prstGeom>
-          <a:noFill/>
-        </p:spPr>
-      </p:pic>
-    </p:spTree>
-  </p:cSld>
-  <p:clrMapOvr>
-    <a:masterClrMapping/>
-  </p:clrMapOvr>
-  <p:timing>
-    <p:tnLst>
-      <p:par>
-        <p:cTn id="1" dur="indefinite" restart="never" nodeType="tmRoot"/>
-      </p:par>
-    </p:tnLst>
-  </p:timing>
-</p:sld>
-</file>
-
-<file path=ppt/slides/slide20.xml><?xml version="1.0" encoding="utf-8"?>
-<p:sld xmlns:a="http://schemas.openxmlformats.org/drawingml/2006/main" xmlns:r="http://schemas.openxmlformats.org/officeDocument/2006/relationships" xmlns:p="http://schemas.openxmlformats.org/presentationml/2006/main">
-  <p:cSld>
-    <p:spTree>
-      <p:nvGrpSpPr>
-        <p:cNvPr id="1" name=""/>
-        <p:cNvGrpSpPr/>
-        <p:nvPr/>
-      </p:nvGrpSpPr>
-      <p:grpSpPr>
-        <a:xfrm>
-          <a:off x="0" y="0"/>
-          <a:ext cx="0" cy="0"/>
-          <a:chOff x="0" y="0"/>
-          <a:chExt cx="0" cy="0"/>
-        </a:xfrm>
-      </p:grpSpPr>
-      <p:sp>
-        <p:nvSpPr>
-          <p:cNvPr id="2" name="Title 1"/>
-          <p:cNvSpPr>
-            <a:spLocks noGrp="1"/>
-          </p:cNvSpPr>
-          <p:nvPr>
-            <p:ph type="title"/>
-          </p:nvPr>
-        </p:nvSpPr>
-        <p:spPr/>
-        <p:txBody>
-          <a:bodyPr/>
-          <a:lstStyle/>
-          <a:p>
-            <a:r>
-              <a:rPr lang="en-US" dirty="0" smtClean="0"/>
               <a:t>Assessment (2)</a:t>
             </a:r>
             <a:endParaRPr lang="en-US" dirty="0"/>
@@ -8983,7 +7059,7 @@
               <a:pPr>
                 <a:defRPr/>
               </a:pPr>
-              <a:t>20</a:t>
+              <a:t>15</a:t>
             </a:fld>
             <a:endParaRPr lang="en-US" dirty="0"/>
           </a:p>
@@ -10427,7 +8503,7 @@
 </p:sld>
 </file>
 
-<file path=ppt/slides/slide21.xml><?xml version="1.0" encoding="utf-8"?>
+<file path=ppt/slides/slide16.xml><?xml version="1.0" encoding="utf-8"?>
 <p:sld xmlns:a="http://schemas.openxmlformats.org/drawingml/2006/main" xmlns:r="http://schemas.openxmlformats.org/officeDocument/2006/relationships" xmlns:p="http://schemas.openxmlformats.org/presentationml/2006/main">
   <p:cSld>
     <p:spTree>
@@ -10616,7 +8692,7 @@
               <a:pPr>
                 <a:defRPr/>
               </a:pPr>
-              <a:t>21</a:t>
+              <a:t>16</a:t>
             </a:fld>
             <a:endParaRPr lang="en-US" dirty="0"/>
           </a:p>
@@ -10757,7 +8833,7 @@
 </p:sld>
 </file>
 
-<file path=ppt/slides/slide22.xml><?xml version="1.0" encoding="utf-8"?>
+<file path=ppt/slides/slide17.xml><?xml version="1.0" encoding="utf-8"?>
 <p:sld xmlns:a="http://schemas.openxmlformats.org/drawingml/2006/main" xmlns:r="http://schemas.openxmlformats.org/officeDocument/2006/relationships" xmlns:p="http://schemas.openxmlformats.org/presentationml/2006/main">
   <p:cSld>
     <p:spTree>
@@ -10857,7 +8933,7 @@
 </p:sld>
 </file>
 
-<file path=ppt/slides/slide23.xml><?xml version="1.0" encoding="utf-8"?>
+<file path=ppt/slides/slide18.xml><?xml version="1.0" encoding="utf-8"?>
 <p:sld xmlns:a="http://schemas.openxmlformats.org/drawingml/2006/main" xmlns:r="http://schemas.openxmlformats.org/officeDocument/2006/relationships" xmlns:p="http://schemas.openxmlformats.org/presentationml/2006/main">
   <p:cSld>
     <p:spTree>
@@ -11059,7 +9135,7 @@
               <a:pPr>
                 <a:defRPr/>
               </a:pPr>
-              <a:t>23</a:t>
+              <a:t>18</a:t>
             </a:fld>
             <a:endParaRPr lang="en-US" dirty="0"/>
           </a:p>
@@ -11221,7 +9297,7 @@
 </p:sld>
 </file>
 
-<file path=ppt/slides/slide24.xml><?xml version="1.0" encoding="utf-8"?>
+<file path=ppt/slides/slide19.xml><?xml version="1.0" encoding="utf-8"?>
 <p:sld xmlns:a="http://schemas.openxmlformats.org/drawingml/2006/main" xmlns:r="http://schemas.openxmlformats.org/officeDocument/2006/relationships" xmlns:p="http://schemas.openxmlformats.org/presentationml/2006/main">
   <p:cSld>
     <p:spTree>
@@ -11964,6 +10040,201 @@
     <a:masterClrMapping/>
   </p:clrMapOvr>
   <p:transition/>
+  <p:timing>
+    <p:tnLst>
+      <p:par>
+        <p:cTn id="1" dur="indefinite" restart="never" nodeType="tmRoot"/>
+      </p:par>
+    </p:tnLst>
+  </p:timing>
+</p:sld>
+</file>
+
+<file path=ppt/slides/slide2.xml><?xml version="1.0" encoding="utf-8"?>
+<p:sld xmlns:a="http://schemas.openxmlformats.org/drawingml/2006/main" xmlns:r="http://schemas.openxmlformats.org/officeDocument/2006/relationships" xmlns:p="http://schemas.openxmlformats.org/presentationml/2006/main">
+  <p:cSld>
+    <p:spTree>
+      <p:nvGrpSpPr>
+        <p:cNvPr id="1" name=""/>
+        <p:cNvGrpSpPr/>
+        <p:nvPr/>
+      </p:nvGrpSpPr>
+      <p:grpSpPr>
+        <a:xfrm>
+          <a:off x="0" y="0"/>
+          <a:ext cx="0" cy="0"/>
+          <a:chOff x="0" y="0"/>
+          <a:chExt cx="0" cy="0"/>
+        </a:xfrm>
+      </p:grpSpPr>
+      <p:sp>
+        <p:nvSpPr>
+          <p:cNvPr id="2" name="Title 1"/>
+          <p:cNvSpPr>
+            <a:spLocks noGrp="1"/>
+          </p:cNvSpPr>
+          <p:nvPr>
+            <p:ph type="title"/>
+          </p:nvPr>
+        </p:nvSpPr>
+        <p:spPr/>
+        <p:txBody>
+          <a:bodyPr/>
+          <a:lstStyle/>
+          <a:p>
+            <a:r>
+              <a:rPr lang="en-US" dirty="0" smtClean="0"/>
+              <a:t>About the Course</a:t>
+            </a:r>
+            <a:endParaRPr lang="en-US" dirty="0"/>
+          </a:p>
+        </p:txBody>
+      </p:sp>
+      <p:sp>
+        <p:nvSpPr>
+          <p:cNvPr id="3" name="Content Placeholder 2"/>
+          <p:cNvSpPr>
+            <a:spLocks noGrp="1"/>
+          </p:cNvSpPr>
+          <p:nvPr>
+            <p:ph idx="1"/>
+          </p:nvPr>
+        </p:nvSpPr>
+        <p:spPr/>
+        <p:txBody>
+          <a:bodyPr/>
+          <a:lstStyle/>
+          <a:p>
+            <a:pPr>
+              <a:lnSpc>
+                <a:spcPct val="120000"/>
+              </a:lnSpc>
+            </a:pPr>
+            <a:r>
+              <a:rPr lang="en-US" sz="3000" dirty="0" smtClean="0"/>
+              <a:t>Web Applications Development with .NET Framework and ASP.NET objectives</a:t>
+            </a:r>
+          </a:p>
+          <a:p>
+            <a:pPr lvl="1">
+              <a:lnSpc>
+                <a:spcPct val="120000"/>
+              </a:lnSpc>
+            </a:pPr>
+            <a:r>
+              <a:rPr lang="en-US" sz="2800" dirty="0" smtClean="0"/>
+              <a:t>Provides basic skills for development of dynamic data-driven ASP.NET Web applications</a:t>
+            </a:r>
+          </a:p>
+          <a:p>
+            <a:pPr lvl="1">
+              <a:lnSpc>
+                <a:spcPct val="120000"/>
+              </a:lnSpc>
+            </a:pPr>
+            <a:r>
+              <a:rPr lang="en-US" sz="2800" dirty="0" smtClean="0"/>
+              <a:t>C# language fundamentals</a:t>
+            </a:r>
+          </a:p>
+          <a:p>
+            <a:pPr lvl="1">
+              <a:lnSpc>
+                <a:spcPct val="120000"/>
+              </a:lnSpc>
+            </a:pPr>
+            <a:r>
+              <a:rPr lang="en-US" sz="2800" dirty="0" smtClean="0"/>
+              <a:t>Databases and SQL Server</a:t>
+            </a:r>
+          </a:p>
+          <a:p>
+            <a:pPr lvl="1">
+              <a:lnSpc>
+                <a:spcPct val="120000"/>
+              </a:lnSpc>
+            </a:pPr>
+            <a:r>
+              <a:rPr lang="en-US" sz="2800" dirty="0" smtClean="0"/>
+              <a:t>LINQ and LINQ-to-SQL</a:t>
+            </a:r>
+          </a:p>
+          <a:p>
+            <a:pPr lvl="1">
+              <a:lnSpc>
+                <a:spcPct val="120000"/>
+              </a:lnSpc>
+            </a:pPr>
+            <a:r>
+              <a:rPr lang="en-US" sz="2800" dirty="0" smtClean="0"/>
+              <a:t>ASP.NET and AJAX</a:t>
+            </a:r>
+            <a:endParaRPr lang="en-US" sz="2800" dirty="0" smtClean="0"/>
+          </a:p>
+        </p:txBody>
+      </p:sp>
+      <p:sp>
+        <p:nvSpPr>
+          <p:cNvPr id="4" name="Slide Number Placeholder 3"/>
+          <p:cNvSpPr>
+            <a:spLocks noGrp="1"/>
+          </p:cNvSpPr>
+          <p:nvPr>
+            <p:ph type="sldNum" sz="quarter" idx="10"/>
+          </p:nvPr>
+        </p:nvSpPr>
+        <p:spPr/>
+        <p:txBody>
+          <a:bodyPr/>
+          <a:lstStyle/>
+          <a:p>
+            <a:pPr>
+              <a:defRPr/>
+            </a:pPr>
+            <a:fld id="{58452FF4-89E3-4D1B-9927-2DBDC00E58D7}" type="slidenum">
+              <a:rPr lang="en-US" smtClean="0"/>
+              <a:pPr>
+                <a:defRPr/>
+              </a:pPr>
+              <a:t>2</a:t>
+            </a:fld>
+            <a:endParaRPr lang="en-US" dirty="0"/>
+          </a:p>
+        </p:txBody>
+      </p:sp>
+      <p:pic>
+        <p:nvPicPr>
+          <p:cNvPr id="25604" name="Picture 4" descr="http://www.artegraficas.com.br/img/web_sites/web_sites.jpg"/>
+          <p:cNvPicPr>
+            <a:picLocks noChangeAspect="1" noChangeArrowheads="1"/>
+          </p:cNvPicPr>
+          <p:nvPr/>
+        </p:nvPicPr>
+        <p:blipFill>
+          <a:blip r:embed="rId2" cstate="print"/>
+          <a:srcRect t="5517" b="3448"/>
+          <a:stretch>
+            <a:fillRect/>
+          </a:stretch>
+        </p:blipFill>
+        <p:spPr bwMode="auto">
+          <a:xfrm>
+            <a:off x="5562600" y="3886200"/>
+            <a:ext cx="2950185" cy="2362200"/>
+          </a:xfrm>
+          <a:prstGeom prst="roundRect">
+            <a:avLst>
+              <a:gd name="adj" fmla="val 8046"/>
+            </a:avLst>
+          </a:prstGeom>
+          <a:noFill/>
+        </p:spPr>
+      </p:pic>
+    </p:spTree>
+  </p:cSld>
+  <p:clrMapOvr>
+    <a:masterClrMapping/>
+  </p:clrMapOvr>
   <p:timing>
     <p:tnLst>
       <p:par>
@@ -12831,7 +11102,11 @@
             </a:pPr>
             <a:r>
               <a:rPr lang="en-US" sz="2600" dirty="0" smtClean="0"/>
-              <a:t>RDBMS, SQL Language, SQL SELECT, Joins, Grouping, SQL INSERT, SQL UPDATE, SQL DELETE, MS SQL Server, SQL Server Management Studio </a:t>
+              <a:t>RDBMS, </a:t>
+            </a:r>
+            <a:r>
+              <a:rPr lang="en-US" sz="2600" dirty="0" smtClean="0"/>
+              <a:t>SQL Language, SQL SELECT, Joins, Grouping, SQL INSERT, SQL UPDATE, SQL DELETE, MS SQL Server, SQL Server Management Studio </a:t>
             </a:r>
           </a:p>
           <a:p>
@@ -13014,9 +11289,12 @@
               <a:tabLst/>
             </a:pPr>
             <a:r>
-              <a:rPr lang="en-US" sz="2800" dirty="0" smtClean="0"/>
-              <a:t>ASP.NET – Part I</a:t>
-            </a:r>
+              <a:rPr lang="en-US" sz="2800" dirty="0">
+                <a:effectLst/>
+              </a:rPr>
+              <a:t>ASP.NET Basics</a:t>
+            </a:r>
+            <a:endParaRPr lang="en-US" sz="2800" dirty="0" smtClean="0"/>
           </a:p>
           <a:p>
             <a:pPr marL="714375" lvl="1" indent="-366713">
@@ -13045,9 +11323,12 @@
               <a:tabLst/>
             </a:pPr>
             <a:r>
-              <a:rPr lang="en-US" sz="2800" dirty="0" smtClean="0"/>
-              <a:t>ASP.NET – Part II</a:t>
-            </a:r>
+              <a:rPr lang="en-US" sz="2800" dirty="0">
+                <a:effectLst/>
+              </a:rPr>
+              <a:t>ASP.NET Data Binding</a:t>
+            </a:r>
+            <a:endParaRPr lang="en-US" sz="2800" dirty="0" smtClean="0"/>
           </a:p>
           <a:p>
             <a:pPr marL="714375" lvl="1" indent="-366713">
@@ -13060,7 +11341,11 @@
             </a:pPr>
             <a:r>
               <a:rPr lang="en-US" sz="2600" dirty="0" smtClean="0"/>
-              <a:t>Data-Bound Controls: Data Sources, </a:t>
+              <a:t>Data-Bound </a:t>
+            </a:r>
+            <a:r>
+              <a:rPr lang="en-US" sz="2600" dirty="0" smtClean="0"/>
+              <a:t>Controls: Data Sources, </a:t>
             </a:r>
             <a:r>
               <a:rPr lang="en-US" sz="2600" noProof="1" smtClean="0"/>
@@ -13080,8 +11365,10 @@
               <a:tabLst/>
             </a:pPr>
             <a:r>
-              <a:rPr lang="en-US" sz="2800" dirty="0" smtClean="0"/>
-              <a:t>ASP.NET – Part III</a:t>
+              <a:rPr lang="en-US" sz="2800" dirty="0">
+                <a:effectLst/>
+              </a:rPr>
+              <a:t>ASP.NET and Databases</a:t>
             </a:r>
             <a:endParaRPr lang="en-US" sz="2600" dirty="0" smtClean="0"/>
           </a:p>
@@ -13095,33 +11382,51 @@
               </a:spcBef>
             </a:pPr>
             <a:r>
+              <a:rPr lang="en-US" sz="2600" dirty="0"/>
+              <a:t>Integrating LINQ-to-SQL with ASP.NET, Using Data Sources </a:t>
+            </a:r>
+            <a:r>
               <a:rPr lang="en-US" sz="2600" dirty="0" smtClean="0"/>
-              <a:t>Session and State Management, Master Pages and Navigation, User Controls, </a:t>
+              <a:t>(</a:t>
             </a:r>
             <a:r>
               <a:rPr lang="en-US" sz="2600" noProof="1" smtClean="0"/>
-              <a:t>Web.config</a:t>
+              <a:t>LinqDataSource</a:t>
             </a:r>
             <a:r>
               <a:rPr lang="en-US" sz="2600" dirty="0" smtClean="0"/>
-              <a:t>, IIS</a:t>
-            </a:r>
-          </a:p>
-          <a:p>
-            <a:pPr marL="361950" lvl="0" indent="-361950">
+              <a:t> </a:t>
+            </a:r>
+            <a:r>
+              <a:rPr lang="en-US" sz="2600" dirty="0"/>
+              <a:t>and </a:t>
+            </a:r>
+            <a:r>
+              <a:rPr lang="en-US" sz="2600" noProof="1" smtClean="0"/>
+              <a:t>ObjectDataSource</a:t>
+            </a:r>
+            <a:r>
+              <a:rPr lang="en-US" sz="2600" dirty="0" smtClean="0"/>
+              <a:t>)</a:t>
+            </a:r>
+            <a:endParaRPr lang="en-US" sz="2600" dirty="0" smtClean="0"/>
+          </a:p>
+          <a:p>
+            <a:pPr marL="361950" lvl="0" indent="0">
               <a:lnSpc>
                 <a:spcPts val="3400"/>
               </a:lnSpc>
               <a:spcBef>
                 <a:spcPts val="300"/>
               </a:spcBef>
-              <a:buFont typeface="+mj-lt"/>
-              <a:buAutoNum type="arabicPeriod" startAt="8"/>
+              <a:buNone/>
               <a:tabLst/>
             </a:pPr>
             <a:r>
-              <a:rPr lang="en-US" sz="2800" dirty="0" smtClean="0"/>
-              <a:t>ASP.NET AJAX</a:t>
+              <a:rPr lang="en-US" sz="2800" dirty="0">
+                <a:effectLst/>
+              </a:rPr>
+              <a:t>ASP.NET State Management</a:t>
             </a:r>
             <a:endParaRPr lang="en-US" sz="2600" dirty="0" smtClean="0"/>
           </a:p>
@@ -13135,13 +11440,24 @@
               </a:spcBef>
             </a:pPr>
             <a:r>
-              <a:rPr lang="en-US" sz="2600" noProof="1" smtClean="0"/>
-              <a:t>ScriptManager, UpdatePanel</a:t>
-            </a:r>
-            <a:r>
-              <a:rPr lang="en-US" sz="2600" dirty="0" smtClean="0"/>
-              <a:t>, AJAX Control Toolkit</a:t>
-            </a:r>
+              <a:rPr lang="en-US" sz="2800" dirty="0" smtClean="0">
+                <a:effectLst/>
+              </a:rPr>
+              <a:t>View </a:t>
+            </a:r>
+            <a:r>
+              <a:rPr lang="en-US" sz="2800" dirty="0">
+                <a:effectLst/>
+              </a:rPr>
+              <a:t>State, Application State, Session </a:t>
+            </a:r>
+            <a:r>
+              <a:rPr lang="en-US" sz="2800" dirty="0" smtClean="0">
+                <a:effectLst/>
+              </a:rPr>
+              <a:t>State</a:t>
+            </a:r>
+            <a:endParaRPr lang="en-US" sz="2600" dirty="0" smtClean="0"/>
           </a:p>
         </p:txBody>
       </p:sp>
@@ -13249,7 +11565,7 @@
           <a:bodyPr/>
           <a:lstStyle/>
           <a:p>
-            <a:pPr marL="514350" lvl="0" indent="-514350">
+            <a:pPr marL="361950" lvl="0" indent="-361950">
               <a:lnSpc>
                 <a:spcPts val="3400"/>
               </a:lnSpc>
@@ -13257,13 +11573,16 @@
                 <a:spcPts val="300"/>
               </a:spcBef>
               <a:buFont typeface="+mj-lt"/>
-              <a:buAutoNum type="arabicPeriod" startAt="12"/>
+              <a:buAutoNum type="arabicPeriod" startAt="11"/>
               <a:tabLst/>
             </a:pPr>
             <a:r>
-              <a:rPr lang="en-US" sz="2800" dirty="0" smtClean="0"/>
-              <a:t>Silverlight and RIA</a:t>
-            </a:r>
+              <a:rPr lang="en-US" sz="2800" dirty="0">
+                <a:effectLst/>
+              </a:rPr>
+              <a:t>ASP.NET Advanced Topics</a:t>
+            </a:r>
+            <a:endParaRPr lang="en-US" sz="2800" dirty="0" smtClean="0"/>
           </a:p>
           <a:p>
             <a:pPr marL="714375" lvl="1" indent="-366713">
@@ -13275,9 +11594,22 @@
               </a:spcBef>
             </a:pPr>
             <a:r>
+              <a:rPr lang="en-US" sz="2600" dirty="0"/>
+              <a:t>Master Pages, User Controls, Site Maps, Localization, Validation Controls, </a:t>
+            </a:r>
+            <a:r>
+              <a:rPr lang="en-US" sz="2600" noProof="1" smtClean="0"/>
+              <a:t>Web.config</a:t>
+            </a:r>
+            <a:r>
               <a:rPr lang="en-US" sz="2600" dirty="0" smtClean="0"/>
-              <a:t>XAML, Text, Images, Graphics, Shapes, Creating Silverlight Applications, Text Controls, Buttons, List Controls, Data Binding and Data-Bound Controls</a:t>
-            </a:r>
+              <a:t>, </a:t>
+            </a:r>
+            <a:r>
+              <a:rPr lang="en-US" sz="2600" dirty="0"/>
+              <a:t>IIS and Deployment</a:t>
+            </a:r>
+            <a:endParaRPr lang="en-US" sz="2600" dirty="0" smtClean="0"/>
           </a:p>
           <a:p>
             <a:pPr marL="361950" lvl="0" indent="-361950">
@@ -13288,13 +11620,16 @@
                 <a:spcPts val="300"/>
               </a:spcBef>
               <a:buFont typeface="+mj-lt"/>
-              <a:buAutoNum type="arabicPeriod" startAt="12"/>
+              <a:buAutoNum type="arabicPeriod" startAt="11"/>
               <a:tabLst/>
             </a:pPr>
             <a:r>
-              <a:rPr lang="en-US" sz="2800" dirty="0" smtClean="0"/>
-              <a:t>Practical Project</a:t>
-            </a:r>
+              <a:rPr lang="en-US" sz="2800" dirty="0">
+                <a:effectLst/>
+              </a:rPr>
+              <a:t>ASP.NET Membership</a:t>
+            </a:r>
+            <a:endParaRPr lang="en-US" sz="2800" dirty="0" smtClean="0"/>
           </a:p>
           <a:p>
             <a:pPr marL="714375" lvl="1" indent="-366713">
@@ -13306,8 +11641,8 @@
               </a:spcBef>
             </a:pPr>
             <a:r>
-              <a:rPr lang="en-US" sz="2600" dirty="0" smtClean="0"/>
-              <a:t>Creating Dynamic Rich-Data ASP.NET Web Application: Step-by-Step Live Demo</a:t>
+              <a:rPr lang="en-US" sz="2600" dirty="0"/>
+              <a:t>Authentication and Authorization, Windows and Forms Authentication, Users, Roles, Membership and Providers, Login Controls</a:t>
             </a:r>
             <a:endParaRPr lang="en-US" sz="2600" noProof="1" smtClean="0"/>
           </a:p>
@@ -13320,12 +11655,14 @@
                 <a:spcPts val="300"/>
               </a:spcBef>
               <a:buFont typeface="+mj-lt"/>
-              <a:buAutoNum type="arabicPeriod" startAt="12"/>
+              <a:buAutoNum type="arabicPeriod" startAt="11"/>
               <a:tabLst/>
             </a:pPr>
             <a:r>
-              <a:rPr lang="en-US" sz="2800" dirty="0" smtClean="0"/>
-              <a:t>Additional Topic #1</a:t>
+              <a:rPr lang="en-US" sz="2800" dirty="0">
+                <a:effectLst/>
+              </a:rPr>
+              <a:t>ASP.NET AJAX</a:t>
             </a:r>
             <a:endParaRPr lang="en-US" sz="2600" dirty="0" smtClean="0"/>
           </a:p>
@@ -13339,9 +11676,26 @@
               </a:spcBef>
             </a:pPr>
             <a:r>
+              <a:rPr lang="en-US" sz="2600" noProof="1" smtClean="0"/>
+              <a:t>ScriptManager</a:t>
+            </a:r>
+            <a:r>
               <a:rPr lang="en-US" sz="2600" dirty="0" smtClean="0"/>
-              <a:t>Student will Suggest Interesting Topics</a:t>
-            </a:r>
+              <a:t>, </a:t>
+            </a:r>
+            <a:r>
+              <a:rPr lang="en-US" sz="2600" noProof="1" smtClean="0"/>
+              <a:t>UpdatePanel</a:t>
+            </a:r>
+            <a:r>
+              <a:rPr lang="en-US" sz="2600" dirty="0" smtClean="0"/>
+              <a:t>, </a:t>
+            </a:r>
+            <a:r>
+              <a:rPr lang="en-US" sz="2600" dirty="0"/>
+              <a:t>AJAX Control Toolkit</a:t>
+            </a:r>
+            <a:endParaRPr lang="en-US" sz="2600" dirty="0" smtClean="0"/>
           </a:p>
           <a:p>
             <a:pPr marL="361950" lvl="0" indent="-361950">
@@ -13352,13 +11706,22 @@
                 <a:spcPts val="300"/>
               </a:spcBef>
               <a:buFont typeface="+mj-lt"/>
-              <a:buAutoNum type="arabicPeriod" startAt="12"/>
+              <a:buAutoNum type="arabicPeriod" startAt="11"/>
               <a:tabLst/>
             </a:pPr>
             <a:r>
-              <a:rPr lang="en-US" sz="2800" dirty="0" smtClean="0"/>
-              <a:t>Additional Topic #1</a:t>
-            </a:r>
+              <a:rPr lang="en-US" sz="2800" dirty="0">
+                <a:effectLst/>
+              </a:rPr>
+              <a:t>Practical Project Live </a:t>
+            </a:r>
+            <a:r>
+              <a:rPr lang="en-US" sz="2800" dirty="0" smtClean="0">
+                <a:effectLst/>
+              </a:rPr>
+              <a:t>Demo – Blog System</a:t>
+            </a:r>
+            <a:endParaRPr lang="en-US" sz="2800" dirty="0" smtClean="0"/>
           </a:p>
           <a:p>
             <a:pPr marL="361950" lvl="0" indent="-361950">
@@ -13369,12 +11732,20 @@
                 <a:spcPts val="300"/>
               </a:spcBef>
               <a:buFont typeface="+mj-lt"/>
-              <a:buAutoNum type="arabicPeriod" startAt="12"/>
+              <a:buAutoNum type="arabicPeriod" startAt="11"/>
               <a:tabLst/>
             </a:pPr>
             <a:r>
-              <a:rPr lang="en-US" sz="2800" dirty="0" smtClean="0"/>
-              <a:t>Certification Exam</a:t>
+              <a:rPr lang="en-US" sz="2800" dirty="0">
+                <a:effectLst/>
+              </a:rPr>
+              <a:t>Practical Projects </a:t>
+            </a:r>
+            <a:r>
+              <a:rPr lang="en-US" sz="2800" dirty="0" smtClean="0">
+                <a:effectLst/>
+              </a:rPr>
+              <a:t>Defense (Certification Exam)</a:t>
             </a:r>
             <a:endParaRPr lang="en-US" sz="2600" dirty="0" smtClean="0"/>
           </a:p>

</xml_diff>

<commit_message>
added slides to the trainers section fixes to the formatting added Vesko and Shasho's pictures
</commit_message>
<xml_diff>
--- a/2010/lectures/0. Course Introduction.pptx
+++ b/2010/lectures/0. Course Introduction.pptx
@@ -5,10 +5,10 @@
     <p:sldMasterId id="2147483704" r:id="rId1"/>
   </p:sldMasterIdLst>
   <p:notesMasterIdLst>
-    <p:notesMasterId r:id="rId21"/>
+    <p:notesMasterId r:id="rId27"/>
   </p:notesMasterIdLst>
   <p:handoutMasterIdLst>
-    <p:handoutMasterId r:id="rId22"/>
+    <p:handoutMasterId r:id="rId28"/>
   </p:handoutMasterIdLst>
   <p:sldIdLst>
     <p:sldId id="320" r:id="rId2"/>
@@ -23,13 +23,19 @@
     <p:sldId id="328" r:id="rId11"/>
     <p:sldId id="329" r:id="rId12"/>
     <p:sldId id="332" r:id="rId13"/>
-    <p:sldId id="339" r:id="rId14"/>
-    <p:sldId id="340" r:id="rId15"/>
-    <p:sldId id="350" r:id="rId16"/>
-    <p:sldId id="343" r:id="rId17"/>
-    <p:sldId id="344" r:id="rId18"/>
-    <p:sldId id="345" r:id="rId19"/>
-    <p:sldId id="346" r:id="rId20"/>
+    <p:sldId id="352" r:id="rId14"/>
+    <p:sldId id="353" r:id="rId15"/>
+    <p:sldId id="354" r:id="rId16"/>
+    <p:sldId id="355" r:id="rId17"/>
+    <p:sldId id="356" r:id="rId18"/>
+    <p:sldId id="357" r:id="rId19"/>
+    <p:sldId id="339" r:id="rId20"/>
+    <p:sldId id="340" r:id="rId21"/>
+    <p:sldId id="350" r:id="rId22"/>
+    <p:sldId id="343" r:id="rId23"/>
+    <p:sldId id="344" r:id="rId24"/>
+    <p:sldId id="345" r:id="rId25"/>
+    <p:sldId id="346" r:id="rId26"/>
   </p:sldIdLst>
   <p:sldSz cx="9144000" cy="6858000" type="screen4x3"/>
   <p:notesSz cx="6881813" cy="9296400"/>
@@ -276,7 +282,7 @@
             <a:fld id="{3BF7C7B5-275F-4D1F-9AB4-9255447DBC73}" type="datetimeFigureOut">
               <a:rPr lang="en-US"/>
               <a:pPr/>
-              <a:t>30-Sep-10</a:t>
+              <a:t>10/5/2010</a:t>
             </a:fld>
             <a:endParaRPr lang="en-US" dirty="0"/>
           </a:p>
@@ -507,7 +513,7 @@
             <a:fld id="{9B46F231-FB2B-4655-A644-E2477325E686}" type="datetimeFigureOut">
               <a:rPr lang="en-US"/>
               <a:pPr/>
-              <a:t>30-Sep-10</a:t>
+              <a:t>10/5/2010</a:t>
             </a:fld>
             <a:endParaRPr lang="en-US" dirty="0"/>
           </a:p>
@@ -4176,8 +4182,13 @@
           <p:nvPr/>
         </p:nvPicPr>
         <p:blipFill>
-          <a:blip r:embed="rId11" cstate="print">
+          <a:blip r:embed="rId11" cstate="screen">
             <a:lum bright="-20000"/>
+            <a:extLst>
+              <a:ext uri="{28A0092B-C50C-407E-A947-70E740481C1C}">
+                <a14:useLocalDpi xmlns:a14="http://schemas.microsoft.com/office/drawing/2010/main"/>
+              </a:ext>
+            </a:extLst>
           </a:blip>
           <a:srcRect/>
           <a:stretch>
@@ -4988,6 +4999,11 @@
         <p:blipFill>
           <a:blip r:embed="rId11" cstate="screen">
             <a:lum bright="-20000"/>
+            <a:extLst>
+              <a:ext uri="{28A0092B-C50C-407E-A947-70E740481C1C}">
+                <a14:useLocalDpi xmlns:a14="http://schemas.microsoft.com/office/drawing/2010/main"/>
+              </a:ext>
+            </a:extLst>
           </a:blip>
           <a:srcRect/>
           <a:stretch>
@@ -5771,10 +5787,15 @@
           <p:nvPr/>
         </p:nvPicPr>
         <p:blipFill>
-          <a:blip r:embed="rId2" cstate="print">
+          <a:blip r:embed="rId2" cstate="screen">
             <a:lum bright="10000" contrast="20000"/>
+            <a:extLst>
+              <a:ext uri="{28A0092B-C50C-407E-A947-70E740481C1C}">
+                <a14:useLocalDpi xmlns:a14="http://schemas.microsoft.com/office/drawing/2010/main"/>
+              </a:ext>
+            </a:extLst>
           </a:blip>
-          <a:srcRect r="2250" b="3019"/>
+          <a:srcRect/>
           <a:stretch>
             <a:fillRect/>
           </a:stretch>
@@ -5878,23 +5899,18 @@
           <a:p>
             <a:pPr>
               <a:lnSpc>
-                <a:spcPts val="4000"/>
+                <a:spcPct val="100000"/>
               </a:lnSpc>
             </a:pPr>
             <a:r>
               <a:rPr lang="en-US" dirty="0" smtClean="0"/>
-              <a:t>Svetlin </a:t>
-            </a:r>
-            <a:r>
-              <a:rPr lang="en-US" dirty="0" smtClean="0"/>
-              <a:t>Nakov, PhD</a:t>
-            </a:r>
-            <a:endParaRPr lang="en-US" dirty="0" smtClean="0"/>
+              <a:t>Svetlin Nakov, PhD</a:t>
+            </a:r>
           </a:p>
           <a:p>
             <a:pPr lvl="1">
               <a:lnSpc>
-                <a:spcPts val="4000"/>
+                <a:spcPct val="100000"/>
               </a:lnSpc>
             </a:pPr>
             <a:r>
@@ -5905,7 +5921,7 @@
           <a:p>
             <a:pPr lvl="1" eaLnBrk="1" hangingPunct="1">
               <a:lnSpc>
-                <a:spcPts val="4000"/>
+                <a:spcPct val="100000"/>
               </a:lnSpc>
             </a:pPr>
             <a:r>
@@ -5988,8 +6004,8 @@
         </p:nvSpPr>
         <p:spPr>
           <a:xfrm>
-            <a:off x="228600" y="4572000"/>
-            <a:ext cx="8610600" cy="1938992"/>
+            <a:off x="228600" y="4419600"/>
+            <a:ext cx="8610600" cy="1785104"/>
           </a:xfrm>
           <a:prstGeom prst="rect">
             <a:avLst/>
@@ -6002,9 +6018,6 @@
           <a:lstStyle/>
           <a:p>
             <a:pPr marL="630238" lvl="1" indent="-273050">
-              <a:lnSpc>
-                <a:spcPts val="4000"/>
-              </a:lnSpc>
               <a:spcBef>
                 <a:spcPts val="600"/>
               </a:spcBef>
@@ -6077,9 +6090,6 @@
           </a:p>
           <a:p>
             <a:pPr marL="630238" lvl="1" indent="-273050">
-              <a:lnSpc>
-                <a:spcPts val="4000"/>
-              </a:lnSpc>
               <a:spcBef>
                 <a:spcPts val="600"/>
               </a:spcBef>
@@ -6169,9 +6179,6 @@
           </a:p>
           <a:p>
             <a:pPr marL="630238" lvl="1" indent="-273050">
-              <a:lnSpc>
-                <a:spcPts val="4000"/>
-              </a:lnSpc>
               <a:spcBef>
                 <a:spcPts val="600"/>
               </a:spcBef>
@@ -6291,7 +6298,11 @@
           <a:p>
             <a:r>
               <a:rPr lang="en-US" dirty="0" smtClean="0"/>
-              <a:t>Trainers Team (4)</a:t>
+              <a:t>Trainers Team </a:t>
+            </a:r>
+            <a:r>
+              <a:rPr lang="en-US" dirty="0" smtClean="0"/>
+              <a:t>(2)</a:t>
             </a:r>
             <a:endParaRPr lang="en-US" dirty="0"/>
           </a:p>
@@ -6319,7 +6330,7 @@
           <a:p>
             <a:pPr>
               <a:lnSpc>
-                <a:spcPts val="4000"/>
+                <a:spcPct val="100000"/>
               </a:lnSpc>
             </a:pPr>
             <a:r>
@@ -6330,7 +6341,7 @@
           <a:p>
             <a:pPr lvl="1">
               <a:lnSpc>
-                <a:spcPts val="4000"/>
+                <a:spcPct val="100000"/>
               </a:lnSpc>
             </a:pPr>
             <a:r>
@@ -6385,7 +6396,7 @@
         <p:spPr>
           <a:xfrm>
             <a:off x="228600" y="3429000"/>
-            <a:ext cx="8610600" cy="578620"/>
+            <a:ext cx="8610600" cy="553998"/>
           </a:xfrm>
           <a:prstGeom prst="rect">
             <a:avLst/>
@@ -6398,9 +6409,6 @@
           <a:lstStyle/>
           <a:p>
             <a:pPr marL="630238" lvl="1" indent="-273050">
-              <a:lnSpc>
-                <a:spcPts val="4000"/>
-              </a:lnSpc>
               <a:spcBef>
                 <a:spcPts val="600"/>
               </a:spcBef>
@@ -6475,25 +6483,30 @@
       </p:sp>
       <p:pic>
         <p:nvPicPr>
-          <p:cNvPr id="6" name="Picture 5" descr="C:\Users\9680\Desktop\VentsislavPopov.jpg"/>
+          <p:cNvPr id="4098" name="Picture 2" descr="C:\Telerik Academy\ASP.NET Cource\2010\lectures\lecturers-photos\venci.jpg"/>
           <p:cNvPicPr>
             <a:picLocks noChangeAspect="1" noChangeArrowheads="1"/>
           </p:cNvPicPr>
           <p:nvPr/>
         </p:nvPicPr>
         <p:blipFill>
-          <a:blip r:embed="rId3" cstate="print">
+          <a:blip r:embed="rId3">
             <a:lum/>
+            <a:extLst>
+              <a:ext uri="{28A0092B-C50C-407E-A947-70E740481C1C}">
+                <a14:useLocalDpi xmlns:a14="http://schemas.microsoft.com/office/drawing/2010/main"/>
+              </a:ext>
+            </a:extLst>
           </a:blip>
-          <a:srcRect l="10588" t="1272" r="14643" b="17346"/>
+          <a:srcRect/>
           <a:stretch>
             <a:fillRect/>
           </a:stretch>
         </p:blipFill>
         <p:spPr bwMode="auto">
           <a:xfrm>
-            <a:off x="6827520" y="1219200"/>
-            <a:ext cx="1554480" cy="1950720"/>
+            <a:off x="6553200" y="1143000"/>
+            <a:ext cx="1511300" cy="2266950"/>
           </a:xfrm>
           <a:prstGeom prst="rect">
             <a:avLst/>
@@ -6509,6 +6522,15 @@
             <a:headEnd/>
             <a:tailEnd/>
           </a:ln>
+          <a:extLst>
+            <a:ext uri="{909E8E84-426E-40DD-AFC4-6F175D3DCCD1}">
+              <a14:hiddenFill xmlns:a14="http://schemas.microsoft.com/office/drawing/2010/main">
+                <a:solidFill>
+                  <a:srgbClr val="FFFFFF"/>
+                </a:solidFill>
+              </a14:hiddenFill>
+            </a:ext>
+          </a:extLst>
         </p:spPr>
       </p:pic>
     </p:spTree>
@@ -6527,6 +6549,1800 @@
 </file>
 
 <file path=ppt/slides/slide13.xml><?xml version="1.0" encoding="utf-8"?>
+<p:sld xmlns:a="http://schemas.openxmlformats.org/drawingml/2006/main" xmlns:r="http://schemas.openxmlformats.org/officeDocument/2006/relationships" xmlns:p="http://schemas.openxmlformats.org/presentationml/2006/main">
+  <p:cSld>
+    <p:spTree>
+      <p:nvGrpSpPr>
+        <p:cNvPr id="1" name=""/>
+        <p:cNvGrpSpPr/>
+        <p:nvPr/>
+      </p:nvGrpSpPr>
+      <p:grpSpPr>
+        <a:xfrm>
+          <a:off x="0" y="0"/>
+          <a:ext cx="0" cy="0"/>
+          <a:chOff x="0" y="0"/>
+          <a:chExt cx="0" cy="0"/>
+        </a:xfrm>
+      </p:grpSpPr>
+      <p:sp>
+        <p:nvSpPr>
+          <p:cNvPr id="4" name="Title 3"/>
+          <p:cNvSpPr>
+            <a:spLocks noGrp="1"/>
+          </p:cNvSpPr>
+          <p:nvPr>
+            <p:ph type="title"/>
+          </p:nvPr>
+        </p:nvSpPr>
+        <p:spPr/>
+        <p:txBody>
+          <a:bodyPr/>
+          <a:lstStyle/>
+          <a:p>
+            <a:r>
+              <a:rPr lang="en-US" dirty="0" smtClean="0"/>
+              <a:t>Trainers </a:t>
+            </a:r>
+            <a:r>
+              <a:rPr lang="en-US" dirty="0" smtClean="0"/>
+              <a:t>Team (3)</a:t>
+            </a:r>
+            <a:endParaRPr lang="en-US" dirty="0"/>
+          </a:p>
+        </p:txBody>
+      </p:sp>
+      <p:sp>
+        <p:nvSpPr>
+          <p:cNvPr id="5" name="Content Placeholder 4"/>
+          <p:cNvSpPr>
+            <a:spLocks noGrp="1"/>
+          </p:cNvSpPr>
+          <p:nvPr>
+            <p:ph idx="1"/>
+          </p:nvPr>
+        </p:nvSpPr>
+        <p:spPr>
+          <a:xfrm>
+            <a:off x="228600" y="1066800"/>
+            <a:ext cx="6477000" cy="3505200"/>
+          </a:xfrm>
+        </p:spPr>
+        <p:txBody>
+          <a:bodyPr/>
+          <a:lstStyle/>
+          <a:p>
+            <a:pPr>
+              <a:lnSpc>
+                <a:spcPct val="100000"/>
+              </a:lnSpc>
+            </a:pPr>
+            <a:r>
+              <a:rPr lang="en-US" dirty="0" smtClean="0"/>
+              <a:t>Vesko Kolev</a:t>
+            </a:r>
+            <a:endParaRPr lang="en-US" dirty="0" smtClean="0"/>
+          </a:p>
+          <a:p>
+            <a:pPr lvl="1">
+              <a:lnSpc>
+                <a:spcPct val="100000"/>
+              </a:lnSpc>
+            </a:pPr>
+            <a:r>
+              <a:rPr lang="en-US" dirty="0"/>
+              <a:t>Senior Software Engineer</a:t>
+            </a:r>
+            <a:r>
+              <a:rPr lang="bg-BG" dirty="0" smtClean="0"/>
+              <a:t>,</a:t>
+            </a:r>
+            <a:r>
+              <a:rPr lang="en-US" dirty="0" smtClean="0"/>
+              <a:t>    </a:t>
+            </a:r>
+            <a:r>
+              <a:rPr lang="bg-BG" dirty="0" smtClean="0"/>
+              <a:t> </a:t>
+            </a:r>
+            <a:r>
+              <a:rPr lang="en-US" dirty="0">
+                <a:hlinkClick r:id="rId2"/>
+              </a:rPr>
+              <a:t>Telerik </a:t>
+            </a:r>
+            <a:r>
+              <a:rPr lang="en-US" dirty="0" smtClean="0">
+                <a:hlinkClick r:id="rId2"/>
+              </a:rPr>
+              <a:t>Corporation</a:t>
+            </a:r>
+            <a:endParaRPr lang="en-US" dirty="0"/>
+          </a:p>
+        </p:txBody>
+      </p:sp>
+      <p:sp>
+        <p:nvSpPr>
+          <p:cNvPr id="7" name="Slide Number Placeholder 3"/>
+          <p:cNvSpPr>
+            <a:spLocks noGrp="1"/>
+          </p:cNvSpPr>
+          <p:nvPr>
+            <p:ph type="sldNum" sz="quarter" idx="10"/>
+          </p:nvPr>
+        </p:nvSpPr>
+        <p:spPr/>
+        <p:txBody>
+          <a:bodyPr/>
+          <a:lstStyle/>
+          <a:p>
+            <a:pPr>
+              <a:defRPr/>
+            </a:pPr>
+            <a:fld id="{58452FF4-89E3-4D1B-9927-2DBDC00E58D7}" type="slidenum">
+              <a:rPr lang="en-US" smtClean="0"/>
+              <a:pPr>
+                <a:defRPr/>
+              </a:pPr>
+              <a:t>13</a:t>
+            </a:fld>
+            <a:endParaRPr lang="en-US" dirty="0"/>
+          </a:p>
+        </p:txBody>
+      </p:sp>
+      <p:sp>
+        <p:nvSpPr>
+          <p:cNvPr id="8" name="Rectangle 7"/>
+          <p:cNvSpPr/>
+          <p:nvPr/>
+        </p:nvSpPr>
+        <p:spPr>
+          <a:xfrm>
+            <a:off x="228600" y="2819400"/>
+            <a:ext cx="7010400" cy="1169551"/>
+          </a:xfrm>
+          <a:prstGeom prst="rect">
+            <a:avLst/>
+          </a:prstGeom>
+        </p:spPr>
+        <p:txBody>
+          <a:bodyPr wrap="square">
+            <a:spAutoFit/>
+          </a:bodyPr>
+          <a:lstStyle/>
+          <a:p>
+            <a:pPr marL="630238" lvl="1" indent="-273050">
+              <a:spcBef>
+                <a:spcPts val="600"/>
+              </a:spcBef>
+              <a:spcAft>
+                <a:spcPts val="600"/>
+              </a:spcAft>
+              <a:buClr>
+                <a:srgbClr val="8FD600"/>
+              </a:buClr>
+              <a:buFont typeface="Wingdings 2" pitchFamily="18" charset="2"/>
+              <a:buChar char=""/>
+            </a:pPr>
+            <a:r>
+              <a:rPr lang="en-US" sz="3000" b="1" dirty="0">
+                <a:effectLst>
+                  <a:outerShdw blurRad="38100" dist="38100" dir="2700000" algn="tl">
+                    <a:srgbClr val="000000">
+                      <a:alpha val="43137"/>
+                    </a:srgbClr>
+                  </a:outerShdw>
+                </a:effectLst>
+              </a:rPr>
+              <a:t>Email: </a:t>
+            </a:r>
+            <a:r>
+              <a:rPr lang="en-US" sz="3000" b="1" dirty="0" smtClean="0">
+                <a:effectLst>
+                  <a:outerShdw blurRad="38100" dist="38100" dir="2700000" algn="tl">
+                    <a:srgbClr val="000000">
+                      <a:alpha val="43137"/>
+                    </a:srgbClr>
+                  </a:outerShdw>
+                </a:effectLst>
+              </a:rPr>
+              <a:t>vesko.kolev [at] telerik.com</a:t>
+            </a:r>
+          </a:p>
+          <a:p>
+            <a:pPr marL="630238" lvl="1" indent="-273050">
+              <a:spcBef>
+                <a:spcPts val="600"/>
+              </a:spcBef>
+              <a:spcAft>
+                <a:spcPts val="600"/>
+              </a:spcAft>
+              <a:buClr>
+                <a:srgbClr val="8FD600"/>
+              </a:buClr>
+              <a:buFont typeface="Wingdings 2" pitchFamily="18" charset="2"/>
+              <a:buChar char=""/>
+            </a:pPr>
+            <a:r>
+              <a:rPr lang="en-US" sz="3000" b="1" dirty="0" smtClean="0">
+                <a:effectLst>
+                  <a:outerShdw blurRad="38100" dist="38100" dir="2700000" algn="tl">
+                    <a:srgbClr val="000000">
+                      <a:alpha val="43137"/>
+                    </a:srgbClr>
+                  </a:outerShdw>
+                </a:effectLst>
+              </a:rPr>
+              <a:t>Blog</a:t>
+            </a:r>
+            <a:r>
+              <a:rPr lang="en-US" sz="3000" b="1" dirty="0">
+                <a:effectLst>
+                  <a:outerShdw blurRad="38100" dist="38100" dir="2700000" algn="tl">
+                    <a:srgbClr val="000000">
+                      <a:alpha val="43137"/>
+                    </a:srgbClr>
+                  </a:outerShdw>
+                </a:effectLst>
+              </a:rPr>
+              <a:t>: </a:t>
+            </a:r>
+            <a:r>
+              <a:rPr lang="en-US" sz="3000" b="1" dirty="0">
+                <a:effectLst>
+                  <a:outerShdw blurRad="38100" dist="38100" dir="2700000" algn="tl">
+                    <a:srgbClr val="000000">
+                      <a:alpha val="43137"/>
+                    </a:srgbClr>
+                  </a:outerShdw>
+                </a:effectLst>
+                <a:hlinkClick r:id="rId3"/>
+              </a:rPr>
+              <a:t>http://veskokolev.blogspot.com</a:t>
+            </a:r>
+            <a:endParaRPr lang="en-US" sz="3000" b="1" dirty="0">
+              <a:solidFill>
+                <a:srgbClr val="CCFF66">
+                  <a:lumMod val="40000"/>
+                  <a:lumOff val="60000"/>
+                </a:srgbClr>
+              </a:solidFill>
+              <a:effectLst>
+                <a:outerShdw blurRad="38100" dist="38100" dir="2700000" algn="tl">
+                  <a:srgbClr val="000000">
+                    <a:alpha val="43137"/>
+                  </a:srgbClr>
+                </a:outerShdw>
+              </a:effectLst>
+              <a:latin typeface="Corbel"/>
+            </a:endParaRPr>
+          </a:p>
+        </p:txBody>
+      </p:sp>
+      <p:pic>
+        <p:nvPicPr>
+          <p:cNvPr id="1026" name="Picture 2" descr="C:\Telerik Academy\ASP.NET Cource\2010\lectures\lecturers-photos\Vesko Kolev.png"/>
+          <p:cNvPicPr>
+            <a:picLocks noChangeAspect="1" noChangeArrowheads="1"/>
+          </p:cNvPicPr>
+          <p:nvPr/>
+        </p:nvPicPr>
+        <p:blipFill>
+          <a:blip r:embed="rId4">
+            <a:lum/>
+            <a:extLst>
+              <a:ext uri="{28A0092B-C50C-407E-A947-70E740481C1C}">
+                <a14:useLocalDpi xmlns:a14="http://schemas.microsoft.com/office/drawing/2010/main"/>
+              </a:ext>
+            </a:extLst>
+          </a:blip>
+          <a:srcRect/>
+          <a:stretch>
+            <a:fillRect/>
+          </a:stretch>
+        </p:blipFill>
+        <p:spPr bwMode="auto">
+          <a:xfrm>
+            <a:off x="6858000" y="990600"/>
+            <a:ext cx="1714500" cy="2286000"/>
+          </a:xfrm>
+          <a:prstGeom prst="rect">
+            <a:avLst/>
+          </a:prstGeom>
+          <a:noFill/>
+          <a:ln w="3175">
+            <a:solidFill>
+              <a:schemeClr val="accent5">
+                <a:lumMod val="75000"/>
+              </a:schemeClr>
+            </a:solidFill>
+            <a:miter lim="800000"/>
+            <a:headEnd/>
+            <a:tailEnd/>
+          </a:ln>
+          <a:extLst>
+            <a:ext uri="{909E8E84-426E-40DD-AFC4-6F175D3DCCD1}">
+              <a14:hiddenFill xmlns:a14="http://schemas.microsoft.com/office/drawing/2010/main">
+                <a:solidFill>
+                  <a:srgbClr val="FFFFFF"/>
+                </a:solidFill>
+              </a14:hiddenFill>
+            </a:ext>
+          </a:extLst>
+        </p:spPr>
+      </p:pic>
+    </p:spTree>
+    <p:extLst>
+      <p:ext uri="{BB962C8B-B14F-4D97-AF65-F5344CB8AC3E}">
+        <p14:creationId xmlns:p14="http://schemas.microsoft.com/office/powerpoint/2010/main" val="3089033343"/>
+      </p:ext>
+    </p:extLst>
+  </p:cSld>
+  <p:clrMapOvr>
+    <a:masterClrMapping/>
+  </p:clrMapOvr>
+  <p:timing>
+    <p:tnLst>
+      <p:par>
+        <p:cTn id="1" dur="indefinite" restart="never" nodeType="tmRoot"/>
+      </p:par>
+    </p:tnLst>
+  </p:timing>
+</p:sld>
+</file>
+
+<file path=ppt/slides/slide14.xml><?xml version="1.0" encoding="utf-8"?>
+<p:sld xmlns:a="http://schemas.openxmlformats.org/drawingml/2006/main" xmlns:r="http://schemas.openxmlformats.org/officeDocument/2006/relationships" xmlns:p="http://schemas.openxmlformats.org/presentationml/2006/main">
+  <p:cSld>
+    <p:spTree>
+      <p:nvGrpSpPr>
+        <p:cNvPr id="1" name=""/>
+        <p:cNvGrpSpPr/>
+        <p:nvPr/>
+      </p:nvGrpSpPr>
+      <p:grpSpPr>
+        <a:xfrm>
+          <a:off x="0" y="0"/>
+          <a:ext cx="0" cy="0"/>
+          <a:chOff x="0" y="0"/>
+          <a:chExt cx="0" cy="0"/>
+        </a:xfrm>
+      </p:grpSpPr>
+      <p:sp>
+        <p:nvSpPr>
+          <p:cNvPr id="4" name="Title 3"/>
+          <p:cNvSpPr>
+            <a:spLocks noGrp="1"/>
+          </p:cNvSpPr>
+          <p:nvPr>
+            <p:ph type="title"/>
+          </p:nvPr>
+        </p:nvSpPr>
+        <p:spPr/>
+        <p:txBody>
+          <a:bodyPr/>
+          <a:lstStyle/>
+          <a:p>
+            <a:r>
+              <a:rPr lang="en-US" dirty="0" smtClean="0"/>
+              <a:t>Trainers Team (4)</a:t>
+            </a:r>
+            <a:endParaRPr lang="en-US" dirty="0"/>
+          </a:p>
+        </p:txBody>
+      </p:sp>
+      <p:sp>
+        <p:nvSpPr>
+          <p:cNvPr id="5" name="Content Placeholder 4"/>
+          <p:cNvSpPr>
+            <a:spLocks noGrp="1"/>
+          </p:cNvSpPr>
+          <p:nvPr>
+            <p:ph idx="1"/>
+          </p:nvPr>
+        </p:nvSpPr>
+        <p:spPr>
+          <a:xfrm>
+            <a:off x="228600" y="1066800"/>
+            <a:ext cx="5486400" cy="2438400"/>
+          </a:xfrm>
+        </p:spPr>
+        <p:txBody>
+          <a:bodyPr/>
+          <a:lstStyle/>
+          <a:p>
+            <a:pPr>
+              <a:lnSpc>
+                <a:spcPct val="100000"/>
+              </a:lnSpc>
+            </a:pPr>
+            <a:r>
+              <a:rPr lang="en-US" dirty="0" smtClean="0"/>
+              <a:t>Doncho Minkov</a:t>
+            </a:r>
+            <a:endParaRPr lang="en-US" dirty="0" smtClean="0"/>
+          </a:p>
+          <a:p>
+            <a:pPr lvl="1">
+              <a:lnSpc>
+                <a:spcPct val="100000"/>
+              </a:lnSpc>
+            </a:pPr>
+            <a:r>
+              <a:rPr lang="en-US" dirty="0" smtClean="0"/>
+              <a:t>Junior </a:t>
+            </a:r>
+            <a:r>
+              <a:rPr lang="en-US" dirty="0"/>
+              <a:t>Technical Trainer</a:t>
+            </a:r>
+            <a:r>
+              <a:rPr lang="bg-BG" dirty="0"/>
+              <a:t>, </a:t>
+            </a:r>
+            <a:r>
+              <a:rPr lang="en-US" dirty="0" smtClean="0"/>
+              <a:t>             </a:t>
+            </a:r>
+            <a:r>
+              <a:rPr lang="en-US" dirty="0" smtClean="0">
+                <a:hlinkClick r:id="rId2"/>
+              </a:rPr>
+              <a:t>Telerik </a:t>
+            </a:r>
+            <a:r>
+              <a:rPr lang="en-US" dirty="0">
+                <a:hlinkClick r:id="rId2"/>
+              </a:rPr>
+              <a:t>Corporation</a:t>
+            </a:r>
+            <a:r>
+              <a:rPr lang="bg-BG" dirty="0"/>
+              <a:t>, </a:t>
+            </a:r>
+            <a:r>
+              <a:rPr lang="en-US" dirty="0" smtClean="0"/>
+              <a:t>               </a:t>
+            </a:r>
+            <a:r>
+              <a:rPr lang="bg-BG" dirty="0" smtClean="0">
+                <a:hlinkClick r:id="rId3"/>
+              </a:rPr>
+              <a:t>Telerik Academy</a:t>
+            </a:r>
+            <a:endParaRPr lang="en-US" dirty="0"/>
+          </a:p>
+        </p:txBody>
+      </p:sp>
+      <p:sp>
+        <p:nvSpPr>
+          <p:cNvPr id="7" name="Slide Number Placeholder 3"/>
+          <p:cNvSpPr>
+            <a:spLocks noGrp="1"/>
+          </p:cNvSpPr>
+          <p:nvPr>
+            <p:ph type="sldNum" sz="quarter" idx="10"/>
+          </p:nvPr>
+        </p:nvSpPr>
+        <p:spPr/>
+        <p:txBody>
+          <a:bodyPr/>
+          <a:lstStyle/>
+          <a:p>
+            <a:pPr>
+              <a:defRPr/>
+            </a:pPr>
+            <a:fld id="{58452FF4-89E3-4D1B-9927-2DBDC00E58D7}" type="slidenum">
+              <a:rPr lang="en-US" smtClean="0"/>
+              <a:pPr>
+                <a:defRPr/>
+              </a:pPr>
+              <a:t>14</a:t>
+            </a:fld>
+            <a:endParaRPr lang="en-US" dirty="0"/>
+          </a:p>
+        </p:txBody>
+      </p:sp>
+      <p:sp>
+        <p:nvSpPr>
+          <p:cNvPr id="8" name="Rectangle 7"/>
+          <p:cNvSpPr/>
+          <p:nvPr/>
+        </p:nvSpPr>
+        <p:spPr>
+          <a:xfrm>
+            <a:off x="609600" y="3200400"/>
+            <a:ext cx="7086600" cy="553998"/>
+          </a:xfrm>
+          <a:prstGeom prst="rect">
+            <a:avLst/>
+          </a:prstGeom>
+        </p:spPr>
+        <p:txBody>
+          <a:bodyPr wrap="square">
+            <a:spAutoFit/>
+          </a:bodyPr>
+          <a:lstStyle/>
+          <a:p>
+            <a:pPr marL="173038" indent="-273050">
+              <a:spcBef>
+                <a:spcPts val="600"/>
+              </a:spcBef>
+              <a:spcAft>
+                <a:spcPts val="600"/>
+              </a:spcAft>
+              <a:buClr>
+                <a:srgbClr val="8FD600"/>
+              </a:buClr>
+              <a:buFont typeface="Wingdings 2" pitchFamily="18" charset="2"/>
+              <a:buChar char=""/>
+            </a:pPr>
+            <a:r>
+              <a:rPr lang="en-US" sz="3000" b="1" dirty="0">
+                <a:solidFill>
+                  <a:schemeClr val="tx1">
+                    <a:lumMod val="40000"/>
+                    <a:lumOff val="60000"/>
+                  </a:schemeClr>
+                </a:solidFill>
+                <a:effectLst>
+                  <a:outerShdw blurRad="38100" dist="38100" dir="2700000" algn="tl">
+                    <a:srgbClr val="000000">
+                      <a:alpha val="43137"/>
+                    </a:srgbClr>
+                  </a:outerShdw>
+                </a:effectLst>
+                <a:latin typeface="+mn-lt"/>
+              </a:rPr>
+              <a:t>Email: </a:t>
+            </a:r>
+            <a:r>
+              <a:rPr lang="en-US" sz="3000" b="1" dirty="0">
+                <a:solidFill>
+                  <a:schemeClr val="tx1">
+                    <a:lumMod val="40000"/>
+                    <a:lumOff val="60000"/>
+                  </a:schemeClr>
+                </a:solidFill>
+                <a:effectLst>
+                  <a:outerShdw blurRad="38100" dist="38100" dir="2700000" algn="tl">
+                    <a:srgbClr val="000000">
+                      <a:alpha val="43137"/>
+                    </a:srgbClr>
+                  </a:outerShdw>
+                </a:effectLst>
+                <a:latin typeface="+mn-lt"/>
+              </a:rPr>
+              <a:t>doncho.minkov [at] </a:t>
+            </a:r>
+            <a:r>
+              <a:rPr lang="en-US" sz="3000" b="1" dirty="0">
+                <a:solidFill>
+                  <a:schemeClr val="tx1">
+                    <a:lumMod val="40000"/>
+                    <a:lumOff val="60000"/>
+                  </a:schemeClr>
+                </a:solidFill>
+                <a:effectLst>
+                  <a:outerShdw blurRad="38100" dist="38100" dir="2700000" algn="tl">
+                    <a:srgbClr val="000000">
+                      <a:alpha val="43137"/>
+                    </a:srgbClr>
+                  </a:outerShdw>
+                </a:effectLst>
+                <a:latin typeface="+mn-lt"/>
+              </a:rPr>
+              <a:t>telerik.com</a:t>
+            </a:r>
+          </a:p>
+        </p:txBody>
+      </p:sp>
+    </p:spTree>
+    <p:extLst>
+      <p:ext uri="{BB962C8B-B14F-4D97-AF65-F5344CB8AC3E}">
+        <p14:creationId xmlns:p14="http://schemas.microsoft.com/office/powerpoint/2010/main" val="4028452447"/>
+      </p:ext>
+    </p:extLst>
+  </p:cSld>
+  <p:clrMapOvr>
+    <a:masterClrMapping/>
+  </p:clrMapOvr>
+  <p:timing>
+    <p:tnLst>
+      <p:par>
+        <p:cTn id="1" dur="indefinite" restart="never" nodeType="tmRoot"/>
+      </p:par>
+    </p:tnLst>
+  </p:timing>
+</p:sld>
+</file>
+
+<file path=ppt/slides/slide15.xml><?xml version="1.0" encoding="utf-8"?>
+<p:sld xmlns:a="http://schemas.openxmlformats.org/drawingml/2006/main" xmlns:r="http://schemas.openxmlformats.org/officeDocument/2006/relationships" xmlns:p="http://schemas.openxmlformats.org/presentationml/2006/main">
+  <p:cSld>
+    <p:spTree>
+      <p:nvGrpSpPr>
+        <p:cNvPr id="1" name=""/>
+        <p:cNvGrpSpPr/>
+        <p:nvPr/>
+      </p:nvGrpSpPr>
+      <p:grpSpPr>
+        <a:xfrm>
+          <a:off x="0" y="0"/>
+          <a:ext cx="0" cy="0"/>
+          <a:chOff x="0" y="0"/>
+          <a:chExt cx="0" cy="0"/>
+        </a:xfrm>
+      </p:grpSpPr>
+      <p:sp>
+        <p:nvSpPr>
+          <p:cNvPr id="4" name="Title 3"/>
+          <p:cNvSpPr>
+            <a:spLocks noGrp="1"/>
+          </p:cNvSpPr>
+          <p:nvPr>
+            <p:ph type="title"/>
+          </p:nvPr>
+        </p:nvSpPr>
+        <p:spPr/>
+        <p:txBody>
+          <a:bodyPr/>
+          <a:lstStyle/>
+          <a:p>
+            <a:r>
+              <a:rPr lang="en-US" dirty="0" smtClean="0"/>
+              <a:t>Trainers </a:t>
+            </a:r>
+            <a:r>
+              <a:rPr lang="en-US" dirty="0" smtClean="0"/>
+              <a:t>Team (5)</a:t>
+            </a:r>
+            <a:endParaRPr lang="en-US" dirty="0"/>
+          </a:p>
+        </p:txBody>
+      </p:sp>
+      <p:sp>
+        <p:nvSpPr>
+          <p:cNvPr id="5" name="Content Placeholder 4"/>
+          <p:cNvSpPr>
+            <a:spLocks noGrp="1"/>
+          </p:cNvSpPr>
+          <p:nvPr>
+            <p:ph idx="1"/>
+          </p:nvPr>
+        </p:nvSpPr>
+        <p:spPr>
+          <a:xfrm>
+            <a:off x="228600" y="1295400"/>
+            <a:ext cx="5181600" cy="1828800"/>
+          </a:xfrm>
+        </p:spPr>
+        <p:txBody>
+          <a:bodyPr/>
+          <a:lstStyle/>
+          <a:p>
+            <a:pPr>
+              <a:lnSpc>
+                <a:spcPct val="100000"/>
+              </a:lnSpc>
+            </a:pPr>
+            <a:r>
+              <a:rPr lang="en-US" dirty="0"/>
+              <a:t>Momchil Mitev </a:t>
+            </a:r>
+            <a:endParaRPr lang="en-US" dirty="0" smtClean="0"/>
+          </a:p>
+          <a:p>
+            <a:pPr lvl="1">
+              <a:lnSpc>
+                <a:spcPct val="100000"/>
+              </a:lnSpc>
+            </a:pPr>
+            <a:r>
+              <a:rPr lang="en-US" dirty="0" smtClean="0"/>
+              <a:t>Software </a:t>
+            </a:r>
+            <a:r>
+              <a:rPr lang="en-US" dirty="0"/>
+              <a:t>Developer</a:t>
+            </a:r>
+            <a:r>
+              <a:rPr lang="bg-BG" dirty="0"/>
+              <a:t>, </a:t>
+            </a:r>
+            <a:r>
+              <a:rPr lang="en-US" dirty="0">
+                <a:hlinkClick r:id="rId2"/>
+              </a:rPr>
+              <a:t>Telerik </a:t>
+            </a:r>
+            <a:r>
+              <a:rPr lang="en-US" dirty="0" smtClean="0">
+                <a:hlinkClick r:id="rId2"/>
+              </a:rPr>
+              <a:t>Corporation</a:t>
+            </a:r>
+            <a:endParaRPr lang="en-US" dirty="0"/>
+          </a:p>
+        </p:txBody>
+      </p:sp>
+      <p:sp>
+        <p:nvSpPr>
+          <p:cNvPr id="7" name="Slide Number Placeholder 3"/>
+          <p:cNvSpPr>
+            <a:spLocks noGrp="1"/>
+          </p:cNvSpPr>
+          <p:nvPr>
+            <p:ph type="sldNum" sz="quarter" idx="10"/>
+          </p:nvPr>
+        </p:nvSpPr>
+        <p:spPr/>
+        <p:txBody>
+          <a:bodyPr/>
+          <a:lstStyle/>
+          <a:p>
+            <a:pPr>
+              <a:defRPr/>
+            </a:pPr>
+            <a:fld id="{58452FF4-89E3-4D1B-9927-2DBDC00E58D7}" type="slidenum">
+              <a:rPr lang="en-US" smtClean="0"/>
+              <a:pPr>
+                <a:defRPr/>
+              </a:pPr>
+              <a:t>15</a:t>
+            </a:fld>
+            <a:endParaRPr lang="en-US" dirty="0"/>
+          </a:p>
+        </p:txBody>
+      </p:sp>
+      <p:sp>
+        <p:nvSpPr>
+          <p:cNvPr id="8" name="Rectangle 7"/>
+          <p:cNvSpPr/>
+          <p:nvPr/>
+        </p:nvSpPr>
+        <p:spPr>
+          <a:xfrm>
+            <a:off x="228600" y="3027402"/>
+            <a:ext cx="8610600" cy="553998"/>
+          </a:xfrm>
+          <a:prstGeom prst="rect">
+            <a:avLst/>
+          </a:prstGeom>
+        </p:spPr>
+        <p:txBody>
+          <a:bodyPr wrap="square">
+            <a:spAutoFit/>
+          </a:bodyPr>
+          <a:lstStyle/>
+          <a:p>
+            <a:pPr marL="630238" lvl="1" indent="-273050">
+              <a:spcBef>
+                <a:spcPts val="600"/>
+              </a:spcBef>
+              <a:spcAft>
+                <a:spcPts val="600"/>
+              </a:spcAft>
+              <a:buClr>
+                <a:srgbClr val="8FD600"/>
+              </a:buClr>
+              <a:buFont typeface="Wingdings 2" pitchFamily="18" charset="2"/>
+              <a:buChar char=""/>
+            </a:pPr>
+            <a:r>
+              <a:rPr lang="en-US" sz="3000" b="1" dirty="0">
+                <a:effectLst>
+                  <a:outerShdw blurRad="38100" dist="38100" dir="2700000" algn="tl">
+                    <a:srgbClr val="000000">
+                      <a:alpha val="43137"/>
+                    </a:srgbClr>
+                  </a:outerShdw>
+                </a:effectLst>
+              </a:rPr>
+              <a:t>Email: </a:t>
+            </a:r>
+            <a:r>
+              <a:rPr lang="en-US" sz="3000" b="1" dirty="0" smtClean="0">
+                <a:effectLst>
+                  <a:outerShdw blurRad="38100" dist="38100" dir="2700000" algn="tl">
+                    <a:srgbClr val="000000">
+                      <a:alpha val="43137"/>
+                    </a:srgbClr>
+                  </a:outerShdw>
+                </a:effectLst>
+              </a:rPr>
+              <a:t>momchil.mitev [at] </a:t>
+            </a:r>
+            <a:r>
+              <a:rPr lang="en-US" sz="3000" b="1" dirty="0">
+                <a:effectLst>
+                  <a:outerShdw blurRad="38100" dist="38100" dir="2700000" algn="tl">
+                    <a:srgbClr val="000000">
+                      <a:alpha val="43137"/>
+                    </a:srgbClr>
+                  </a:outerShdw>
+                </a:effectLst>
+              </a:rPr>
+              <a:t>telerik.com</a:t>
+            </a:r>
+          </a:p>
+        </p:txBody>
+      </p:sp>
+      <p:pic>
+        <p:nvPicPr>
+          <p:cNvPr id="2050" name="Picture 2" descr="C:\Telerik Academy\ASP.NET Cource\2010\lectures\lecturers-photos\MomchilMitev.jpg"/>
+          <p:cNvPicPr>
+            <a:picLocks noChangeAspect="1" noChangeArrowheads="1"/>
+          </p:cNvPicPr>
+          <p:nvPr/>
+        </p:nvPicPr>
+        <p:blipFill rotWithShape="1">
+          <a:blip r:embed="rId3" cstate="screen">
+            <a:lum/>
+            <a:extLst>
+              <a:ext uri="{28A0092B-C50C-407E-A947-70E740481C1C}">
+                <a14:useLocalDpi xmlns:a14="http://schemas.microsoft.com/office/drawing/2010/main"/>
+              </a:ext>
+            </a:extLst>
+          </a:blip>
+          <a:srcRect/>
+          <a:stretch/>
+        </p:blipFill>
+        <p:spPr bwMode="auto">
+          <a:xfrm>
+            <a:off x="6534149" y="1143000"/>
+            <a:ext cx="1390651" cy="1790700"/>
+          </a:xfrm>
+          <a:prstGeom prst="rect">
+            <a:avLst/>
+          </a:prstGeom>
+          <a:noFill/>
+          <a:ln w="3175">
+            <a:solidFill>
+              <a:schemeClr val="accent5">
+                <a:lumMod val="75000"/>
+              </a:schemeClr>
+            </a:solidFill>
+            <a:miter lim="800000"/>
+            <a:headEnd/>
+            <a:tailEnd/>
+          </a:ln>
+          <a:extLst>
+            <a:ext uri="{909E8E84-426E-40DD-AFC4-6F175D3DCCD1}">
+              <a14:hiddenFill xmlns:a14="http://schemas.microsoft.com/office/drawing/2010/main">
+                <a:solidFill>
+                  <a:srgbClr val="FFFFFF"/>
+                </a:solidFill>
+              </a14:hiddenFill>
+            </a:ext>
+          </a:extLst>
+        </p:spPr>
+      </p:pic>
+    </p:spTree>
+    <p:extLst>
+      <p:ext uri="{BB962C8B-B14F-4D97-AF65-F5344CB8AC3E}">
+        <p14:creationId xmlns:p14="http://schemas.microsoft.com/office/powerpoint/2010/main" val="3089033343"/>
+      </p:ext>
+    </p:extLst>
+  </p:cSld>
+  <p:clrMapOvr>
+    <a:masterClrMapping/>
+  </p:clrMapOvr>
+  <p:timing>
+    <p:tnLst>
+      <p:par>
+        <p:cTn id="1" dur="indefinite" restart="never" nodeType="tmRoot"/>
+      </p:par>
+    </p:tnLst>
+  </p:timing>
+</p:sld>
+</file>
+
+<file path=ppt/slides/slide16.xml><?xml version="1.0" encoding="utf-8"?>
+<p:sld xmlns:a="http://schemas.openxmlformats.org/drawingml/2006/main" xmlns:r="http://schemas.openxmlformats.org/officeDocument/2006/relationships" xmlns:p="http://schemas.openxmlformats.org/presentationml/2006/main">
+  <p:cSld>
+    <p:spTree>
+      <p:nvGrpSpPr>
+        <p:cNvPr id="1" name=""/>
+        <p:cNvGrpSpPr/>
+        <p:nvPr/>
+      </p:nvGrpSpPr>
+      <p:grpSpPr>
+        <a:xfrm>
+          <a:off x="0" y="0"/>
+          <a:ext cx="0" cy="0"/>
+          <a:chOff x="0" y="0"/>
+          <a:chExt cx="0" cy="0"/>
+        </a:xfrm>
+      </p:grpSpPr>
+      <p:sp>
+        <p:nvSpPr>
+          <p:cNvPr id="4" name="Title 3"/>
+          <p:cNvSpPr>
+            <a:spLocks noGrp="1"/>
+          </p:cNvSpPr>
+          <p:nvPr>
+            <p:ph type="title"/>
+          </p:nvPr>
+        </p:nvSpPr>
+        <p:spPr/>
+        <p:txBody>
+          <a:bodyPr/>
+          <a:lstStyle/>
+          <a:p>
+            <a:r>
+              <a:rPr lang="en-US" dirty="0" smtClean="0"/>
+              <a:t>Trainers Team </a:t>
+            </a:r>
+            <a:r>
+              <a:rPr lang="en-US" dirty="0" smtClean="0"/>
+              <a:t>(6)</a:t>
+            </a:r>
+            <a:endParaRPr lang="en-US" dirty="0"/>
+          </a:p>
+        </p:txBody>
+      </p:sp>
+      <p:sp>
+        <p:nvSpPr>
+          <p:cNvPr id="5" name="Content Placeholder 4"/>
+          <p:cNvSpPr>
+            <a:spLocks noGrp="1"/>
+          </p:cNvSpPr>
+          <p:nvPr>
+            <p:ph idx="1"/>
+          </p:nvPr>
+        </p:nvSpPr>
+        <p:spPr>
+          <a:xfrm>
+            <a:off x="228600" y="1252498"/>
+            <a:ext cx="5562600" cy="2438400"/>
+          </a:xfrm>
+        </p:spPr>
+        <p:txBody>
+          <a:bodyPr/>
+          <a:lstStyle/>
+          <a:p>
+            <a:pPr>
+              <a:lnSpc>
+                <a:spcPct val="100000"/>
+              </a:lnSpc>
+            </a:pPr>
+            <a:r>
+              <a:rPr lang="en-US" dirty="0"/>
+              <a:t>Veronica </a:t>
+            </a:r>
+            <a:r>
+              <a:rPr lang="en-US" dirty="0" smtClean="0"/>
+              <a:t>Milcheva </a:t>
+            </a:r>
+            <a:endParaRPr lang="en-US" dirty="0" smtClean="0"/>
+          </a:p>
+          <a:p>
+            <a:pPr lvl="1">
+              <a:lnSpc>
+                <a:spcPct val="100000"/>
+              </a:lnSpc>
+            </a:pPr>
+            <a:r>
+              <a:rPr lang="en-US" dirty="0"/>
+              <a:t>Junior Software Developer</a:t>
+            </a:r>
+            <a:r>
+              <a:rPr lang="bg-BG" dirty="0"/>
+              <a:t>, </a:t>
+            </a:r>
+            <a:r>
+              <a:rPr lang="en-US" dirty="0">
+                <a:hlinkClick r:id="rId2"/>
+              </a:rPr>
+              <a:t>Telerik</a:t>
+            </a:r>
+            <a:r>
+              <a:rPr lang="en-US" u="sng" dirty="0">
+                <a:hlinkClick r:id="rId2"/>
+              </a:rPr>
+              <a:t> </a:t>
+            </a:r>
+            <a:r>
+              <a:rPr lang="en-US" dirty="0" smtClean="0">
+                <a:hlinkClick r:id="rId2"/>
+              </a:rPr>
+              <a:t>Corporation</a:t>
+            </a:r>
+            <a:endParaRPr lang="en-US" dirty="0"/>
+          </a:p>
+        </p:txBody>
+      </p:sp>
+      <p:sp>
+        <p:nvSpPr>
+          <p:cNvPr id="7" name="Slide Number Placeholder 3"/>
+          <p:cNvSpPr>
+            <a:spLocks noGrp="1"/>
+          </p:cNvSpPr>
+          <p:nvPr>
+            <p:ph type="sldNum" sz="quarter" idx="10"/>
+          </p:nvPr>
+        </p:nvSpPr>
+        <p:spPr/>
+        <p:txBody>
+          <a:bodyPr/>
+          <a:lstStyle/>
+          <a:p>
+            <a:pPr>
+              <a:defRPr/>
+            </a:pPr>
+            <a:fld id="{58452FF4-89E3-4D1B-9927-2DBDC00E58D7}" type="slidenum">
+              <a:rPr lang="en-US" smtClean="0"/>
+              <a:pPr>
+                <a:defRPr/>
+              </a:pPr>
+              <a:t>16</a:t>
+            </a:fld>
+            <a:endParaRPr lang="en-US" dirty="0"/>
+          </a:p>
+        </p:txBody>
+      </p:sp>
+      <p:sp>
+        <p:nvSpPr>
+          <p:cNvPr id="8" name="Rectangle 7"/>
+          <p:cNvSpPr/>
+          <p:nvPr/>
+        </p:nvSpPr>
+        <p:spPr>
+          <a:xfrm>
+            <a:off x="228600" y="3124200"/>
+            <a:ext cx="8610600" cy="553998"/>
+          </a:xfrm>
+          <a:prstGeom prst="rect">
+            <a:avLst/>
+          </a:prstGeom>
+        </p:spPr>
+        <p:txBody>
+          <a:bodyPr wrap="square">
+            <a:spAutoFit/>
+          </a:bodyPr>
+          <a:lstStyle/>
+          <a:p>
+            <a:pPr marL="630238" lvl="1" indent="-273050">
+              <a:spcBef>
+                <a:spcPts val="600"/>
+              </a:spcBef>
+              <a:spcAft>
+                <a:spcPts val="600"/>
+              </a:spcAft>
+              <a:buClr>
+                <a:srgbClr val="8FD600"/>
+              </a:buClr>
+              <a:buFont typeface="Wingdings 2" pitchFamily="18" charset="2"/>
+              <a:buChar char=""/>
+            </a:pPr>
+            <a:r>
+              <a:rPr lang="en-US" sz="3000" b="1" dirty="0">
+                <a:effectLst>
+                  <a:outerShdw blurRad="38100" dist="38100" dir="2700000" algn="tl">
+                    <a:srgbClr val="000000">
+                      <a:alpha val="43137"/>
+                    </a:srgbClr>
+                  </a:outerShdw>
+                </a:effectLst>
+              </a:rPr>
+              <a:t>Email: </a:t>
+            </a:r>
+            <a:r>
+              <a:rPr lang="en-US" sz="3000" b="1" dirty="0" smtClean="0">
+                <a:effectLst>
+                  <a:outerShdw blurRad="38100" dist="38100" dir="2700000" algn="tl">
+                    <a:srgbClr val="000000">
+                      <a:alpha val="43137"/>
+                    </a:srgbClr>
+                  </a:outerShdw>
+                </a:effectLst>
+              </a:rPr>
+              <a:t>veronica.milcheva [at] </a:t>
+            </a:r>
+            <a:r>
+              <a:rPr lang="en-US" sz="3000" b="1" dirty="0">
+                <a:effectLst>
+                  <a:outerShdw blurRad="38100" dist="38100" dir="2700000" algn="tl">
+                    <a:srgbClr val="000000">
+                      <a:alpha val="43137"/>
+                    </a:srgbClr>
+                  </a:outerShdw>
+                </a:effectLst>
+              </a:rPr>
+              <a:t>telerik.com</a:t>
+            </a:r>
+            <a:endParaRPr lang="en-US" sz="3000" b="1" dirty="0" smtClean="0">
+              <a:solidFill>
+                <a:srgbClr val="CCFF66">
+                  <a:lumMod val="40000"/>
+                  <a:lumOff val="60000"/>
+                </a:srgbClr>
+              </a:solidFill>
+              <a:effectLst>
+                <a:outerShdw blurRad="38100" dist="38100" dir="2700000" algn="tl">
+                  <a:srgbClr val="000000">
+                    <a:alpha val="43137"/>
+                  </a:srgbClr>
+                </a:outerShdw>
+              </a:effectLst>
+              <a:latin typeface="Corbel"/>
+            </a:endParaRPr>
+          </a:p>
+        </p:txBody>
+      </p:sp>
+      <p:pic>
+        <p:nvPicPr>
+          <p:cNvPr id="3074" name="Picture 2" descr="C:\Telerik Academy\ASP.NET Cource\2010\lectures\lecturers-photos\veronica.jpg"/>
+          <p:cNvPicPr>
+            <a:picLocks noChangeAspect="1" noChangeArrowheads="1"/>
+          </p:cNvPicPr>
+          <p:nvPr/>
+        </p:nvPicPr>
+        <p:blipFill>
+          <a:blip r:embed="rId3">
+            <a:lum/>
+            <a:extLst>
+              <a:ext uri="{28A0092B-C50C-407E-A947-70E740481C1C}">
+                <a14:useLocalDpi xmlns:a14="http://schemas.microsoft.com/office/drawing/2010/main"/>
+              </a:ext>
+            </a:extLst>
+          </a:blip>
+          <a:srcRect/>
+          <a:stretch>
+            <a:fillRect/>
+          </a:stretch>
+        </p:blipFill>
+        <p:spPr bwMode="auto">
+          <a:xfrm>
+            <a:off x="6400800" y="914400"/>
+            <a:ext cx="1809750" cy="2120900"/>
+          </a:xfrm>
+          <a:prstGeom prst="rect">
+            <a:avLst/>
+          </a:prstGeom>
+          <a:noFill/>
+          <a:ln w="3175">
+            <a:solidFill>
+              <a:schemeClr val="accent5">
+                <a:lumMod val="75000"/>
+              </a:schemeClr>
+            </a:solidFill>
+            <a:miter lim="800000"/>
+            <a:headEnd/>
+            <a:tailEnd/>
+          </a:ln>
+          <a:extLst>
+            <a:ext uri="{909E8E84-426E-40DD-AFC4-6F175D3DCCD1}">
+              <a14:hiddenFill xmlns:a14="http://schemas.microsoft.com/office/drawing/2010/main">
+                <a:solidFill>
+                  <a:srgbClr val="FFFFFF"/>
+                </a:solidFill>
+              </a14:hiddenFill>
+            </a:ext>
+          </a:extLst>
+        </p:spPr>
+      </p:pic>
+    </p:spTree>
+    <p:extLst>
+      <p:ext uri="{BB962C8B-B14F-4D97-AF65-F5344CB8AC3E}">
+        <p14:creationId xmlns:p14="http://schemas.microsoft.com/office/powerpoint/2010/main" val="4028452447"/>
+      </p:ext>
+    </p:extLst>
+  </p:cSld>
+  <p:clrMapOvr>
+    <a:masterClrMapping/>
+  </p:clrMapOvr>
+  <p:timing>
+    <p:tnLst>
+      <p:par>
+        <p:cTn id="1" dur="indefinite" restart="never" nodeType="tmRoot"/>
+      </p:par>
+    </p:tnLst>
+  </p:timing>
+</p:sld>
+</file>
+
+<file path=ppt/slides/slide17.xml><?xml version="1.0" encoding="utf-8"?>
+<p:sld xmlns:a="http://schemas.openxmlformats.org/drawingml/2006/main" xmlns:r="http://schemas.openxmlformats.org/officeDocument/2006/relationships" xmlns:p="http://schemas.openxmlformats.org/presentationml/2006/main">
+  <p:cSld>
+    <p:spTree>
+      <p:nvGrpSpPr>
+        <p:cNvPr id="1" name=""/>
+        <p:cNvGrpSpPr/>
+        <p:nvPr/>
+      </p:nvGrpSpPr>
+      <p:grpSpPr>
+        <a:xfrm>
+          <a:off x="0" y="0"/>
+          <a:ext cx="0" cy="0"/>
+          <a:chOff x="0" y="0"/>
+          <a:chExt cx="0" cy="0"/>
+        </a:xfrm>
+      </p:grpSpPr>
+      <p:sp>
+        <p:nvSpPr>
+          <p:cNvPr id="4" name="Title 3"/>
+          <p:cNvSpPr>
+            <a:spLocks noGrp="1"/>
+          </p:cNvSpPr>
+          <p:nvPr>
+            <p:ph type="title"/>
+          </p:nvPr>
+        </p:nvSpPr>
+        <p:spPr/>
+        <p:txBody>
+          <a:bodyPr/>
+          <a:lstStyle/>
+          <a:p>
+            <a:r>
+              <a:rPr lang="en-US" dirty="0" smtClean="0"/>
+              <a:t>Trainers </a:t>
+            </a:r>
+            <a:r>
+              <a:rPr lang="en-US" dirty="0" smtClean="0"/>
+              <a:t>Team (7)</a:t>
+            </a:r>
+            <a:endParaRPr lang="en-US" dirty="0"/>
+          </a:p>
+        </p:txBody>
+      </p:sp>
+      <p:sp>
+        <p:nvSpPr>
+          <p:cNvPr id="5" name="Content Placeholder 4"/>
+          <p:cNvSpPr>
+            <a:spLocks noGrp="1"/>
+          </p:cNvSpPr>
+          <p:nvPr>
+            <p:ph idx="1"/>
+          </p:nvPr>
+        </p:nvSpPr>
+        <p:spPr>
+          <a:xfrm>
+            <a:off x="228600" y="1492581"/>
+            <a:ext cx="5486400" cy="2286000"/>
+          </a:xfrm>
+        </p:spPr>
+        <p:txBody>
+          <a:bodyPr/>
+          <a:lstStyle/>
+          <a:p>
+            <a:pPr>
+              <a:lnSpc>
+                <a:spcPct val="100000"/>
+              </a:lnSpc>
+            </a:pPr>
+            <a:r>
+              <a:rPr lang="en-US" dirty="0"/>
+              <a:t>Alexander Vakrilov</a:t>
+            </a:r>
+            <a:r>
+              <a:rPr lang="bg-BG" dirty="0"/>
+              <a:t> </a:t>
+            </a:r>
+            <a:endParaRPr lang="en-US" dirty="0" smtClean="0"/>
+          </a:p>
+          <a:p>
+            <a:pPr lvl="1">
+              <a:lnSpc>
+                <a:spcPct val="100000"/>
+              </a:lnSpc>
+            </a:pPr>
+            <a:r>
+              <a:rPr lang="en-US" dirty="0" smtClean="0"/>
+              <a:t>Junior </a:t>
+            </a:r>
+            <a:r>
+              <a:rPr lang="en-US" dirty="0"/>
+              <a:t>Software Engineer</a:t>
+            </a:r>
+            <a:r>
+              <a:rPr lang="bg-BG" dirty="0"/>
+              <a:t>, </a:t>
+            </a:r>
+            <a:r>
+              <a:rPr lang="en-US" u="sng" dirty="0">
+                <a:hlinkClick r:id="rId2"/>
+              </a:rPr>
+              <a:t>Telerik </a:t>
+            </a:r>
+            <a:r>
+              <a:rPr lang="en-US" u="sng" dirty="0" smtClean="0">
+                <a:hlinkClick r:id="rId2"/>
+              </a:rPr>
+              <a:t>Corporation</a:t>
+            </a:r>
+            <a:endParaRPr lang="en-US" dirty="0"/>
+          </a:p>
+        </p:txBody>
+      </p:sp>
+      <p:sp>
+        <p:nvSpPr>
+          <p:cNvPr id="7" name="Slide Number Placeholder 3"/>
+          <p:cNvSpPr>
+            <a:spLocks noGrp="1"/>
+          </p:cNvSpPr>
+          <p:nvPr>
+            <p:ph type="sldNum" sz="quarter" idx="10"/>
+          </p:nvPr>
+        </p:nvSpPr>
+        <p:spPr/>
+        <p:txBody>
+          <a:bodyPr/>
+          <a:lstStyle/>
+          <a:p>
+            <a:pPr>
+              <a:defRPr/>
+            </a:pPr>
+            <a:fld id="{58452FF4-89E3-4D1B-9927-2DBDC00E58D7}" type="slidenum">
+              <a:rPr lang="en-US" smtClean="0"/>
+              <a:pPr>
+                <a:defRPr/>
+              </a:pPr>
+              <a:t>17</a:t>
+            </a:fld>
+            <a:endParaRPr lang="en-US" dirty="0"/>
+          </a:p>
+        </p:txBody>
+      </p:sp>
+      <p:sp>
+        <p:nvSpPr>
+          <p:cNvPr id="8" name="Rectangle 7"/>
+          <p:cNvSpPr/>
+          <p:nvPr/>
+        </p:nvSpPr>
+        <p:spPr>
+          <a:xfrm>
+            <a:off x="228600" y="3224583"/>
+            <a:ext cx="8610600" cy="553998"/>
+          </a:xfrm>
+          <a:prstGeom prst="rect">
+            <a:avLst/>
+          </a:prstGeom>
+        </p:spPr>
+        <p:txBody>
+          <a:bodyPr wrap="square">
+            <a:spAutoFit/>
+          </a:bodyPr>
+          <a:lstStyle/>
+          <a:p>
+            <a:pPr marL="630238" lvl="1" indent="-273050">
+              <a:spcBef>
+                <a:spcPts val="600"/>
+              </a:spcBef>
+              <a:spcAft>
+                <a:spcPts val="600"/>
+              </a:spcAft>
+              <a:buClr>
+                <a:srgbClr val="8FD600"/>
+              </a:buClr>
+              <a:buFont typeface="Wingdings 2" pitchFamily="18" charset="2"/>
+              <a:buChar char=""/>
+            </a:pPr>
+            <a:r>
+              <a:rPr lang="en-US" sz="3000" b="1" dirty="0" smtClean="0">
+                <a:effectLst>
+                  <a:outerShdw blurRad="38100" dist="38100" dir="2700000" algn="tl">
+                    <a:srgbClr val="000000">
+                      <a:alpha val="43137"/>
+                    </a:srgbClr>
+                  </a:outerShdw>
+                </a:effectLst>
+              </a:rPr>
+              <a:t>Email</a:t>
+            </a:r>
+            <a:r>
+              <a:rPr lang="en-US" sz="3000" b="1" dirty="0">
+                <a:effectLst>
+                  <a:outerShdw blurRad="38100" dist="38100" dir="2700000" algn="tl">
+                    <a:srgbClr val="000000">
+                      <a:alpha val="43137"/>
+                    </a:srgbClr>
+                  </a:outerShdw>
+                </a:effectLst>
+              </a:rPr>
+              <a:t>: </a:t>
+            </a:r>
+            <a:r>
+              <a:rPr lang="en-US" sz="3000" b="1" dirty="0" smtClean="0">
+                <a:effectLst>
+                  <a:outerShdw blurRad="38100" dist="38100" dir="2700000" algn="tl">
+                    <a:srgbClr val="000000">
+                      <a:alpha val="43137"/>
+                    </a:srgbClr>
+                  </a:outerShdw>
+                </a:effectLst>
+              </a:rPr>
+              <a:t>alexander.vakrilov [at] telerik.com</a:t>
+            </a:r>
+            <a:endParaRPr lang="en-US" sz="3000" b="1" dirty="0">
+              <a:solidFill>
+                <a:srgbClr val="CCFF66">
+                  <a:lumMod val="40000"/>
+                  <a:lumOff val="60000"/>
+                </a:srgbClr>
+              </a:solidFill>
+              <a:effectLst>
+                <a:outerShdw blurRad="38100" dist="38100" dir="2700000" algn="tl">
+                  <a:srgbClr val="000000">
+                    <a:alpha val="43137"/>
+                  </a:srgbClr>
+                </a:outerShdw>
+              </a:effectLst>
+              <a:latin typeface="Corbel"/>
+            </a:endParaRPr>
+          </a:p>
+        </p:txBody>
+      </p:sp>
+      <p:pic>
+        <p:nvPicPr>
+          <p:cNvPr id="5122" name="Picture 2" descr="C:\Telerik Academy\ASP.NET Cource\2010\lectures\lecturers-photos\Alexander Vakrilov.png"/>
+          <p:cNvPicPr>
+            <a:picLocks noChangeAspect="1" noChangeArrowheads="1"/>
+          </p:cNvPicPr>
+          <p:nvPr/>
+        </p:nvPicPr>
+        <p:blipFill>
+          <a:blip r:embed="rId3">
+            <a:lum/>
+            <a:extLst>
+              <a:ext uri="{28A0092B-C50C-407E-A947-70E740481C1C}">
+                <a14:useLocalDpi xmlns:a14="http://schemas.microsoft.com/office/drawing/2010/main"/>
+              </a:ext>
+            </a:extLst>
+          </a:blip>
+          <a:srcRect/>
+          <a:stretch>
+            <a:fillRect/>
+          </a:stretch>
+        </p:blipFill>
+        <p:spPr bwMode="auto">
+          <a:xfrm>
+            <a:off x="6400800" y="914400"/>
+            <a:ext cx="1714500" cy="2286000"/>
+          </a:xfrm>
+          <a:prstGeom prst="rect">
+            <a:avLst/>
+          </a:prstGeom>
+          <a:noFill/>
+          <a:ln w="3175">
+            <a:solidFill>
+              <a:schemeClr val="accent5">
+                <a:lumMod val="75000"/>
+              </a:schemeClr>
+            </a:solidFill>
+            <a:miter lim="800000"/>
+            <a:headEnd/>
+            <a:tailEnd/>
+          </a:ln>
+          <a:extLst>
+            <a:ext uri="{909E8E84-426E-40DD-AFC4-6F175D3DCCD1}">
+              <a14:hiddenFill xmlns:a14="http://schemas.microsoft.com/office/drawing/2010/main">
+                <a:solidFill>
+                  <a:srgbClr val="FFFFFF"/>
+                </a:solidFill>
+              </a14:hiddenFill>
+            </a:ext>
+          </a:extLst>
+        </p:spPr>
+      </p:pic>
+    </p:spTree>
+    <p:extLst>
+      <p:ext uri="{BB962C8B-B14F-4D97-AF65-F5344CB8AC3E}">
+        <p14:creationId xmlns:p14="http://schemas.microsoft.com/office/powerpoint/2010/main" val="3089033343"/>
+      </p:ext>
+    </p:extLst>
+  </p:cSld>
+  <p:clrMapOvr>
+    <a:masterClrMapping/>
+  </p:clrMapOvr>
+  <p:timing>
+    <p:tnLst>
+      <p:par>
+        <p:cTn id="1" dur="indefinite" restart="never" nodeType="tmRoot"/>
+      </p:par>
+    </p:tnLst>
+  </p:timing>
+</p:sld>
+</file>
+
+<file path=ppt/slides/slide18.xml><?xml version="1.0" encoding="utf-8"?>
+<p:sld xmlns:a="http://schemas.openxmlformats.org/drawingml/2006/main" xmlns:r="http://schemas.openxmlformats.org/officeDocument/2006/relationships" xmlns:p="http://schemas.openxmlformats.org/presentationml/2006/main">
+  <p:cSld>
+    <p:spTree>
+      <p:nvGrpSpPr>
+        <p:cNvPr id="1" name=""/>
+        <p:cNvGrpSpPr/>
+        <p:nvPr/>
+      </p:nvGrpSpPr>
+      <p:grpSpPr>
+        <a:xfrm>
+          <a:off x="0" y="0"/>
+          <a:ext cx="0" cy="0"/>
+          <a:chOff x="0" y="0"/>
+          <a:chExt cx="0" cy="0"/>
+        </a:xfrm>
+      </p:grpSpPr>
+      <p:sp>
+        <p:nvSpPr>
+          <p:cNvPr id="4" name="Title 3"/>
+          <p:cNvSpPr>
+            <a:spLocks noGrp="1"/>
+          </p:cNvSpPr>
+          <p:nvPr>
+            <p:ph type="title"/>
+          </p:nvPr>
+        </p:nvSpPr>
+        <p:spPr/>
+        <p:txBody>
+          <a:bodyPr/>
+          <a:lstStyle/>
+          <a:p>
+            <a:r>
+              <a:rPr lang="en-US" dirty="0" smtClean="0"/>
+              <a:t>Trainers Team </a:t>
+            </a:r>
+            <a:r>
+              <a:rPr lang="en-US" dirty="0" smtClean="0"/>
+              <a:t>(8)</a:t>
+            </a:r>
+            <a:endParaRPr lang="en-US" dirty="0"/>
+          </a:p>
+        </p:txBody>
+      </p:sp>
+      <p:sp>
+        <p:nvSpPr>
+          <p:cNvPr id="5" name="Content Placeholder 4"/>
+          <p:cNvSpPr>
+            <a:spLocks noGrp="1"/>
+          </p:cNvSpPr>
+          <p:nvPr>
+            <p:ph idx="1"/>
+          </p:nvPr>
+        </p:nvSpPr>
+        <p:spPr>
+          <a:xfrm>
+            <a:off x="228600" y="1828800"/>
+            <a:ext cx="5943600" cy="2438400"/>
+          </a:xfrm>
+        </p:spPr>
+        <p:txBody>
+          <a:bodyPr/>
+          <a:lstStyle/>
+          <a:p>
+            <a:pPr>
+              <a:lnSpc>
+                <a:spcPct val="100000"/>
+              </a:lnSpc>
+            </a:pPr>
+            <a:r>
+              <a:rPr lang="en-US" dirty="0"/>
+              <a:t>Bonny Bonev</a:t>
+            </a:r>
+            <a:r>
+              <a:rPr lang="bg-BG" dirty="0"/>
+              <a:t> </a:t>
+            </a:r>
+            <a:endParaRPr lang="en-US" dirty="0" smtClean="0"/>
+          </a:p>
+          <a:p>
+            <a:pPr lvl="1">
+              <a:lnSpc>
+                <a:spcPct val="100000"/>
+              </a:lnSpc>
+            </a:pPr>
+            <a:r>
+              <a:rPr lang="en-US" dirty="0" smtClean="0"/>
+              <a:t>Junior </a:t>
+            </a:r>
+            <a:r>
+              <a:rPr lang="en-US" dirty="0"/>
+              <a:t>Software Developer</a:t>
+            </a:r>
+            <a:r>
+              <a:rPr lang="bg-BG" dirty="0"/>
+              <a:t>, </a:t>
+            </a:r>
+            <a:r>
+              <a:rPr lang="en-US" u="sng" dirty="0">
+                <a:hlinkClick r:id="rId2"/>
+              </a:rPr>
+              <a:t>Telerik </a:t>
+            </a:r>
+            <a:r>
+              <a:rPr lang="en-US" dirty="0" smtClean="0">
+                <a:hlinkClick r:id="rId2"/>
+              </a:rPr>
+              <a:t>Corporation</a:t>
+            </a:r>
+            <a:endParaRPr lang="en-US" dirty="0"/>
+          </a:p>
+        </p:txBody>
+      </p:sp>
+      <p:sp>
+        <p:nvSpPr>
+          <p:cNvPr id="7" name="Slide Number Placeholder 3"/>
+          <p:cNvSpPr>
+            <a:spLocks noGrp="1"/>
+          </p:cNvSpPr>
+          <p:nvPr>
+            <p:ph type="sldNum" sz="quarter" idx="10"/>
+          </p:nvPr>
+        </p:nvSpPr>
+        <p:spPr/>
+        <p:txBody>
+          <a:bodyPr/>
+          <a:lstStyle/>
+          <a:p>
+            <a:pPr>
+              <a:defRPr/>
+            </a:pPr>
+            <a:fld id="{58452FF4-89E3-4D1B-9927-2DBDC00E58D7}" type="slidenum">
+              <a:rPr lang="en-US" smtClean="0"/>
+              <a:pPr>
+                <a:defRPr/>
+              </a:pPr>
+              <a:t>18</a:t>
+            </a:fld>
+            <a:endParaRPr lang="en-US" dirty="0"/>
+          </a:p>
+        </p:txBody>
+      </p:sp>
+      <p:sp>
+        <p:nvSpPr>
+          <p:cNvPr id="8" name="Rectangle 7"/>
+          <p:cNvSpPr/>
+          <p:nvPr/>
+        </p:nvSpPr>
+        <p:spPr>
+          <a:xfrm>
+            <a:off x="228600" y="3505200"/>
+            <a:ext cx="8610600" cy="553998"/>
+          </a:xfrm>
+          <a:prstGeom prst="rect">
+            <a:avLst/>
+          </a:prstGeom>
+        </p:spPr>
+        <p:txBody>
+          <a:bodyPr wrap="square">
+            <a:spAutoFit/>
+          </a:bodyPr>
+          <a:lstStyle/>
+          <a:p>
+            <a:pPr marL="630238" lvl="1" indent="-273050">
+              <a:spcBef>
+                <a:spcPts val="600"/>
+              </a:spcBef>
+              <a:spcAft>
+                <a:spcPts val="600"/>
+              </a:spcAft>
+              <a:buClr>
+                <a:srgbClr val="8FD600"/>
+              </a:buClr>
+              <a:buFont typeface="Wingdings 2" pitchFamily="18" charset="2"/>
+              <a:buChar char=""/>
+            </a:pPr>
+            <a:r>
+              <a:rPr lang="en-US" sz="3000" b="1" dirty="0" smtClean="0">
+                <a:effectLst>
+                  <a:outerShdw blurRad="38100" dist="38100" dir="2700000" algn="tl">
+                    <a:srgbClr val="000000">
+                      <a:alpha val="43137"/>
+                    </a:srgbClr>
+                  </a:outerShdw>
+                </a:effectLst>
+              </a:rPr>
+              <a:t>Email</a:t>
+            </a:r>
+            <a:r>
+              <a:rPr lang="en-US" sz="3000" b="1" dirty="0">
+                <a:effectLst>
+                  <a:outerShdw blurRad="38100" dist="38100" dir="2700000" algn="tl">
+                    <a:srgbClr val="000000">
+                      <a:alpha val="43137"/>
+                    </a:srgbClr>
+                  </a:outerShdw>
+                </a:effectLst>
+              </a:rPr>
+              <a:t>: </a:t>
+            </a:r>
+            <a:r>
+              <a:rPr lang="en-US" sz="3000" b="1" dirty="0" smtClean="0">
+                <a:effectLst>
+                  <a:outerShdw blurRad="38100" dist="38100" dir="2700000" algn="tl">
+                    <a:srgbClr val="000000">
+                      <a:alpha val="43137"/>
+                    </a:srgbClr>
+                  </a:outerShdw>
+                </a:effectLst>
+              </a:rPr>
+              <a:t>bonny.bonev [at] telerik.com</a:t>
+            </a:r>
+            <a:endParaRPr lang="en-US" sz="3000" b="1" dirty="0">
+              <a:effectLst>
+                <a:outerShdw blurRad="38100" dist="38100" dir="2700000" algn="tl">
+                  <a:srgbClr val="000000">
+                    <a:alpha val="43137"/>
+                  </a:srgbClr>
+                </a:outerShdw>
+              </a:effectLst>
+            </a:endParaRPr>
+          </a:p>
+        </p:txBody>
+      </p:sp>
+      <p:pic>
+        <p:nvPicPr>
+          <p:cNvPr id="6146" name="Picture 2" descr="C:\Telerik Academy\ASP.NET Cource\2010\lectures\lecturers-photos\BonnyBonev.jpg"/>
+          <p:cNvPicPr>
+            <a:picLocks noChangeAspect="1" noChangeArrowheads="1"/>
+          </p:cNvPicPr>
+          <p:nvPr/>
+        </p:nvPicPr>
+        <p:blipFill>
+          <a:blip r:embed="rId3" cstate="screen">
+            <a:lum/>
+            <a:extLst>
+              <a:ext uri="{28A0092B-C50C-407E-A947-70E740481C1C}">
+                <a14:useLocalDpi xmlns:a14="http://schemas.microsoft.com/office/drawing/2010/main"/>
+              </a:ext>
+            </a:extLst>
+          </a:blip>
+          <a:srcRect/>
+          <a:stretch>
+            <a:fillRect/>
+          </a:stretch>
+        </p:blipFill>
+        <p:spPr bwMode="auto">
+          <a:xfrm>
+            <a:off x="6581774" y="1054100"/>
+            <a:ext cx="1724026" cy="2298700"/>
+          </a:xfrm>
+          <a:prstGeom prst="rect">
+            <a:avLst/>
+          </a:prstGeom>
+          <a:noFill/>
+          <a:ln w="3175">
+            <a:solidFill>
+              <a:schemeClr val="accent5">
+                <a:lumMod val="75000"/>
+              </a:schemeClr>
+            </a:solidFill>
+            <a:miter lim="800000"/>
+            <a:headEnd/>
+            <a:tailEnd/>
+          </a:ln>
+          <a:extLst>
+            <a:ext uri="{909E8E84-426E-40DD-AFC4-6F175D3DCCD1}">
+              <a14:hiddenFill xmlns:a14="http://schemas.microsoft.com/office/drawing/2010/main">
+                <a:solidFill>
+                  <a:srgbClr val="FFFFFF"/>
+                </a:solidFill>
+              </a14:hiddenFill>
+            </a:ext>
+          </a:extLst>
+        </p:spPr>
+      </p:pic>
+    </p:spTree>
+    <p:extLst>
+      <p:ext uri="{BB962C8B-B14F-4D97-AF65-F5344CB8AC3E}">
+        <p14:creationId xmlns:p14="http://schemas.microsoft.com/office/powerpoint/2010/main" val="4028452447"/>
+      </p:ext>
+    </p:extLst>
+  </p:cSld>
+  <p:clrMapOvr>
+    <a:masterClrMapping/>
+  </p:clrMapOvr>
+  <p:timing>
+    <p:tnLst>
+      <p:par>
+        <p:cTn id="1" dur="indefinite" restart="never" nodeType="tmRoot"/>
+      </p:par>
+    </p:tnLst>
+  </p:timing>
+</p:sld>
+</file>
+
+<file path=ppt/slides/slide19.xml><?xml version="1.0" encoding="utf-8"?>
 <p:sld xmlns:a="http://schemas.openxmlformats.org/drawingml/2006/main" xmlns:r="http://schemas.openxmlformats.org/officeDocument/2006/relationships" xmlns:p="http://schemas.openxmlformats.org/presentationml/2006/main">
   <p:cSld>
     <p:spTree>
@@ -6680,7 +8496,7 @@
 </p:sld>
 </file>
 
-<file path=ppt/slides/slide14.xml><?xml version="1.0" encoding="utf-8"?>
+<file path=ppt/slides/slide2.xml><?xml version="1.0" encoding="utf-8"?>
 <p:sld xmlns:a="http://schemas.openxmlformats.org/drawingml/2006/main" xmlns:r="http://schemas.openxmlformats.org/officeDocument/2006/relationships" xmlns:p="http://schemas.openxmlformats.org/presentationml/2006/main">
   <p:cSld>
     <p:spTree>
@@ -6714,7 +8530,7 @@
           <a:p>
             <a:r>
               <a:rPr lang="en-US" dirty="0" smtClean="0"/>
-              <a:t>Assessment</a:t>
+              <a:t>About the Course</a:t>
             </a:r>
             <a:endParaRPr lang="en-US" dirty="0"/>
           </a:p>
@@ -6737,91 +8553,68 @@
           <a:p>
             <a:pPr>
               <a:lnSpc>
-                <a:spcPts val="3700"/>
+                <a:spcPct val="100000"/>
               </a:lnSpc>
             </a:pPr>
             <a:r>
               <a:rPr lang="en-US" dirty="0" smtClean="0"/>
-              <a:t>Practical project</a:t>
+              <a:t>Web Applications Development with .NET Framework and ASP.NET objectives</a:t>
             </a:r>
           </a:p>
           <a:p>
             <a:pPr lvl="1">
               <a:lnSpc>
-                <a:spcPts val="3700"/>
+                <a:spcPct val="100000"/>
               </a:lnSpc>
             </a:pPr>
             <a:r>
               <a:rPr lang="en-US" dirty="0" smtClean="0"/>
-              <a:t>Dynamic Web application – developed at home</a:t>
+              <a:t>Provides basic skills for development of dynamic data-driven ASP.NET Web applications</a:t>
             </a:r>
           </a:p>
           <a:p>
             <a:pPr lvl="1">
               <a:lnSpc>
-                <a:spcPts val="3700"/>
+                <a:spcPct val="100000"/>
               </a:lnSpc>
             </a:pPr>
             <a:r>
               <a:rPr lang="en-US" dirty="0" smtClean="0"/>
-              <a:t>Based on .NET Framework, ASP.NET Web Forms, SQL Server and LINQ-to-SQL</a:t>
-            </a:r>
-          </a:p>
-          <a:p>
-            <a:pPr>
+              <a:t>C# language fundamentals</a:t>
+            </a:r>
+          </a:p>
+          <a:p>
+            <a:pPr lvl="1">
               <a:lnSpc>
-                <a:spcPts val="3700"/>
+                <a:spcPct val="100000"/>
               </a:lnSpc>
             </a:pPr>
             <a:r>
               <a:rPr lang="en-US" dirty="0" smtClean="0"/>
-              <a:t>Examples:</a:t>
+              <a:t>Databases and SQL Server</a:t>
             </a:r>
           </a:p>
           <a:p>
             <a:pPr lvl="1">
               <a:lnSpc>
-                <a:spcPts val="3700"/>
+                <a:spcPct val="100000"/>
               </a:lnSpc>
             </a:pPr>
             <a:r>
               <a:rPr lang="en-US" dirty="0" smtClean="0"/>
-              <a:t>Photo album</a:t>
+              <a:t>LINQ and LINQ-to-SQL</a:t>
             </a:r>
           </a:p>
           <a:p>
             <a:pPr lvl="1">
               <a:lnSpc>
-                <a:spcPts val="3700"/>
+                <a:spcPct val="100000"/>
               </a:lnSpc>
             </a:pPr>
             <a:r>
               <a:rPr lang="en-US" dirty="0" smtClean="0"/>
-              <a:t>CMS system</a:t>
-            </a:r>
-          </a:p>
-          <a:p>
-            <a:pPr lvl="1">
-              <a:lnSpc>
-                <a:spcPts val="3700"/>
-              </a:lnSpc>
-            </a:pPr>
-            <a:r>
-              <a:rPr lang="en-US" dirty="0" smtClean="0"/>
-              <a:t>Blog system</a:t>
-            </a:r>
-          </a:p>
-          <a:p>
-            <a:pPr lvl="1">
-              <a:lnSpc>
-                <a:spcPts val="3700"/>
-              </a:lnSpc>
-            </a:pPr>
-            <a:r>
-              <a:rPr lang="en-US" dirty="0" smtClean="0"/>
-              <a:t>Dating site</a:t>
-            </a:r>
-            <a:endParaRPr lang="en-US" dirty="0"/>
+              <a:t>ASP.NET and AJAX</a:t>
+            </a:r>
           </a:p>
         </p:txBody>
       </p:sp>
@@ -6848,7 +8641,258 @@
               <a:pPr>
                 <a:defRPr/>
               </a:pPr>
-              <a:t>14</a:t>
+              <a:t>2</a:t>
+            </a:fld>
+            <a:endParaRPr lang="en-US" dirty="0"/>
+          </a:p>
+        </p:txBody>
+      </p:sp>
+      <p:pic>
+        <p:nvPicPr>
+          <p:cNvPr id="25604" name="Picture 4" descr="http://www.artegraficas.com.br/img/web_sites/web_sites.jpg"/>
+          <p:cNvPicPr>
+            <a:picLocks noChangeAspect="1" noChangeArrowheads="1"/>
+          </p:cNvPicPr>
+          <p:nvPr/>
+        </p:nvPicPr>
+        <p:blipFill>
+          <a:blip r:embed="rId2" cstate="screen">
+            <a:extLst>
+              <a:ext uri="{28A0092B-C50C-407E-A947-70E740481C1C}">
+                <a14:useLocalDpi xmlns:a14="http://schemas.microsoft.com/office/drawing/2010/main"/>
+              </a:ext>
+            </a:extLst>
+          </a:blip>
+          <a:srcRect/>
+          <a:stretch>
+            <a:fillRect/>
+          </a:stretch>
+        </p:blipFill>
+        <p:spPr bwMode="auto">
+          <a:xfrm>
+            <a:off x="5562600" y="3886200"/>
+            <a:ext cx="2950185" cy="2362200"/>
+          </a:xfrm>
+          <a:prstGeom prst="roundRect">
+            <a:avLst>
+              <a:gd name="adj" fmla="val 8046"/>
+            </a:avLst>
+          </a:prstGeom>
+          <a:noFill/>
+        </p:spPr>
+      </p:pic>
+    </p:spTree>
+  </p:cSld>
+  <p:clrMapOvr>
+    <a:masterClrMapping/>
+  </p:clrMapOvr>
+  <p:timing>
+    <p:tnLst>
+      <p:par>
+        <p:cTn id="1" dur="indefinite" restart="never" nodeType="tmRoot"/>
+      </p:par>
+    </p:tnLst>
+  </p:timing>
+</p:sld>
+</file>
+
+<file path=ppt/slides/slide20.xml><?xml version="1.0" encoding="utf-8"?>
+<p:sld xmlns:a="http://schemas.openxmlformats.org/drawingml/2006/main" xmlns:r="http://schemas.openxmlformats.org/officeDocument/2006/relationships" xmlns:p="http://schemas.openxmlformats.org/presentationml/2006/main">
+  <p:cSld>
+    <p:spTree>
+      <p:nvGrpSpPr>
+        <p:cNvPr id="1" name=""/>
+        <p:cNvGrpSpPr/>
+        <p:nvPr/>
+      </p:nvGrpSpPr>
+      <p:grpSpPr>
+        <a:xfrm>
+          <a:off x="0" y="0"/>
+          <a:ext cx="0" cy="0"/>
+          <a:chOff x="0" y="0"/>
+          <a:chExt cx="0" cy="0"/>
+        </a:xfrm>
+      </p:grpSpPr>
+      <p:sp>
+        <p:nvSpPr>
+          <p:cNvPr id="2" name="Title 1"/>
+          <p:cNvSpPr>
+            <a:spLocks noGrp="1"/>
+          </p:cNvSpPr>
+          <p:nvPr>
+            <p:ph type="title"/>
+          </p:nvPr>
+        </p:nvSpPr>
+        <p:spPr/>
+        <p:txBody>
+          <a:bodyPr/>
+          <a:lstStyle/>
+          <a:p>
+            <a:r>
+              <a:rPr lang="en-US" dirty="0" smtClean="0"/>
+              <a:t>Assessment</a:t>
+            </a:r>
+            <a:endParaRPr lang="en-US" dirty="0"/>
+          </a:p>
+        </p:txBody>
+      </p:sp>
+      <p:sp>
+        <p:nvSpPr>
+          <p:cNvPr id="3" name="Content Placeholder 2"/>
+          <p:cNvSpPr>
+            <a:spLocks noGrp="1"/>
+          </p:cNvSpPr>
+          <p:nvPr>
+            <p:ph idx="1"/>
+          </p:nvPr>
+        </p:nvSpPr>
+        <p:spPr>
+          <a:xfrm>
+            <a:off x="152400" y="762000"/>
+            <a:ext cx="8915400" cy="5943600"/>
+          </a:xfrm>
+        </p:spPr>
+        <p:txBody>
+          <a:bodyPr/>
+          <a:lstStyle/>
+          <a:p>
+            <a:pPr>
+              <a:lnSpc>
+                <a:spcPct val="100000"/>
+              </a:lnSpc>
+            </a:pPr>
+            <a:r>
+              <a:rPr lang="en-US" dirty="0" smtClean="0"/>
+              <a:t>Practical </a:t>
+            </a:r>
+            <a:r>
+              <a:rPr lang="en-US" dirty="0" smtClean="0"/>
+              <a:t>project</a:t>
+            </a:r>
+          </a:p>
+          <a:p>
+            <a:pPr marL="457200" lvl="1" indent="-100013">
+              <a:lnSpc>
+                <a:spcPct val="100000"/>
+              </a:lnSpc>
+            </a:pPr>
+            <a:r>
+              <a:rPr lang="en-US" dirty="0" smtClean="0"/>
+              <a:t>The practical project will consist of two parts</a:t>
+            </a:r>
+          </a:p>
+          <a:p>
+            <a:pPr marL="749300" lvl="2" indent="-100013">
+              <a:lnSpc>
+                <a:spcPct val="100000"/>
+              </a:lnSpc>
+            </a:pPr>
+            <a:r>
+              <a:rPr lang="en-US" dirty="0" smtClean="0"/>
+              <a:t>Data Access Layer and GUI</a:t>
+            </a:r>
+          </a:p>
+          <a:p>
+            <a:pPr marL="457200" lvl="1" indent="-100013">
+              <a:lnSpc>
+                <a:spcPct val="100000"/>
+              </a:lnSpc>
+            </a:pPr>
+            <a:r>
+              <a:rPr lang="en-US" dirty="0" smtClean="0"/>
+              <a:t>Dynamic </a:t>
+            </a:r>
+            <a:r>
+              <a:rPr lang="en-US" dirty="0" smtClean="0"/>
+              <a:t>Web application – developed at home</a:t>
+            </a:r>
+          </a:p>
+          <a:p>
+            <a:pPr marL="457200" lvl="1" indent="-100013">
+              <a:lnSpc>
+                <a:spcPct val="100000"/>
+              </a:lnSpc>
+            </a:pPr>
+            <a:r>
+              <a:rPr lang="en-US" dirty="0" smtClean="0"/>
+              <a:t>Based on .NET Framework, ASP.NET Web Forms, SQL Server and LINQ-to-SQL</a:t>
+            </a:r>
+          </a:p>
+          <a:p>
+            <a:pPr>
+              <a:lnSpc>
+                <a:spcPct val="100000"/>
+              </a:lnSpc>
+            </a:pPr>
+            <a:r>
+              <a:rPr lang="en-US" dirty="0" smtClean="0"/>
+              <a:t>Examples:</a:t>
+            </a:r>
+          </a:p>
+          <a:p>
+            <a:pPr marL="457200" lvl="1" indent="-100013">
+              <a:lnSpc>
+                <a:spcPct val="100000"/>
+              </a:lnSpc>
+            </a:pPr>
+            <a:r>
+              <a:rPr lang="en-US" dirty="0" smtClean="0"/>
+              <a:t>Photo album</a:t>
+            </a:r>
+          </a:p>
+          <a:p>
+            <a:pPr marL="457200" lvl="1" indent="-100013">
+              <a:lnSpc>
+                <a:spcPct val="100000"/>
+              </a:lnSpc>
+            </a:pPr>
+            <a:r>
+              <a:rPr lang="en-US" dirty="0" smtClean="0"/>
+              <a:t>CMS system</a:t>
+            </a:r>
+          </a:p>
+          <a:p>
+            <a:pPr marL="457200" lvl="1" indent="-100013">
+              <a:lnSpc>
+                <a:spcPct val="100000"/>
+              </a:lnSpc>
+            </a:pPr>
+            <a:r>
+              <a:rPr lang="en-US" dirty="0" smtClean="0"/>
+              <a:t>Blog </a:t>
+            </a:r>
+            <a:r>
+              <a:rPr lang="en-US" dirty="0" smtClean="0"/>
+              <a:t>system</a:t>
+            </a:r>
+            <a:endParaRPr lang="en-US" dirty="0" smtClean="0"/>
+          </a:p>
+        </p:txBody>
+      </p:sp>
+      <p:sp>
+        <p:nvSpPr>
+          <p:cNvPr id="4" name="Slide Number Placeholder 3"/>
+          <p:cNvSpPr>
+            <a:spLocks noGrp="1"/>
+          </p:cNvSpPr>
+          <p:nvPr>
+            <p:ph type="sldNum" sz="quarter" idx="10"/>
+          </p:nvPr>
+        </p:nvSpPr>
+        <p:spPr/>
+        <p:txBody>
+          <a:bodyPr/>
+          <a:lstStyle/>
+          <a:p>
+            <a:pPr>
+              <a:defRPr/>
+            </a:pPr>
+            <a:fld id="{58452FF4-89E3-4D1B-9927-2DBDC00E58D7}" type="slidenum">
+              <a:rPr lang="en-US" smtClean="0"/>
+              <a:pPr>
+                <a:defRPr/>
+              </a:pPr>
+              <a:t>20</a:t>
             </a:fld>
             <a:endParaRPr lang="en-US" dirty="0"/>
           </a:p>
@@ -6871,7 +8915,7 @@
         </p:blipFill>
         <p:spPr bwMode="auto">
           <a:xfrm>
-            <a:off x="4863240" y="3846007"/>
+            <a:off x="4863240" y="4191000"/>
             <a:ext cx="3671160" cy="2441321"/>
           </a:xfrm>
           <a:prstGeom prst="roundRect">
@@ -6905,7 +8949,7 @@
 </p:sld>
 </file>
 
-<file path=ppt/slides/slide15.xml><?xml version="1.0" encoding="utf-8"?>
+<file path=ppt/slides/slide21.xml><?xml version="1.0" encoding="utf-8"?>
 <p:sld xmlns:a="http://schemas.openxmlformats.org/drawingml/2006/main" xmlns:r="http://schemas.openxmlformats.org/officeDocument/2006/relationships" xmlns:p="http://schemas.openxmlformats.org/presentationml/2006/main">
   <p:cSld>
     <p:spTree>
@@ -6967,7 +9011,7 @@
           <a:p>
             <a:pPr>
               <a:lnSpc>
-                <a:spcPts val="3600"/>
+                <a:spcPct val="100000"/>
               </a:lnSpc>
             </a:pPr>
             <a:r>
@@ -6978,7 +9022,7 @@
           <a:p>
             <a:pPr lvl="1">
               <a:lnSpc>
-                <a:spcPts val="3600"/>
+                <a:spcPct val="100000"/>
               </a:lnSpc>
             </a:pPr>
             <a:r>
@@ -6989,7 +9033,7 @@
           <a:p>
             <a:pPr lvl="1">
               <a:lnSpc>
-                <a:spcPts val="3600"/>
+                <a:spcPct val="100000"/>
               </a:lnSpc>
             </a:pPr>
             <a:r>
@@ -7000,7 +9044,7 @@
           <a:p>
             <a:pPr lvl="1">
               <a:lnSpc>
-                <a:spcPts val="3600"/>
+                <a:spcPct val="100000"/>
               </a:lnSpc>
             </a:pPr>
             <a:r>
@@ -7011,7 +9055,7 @@
           <a:p>
             <a:pPr lvl="1">
               <a:lnSpc>
-                <a:spcPts val="3600"/>
+                <a:spcPct val="100000"/>
               </a:lnSpc>
             </a:pPr>
             <a:r>
@@ -7059,7 +9103,7 @@
               <a:pPr>
                 <a:defRPr/>
               </a:pPr>
-              <a:t>15</a:t>
+              <a:t>21</a:t>
             </a:fld>
             <a:endParaRPr lang="en-US" dirty="0"/>
           </a:p>
@@ -8444,7 +10488,13 @@
           <p:nvPr/>
         </p:nvPicPr>
         <p:blipFill>
-          <a:blip r:embed="rId2" cstate="print"/>
+          <a:blip r:embed="rId2" cstate="screen">
+            <a:extLst>
+              <a:ext uri="{28A0092B-C50C-407E-A947-70E740481C1C}">
+                <a14:useLocalDpi xmlns:a14="http://schemas.microsoft.com/office/drawing/2010/main"/>
+              </a:ext>
+            </a:extLst>
+          </a:blip>
           <a:srcRect/>
           <a:stretch>
             <a:fillRect/>
@@ -8503,7 +10553,7 @@
 </p:sld>
 </file>
 
-<file path=ppt/slides/slide16.xml><?xml version="1.0" encoding="utf-8"?>
+<file path=ppt/slides/slide22.xml><?xml version="1.0" encoding="utf-8"?>
 <p:sld xmlns:a="http://schemas.openxmlformats.org/drawingml/2006/main" xmlns:r="http://schemas.openxmlformats.org/officeDocument/2006/relationships" xmlns:p="http://schemas.openxmlformats.org/presentationml/2006/main">
   <p:cSld>
     <p:spTree>
@@ -8560,7 +10610,7 @@
           <a:p>
             <a:pPr lvl="0">
               <a:lnSpc>
-                <a:spcPts val="3600"/>
+                <a:spcPct val="100000"/>
               </a:lnSpc>
             </a:pPr>
             <a:r>
@@ -8571,7 +10621,7 @@
           <a:p>
             <a:pPr>
               <a:lnSpc>
-                <a:spcPts val="3600"/>
+                <a:spcPct val="100000"/>
               </a:lnSpc>
             </a:pPr>
             <a:r>
@@ -8582,7 +10632,7 @@
           <a:p>
             <a:pPr lvl="1">
               <a:lnSpc>
-                <a:spcPts val="3600"/>
+                <a:spcPct val="100000"/>
               </a:lnSpc>
             </a:pPr>
             <a:r>
@@ -8604,7 +10654,7 @@
           <a:p>
             <a:pPr lvl="1">
               <a:lnSpc>
-                <a:spcPts val="3600"/>
+                <a:spcPct val="100000"/>
               </a:lnSpc>
             </a:pPr>
             <a:r>
@@ -8615,7 +10665,7 @@
           <a:p>
             <a:pPr lvl="1">
               <a:lnSpc>
-                <a:spcPts val="3600"/>
+                <a:spcPct val="100000"/>
               </a:lnSpc>
             </a:pPr>
             <a:r>
@@ -8626,7 +10676,7 @@
           <a:p>
             <a:pPr>
               <a:lnSpc>
-                <a:spcPts val="3600"/>
+                <a:spcPct val="100000"/>
               </a:lnSpc>
             </a:pPr>
             <a:r>
@@ -8637,7 +10687,7 @@
           <a:p>
             <a:pPr lvl="1">
               <a:lnSpc>
-                <a:spcPts val="3600"/>
+                <a:spcPct val="100000"/>
               </a:lnSpc>
             </a:pPr>
             <a:r>
@@ -8648,7 +10698,7 @@
           <a:p>
             <a:pPr lvl="1">
               <a:lnSpc>
-                <a:spcPts val="3600"/>
+                <a:spcPct val="100000"/>
               </a:lnSpc>
             </a:pPr>
             <a:r>
@@ -8692,7 +10742,7 @@
               <a:pPr>
                 <a:defRPr/>
               </a:pPr>
-              <a:t>16</a:t>
+              <a:t>22</a:t>
             </a:fld>
             <a:endParaRPr lang="en-US" dirty="0"/>
           </a:p>
@@ -8768,7 +10818,13 @@
           <p:nvPr/>
         </p:nvPicPr>
         <p:blipFill>
-          <a:blip r:embed="rId2" cstate="print"/>
+          <a:blip r:embed="rId2" cstate="screen">
+            <a:extLst>
+              <a:ext uri="{28A0092B-C50C-407E-A947-70E740481C1C}">
+                <a14:useLocalDpi xmlns:a14="http://schemas.microsoft.com/office/drawing/2010/main"/>
+              </a:ext>
+            </a:extLst>
+          </a:blip>
           <a:srcRect l="-4348" t="-12756" r="-4348" b="-8419"/>
           <a:stretch>
             <a:fillRect/>
@@ -8833,7 +10889,7 @@
 </p:sld>
 </file>
 
-<file path=ppt/slides/slide17.xml><?xml version="1.0" encoding="utf-8"?>
+<file path=ppt/slides/slide23.xml><?xml version="1.0" encoding="utf-8"?>
 <p:sld xmlns:a="http://schemas.openxmlformats.org/drawingml/2006/main" xmlns:r="http://schemas.openxmlformats.org/officeDocument/2006/relationships" xmlns:p="http://schemas.openxmlformats.org/presentationml/2006/main">
   <p:cSld>
     <p:spTree>
@@ -8933,7 +10989,7 @@
 </p:sld>
 </file>
 
-<file path=ppt/slides/slide18.xml><?xml version="1.0" encoding="utf-8"?>
+<file path=ppt/slides/slide24.xml><?xml version="1.0" encoding="utf-8"?>
 <p:sld xmlns:a="http://schemas.openxmlformats.org/drawingml/2006/main" xmlns:r="http://schemas.openxmlformats.org/officeDocument/2006/relationships" xmlns:p="http://schemas.openxmlformats.org/presentationml/2006/main">
   <p:cSld>
     <p:spTree>
@@ -8985,7 +11041,7 @@
         </p:nvSpPr>
         <p:spPr>
           <a:xfrm>
-            <a:off x="1828800" y="1066800"/>
+            <a:off x="1752600" y="914400"/>
             <a:ext cx="7086600" cy="5638800"/>
           </a:xfrm>
         </p:spPr>
@@ -9001,38 +11057,49 @@
               <a:tabLst/>
             </a:pPr>
             <a:r>
-              <a:rPr lang="en-US" dirty="0" smtClean="0"/>
+              <a:rPr lang="en-US" sz="3000" dirty="0" smtClean="0">
+                <a:effectLst/>
+              </a:rPr>
               <a:t>Nakov S. &amp; Co., Programming for .NET Framework, Volume </a:t>
             </a:r>
             <a:r>
-              <a:rPr lang="en-US" dirty="0" smtClean="0">
+              <a:rPr lang="en-US" sz="3000" dirty="0" smtClean="0">
+                <a:effectLst/>
                 <a:latin typeface="Consolas" pitchFamily="49" charset="0"/>
                 <a:cs typeface="Consolas" pitchFamily="49" charset="0"/>
               </a:rPr>
               <a:t>1</a:t>
             </a:r>
             <a:r>
-              <a:rPr lang="en-US" dirty="0" smtClean="0"/>
+              <a:rPr lang="en-US" sz="3000" dirty="0" smtClean="0">
+                <a:effectLst/>
+              </a:rPr>
               <a:t>, ISBN </a:t>
             </a:r>
             <a:r>
-              <a:rPr lang="en-US" dirty="0" smtClean="0">
+              <a:rPr lang="en-US" sz="3000" dirty="0" smtClean="0">
+                <a:effectLst/>
                 <a:latin typeface="Consolas" pitchFamily="49" charset="0"/>
                 <a:cs typeface="Consolas" pitchFamily="49" charset="0"/>
               </a:rPr>
               <a:t>954-775-505-6</a:t>
             </a:r>
             <a:r>
-              <a:rPr lang="en-US" dirty="0" smtClean="0"/>
+              <a:rPr lang="en-US" sz="3000" dirty="0" smtClean="0">
+                <a:effectLst/>
+              </a:rPr>
               <a:t>, </a:t>
             </a:r>
             <a:r>
-              <a:rPr lang="en-US" u="sng" dirty="0" smtClean="0">
+              <a:rPr lang="en-US" sz="3000" u="sng" dirty="0" smtClean="0">
+                <a:effectLst/>
                 <a:hlinkClick r:id="rId2"/>
               </a:rPr>
               <a:t>www.devbg.org/dotnetbook/</a:t>
             </a:r>
-            <a:endParaRPr lang="en-US" dirty="0" smtClean="0"/>
+            <a:endParaRPr lang="en-US" sz="3000" dirty="0" smtClean="0">
+              <a:effectLst/>
+            </a:endParaRPr>
           </a:p>
           <a:p>
             <a:pPr marL="0" indent="0">
@@ -9043,71 +11110,90 @@
               <a:tabLst/>
             </a:pPr>
             <a:r>
-              <a:rPr lang="en-US" dirty="0" smtClean="0"/>
+              <a:rPr lang="en-US" sz="3000" dirty="0" smtClean="0">
+                <a:effectLst/>
+              </a:rPr>
               <a:t>Nakov S. &amp; Co., Programming for .NET Framework, Volume </a:t>
             </a:r>
             <a:r>
-              <a:rPr lang="en-US" dirty="0" smtClean="0">
+              <a:rPr lang="en-US" sz="3000" dirty="0" smtClean="0">
+                <a:effectLst/>
                 <a:latin typeface="Consolas" pitchFamily="49" charset="0"/>
                 <a:cs typeface="Consolas" pitchFamily="49" charset="0"/>
               </a:rPr>
               <a:t>2</a:t>
             </a:r>
             <a:r>
-              <a:rPr lang="en-US" dirty="0" smtClean="0"/>
+              <a:rPr lang="en-US" sz="3000" dirty="0" smtClean="0">
+                <a:effectLst/>
+              </a:rPr>
               <a:t>, ISBN </a:t>
             </a:r>
             <a:r>
-              <a:rPr lang="en-US" dirty="0" smtClean="0">
+              <a:rPr lang="en-US" sz="3000" dirty="0" smtClean="0">
+                <a:effectLst/>
                 <a:latin typeface="Consolas" pitchFamily="49" charset="0"/>
                 <a:cs typeface="Consolas" pitchFamily="49" charset="0"/>
               </a:rPr>
               <a:t>954-775-672-9</a:t>
             </a:r>
             <a:r>
-              <a:rPr lang="en-US" dirty="0" smtClean="0"/>
+              <a:rPr lang="en-US" sz="3000" dirty="0" smtClean="0">
+                <a:effectLst/>
+              </a:rPr>
               <a:t>, </a:t>
             </a:r>
             <a:r>
-              <a:rPr lang="en-US" u="sng" dirty="0" smtClean="0">
+              <a:rPr lang="en-US" sz="3000" u="sng" dirty="0" smtClean="0">
+                <a:effectLst/>
                 <a:hlinkClick r:id="rId2"/>
               </a:rPr>
               <a:t>www.devbg.org/dotnetbook/</a:t>
             </a:r>
-            <a:endParaRPr lang="en-US" dirty="0" smtClean="0"/>
+            <a:endParaRPr lang="en-US" sz="3000" dirty="0" smtClean="0">
+              <a:effectLst/>
+            </a:endParaRPr>
           </a:p>
           <a:p>
             <a:pPr marL="0" lvl="0" indent="0">
               <a:spcBef>
-                <a:spcPts val="1800"/>
+                <a:spcPts val="3600"/>
               </a:spcBef>
               <a:buNone/>
-              <a:tabLst/>
             </a:pPr>
             <a:r>
-              <a:rPr lang="en-US" dirty="0" smtClean="0"/>
-              <a:t>MacDonald M., Beginning ASP.NET 3.5 in C# 2008 – From Novice to Professional, APress, ISBN </a:t>
-            </a:r>
-            <a:r>
-              <a:rPr lang="en-US" dirty="0" smtClean="0">
-                <a:latin typeface="Consolas" pitchFamily="49" charset="0"/>
-                <a:cs typeface="Consolas" pitchFamily="49" charset="0"/>
+              <a:rPr lang="en-US" sz="3000" dirty="0" smtClean="0">
+                <a:effectLst/>
               </a:rPr>
-              <a:t>978-1-59059-891-7</a:t>
-            </a:r>
-            <a:r>
-              <a:rPr lang="en-US" dirty="0" smtClean="0"/>
-              <a:t>, </a:t>
-            </a:r>
-            <a:r>
-              <a:rPr lang="en-US" u="sng" dirty="0" smtClean="0">
+              <a:t>MacDonald </a:t>
+            </a:r>
+            <a:r>
+              <a:rPr lang="en-US" sz="3000" dirty="0">
+                <a:effectLst/>
+              </a:rPr>
+              <a:t>M., Beginning ASP.NET 4 in C# 2010, 981 pages, </a:t>
+            </a:r>
+            <a:r>
+              <a:rPr lang="en-US" sz="3000" dirty="0" err="1">
+                <a:effectLst/>
+              </a:rPr>
+              <a:t>Apress</a:t>
+            </a:r>
+            <a:r>
+              <a:rPr lang="en-US" sz="3000" dirty="0">
+                <a:effectLst/>
+              </a:rPr>
+              <a:t>, Inc., 2010, ISBN 978-1-4302-2608-6 – </a:t>
+            </a:r>
+            <a:r>
+              <a:rPr lang="en-US" sz="3000" u="sng" dirty="0">
+                <a:effectLst/>
                 <a:hlinkClick r:id="rId3"/>
               </a:rPr>
-              <a:t>http://tiny.cc/vk4Q0</a:t>
-            </a:r>
-            <a:endParaRPr lang="en-US" dirty="0">
-              <a:latin typeface="Consolas" pitchFamily="49" charset="0"/>
-              <a:cs typeface="Consolas" pitchFamily="49" charset="0"/>
+              <a:t>http://apress.com/book/view/1430226080</a:t>
+            </a:r>
+            <a:endParaRPr lang="en-US" sz="3000" dirty="0">
+              <a:effectLst/>
             </a:endParaRPr>
           </a:p>
         </p:txBody>
@@ -9135,7 +11221,7 @@
               <a:pPr>
                 <a:defRPr/>
               </a:pPr>
-              <a:t>18</a:t>
+              <a:t>24</a:t>
             </a:fld>
             <a:endParaRPr lang="en-US" dirty="0"/>
           </a:p>
@@ -9237,15 +11323,19 @@
       </p:pic>
       <p:pic>
         <p:nvPicPr>
-          <p:cNvPr id="2054" name="Picture 6"/>
+          <p:cNvPr id="7170" name="Picture 2" descr="C:\Users\dminkov\Desktop\untitled.bmp"/>
           <p:cNvPicPr>
             <a:picLocks noChangeAspect="1" noChangeArrowheads="1"/>
           </p:cNvPicPr>
           <p:nvPr/>
         </p:nvPicPr>
         <p:blipFill>
-          <a:blip r:embed="rId6" cstate="print">
-            <a:lum contrast="10000"/>
+          <a:blip r:embed="rId6">
+            <a:extLst>
+              <a:ext uri="{28A0092B-C50C-407E-A947-70E740481C1C}">
+                <a14:useLocalDpi xmlns:a14="http://schemas.microsoft.com/office/drawing/2010/main" val="0"/>
+              </a:ext>
+            </a:extLst>
           </a:blip>
           <a:srcRect/>
           <a:stretch>
@@ -9254,32 +11344,22 @@
         </p:blipFill>
         <p:spPr bwMode="auto">
           <a:xfrm>
-            <a:off x="304800" y="4771623"/>
-            <a:ext cx="1234225" cy="1629177"/>
+            <a:off x="348400" y="4911725"/>
+            <a:ext cx="1190625" cy="1571625"/>
           </a:xfrm>
           <a:prstGeom prst="rect">
             <a:avLst/>
           </a:prstGeom>
           <a:noFill/>
-          <a:ln w="3175">
-            <a:solidFill>
-              <a:schemeClr val="accent5">
-                <a:lumMod val="75000"/>
-              </a:schemeClr>
-            </a:solidFill>
-            <a:miter lim="800000"/>
-            <a:headEnd/>
-            <a:tailEnd/>
-          </a:ln>
-          <a:effectLst>
-            <a:outerShdw blurRad="50800" dist="38100" dir="2700000" algn="tl" rotWithShape="0">
-              <a:schemeClr val="bg1">
-                <a:lumMod val="95000"/>
-                <a:lumOff val="5000"/>
-                <a:alpha val="40000"/>
-              </a:schemeClr>
-            </a:outerShdw>
-          </a:effectLst>
+          <a:extLst>
+            <a:ext uri="{909E8E84-426E-40DD-AFC4-6F175D3DCCD1}">
+              <a14:hiddenFill xmlns:a14="http://schemas.microsoft.com/office/drawing/2010/main">
+                <a:solidFill>
+                  <a:srgbClr val="FFFFFF"/>
+                </a:solidFill>
+              </a14:hiddenFill>
+            </a:ext>
+          </a:extLst>
         </p:spPr>
       </p:pic>
     </p:spTree>
@@ -9297,7 +11377,7 @@
 </p:sld>
 </file>
 
-<file path=ppt/slides/slide19.xml><?xml version="1.0" encoding="utf-8"?>
+<file path=ppt/slides/slide25.xml><?xml version="1.0" encoding="utf-8"?>
 <p:sld xmlns:a="http://schemas.openxmlformats.org/drawingml/2006/main" xmlns:r="http://schemas.openxmlformats.org/officeDocument/2006/relationships" xmlns:p="http://schemas.openxmlformats.org/presentationml/2006/main">
   <p:cSld>
     <p:spTree>
@@ -10050,201 +12130,6 @@
 </p:sld>
 </file>
 
-<file path=ppt/slides/slide2.xml><?xml version="1.0" encoding="utf-8"?>
-<p:sld xmlns:a="http://schemas.openxmlformats.org/drawingml/2006/main" xmlns:r="http://schemas.openxmlformats.org/officeDocument/2006/relationships" xmlns:p="http://schemas.openxmlformats.org/presentationml/2006/main">
-  <p:cSld>
-    <p:spTree>
-      <p:nvGrpSpPr>
-        <p:cNvPr id="1" name=""/>
-        <p:cNvGrpSpPr/>
-        <p:nvPr/>
-      </p:nvGrpSpPr>
-      <p:grpSpPr>
-        <a:xfrm>
-          <a:off x="0" y="0"/>
-          <a:ext cx="0" cy="0"/>
-          <a:chOff x="0" y="0"/>
-          <a:chExt cx="0" cy="0"/>
-        </a:xfrm>
-      </p:grpSpPr>
-      <p:sp>
-        <p:nvSpPr>
-          <p:cNvPr id="2" name="Title 1"/>
-          <p:cNvSpPr>
-            <a:spLocks noGrp="1"/>
-          </p:cNvSpPr>
-          <p:nvPr>
-            <p:ph type="title"/>
-          </p:nvPr>
-        </p:nvSpPr>
-        <p:spPr/>
-        <p:txBody>
-          <a:bodyPr/>
-          <a:lstStyle/>
-          <a:p>
-            <a:r>
-              <a:rPr lang="en-US" dirty="0" smtClean="0"/>
-              <a:t>About the Course</a:t>
-            </a:r>
-            <a:endParaRPr lang="en-US" dirty="0"/>
-          </a:p>
-        </p:txBody>
-      </p:sp>
-      <p:sp>
-        <p:nvSpPr>
-          <p:cNvPr id="3" name="Content Placeholder 2"/>
-          <p:cNvSpPr>
-            <a:spLocks noGrp="1"/>
-          </p:cNvSpPr>
-          <p:nvPr>
-            <p:ph idx="1"/>
-          </p:nvPr>
-        </p:nvSpPr>
-        <p:spPr/>
-        <p:txBody>
-          <a:bodyPr/>
-          <a:lstStyle/>
-          <a:p>
-            <a:pPr>
-              <a:lnSpc>
-                <a:spcPct val="120000"/>
-              </a:lnSpc>
-            </a:pPr>
-            <a:r>
-              <a:rPr lang="en-US" sz="3000" dirty="0" smtClean="0"/>
-              <a:t>Web Applications Development with .NET Framework and ASP.NET objectives</a:t>
-            </a:r>
-          </a:p>
-          <a:p>
-            <a:pPr lvl="1">
-              <a:lnSpc>
-                <a:spcPct val="120000"/>
-              </a:lnSpc>
-            </a:pPr>
-            <a:r>
-              <a:rPr lang="en-US" sz="2800" dirty="0" smtClean="0"/>
-              <a:t>Provides basic skills for development of dynamic data-driven ASP.NET Web applications</a:t>
-            </a:r>
-          </a:p>
-          <a:p>
-            <a:pPr lvl="1">
-              <a:lnSpc>
-                <a:spcPct val="120000"/>
-              </a:lnSpc>
-            </a:pPr>
-            <a:r>
-              <a:rPr lang="en-US" sz="2800" dirty="0" smtClean="0"/>
-              <a:t>C# language fundamentals</a:t>
-            </a:r>
-          </a:p>
-          <a:p>
-            <a:pPr lvl="1">
-              <a:lnSpc>
-                <a:spcPct val="120000"/>
-              </a:lnSpc>
-            </a:pPr>
-            <a:r>
-              <a:rPr lang="en-US" sz="2800" dirty="0" smtClean="0"/>
-              <a:t>Databases and SQL Server</a:t>
-            </a:r>
-          </a:p>
-          <a:p>
-            <a:pPr lvl="1">
-              <a:lnSpc>
-                <a:spcPct val="120000"/>
-              </a:lnSpc>
-            </a:pPr>
-            <a:r>
-              <a:rPr lang="en-US" sz="2800" dirty="0" smtClean="0"/>
-              <a:t>LINQ and LINQ-to-SQL</a:t>
-            </a:r>
-          </a:p>
-          <a:p>
-            <a:pPr lvl="1">
-              <a:lnSpc>
-                <a:spcPct val="120000"/>
-              </a:lnSpc>
-            </a:pPr>
-            <a:r>
-              <a:rPr lang="en-US" sz="2800" dirty="0" smtClean="0"/>
-              <a:t>ASP.NET and AJAX</a:t>
-            </a:r>
-            <a:endParaRPr lang="en-US" sz="2800" dirty="0" smtClean="0"/>
-          </a:p>
-        </p:txBody>
-      </p:sp>
-      <p:sp>
-        <p:nvSpPr>
-          <p:cNvPr id="4" name="Slide Number Placeholder 3"/>
-          <p:cNvSpPr>
-            <a:spLocks noGrp="1"/>
-          </p:cNvSpPr>
-          <p:nvPr>
-            <p:ph type="sldNum" sz="quarter" idx="10"/>
-          </p:nvPr>
-        </p:nvSpPr>
-        <p:spPr/>
-        <p:txBody>
-          <a:bodyPr/>
-          <a:lstStyle/>
-          <a:p>
-            <a:pPr>
-              <a:defRPr/>
-            </a:pPr>
-            <a:fld id="{58452FF4-89E3-4D1B-9927-2DBDC00E58D7}" type="slidenum">
-              <a:rPr lang="en-US" smtClean="0"/>
-              <a:pPr>
-                <a:defRPr/>
-              </a:pPr>
-              <a:t>2</a:t>
-            </a:fld>
-            <a:endParaRPr lang="en-US" dirty="0"/>
-          </a:p>
-        </p:txBody>
-      </p:sp>
-      <p:pic>
-        <p:nvPicPr>
-          <p:cNvPr id="25604" name="Picture 4" descr="http://www.artegraficas.com.br/img/web_sites/web_sites.jpg"/>
-          <p:cNvPicPr>
-            <a:picLocks noChangeAspect="1" noChangeArrowheads="1"/>
-          </p:cNvPicPr>
-          <p:nvPr/>
-        </p:nvPicPr>
-        <p:blipFill>
-          <a:blip r:embed="rId2" cstate="print"/>
-          <a:srcRect t="5517" b="3448"/>
-          <a:stretch>
-            <a:fillRect/>
-          </a:stretch>
-        </p:blipFill>
-        <p:spPr bwMode="auto">
-          <a:xfrm>
-            <a:off x="5562600" y="3886200"/>
-            <a:ext cx="2950185" cy="2362200"/>
-          </a:xfrm>
-          <a:prstGeom prst="roundRect">
-            <a:avLst>
-              <a:gd name="adj" fmla="val 8046"/>
-            </a:avLst>
-          </a:prstGeom>
-          <a:noFill/>
-        </p:spPr>
-      </p:pic>
-    </p:spTree>
-  </p:cSld>
-  <p:clrMapOvr>
-    <a:masterClrMapping/>
-  </p:clrMapOvr>
-  <p:timing>
-    <p:tnLst>
-      <p:par>
-        <p:cTn id="1" dur="indefinite" restart="never" nodeType="tmRoot"/>
-      </p:par>
-    </p:tnLst>
-  </p:timing>
-</p:sld>
-</file>
-
 <file path=ppt/slides/slide3.xml><?xml version="1.0" encoding="utf-8"?>
 <p:sld xmlns:a="http://schemas.openxmlformats.org/drawingml/2006/main" xmlns:r="http://schemas.openxmlformats.org/officeDocument/2006/relationships" xmlns:p="http://schemas.openxmlformats.org/presentationml/2006/main">
   <p:cSld>
@@ -10300,49 +12185,77 @@
           <a:bodyPr/>
           <a:lstStyle/>
           <a:p>
-            <a:pPr lvl="0"/>
+            <a:pPr lvl="0">
+              <a:lnSpc>
+                <a:spcPct val="100000"/>
+              </a:lnSpc>
+            </a:pPr>
             <a:r>
               <a:rPr lang="en-US" dirty="0" smtClean="0"/>
               <a:t>Computer programming skills</a:t>
             </a:r>
           </a:p>
           <a:p>
-            <a:pPr lvl="1"/>
+            <a:pPr lvl="1">
+              <a:lnSpc>
+                <a:spcPct val="100000"/>
+              </a:lnSpc>
+            </a:pPr>
             <a:r>
               <a:rPr lang="en-US" dirty="0" smtClean="0"/>
               <a:t>One of the following languages:</a:t>
             </a:r>
           </a:p>
           <a:p>
-            <a:pPr lvl="2"/>
+            <a:pPr lvl="2">
+              <a:lnSpc>
+                <a:spcPct val="100000"/>
+              </a:lnSpc>
+            </a:pPr>
             <a:r>
               <a:rPr lang="en-US" dirty="0" smtClean="0"/>
               <a:t>C#, Java or C++</a:t>
             </a:r>
           </a:p>
           <a:p>
-            <a:pPr lvl="0"/>
+            <a:pPr lvl="0">
+              <a:lnSpc>
+                <a:spcPct val="100000"/>
+              </a:lnSpc>
+            </a:pPr>
             <a:r>
               <a:rPr lang="en-US" dirty="0" smtClean="0"/>
               <a:t>Object-oriented programming</a:t>
             </a:r>
           </a:p>
           <a:p>
-            <a:pPr lvl="1"/>
+            <a:pPr lvl="1">
+              <a:lnSpc>
+                <a:spcPct val="100000"/>
+              </a:lnSpc>
+            </a:pPr>
             <a:r>
               <a:rPr lang="en-US" dirty="0" smtClean="0"/>
               <a:t>Abstraction, encapsulation, inheritance, polymorphism, exceptions handling</a:t>
             </a:r>
           </a:p>
           <a:p>
-            <a:pPr lvl="0"/>
+            <a:pPr lvl="0">
+              <a:lnSpc>
+                <a:spcPct val="100000"/>
+              </a:lnSpc>
+            </a:pPr>
             <a:r>
               <a:rPr lang="en-US" dirty="0" smtClean="0"/>
               <a:t>English language</a:t>
             </a:r>
           </a:p>
           <a:p>
-            <a:pPr lvl="1"/>
+            <a:pPr lvl="1">
+              <a:lnSpc>
+                <a:spcPct val="100000"/>
+              </a:lnSpc>
+            </a:pPr>
             <a:r>
               <a:rPr lang="en-US" dirty="0" smtClean="0"/>
               <a:t>All training materials are in English (intentionally, Telerik Academy policy)</a:t>
@@ -10389,7 +12302,13 @@
           <p:nvPr/>
         </p:nvPicPr>
         <p:blipFill>
-          <a:blip r:embed="rId2" cstate="print"/>
+          <a:blip r:embed="rId2" cstate="screen">
+            <a:extLst>
+              <a:ext uri="{28A0092B-C50C-407E-A947-70E740481C1C}">
+                <a14:useLocalDpi xmlns:a14="http://schemas.microsoft.com/office/drawing/2010/main"/>
+              </a:ext>
+            </a:extLst>
+          </a:blip>
           <a:srcRect/>
           <a:stretch>
             <a:fillRect/>
@@ -10427,7 +12346,13 @@
           <p:nvPr/>
         </p:nvPicPr>
         <p:blipFill>
-          <a:blip r:embed="rId3" cstate="print"/>
+          <a:blip r:embed="rId3" cstate="screen">
+            <a:extLst>
+              <a:ext uri="{28A0092B-C50C-407E-A947-70E740481C1C}">
+                <a14:useLocalDpi xmlns:a14="http://schemas.microsoft.com/office/drawing/2010/main"/>
+              </a:ext>
+            </a:extLst>
+          </a:blip>
           <a:srcRect/>
           <a:stretch>
             <a:fillRect/>
@@ -10545,60 +12470,70 @@
           <a:bodyPr/>
           <a:lstStyle/>
           <a:p>
-            <a:pPr lvl="0"/>
+            <a:pPr lvl="0">
+              <a:lnSpc>
+                <a:spcPct val="100000"/>
+              </a:lnSpc>
+            </a:pPr>
             <a:r>
               <a:rPr lang="en-US" dirty="0" smtClean="0"/>
               <a:t>Sofia University – FMI</a:t>
             </a:r>
           </a:p>
           <a:p>
-            <a:pPr lvl="1"/>
+            <a:pPr lvl="1">
+              <a:lnSpc>
+                <a:spcPct val="100000"/>
+              </a:lnSpc>
+            </a:pPr>
             <a:r>
               <a:rPr lang="en-US" dirty="0" smtClean="0"/>
               <a:t>Every Wednesday, 18:00-21:00, lab 229</a:t>
             </a:r>
           </a:p>
           <a:p>
-            <a:pPr lvl="1"/>
+            <a:pPr lvl="1">
+              <a:lnSpc>
+                <a:spcPct val="100000"/>
+              </a:lnSpc>
+            </a:pPr>
             <a:r>
               <a:rPr lang="en-US" dirty="0" smtClean="0"/>
               <a:t>Start: 6 October 2010</a:t>
             </a:r>
           </a:p>
           <a:p>
-            <a:pPr lvl="0"/>
+            <a:pPr lvl="0">
+              <a:lnSpc>
+                <a:spcPct val="100000"/>
+              </a:lnSpc>
+            </a:pPr>
             <a:r>
               <a:rPr lang="en-US" dirty="0" smtClean="0"/>
-              <a:t>Technical </a:t>
-            </a:r>
+              <a:t>Technical University – Sofia</a:t>
+            </a:r>
+          </a:p>
+          <a:p>
+            <a:pPr lvl="1">
+              <a:lnSpc>
+                <a:spcPct val="100000"/>
+              </a:lnSpc>
+            </a:pPr>
             <a:r>
               <a:rPr lang="en-US" dirty="0" smtClean="0"/>
-              <a:t>University – Sofia</a:t>
-            </a:r>
-          </a:p>
-          <a:p>
-            <a:pPr lvl="1"/>
+              <a:t>Every Monday, 18:00-21:00, lab ???</a:t>
+            </a:r>
+          </a:p>
+          <a:p>
+            <a:pPr lvl="1">
+              <a:lnSpc>
+                <a:spcPct val="100000"/>
+              </a:lnSpc>
+            </a:pPr>
             <a:r>
               <a:rPr lang="en-US" dirty="0" smtClean="0"/>
-              <a:t>Every Monday, 18:00-21:00, </a:t>
-            </a:r>
-            <a:r>
-              <a:rPr lang="en-US" dirty="0" smtClean="0"/>
-              <a:t>lab ???</a:t>
-            </a:r>
-            <a:endParaRPr lang="en-US" dirty="0" smtClean="0"/>
-          </a:p>
-          <a:p>
-            <a:pPr lvl="1"/>
-            <a:r>
-              <a:rPr lang="en-US" dirty="0" smtClean="0"/>
-              <a:t>Start: </a:t>
-            </a:r>
-            <a:r>
-              <a:rPr lang="en-US" dirty="0" smtClean="0"/>
-              <a:t>???</a:t>
-            </a:r>
-            <a:endParaRPr lang="en-US" dirty="0" smtClean="0"/>
+              <a:t>Start: ???</a:t>
+            </a:r>
           </a:p>
         </p:txBody>
       </p:sp>
@@ -10640,8 +12575,14 @@
           <p:nvPr/>
         </p:nvPicPr>
         <p:blipFill>
-          <a:blip r:embed="rId2" cstate="print"/>
-          <a:srcRect l="1415" t="1563" r="1415" b="2083"/>
+          <a:blip r:embed="rId2" cstate="screen">
+            <a:extLst>
+              <a:ext uri="{28A0092B-C50C-407E-A947-70E740481C1C}">
+                <a14:useLocalDpi xmlns:a14="http://schemas.microsoft.com/office/drawing/2010/main"/>
+              </a:ext>
+            </a:extLst>
+          </a:blip>
+          <a:srcRect/>
           <a:stretch>
             <a:fillRect/>
           </a:stretch>
@@ -10838,8 +12779,8 @@
         </p:nvSpPr>
         <p:spPr>
           <a:xfrm>
-            <a:off x="228600" y="914400"/>
-            <a:ext cx="8686800" cy="5791200"/>
+            <a:off x="76200" y="838200"/>
+            <a:ext cx="8991600" cy="5791200"/>
           </a:xfrm>
         </p:spPr>
         <p:txBody>
@@ -10848,124 +12789,100 @@
           <a:p>
             <a:pPr marL="361950" lvl="0" indent="-361950">
               <a:lnSpc>
-                <a:spcPts val="3400"/>
+                <a:spcPct val="95000"/>
               </a:lnSpc>
-              <a:spcBef>
-                <a:spcPts val="300"/>
-              </a:spcBef>
               <a:buFont typeface="+mj-lt"/>
               <a:buAutoNum type="arabicPeriod"/>
               <a:tabLst/>
             </a:pPr>
             <a:r>
+              <a:rPr lang="en-US" sz="3000" dirty="0" smtClean="0"/>
+              <a:t>.NET Framework Overview</a:t>
+            </a:r>
+          </a:p>
+          <a:p>
+            <a:pPr marL="520700" lvl="1" indent="-228600">
+              <a:lnSpc>
+                <a:spcPct val="95000"/>
+              </a:lnSpc>
+            </a:pPr>
+            <a:r>
               <a:rPr lang="en-US" sz="2800" dirty="0" smtClean="0"/>
-              <a:t>.NET Framework Overview</a:t>
-            </a:r>
-          </a:p>
-          <a:p>
-            <a:pPr marL="714375" lvl="1" indent="-366713">
-              <a:lnSpc>
-                <a:spcPts val="3400"/>
-              </a:lnSpc>
-              <a:spcBef>
-                <a:spcPts val="300"/>
-              </a:spcBef>
-            </a:pPr>
-            <a:r>
-              <a:rPr lang="en-US" sz="2600" dirty="0" smtClean="0"/>
               <a:t>.NET, CLR, MSIL, Assemblies, CTS, .NET languages </a:t>
             </a:r>
           </a:p>
           <a:p>
             <a:pPr marL="361950" lvl="0" indent="-361950">
               <a:lnSpc>
-                <a:spcPts val="3400"/>
+                <a:spcPct val="95000"/>
               </a:lnSpc>
-              <a:spcBef>
-                <a:spcPts val="300"/>
-              </a:spcBef>
               <a:buFont typeface="+mj-lt"/>
               <a:buAutoNum type="arabicPeriod"/>
               <a:tabLst/>
             </a:pPr>
             <a:r>
+              <a:rPr lang="en-US" sz="3000" dirty="0" smtClean="0"/>
+              <a:t>C# Language Overview – Part I</a:t>
+            </a:r>
+          </a:p>
+          <a:p>
+            <a:pPr marL="520700" lvl="1" indent="-228600">
+              <a:lnSpc>
+                <a:spcPct val="95000"/>
+              </a:lnSpc>
+            </a:pPr>
+            <a:r>
               <a:rPr lang="en-US" sz="2800" dirty="0" smtClean="0"/>
-              <a:t>C# Language Overview – Part I</a:t>
-            </a:r>
-          </a:p>
-          <a:p>
-            <a:pPr marL="714375" lvl="1" indent="-366713">
-              <a:lnSpc>
-                <a:spcPts val="3400"/>
-              </a:lnSpc>
-              <a:spcBef>
-                <a:spcPts val="300"/>
-              </a:spcBef>
-            </a:pPr>
-            <a:r>
-              <a:rPr lang="en-US" sz="2600" dirty="0" smtClean="0"/>
               <a:t>Data Types, Operators, Expressions, Statements, Console I/O, if / switch / case, Loops, Arrays, Methods</a:t>
             </a:r>
           </a:p>
           <a:p>
             <a:pPr marL="361950" lvl="0" indent="-361950">
               <a:lnSpc>
-                <a:spcPts val="3400"/>
+                <a:spcPct val="95000"/>
               </a:lnSpc>
-              <a:spcBef>
-                <a:spcPts val="300"/>
-              </a:spcBef>
               <a:buFont typeface="+mj-lt"/>
               <a:buAutoNum type="arabicPeriod"/>
               <a:tabLst/>
             </a:pPr>
             <a:r>
+              <a:rPr lang="en-US" sz="3000" dirty="0" smtClean="0"/>
+              <a:t>C# Language Overview – Part II</a:t>
+            </a:r>
+          </a:p>
+          <a:p>
+            <a:pPr marL="520700" lvl="1" indent="-228600">
+              <a:lnSpc>
+                <a:spcPct val="95000"/>
+              </a:lnSpc>
+            </a:pPr>
+            <a:r>
               <a:rPr lang="en-US" sz="2800" dirty="0" smtClean="0"/>
-              <a:t>C# Language Overview – Part II</a:t>
-            </a:r>
-          </a:p>
-          <a:p>
-            <a:pPr marL="714375" lvl="1" indent="-366713">
-              <a:lnSpc>
-                <a:spcPts val="3400"/>
-              </a:lnSpc>
-              <a:spcBef>
-                <a:spcPts val="300"/>
-              </a:spcBef>
-            </a:pPr>
-            <a:r>
-              <a:rPr lang="en-US" sz="2600" dirty="0" smtClean="0"/>
               <a:t>Creating and Using Objects, Exceptions, Strings, Generics, Collections, Attributes</a:t>
             </a:r>
           </a:p>
           <a:p>
             <a:pPr marL="361950" lvl="0" indent="-361950">
               <a:lnSpc>
-                <a:spcPts val="3400"/>
+                <a:spcPct val="95000"/>
               </a:lnSpc>
-              <a:spcBef>
-                <a:spcPts val="300"/>
-              </a:spcBef>
               <a:buFont typeface="+mj-lt"/>
               <a:buAutoNum type="arabicPeriod"/>
               <a:tabLst/>
             </a:pPr>
             <a:r>
+              <a:rPr lang="en-US" sz="3000" dirty="0" smtClean="0"/>
+              <a:t>Object-Oriented Programming with C#</a:t>
+            </a:r>
+          </a:p>
+          <a:p>
+            <a:pPr marL="520700" lvl="1" indent="-228600">
+              <a:lnSpc>
+                <a:spcPct val="95000"/>
+              </a:lnSpc>
+            </a:pPr>
+            <a:r>
               <a:rPr lang="en-US" sz="2800" dirty="0" smtClean="0"/>
-              <a:t>Object-Oriented Programming with C#</a:t>
-            </a:r>
-          </a:p>
-          <a:p>
-            <a:pPr marL="714375" lvl="1" indent="-366713">
-              <a:lnSpc>
-                <a:spcPts val="3400"/>
-              </a:lnSpc>
-              <a:spcBef>
-                <a:spcPts val="300"/>
-              </a:spcBef>
-            </a:pPr>
-            <a:r>
-              <a:rPr lang="en-US" sz="2600" dirty="0" smtClean="0"/>
               <a:t>Defining Classes, Constructors, Properties, Methods, Events, Interfaces, Inheritance, Polymorphism</a:t>
             </a:r>
           </a:p>
@@ -11077,97 +12994,75 @@
           <a:p>
             <a:pPr marL="360363" lvl="0" indent="-360363">
               <a:lnSpc>
-                <a:spcPts val="3600"/>
+                <a:spcPct val="95000"/>
               </a:lnSpc>
-              <a:spcBef>
-                <a:spcPts val="300"/>
-              </a:spcBef>
               <a:buFont typeface="+mj-lt"/>
               <a:buAutoNum type="arabicPeriod" startAt="5"/>
               <a:tabLst/>
             </a:pPr>
             <a:r>
+              <a:rPr lang="en-US" sz="3000" dirty="0" smtClean="0"/>
+              <a:t>Databases, SQL and MS SQL Server</a:t>
+            </a:r>
+          </a:p>
+          <a:p>
+            <a:pPr marL="457200" lvl="1" indent="-228600">
+              <a:lnSpc>
+                <a:spcPct val="95000"/>
+              </a:lnSpc>
+            </a:pPr>
+            <a:r>
               <a:rPr lang="en-US" sz="2800" dirty="0" smtClean="0"/>
-              <a:t>Databases, SQL and MS SQL Server</a:t>
-            </a:r>
-          </a:p>
-          <a:p>
-            <a:pPr marL="714375" lvl="1" indent="-366713">
-              <a:lnSpc>
-                <a:spcPts val="3600"/>
-              </a:lnSpc>
-              <a:spcBef>
-                <a:spcPts val="300"/>
-              </a:spcBef>
-            </a:pPr>
-            <a:r>
-              <a:rPr lang="en-US" sz="2600" dirty="0" smtClean="0"/>
-              <a:t>RDBMS, </a:t>
-            </a:r>
-            <a:r>
-              <a:rPr lang="en-US" sz="2600" dirty="0" smtClean="0"/>
-              <a:t>SQL Language, SQL SELECT, Joins, Grouping, SQL INSERT, SQL UPDATE, SQL DELETE, MS SQL Server, SQL Server Management Studio </a:t>
+              <a:t>RDBMS, SQL Language, SQL SELECT, Joins, Grouping, SQL INSERT, SQL UPDATE, SQL DELETE, MS SQL Server, SQL Server Management Studio </a:t>
             </a:r>
           </a:p>
           <a:p>
             <a:pPr marL="361950" lvl="0" indent="-361950">
               <a:lnSpc>
-                <a:spcPts val="3600"/>
+                <a:spcPct val="95000"/>
               </a:lnSpc>
-              <a:spcBef>
-                <a:spcPts val="300"/>
-              </a:spcBef>
               <a:buFont typeface="+mj-lt"/>
               <a:buAutoNum type="arabicPeriod" startAt="5"/>
               <a:tabLst/>
             </a:pPr>
             <a:r>
+              <a:rPr lang="en-US" sz="3000" dirty="0" smtClean="0"/>
+              <a:t>LINQ and LINQ-to-SQL</a:t>
+            </a:r>
+          </a:p>
+          <a:p>
+            <a:pPr marL="457200" lvl="1" indent="-228600">
+              <a:lnSpc>
+                <a:spcPct val="95000"/>
+              </a:lnSpc>
+            </a:pPr>
+            <a:r>
               <a:rPr lang="en-US" sz="2800" dirty="0" smtClean="0"/>
-              <a:t>LINQ and LINQ-to-SQL</a:t>
-            </a:r>
-          </a:p>
-          <a:p>
-            <a:pPr marL="714375" lvl="1" indent="-366713">
-              <a:lnSpc>
-                <a:spcPts val="3600"/>
-              </a:lnSpc>
-              <a:spcBef>
-                <a:spcPts val="300"/>
-              </a:spcBef>
-            </a:pPr>
-            <a:r>
-              <a:rPr lang="en-US" sz="2600" dirty="0" smtClean="0"/>
               <a:t>LINQ Operators and Expressions, Projections, Conversions, Aggregations, LINQ-to-SQL, Using DataContext to Read / Create / Update / Delete Data</a:t>
             </a:r>
           </a:p>
           <a:p>
             <a:pPr marL="361950" lvl="0" indent="-361950">
               <a:lnSpc>
-                <a:spcPts val="3600"/>
+                <a:spcPct val="95000"/>
               </a:lnSpc>
-              <a:spcBef>
-                <a:spcPts val="300"/>
-              </a:spcBef>
               <a:buFont typeface="+mj-lt"/>
               <a:buAutoNum type="arabicPeriod" startAt="5"/>
               <a:tabLst/>
             </a:pPr>
             <a:r>
+              <a:rPr lang="en-US" sz="3000" dirty="0" smtClean="0"/>
+              <a:t>Web Technologies Basics</a:t>
+            </a:r>
+          </a:p>
+          <a:p>
+            <a:pPr marL="457200" lvl="1" indent="-228600">
+              <a:lnSpc>
+                <a:spcPct val="95000"/>
+              </a:lnSpc>
+            </a:pPr>
+            <a:r>
               <a:rPr lang="en-US" sz="2800" dirty="0" smtClean="0"/>
-              <a:t>Web Technologies Basics</a:t>
-            </a:r>
-          </a:p>
-          <a:p>
-            <a:pPr marL="714375" lvl="1" indent="-366713">
-              <a:lnSpc>
-                <a:spcPts val="3600"/>
-              </a:lnSpc>
-              <a:spcBef>
-                <a:spcPts val="300"/>
-              </a:spcBef>
-            </a:pPr>
-            <a:r>
-              <a:rPr lang="en-US" sz="2600" dirty="0" smtClean="0"/>
               <a:t>HTTP, HTML, Text, Images, Tables, Forms, CSS, JavaScript</a:t>
             </a:r>
           </a:p>
@@ -11269,195 +13164,152 @@
         </p:nvSpPr>
         <p:spPr>
           <a:xfrm>
-            <a:off x="228600" y="990600"/>
-            <a:ext cx="8686800" cy="5715000"/>
+            <a:off x="152400" y="838200"/>
+            <a:ext cx="8839200" cy="5715000"/>
           </a:xfrm>
         </p:spPr>
         <p:txBody>
           <a:bodyPr/>
           <a:lstStyle/>
           <a:p>
-            <a:pPr marL="361950" lvl="0" indent="-361950">
+            <a:pPr marL="514350" indent="-514350">
               <a:lnSpc>
-                <a:spcPts val="3400"/>
+                <a:spcPct val="95000"/>
               </a:lnSpc>
-              <a:spcBef>
-                <a:spcPts val="300"/>
-              </a:spcBef>
               <a:buFont typeface="+mj-lt"/>
               <a:buAutoNum type="arabicPeriod" startAt="8"/>
               <a:tabLst/>
             </a:pPr>
             <a:r>
-              <a:rPr lang="en-US" sz="2800" dirty="0">
-                <a:effectLst/>
-              </a:rPr>
+              <a:rPr lang="en-US" sz="3000" dirty="0"/>
               <a:t>ASP.NET Basics</a:t>
             </a:r>
-            <a:endParaRPr lang="en-US" sz="2800" dirty="0" smtClean="0"/>
-          </a:p>
-          <a:p>
-            <a:pPr marL="714375" lvl="1" indent="-366713">
+            <a:endParaRPr lang="en-US" sz="3000" dirty="0"/>
+          </a:p>
+          <a:p>
+            <a:pPr marL="457200" lvl="1" indent="-228600">
               <a:lnSpc>
-                <a:spcPts val="3400"/>
+                <a:spcPct val="95000"/>
               </a:lnSpc>
-              <a:spcBef>
-                <a:spcPts val="300"/>
-              </a:spcBef>
             </a:pPr>
             <a:r>
-              <a:rPr lang="en-US" sz="2600" dirty="0" smtClean="0"/>
+              <a:rPr lang="en-US" sz="2800" dirty="0"/>
               <a:t>ASP.NET Web Forms, Web Server Controls, HTML Server Controls, Creating Simple Web Applications</a:t>
             </a:r>
           </a:p>
           <a:p>
-            <a:pPr marL="361950" lvl="0" indent="-361950">
+            <a:pPr marL="514350" indent="-514350">
               <a:lnSpc>
-                <a:spcPts val="3400"/>
+                <a:spcPct val="95000"/>
               </a:lnSpc>
-              <a:spcBef>
-                <a:spcPts val="300"/>
-              </a:spcBef>
               <a:buFont typeface="+mj-lt"/>
               <a:buAutoNum type="arabicPeriod" startAt="8"/>
               <a:tabLst/>
             </a:pPr>
             <a:r>
-              <a:rPr lang="en-US" sz="2800" dirty="0">
-                <a:effectLst/>
-              </a:rPr>
+              <a:rPr lang="en-US" sz="3000" dirty="0"/>
               <a:t>ASP.NET Data Binding</a:t>
             </a:r>
-            <a:endParaRPr lang="en-US" sz="2800" dirty="0" smtClean="0"/>
-          </a:p>
-          <a:p>
-            <a:pPr marL="714375" lvl="1" indent="-366713">
+            <a:endParaRPr lang="en-US" sz="3000" dirty="0"/>
+          </a:p>
+          <a:p>
+            <a:pPr marL="457200" lvl="1" indent="-228600">
               <a:lnSpc>
-                <a:spcPts val="3400"/>
+                <a:spcPct val="95000"/>
               </a:lnSpc>
-              <a:spcBef>
-                <a:spcPts val="300"/>
-              </a:spcBef>
             </a:pPr>
             <a:r>
-              <a:rPr lang="en-US" sz="2600" dirty="0" smtClean="0"/>
-              <a:t>Data-Bound </a:t>
-            </a:r>
-            <a:r>
-              <a:rPr lang="en-US" sz="2600" dirty="0" smtClean="0"/>
-              <a:t>Controls: Data Sources, </a:t>
-            </a:r>
-            <a:r>
-              <a:rPr lang="en-US" sz="2600" noProof="1" smtClean="0"/>
+              <a:rPr lang="en-US" sz="2800" dirty="0"/>
+              <a:t>Data-Bound Controls: Data Sources, </a:t>
+            </a:r>
+            <a:r>
+              <a:rPr lang="en-US" sz="2800" noProof="1"/>
               <a:t>GridView, FormView, DetailsView, DataList, Repeater, ListView</a:t>
             </a:r>
           </a:p>
           <a:p>
-            <a:pPr marL="361950" lvl="0" indent="-361950">
+            <a:pPr marL="514350" indent="-514350">
               <a:lnSpc>
-                <a:spcPts val="3400"/>
+                <a:spcPct val="95000"/>
               </a:lnSpc>
-              <a:spcBef>
-                <a:spcPts val="300"/>
-              </a:spcBef>
               <a:buFont typeface="+mj-lt"/>
               <a:buAutoNum type="arabicPeriod" startAt="8"/>
               <a:tabLst/>
             </a:pPr>
             <a:r>
-              <a:rPr lang="en-US" sz="2800" dirty="0">
-                <a:effectLst/>
-              </a:rPr>
+              <a:rPr lang="en-US" sz="3000" dirty="0"/>
               <a:t>ASP.NET and Databases</a:t>
             </a:r>
-            <a:endParaRPr lang="en-US" sz="2600" dirty="0" smtClean="0"/>
-          </a:p>
-          <a:p>
-            <a:pPr marL="714375" lvl="1" indent="-366713">
+            <a:endParaRPr lang="en-US" sz="3000" dirty="0"/>
+          </a:p>
+          <a:p>
+            <a:pPr marL="457200" lvl="1" indent="-228600">
               <a:lnSpc>
-                <a:spcPts val="3400"/>
+                <a:spcPct val="95000"/>
               </a:lnSpc>
-              <a:spcBef>
-                <a:spcPts val="300"/>
-              </a:spcBef>
             </a:pPr>
             <a:r>
-              <a:rPr lang="en-US" sz="2600" dirty="0"/>
+              <a:rPr lang="en-US" sz="2800" dirty="0"/>
               <a:t>Integrating LINQ-to-SQL with ASP.NET, Using Data Sources </a:t>
             </a:r>
             <a:r>
-              <a:rPr lang="en-US" sz="2600" dirty="0" smtClean="0"/>
+              <a:rPr lang="en-US" sz="2800" dirty="0"/>
               <a:t>(</a:t>
             </a:r>
             <a:r>
-              <a:rPr lang="en-US" sz="2600" noProof="1" smtClean="0"/>
+              <a:rPr lang="en-US" sz="2800" noProof="1"/>
               <a:t>LinqDataSource</a:t>
             </a:r>
             <a:r>
-              <a:rPr lang="en-US" sz="2600" dirty="0" smtClean="0"/>
+              <a:rPr lang="en-US" sz="2800" dirty="0"/>
               <a:t> </a:t>
             </a:r>
             <a:r>
-              <a:rPr lang="en-US" sz="2600" dirty="0"/>
+              <a:rPr lang="en-US" sz="2800" dirty="0"/>
               <a:t>and </a:t>
             </a:r>
             <a:r>
-              <a:rPr lang="en-US" sz="2600" noProof="1" smtClean="0"/>
+              <a:rPr lang="en-US" sz="2800" noProof="1"/>
               <a:t>ObjectDataSource</a:t>
             </a:r>
             <a:r>
-              <a:rPr lang="en-US" sz="2600" dirty="0" smtClean="0"/>
+              <a:rPr lang="en-US" sz="2800" dirty="0"/>
               <a:t>)</a:t>
             </a:r>
-            <a:endParaRPr lang="en-US" sz="2600" dirty="0" smtClean="0"/>
-          </a:p>
-          <a:p>
-            <a:pPr marL="361950" lvl="0" indent="0">
+          </a:p>
+          <a:p>
+            <a:pPr marL="514350" indent="-514350">
               <a:lnSpc>
-                <a:spcPts val="3400"/>
+                <a:spcPct val="95000"/>
               </a:lnSpc>
-              <a:spcBef>
-                <a:spcPts val="300"/>
-              </a:spcBef>
-              <a:buNone/>
+              <a:buFont typeface="+mj-lt"/>
+              <a:buAutoNum type="arabicPeriod" startAt="8"/>
               <a:tabLst/>
             </a:pPr>
             <a:r>
-              <a:rPr lang="en-US" sz="2800" dirty="0">
-                <a:effectLst/>
-              </a:rPr>
+              <a:rPr lang="en-US" sz="3000" dirty="0"/>
               <a:t>ASP.NET State Management</a:t>
             </a:r>
-            <a:endParaRPr lang="en-US" sz="2600" dirty="0" smtClean="0"/>
-          </a:p>
-          <a:p>
-            <a:pPr marL="714375" lvl="1" indent="-366713">
+            <a:endParaRPr lang="en-US" sz="3000" dirty="0"/>
+          </a:p>
+          <a:p>
+            <a:pPr marL="457200" lvl="1" indent="-228600">
               <a:lnSpc>
-                <a:spcPts val="3400"/>
+                <a:spcPct val="95000"/>
               </a:lnSpc>
-              <a:spcBef>
-                <a:spcPts val="300"/>
-              </a:spcBef>
             </a:pPr>
             <a:r>
-              <a:rPr lang="en-US" sz="2800" dirty="0" smtClean="0">
-                <a:effectLst/>
-              </a:rPr>
+              <a:rPr lang="en-US" sz="2800" dirty="0"/>
               <a:t>View </a:t>
             </a:r>
             <a:r>
-              <a:rPr lang="en-US" sz="2800" dirty="0">
-                <a:effectLst/>
-              </a:rPr>
+              <a:rPr lang="en-US" sz="2800" dirty="0"/>
               <a:t>State, Application State, Session </a:t>
             </a:r>
             <a:r>
-              <a:rPr lang="en-US" sz="2800" dirty="0" smtClean="0">
-                <a:effectLst/>
-              </a:rPr>
+              <a:rPr lang="en-US" sz="2800" dirty="0"/>
               <a:t>State</a:t>
             </a:r>
-            <a:endParaRPr lang="en-US" sz="2600" dirty="0" smtClean="0"/>
           </a:p>
         </p:txBody>
       </p:sp>
@@ -11557,197 +13409,138 @@
         </p:nvSpPr>
         <p:spPr>
           <a:xfrm>
-            <a:off x="228600" y="990600"/>
-            <a:ext cx="8686800" cy="5715000"/>
+            <a:off x="228600" y="685800"/>
+            <a:ext cx="8686800" cy="5943600"/>
           </a:xfrm>
         </p:spPr>
         <p:txBody>
           <a:bodyPr/>
           <a:lstStyle/>
           <a:p>
-            <a:pPr marL="361950" lvl="0" indent="-361950">
+            <a:pPr marL="514350" indent="-514350">
               <a:lnSpc>
-                <a:spcPts val="3400"/>
+                <a:spcPct val="90000"/>
               </a:lnSpc>
-              <a:spcBef>
-                <a:spcPts val="300"/>
-              </a:spcBef>
               <a:buFont typeface="+mj-lt"/>
-              <a:buAutoNum type="arabicPeriod" startAt="11"/>
+              <a:buAutoNum type="arabicPeriod" startAt="12"/>
               <a:tabLst/>
             </a:pPr>
             <a:r>
-              <a:rPr lang="en-US" sz="2800" dirty="0">
-                <a:effectLst/>
-              </a:rPr>
+              <a:rPr lang="en-US" sz="3000" dirty="0"/>
               <a:t>ASP.NET Advanced Topics</a:t>
             </a:r>
-            <a:endParaRPr lang="en-US" sz="2800" dirty="0" smtClean="0"/>
-          </a:p>
-          <a:p>
-            <a:pPr marL="714375" lvl="1" indent="-366713">
+          </a:p>
+          <a:p>
+            <a:pPr marL="457200" lvl="1" indent="-228600">
               <a:lnSpc>
-                <a:spcPts val="3400"/>
+                <a:spcPct val="90000"/>
               </a:lnSpc>
-              <a:spcBef>
-                <a:spcPts val="300"/>
-              </a:spcBef>
             </a:pPr>
             <a:r>
-              <a:rPr lang="en-US" sz="2600" dirty="0"/>
+              <a:rPr lang="en-US" sz="2800" dirty="0"/>
               <a:t>Master Pages, User Controls, Site Maps, Localization, Validation Controls, </a:t>
             </a:r>
             <a:r>
-              <a:rPr lang="en-US" sz="2600" noProof="1" smtClean="0"/>
+              <a:rPr lang="en-US" sz="2800" noProof="1"/>
               <a:t>Web.config</a:t>
             </a:r>
             <a:r>
-              <a:rPr lang="en-US" sz="2600" dirty="0" smtClean="0"/>
-              <a:t>, </a:t>
-            </a:r>
-            <a:r>
-              <a:rPr lang="en-US" sz="2600" dirty="0"/>
-              <a:t>IIS and Deployment</a:t>
-            </a:r>
-            <a:endParaRPr lang="en-US" sz="2600" dirty="0" smtClean="0"/>
-          </a:p>
-          <a:p>
-            <a:pPr marL="361950" lvl="0" indent="-361950">
+              <a:rPr lang="en-US" sz="2800" dirty="0"/>
+              <a:t>, IIS and Deployment</a:t>
+            </a:r>
+          </a:p>
+          <a:p>
+            <a:pPr marL="514350" indent="-514350">
               <a:lnSpc>
-                <a:spcPts val="3400"/>
+                <a:spcPct val="90000"/>
               </a:lnSpc>
-              <a:spcBef>
-                <a:spcPts val="300"/>
-              </a:spcBef>
               <a:buFont typeface="+mj-lt"/>
-              <a:buAutoNum type="arabicPeriod" startAt="11"/>
+              <a:buAutoNum type="arabicPeriod" startAt="12"/>
               <a:tabLst/>
             </a:pPr>
             <a:r>
-              <a:rPr lang="en-US" sz="2800" dirty="0">
-                <a:effectLst/>
-              </a:rPr>
+              <a:rPr lang="en-US" sz="3000" dirty="0"/>
               <a:t>ASP.NET Membership</a:t>
             </a:r>
-            <a:endParaRPr lang="en-US" sz="2800" dirty="0" smtClean="0"/>
-          </a:p>
-          <a:p>
-            <a:pPr marL="714375" lvl="1" indent="-366713">
+          </a:p>
+          <a:p>
+            <a:pPr marL="457200" lvl="1" indent="-228600">
               <a:lnSpc>
-                <a:spcPts val="3400"/>
+                <a:spcPct val="90000"/>
               </a:lnSpc>
-              <a:spcBef>
-                <a:spcPts val="300"/>
-              </a:spcBef>
             </a:pPr>
             <a:r>
-              <a:rPr lang="en-US" sz="2600" dirty="0"/>
+              <a:rPr lang="en-US" sz="2800" dirty="0"/>
               <a:t>Authentication and Authorization, Windows and Forms Authentication, Users, Roles, Membership and Providers, Login Controls</a:t>
             </a:r>
-            <a:endParaRPr lang="en-US" sz="2600" noProof="1" smtClean="0"/>
-          </a:p>
-          <a:p>
-            <a:pPr marL="361950" lvl="0" indent="-361950">
+            <a:endParaRPr lang="en-US" sz="2800" noProof="1"/>
+          </a:p>
+          <a:p>
+            <a:pPr marL="457200" lvl="1" indent="-228600">
               <a:lnSpc>
-                <a:spcPts val="3400"/>
+                <a:spcPct val="90000"/>
               </a:lnSpc>
-              <a:spcBef>
-                <a:spcPts val="300"/>
-              </a:spcBef>
+            </a:pPr>
+            <a:r>
+              <a:rPr lang="en-US" sz="2800" dirty="0"/>
+              <a:t>ASP.NET AJAX</a:t>
+            </a:r>
+          </a:p>
+          <a:p>
+            <a:pPr marL="457200" lvl="1" indent="-228600">
+              <a:lnSpc>
+                <a:spcPct val="90000"/>
+              </a:lnSpc>
+            </a:pPr>
+            <a:r>
+              <a:rPr lang="en-US" sz="2800" noProof="1"/>
+              <a:t>ScriptManager</a:t>
+            </a:r>
+            <a:r>
+              <a:rPr lang="en-US" sz="2800" dirty="0"/>
+              <a:t>, </a:t>
+            </a:r>
+            <a:r>
+              <a:rPr lang="en-US" sz="2800" noProof="1"/>
+              <a:t>UpdatePanel</a:t>
+            </a:r>
+            <a:r>
+              <a:rPr lang="en-US" sz="2800" dirty="0"/>
+              <a:t>, AJAX Control Toolkit</a:t>
+            </a:r>
+          </a:p>
+          <a:p>
+            <a:pPr marL="514350" indent="-514350">
+              <a:lnSpc>
+                <a:spcPct val="90000"/>
+              </a:lnSpc>
               <a:buFont typeface="+mj-lt"/>
-              <a:buAutoNum type="arabicPeriod" startAt="11"/>
+              <a:buAutoNum type="arabicPeriod" startAt="12"/>
               <a:tabLst/>
             </a:pPr>
             <a:r>
-              <a:rPr lang="en-US" sz="2800" dirty="0">
-                <a:effectLst/>
-              </a:rPr>
-              <a:t>ASP.NET AJAX</a:t>
-            </a:r>
-            <a:endParaRPr lang="en-US" sz="2600" dirty="0" smtClean="0"/>
-          </a:p>
-          <a:p>
-            <a:pPr marL="714375" lvl="1" indent="-366713">
+              <a:rPr lang="en-US" sz="3000" dirty="0"/>
+              <a:t>Practical Project Live Demo – Blog System</a:t>
+            </a:r>
+          </a:p>
+          <a:p>
+            <a:pPr marL="514350" indent="-514350">
               <a:lnSpc>
-                <a:spcPts val="3400"/>
+                <a:spcPct val="90000"/>
               </a:lnSpc>
-              <a:spcBef>
-                <a:spcPts val="300"/>
-              </a:spcBef>
-            </a:pPr>
-            <a:r>
-              <a:rPr lang="en-US" sz="2600" noProof="1" smtClean="0"/>
-              <a:t>ScriptManager</a:t>
-            </a:r>
-            <a:r>
-              <a:rPr lang="en-US" sz="2600" dirty="0" smtClean="0"/>
-              <a:t>, </a:t>
-            </a:r>
-            <a:r>
-              <a:rPr lang="en-US" sz="2600" noProof="1" smtClean="0"/>
-              <a:t>UpdatePanel</a:t>
-            </a:r>
-            <a:r>
-              <a:rPr lang="en-US" sz="2600" dirty="0" smtClean="0"/>
-              <a:t>, </a:t>
-            </a:r>
-            <a:r>
-              <a:rPr lang="en-US" sz="2600" dirty="0"/>
-              <a:t>AJAX Control Toolkit</a:t>
-            </a:r>
-            <a:endParaRPr lang="en-US" sz="2600" dirty="0" smtClean="0"/>
-          </a:p>
-          <a:p>
-            <a:pPr marL="361950" lvl="0" indent="-361950">
-              <a:lnSpc>
-                <a:spcPts val="3400"/>
-              </a:lnSpc>
-              <a:spcBef>
-                <a:spcPts val="300"/>
-              </a:spcBef>
               <a:buFont typeface="+mj-lt"/>
-              <a:buAutoNum type="arabicPeriod" startAt="11"/>
+              <a:buAutoNum type="arabicPeriod" startAt="12"/>
               <a:tabLst/>
             </a:pPr>
             <a:r>
-              <a:rPr lang="en-US" sz="2800" dirty="0">
-                <a:effectLst/>
-              </a:rPr>
-              <a:t>Practical Project Live </a:t>
-            </a:r>
-            <a:r>
-              <a:rPr lang="en-US" sz="2800" dirty="0" smtClean="0">
-                <a:effectLst/>
-              </a:rPr>
-              <a:t>Demo – Blog System</a:t>
-            </a:r>
-            <a:endParaRPr lang="en-US" sz="2800" dirty="0" smtClean="0"/>
-          </a:p>
-          <a:p>
-            <a:pPr marL="361950" lvl="0" indent="-361950">
-              <a:lnSpc>
-                <a:spcPts val="3400"/>
-              </a:lnSpc>
-              <a:spcBef>
-                <a:spcPts val="300"/>
-              </a:spcBef>
-              <a:buFont typeface="+mj-lt"/>
-              <a:buAutoNum type="arabicPeriod" startAt="11"/>
-              <a:tabLst/>
-            </a:pPr>
-            <a:r>
-              <a:rPr lang="en-US" sz="2800" dirty="0">
-                <a:effectLst/>
-              </a:rPr>
-              <a:t>Practical Projects </a:t>
-            </a:r>
-            <a:r>
-              <a:rPr lang="en-US" sz="2800" dirty="0" smtClean="0">
-                <a:effectLst/>
-              </a:rPr>
-              <a:t>Defense (Certification Exam)</a:t>
-            </a:r>
-            <a:endParaRPr lang="en-US" sz="2600" dirty="0" smtClean="0"/>
+              <a:rPr lang="en-US" sz="3000" dirty="0"/>
+              <a:t>Practical Projects Defense (Certification </a:t>
+            </a:r>
+            <a:r>
+              <a:rPr lang="en-US" sz="3000" dirty="0" smtClean="0"/>
+              <a:t>Exam)</a:t>
+            </a:r>
+            <a:endParaRPr lang="en-US" sz="3000" dirty="0"/>
           </a:p>
         </p:txBody>
       </p:sp>

</xml_diff>

<commit_message>
Added few photos; Completed the lectures 0 and 1
</commit_message>
<xml_diff>
--- a/2010/lectures/0. Course Introduction.pptx
+++ b/2010/lectures/0. Course Introduction.pptx
@@ -5,37 +5,38 @@
     <p:sldMasterId id="2147483704" r:id="rId1"/>
   </p:sldMasterIdLst>
   <p:notesMasterIdLst>
-    <p:notesMasterId r:id="rId27"/>
+    <p:notesMasterId r:id="rId28"/>
   </p:notesMasterIdLst>
   <p:handoutMasterIdLst>
-    <p:handoutMasterId r:id="rId28"/>
+    <p:handoutMasterId r:id="rId29"/>
   </p:handoutMasterIdLst>
   <p:sldIdLst>
     <p:sldId id="320" r:id="rId2"/>
     <p:sldId id="322" r:id="rId3"/>
     <p:sldId id="323" r:id="rId4"/>
-    <p:sldId id="351" r:id="rId5"/>
-    <p:sldId id="324" r:id="rId6"/>
-    <p:sldId id="325" r:id="rId7"/>
-    <p:sldId id="347" r:id="rId8"/>
-    <p:sldId id="348" r:id="rId9"/>
-    <p:sldId id="349" r:id="rId10"/>
-    <p:sldId id="328" r:id="rId11"/>
-    <p:sldId id="329" r:id="rId12"/>
-    <p:sldId id="332" r:id="rId13"/>
+    <p:sldId id="358" r:id="rId5"/>
+    <p:sldId id="351" r:id="rId6"/>
+    <p:sldId id="324" r:id="rId7"/>
+    <p:sldId id="325" r:id="rId8"/>
+    <p:sldId id="347" r:id="rId9"/>
+    <p:sldId id="348" r:id="rId10"/>
+    <p:sldId id="349" r:id="rId11"/>
+    <p:sldId id="328" r:id="rId12"/>
+    <p:sldId id="329" r:id="rId13"/>
     <p:sldId id="352" r:id="rId14"/>
-    <p:sldId id="353" r:id="rId15"/>
-    <p:sldId id="354" r:id="rId16"/>
-    <p:sldId id="355" r:id="rId17"/>
-    <p:sldId id="356" r:id="rId18"/>
-    <p:sldId id="357" r:id="rId19"/>
-    <p:sldId id="339" r:id="rId20"/>
-    <p:sldId id="340" r:id="rId21"/>
-    <p:sldId id="350" r:id="rId22"/>
-    <p:sldId id="343" r:id="rId23"/>
-    <p:sldId id="344" r:id="rId24"/>
-    <p:sldId id="345" r:id="rId25"/>
-    <p:sldId id="346" r:id="rId26"/>
+    <p:sldId id="332" r:id="rId15"/>
+    <p:sldId id="353" r:id="rId16"/>
+    <p:sldId id="354" r:id="rId17"/>
+    <p:sldId id="355" r:id="rId18"/>
+    <p:sldId id="356" r:id="rId19"/>
+    <p:sldId id="357" r:id="rId20"/>
+    <p:sldId id="339" r:id="rId21"/>
+    <p:sldId id="340" r:id="rId22"/>
+    <p:sldId id="350" r:id="rId23"/>
+    <p:sldId id="343" r:id="rId24"/>
+    <p:sldId id="344" r:id="rId25"/>
+    <p:sldId id="345" r:id="rId26"/>
+    <p:sldId id="346" r:id="rId27"/>
   </p:sldIdLst>
   <p:sldSz cx="9144000" cy="6858000" type="screen4x3"/>
   <p:notesSz cx="6881813" cy="9296400"/>
@@ -282,7 +283,7 @@
             <a:fld id="{3BF7C7B5-275F-4D1F-9AB4-9255447DBC73}" type="datetimeFigureOut">
               <a:rPr lang="en-US"/>
               <a:pPr/>
-              <a:t>10/5/2010</a:t>
+              <a:t>06-Oct-10</a:t>
             </a:fld>
             <a:endParaRPr lang="en-US" dirty="0"/>
           </a:p>
@@ -513,7 +514,7 @@
             <a:fld id="{9B46F231-FB2B-4655-A644-E2477325E686}" type="datetimeFigureOut">
               <a:rPr lang="en-US"/>
               <a:pPr/>
-              <a:t>10/5/2010</a:t>
+              <a:t>06-Oct-10</a:t>
             </a:fld>
             <a:endParaRPr lang="en-US" dirty="0"/>
           </a:p>
@@ -5748,6 +5749,237 @@
       </p:grpSpPr>
       <p:sp>
         <p:nvSpPr>
+          <p:cNvPr id="2" name="Title 1"/>
+          <p:cNvSpPr>
+            <a:spLocks noGrp="1"/>
+          </p:cNvSpPr>
+          <p:nvPr>
+            <p:ph type="title"/>
+          </p:nvPr>
+        </p:nvSpPr>
+        <p:spPr/>
+        <p:txBody>
+          <a:bodyPr/>
+          <a:lstStyle/>
+          <a:p>
+            <a:r>
+              <a:rPr lang="en-US" dirty="0" smtClean="0"/>
+              <a:t>Curriculum (4)</a:t>
+            </a:r>
+            <a:endParaRPr lang="en-US" dirty="0"/>
+          </a:p>
+        </p:txBody>
+      </p:sp>
+      <p:sp>
+        <p:nvSpPr>
+          <p:cNvPr id="3" name="Content Placeholder 2"/>
+          <p:cNvSpPr>
+            <a:spLocks noGrp="1"/>
+          </p:cNvSpPr>
+          <p:nvPr>
+            <p:ph idx="1"/>
+          </p:nvPr>
+        </p:nvSpPr>
+        <p:spPr>
+          <a:xfrm>
+            <a:off x="228600" y="762000"/>
+            <a:ext cx="8686800" cy="5867400"/>
+          </a:xfrm>
+        </p:spPr>
+        <p:txBody>
+          <a:bodyPr/>
+          <a:lstStyle/>
+          <a:p>
+            <a:pPr marL="514350" indent="-514350">
+              <a:lnSpc>
+                <a:spcPct val="90000"/>
+              </a:lnSpc>
+              <a:buFont typeface="+mj-lt"/>
+              <a:buAutoNum type="arabicPeriod" startAt="12"/>
+              <a:tabLst/>
+            </a:pPr>
+            <a:r>
+              <a:rPr lang="en-US" sz="3000" dirty="0"/>
+              <a:t>ASP.NET Advanced Topics</a:t>
+            </a:r>
+          </a:p>
+          <a:p>
+            <a:pPr marL="457200" lvl="1" indent="-228600">
+              <a:lnSpc>
+                <a:spcPct val="90000"/>
+              </a:lnSpc>
+            </a:pPr>
+            <a:r>
+              <a:rPr lang="en-US" sz="2800" dirty="0"/>
+              <a:t>Master Pages, User Controls, Site Maps, Localization, Validation Controls, </a:t>
+            </a:r>
+            <a:r>
+              <a:rPr lang="en-US" sz="2800" noProof="1"/>
+              <a:t>Web.config</a:t>
+            </a:r>
+            <a:r>
+              <a:rPr lang="en-US" sz="2800" dirty="0"/>
+              <a:t>, IIS and Deployment</a:t>
+            </a:r>
+          </a:p>
+          <a:p>
+            <a:pPr marL="514350" indent="-514350">
+              <a:lnSpc>
+                <a:spcPct val="90000"/>
+              </a:lnSpc>
+              <a:buFont typeface="+mj-lt"/>
+              <a:buAutoNum type="arabicPeriod" startAt="12"/>
+              <a:tabLst/>
+            </a:pPr>
+            <a:r>
+              <a:rPr lang="en-US" sz="3000" dirty="0"/>
+              <a:t>ASP.NET Membership</a:t>
+            </a:r>
+          </a:p>
+          <a:p>
+            <a:pPr marL="457200" lvl="1" indent="-228600">
+              <a:lnSpc>
+                <a:spcPct val="90000"/>
+              </a:lnSpc>
+            </a:pPr>
+            <a:r>
+              <a:rPr lang="en-US" sz="2800" dirty="0"/>
+              <a:t>Authentication and Authorization, Windows and Forms Authentication, Users, Roles, Membership and Providers, Login Controls</a:t>
+            </a:r>
+            <a:endParaRPr lang="en-US" sz="2800" noProof="1"/>
+          </a:p>
+          <a:p>
+            <a:pPr marL="457200" lvl="1" indent="-228600">
+              <a:lnSpc>
+                <a:spcPct val="90000"/>
+              </a:lnSpc>
+            </a:pPr>
+            <a:r>
+              <a:rPr lang="en-US" sz="2800" dirty="0"/>
+              <a:t>ASP.NET AJAX</a:t>
+            </a:r>
+          </a:p>
+          <a:p>
+            <a:pPr marL="457200" lvl="1" indent="-228600">
+              <a:lnSpc>
+                <a:spcPct val="90000"/>
+              </a:lnSpc>
+            </a:pPr>
+            <a:r>
+              <a:rPr lang="en-US" sz="2800" noProof="1"/>
+              <a:t>ScriptManager</a:t>
+            </a:r>
+            <a:r>
+              <a:rPr lang="en-US" sz="2800" dirty="0"/>
+              <a:t>, </a:t>
+            </a:r>
+            <a:r>
+              <a:rPr lang="en-US" sz="2800" noProof="1"/>
+              <a:t>UpdatePanel</a:t>
+            </a:r>
+            <a:r>
+              <a:rPr lang="en-US" sz="2800" dirty="0"/>
+              <a:t>, AJAX Control Toolkit</a:t>
+            </a:r>
+          </a:p>
+          <a:p>
+            <a:pPr marL="514350" indent="-514350">
+              <a:lnSpc>
+                <a:spcPct val="90000"/>
+              </a:lnSpc>
+              <a:buFont typeface="+mj-lt"/>
+              <a:buAutoNum type="arabicPeriod" startAt="12"/>
+              <a:tabLst/>
+            </a:pPr>
+            <a:r>
+              <a:rPr lang="en-US" sz="3000" dirty="0"/>
+              <a:t>Practical Project Live Demo – Blog System</a:t>
+            </a:r>
+          </a:p>
+          <a:p>
+            <a:pPr marL="514350" indent="-514350">
+              <a:lnSpc>
+                <a:spcPct val="90000"/>
+              </a:lnSpc>
+              <a:buFont typeface="+mj-lt"/>
+              <a:buAutoNum type="arabicPeriod" startAt="12"/>
+              <a:tabLst/>
+            </a:pPr>
+            <a:r>
+              <a:rPr lang="en-US" sz="3000" dirty="0"/>
+              <a:t>Practical Projects Defense (Certification </a:t>
+            </a:r>
+            <a:r>
+              <a:rPr lang="en-US" sz="3000" dirty="0" smtClean="0"/>
+              <a:t>Exam)</a:t>
+            </a:r>
+            <a:endParaRPr lang="en-US" sz="3000" dirty="0"/>
+          </a:p>
+        </p:txBody>
+      </p:sp>
+      <p:sp>
+        <p:nvSpPr>
+          <p:cNvPr id="4" name="Slide Number Placeholder 3"/>
+          <p:cNvSpPr>
+            <a:spLocks noGrp="1"/>
+          </p:cNvSpPr>
+          <p:nvPr>
+            <p:ph type="sldNum" sz="quarter" idx="10"/>
+          </p:nvPr>
+        </p:nvSpPr>
+        <p:spPr/>
+        <p:txBody>
+          <a:bodyPr/>
+          <a:lstStyle/>
+          <a:p>
+            <a:pPr>
+              <a:defRPr/>
+            </a:pPr>
+            <a:fld id="{58452FF4-89E3-4D1B-9927-2DBDC00E58D7}" type="slidenum">
+              <a:rPr lang="en-US" smtClean="0"/>
+              <a:pPr>
+                <a:defRPr/>
+              </a:pPr>
+              <a:t>10</a:t>
+            </a:fld>
+            <a:endParaRPr lang="en-US" dirty="0"/>
+          </a:p>
+        </p:txBody>
+      </p:sp>
+    </p:spTree>
+  </p:cSld>
+  <p:clrMapOvr>
+    <a:masterClrMapping/>
+  </p:clrMapOvr>
+  <p:timing>
+    <p:tnLst>
+      <p:par>
+        <p:cTn id="1" dur="indefinite" restart="never" nodeType="tmRoot"/>
+      </p:par>
+    </p:tnLst>
+  </p:timing>
+</p:sld>
+</file>
+
+<file path=ppt/slides/slide11.xml><?xml version="1.0" encoding="utf-8"?>
+<p:sld xmlns:a="http://schemas.openxmlformats.org/drawingml/2006/main" xmlns:r="http://schemas.openxmlformats.org/officeDocument/2006/relationships" xmlns:p="http://schemas.openxmlformats.org/presentationml/2006/main">
+  <p:cSld>
+    <p:spTree>
+      <p:nvGrpSpPr>
+        <p:cNvPr id="1" name=""/>
+        <p:cNvGrpSpPr/>
+        <p:nvPr/>
+      </p:nvGrpSpPr>
+      <p:grpSpPr>
+        <a:xfrm>
+          <a:off x="0" y="0"/>
+          <a:ext cx="0" cy="0"/>
+          <a:chOff x="0" y="0"/>
+          <a:chExt cx="0" cy="0"/>
+        </a:xfrm>
+      </p:grpSpPr>
+      <p:sp>
+        <p:nvSpPr>
           <p:cNvPr id="5" name="Title 4"/>
           <p:cNvSpPr>
             <a:spLocks noGrp="1"/>
@@ -5837,7 +6069,7 @@
 </p:sld>
 </file>
 
-<file path=ppt/slides/slide11.xml><?xml version="1.0" encoding="utf-8"?>
+<file path=ppt/slides/slide12.xml><?xml version="1.0" encoding="utf-8"?>
 <p:sld xmlns:a="http://schemas.openxmlformats.org/drawingml/2006/main" xmlns:r="http://schemas.openxmlformats.org/officeDocument/2006/relationships" xmlns:p="http://schemas.openxmlformats.org/presentationml/2006/main">
   <p:cSld>
     <p:spTree>
@@ -5954,7 +6186,7 @@
               <a:pPr>
                 <a:defRPr/>
               </a:pPr>
-              <a:t>11</a:t>
+              <a:t>12</a:t>
             </a:fld>
             <a:endParaRPr lang="en-US" dirty="0"/>
           </a:p>
@@ -5977,8 +6209,8 @@
         </p:blipFill>
         <p:spPr bwMode="auto">
           <a:xfrm>
-            <a:off x="6858000" y="1219200"/>
-            <a:ext cx="1622425" cy="1981200"/>
+            <a:off x="6629400" y="1066800"/>
+            <a:ext cx="2003425" cy="2446453"/>
           </a:xfrm>
           <a:prstGeom prst="rect">
             <a:avLst/>
@@ -6249,290 +6481,6 @@
           </a:p>
         </p:txBody>
       </p:sp>
-    </p:spTree>
-  </p:cSld>
-  <p:clrMapOvr>
-    <a:masterClrMapping/>
-  </p:clrMapOvr>
-  <p:timing>
-    <p:tnLst>
-      <p:par>
-        <p:cTn id="1" dur="indefinite" restart="never" nodeType="tmRoot"/>
-      </p:par>
-    </p:tnLst>
-  </p:timing>
-</p:sld>
-</file>
-
-<file path=ppt/slides/slide12.xml><?xml version="1.0" encoding="utf-8"?>
-<p:sld xmlns:a="http://schemas.openxmlformats.org/drawingml/2006/main" xmlns:r="http://schemas.openxmlformats.org/officeDocument/2006/relationships" xmlns:p="http://schemas.openxmlformats.org/presentationml/2006/main">
-  <p:cSld>
-    <p:spTree>
-      <p:nvGrpSpPr>
-        <p:cNvPr id="1" name=""/>
-        <p:cNvGrpSpPr/>
-        <p:nvPr/>
-      </p:nvGrpSpPr>
-      <p:grpSpPr>
-        <a:xfrm>
-          <a:off x="0" y="0"/>
-          <a:ext cx="0" cy="0"/>
-          <a:chOff x="0" y="0"/>
-          <a:chExt cx="0" cy="0"/>
-        </a:xfrm>
-      </p:grpSpPr>
-      <p:sp>
-        <p:nvSpPr>
-          <p:cNvPr id="4" name="Title 3"/>
-          <p:cNvSpPr>
-            <a:spLocks noGrp="1"/>
-          </p:cNvSpPr>
-          <p:nvPr>
-            <p:ph type="title"/>
-          </p:nvPr>
-        </p:nvSpPr>
-        <p:spPr/>
-        <p:txBody>
-          <a:bodyPr/>
-          <a:lstStyle/>
-          <a:p>
-            <a:r>
-              <a:rPr lang="en-US" dirty="0" smtClean="0"/>
-              <a:t>Trainers Team </a:t>
-            </a:r>
-            <a:r>
-              <a:rPr lang="en-US" dirty="0" smtClean="0"/>
-              <a:t>(2)</a:t>
-            </a:r>
-            <a:endParaRPr lang="en-US" dirty="0"/>
-          </a:p>
-        </p:txBody>
-      </p:sp>
-      <p:sp>
-        <p:nvSpPr>
-          <p:cNvPr id="5" name="Content Placeholder 4"/>
-          <p:cNvSpPr>
-            <a:spLocks noGrp="1"/>
-          </p:cNvSpPr>
-          <p:nvPr>
-            <p:ph idx="1"/>
-          </p:nvPr>
-        </p:nvSpPr>
-        <p:spPr>
-          <a:xfrm>
-            <a:off x="228600" y="1066800"/>
-            <a:ext cx="6477000" cy="2438400"/>
-          </a:xfrm>
-        </p:spPr>
-        <p:txBody>
-          <a:bodyPr/>
-          <a:lstStyle/>
-          <a:p>
-            <a:pPr>
-              <a:lnSpc>
-                <a:spcPct val="100000"/>
-              </a:lnSpc>
-            </a:pPr>
-            <a:r>
-              <a:rPr lang="en-US" dirty="0" smtClean="0"/>
-              <a:t>Ventsislav Popov</a:t>
-            </a:r>
-          </a:p>
-          <a:p>
-            <a:pPr lvl="1">
-              <a:lnSpc>
-                <a:spcPct val="100000"/>
-              </a:lnSpc>
-            </a:pPr>
-            <a:r>
-              <a:rPr lang="en-US" dirty="0" smtClean="0"/>
-              <a:t>Developer,		 	         Crossroad,		 </a:t>
-            </a:r>
-            <a:r>
-              <a:rPr lang="en-US" dirty="0" smtClean="0">
-                <a:hlinkClick r:id="rId2"/>
-              </a:rPr>
-              <a:t>www.crossroad.bg</a:t>
-            </a:r>
-            <a:endParaRPr lang="en-US" dirty="0" smtClean="0"/>
-          </a:p>
-        </p:txBody>
-      </p:sp>
-      <p:sp>
-        <p:nvSpPr>
-          <p:cNvPr id="7" name="Slide Number Placeholder 3"/>
-          <p:cNvSpPr>
-            <a:spLocks noGrp="1"/>
-          </p:cNvSpPr>
-          <p:nvPr>
-            <p:ph type="sldNum" sz="quarter" idx="10"/>
-          </p:nvPr>
-        </p:nvSpPr>
-        <p:spPr/>
-        <p:txBody>
-          <a:bodyPr/>
-          <a:lstStyle/>
-          <a:p>
-            <a:pPr>
-              <a:defRPr/>
-            </a:pPr>
-            <a:fld id="{58452FF4-89E3-4D1B-9927-2DBDC00E58D7}" type="slidenum">
-              <a:rPr lang="en-US" smtClean="0"/>
-              <a:pPr>
-                <a:defRPr/>
-              </a:pPr>
-              <a:t>12</a:t>
-            </a:fld>
-            <a:endParaRPr lang="en-US" dirty="0"/>
-          </a:p>
-        </p:txBody>
-      </p:sp>
-      <p:sp>
-        <p:nvSpPr>
-          <p:cNvPr id="8" name="Rectangle 7"/>
-          <p:cNvSpPr/>
-          <p:nvPr/>
-        </p:nvSpPr>
-        <p:spPr>
-          <a:xfrm>
-            <a:off x="228600" y="3429000"/>
-            <a:ext cx="8610600" cy="553998"/>
-          </a:xfrm>
-          <a:prstGeom prst="rect">
-            <a:avLst/>
-          </a:prstGeom>
-        </p:spPr>
-        <p:txBody>
-          <a:bodyPr wrap="square">
-            <a:spAutoFit/>
-          </a:bodyPr>
-          <a:lstStyle/>
-          <a:p>
-            <a:pPr marL="630238" lvl="1" indent="-273050">
-              <a:spcBef>
-                <a:spcPts val="600"/>
-              </a:spcBef>
-              <a:spcAft>
-                <a:spcPts val="600"/>
-              </a:spcAft>
-              <a:buClr>
-                <a:srgbClr val="8FD600"/>
-              </a:buClr>
-              <a:buFont typeface="Wingdings 2" pitchFamily="18" charset="2"/>
-              <a:buChar char=""/>
-            </a:pPr>
-            <a:r>
-              <a:rPr lang="en-US" sz="3000" b="1" dirty="0" smtClean="0">
-                <a:solidFill>
-                  <a:srgbClr val="CCFF66">
-                    <a:lumMod val="40000"/>
-                    <a:lumOff val="60000"/>
-                  </a:srgbClr>
-                </a:solidFill>
-                <a:effectLst>
-                  <a:outerShdw blurRad="38100" dist="38100" dir="2700000" algn="tl">
-                    <a:srgbClr val="000000">
-                      <a:alpha val="43137"/>
-                    </a:srgbClr>
-                  </a:outerShdw>
-                </a:effectLst>
-                <a:latin typeface="Corbel"/>
-              </a:rPr>
-              <a:t>E-mail: </a:t>
-            </a:r>
-            <a:r>
-              <a:rPr lang="en-US" sz="3000" b="1" noProof="1" smtClean="0">
-                <a:solidFill>
-                  <a:srgbClr val="CCFF66">
-                    <a:lumMod val="40000"/>
-                    <a:lumOff val="60000"/>
-                  </a:srgbClr>
-                </a:solidFill>
-                <a:effectLst>
-                  <a:outerShdw blurRad="38100" dist="38100" dir="2700000" algn="tl">
-                    <a:srgbClr val="000000">
-                      <a:alpha val="43137"/>
-                    </a:srgbClr>
-                  </a:outerShdw>
-                </a:effectLst>
-                <a:latin typeface="Corbel"/>
-              </a:rPr>
-              <a:t>ventsy.popov </a:t>
-            </a:r>
-            <a:r>
-              <a:rPr lang="en-US" sz="3000" b="1" dirty="0" smtClean="0">
-                <a:solidFill>
-                  <a:srgbClr val="CCFF66">
-                    <a:lumMod val="40000"/>
-                    <a:lumOff val="60000"/>
-                  </a:srgbClr>
-                </a:solidFill>
-                <a:effectLst>
-                  <a:outerShdw blurRad="38100" dist="38100" dir="2700000" algn="tl">
-                    <a:srgbClr val="000000">
-                      <a:alpha val="43137"/>
-                    </a:srgbClr>
-                  </a:outerShdw>
-                </a:effectLst>
-                <a:latin typeface="Corbel"/>
-              </a:rPr>
-              <a:t>[at] gmail.com</a:t>
-            </a:r>
-          </a:p>
-        </p:txBody>
-      </p:sp>
-      <p:pic>
-        <p:nvPicPr>
-          <p:cNvPr id="4098" name="Picture 2" descr="C:\Telerik Academy\ASP.NET Cource\2010\lectures\lecturers-photos\venci.jpg"/>
-          <p:cNvPicPr>
-            <a:picLocks noChangeAspect="1" noChangeArrowheads="1"/>
-          </p:cNvPicPr>
-          <p:nvPr/>
-        </p:nvPicPr>
-        <p:blipFill>
-          <a:blip r:embed="rId3">
-            <a:lum/>
-            <a:extLst>
-              <a:ext uri="{28A0092B-C50C-407E-A947-70E740481C1C}">
-                <a14:useLocalDpi xmlns:a14="http://schemas.microsoft.com/office/drawing/2010/main"/>
-              </a:ext>
-            </a:extLst>
-          </a:blip>
-          <a:srcRect/>
-          <a:stretch>
-            <a:fillRect/>
-          </a:stretch>
-        </p:blipFill>
-        <p:spPr bwMode="auto">
-          <a:xfrm>
-            <a:off x="6553200" y="1143000"/>
-            <a:ext cx="1511300" cy="2266950"/>
-          </a:xfrm>
-          <a:prstGeom prst="rect">
-            <a:avLst/>
-          </a:prstGeom>
-          <a:noFill/>
-          <a:ln w="3175">
-            <a:solidFill>
-              <a:schemeClr val="accent5">
-                <a:lumMod val="75000"/>
-              </a:schemeClr>
-            </a:solidFill>
-            <a:miter lim="800000"/>
-            <a:headEnd/>
-            <a:tailEnd/>
-          </a:ln>
-          <a:extLst>
-            <a:ext uri="{909E8E84-426E-40DD-AFC4-6F175D3DCCD1}">
-              <a14:hiddenFill xmlns:a14="http://schemas.microsoft.com/office/drawing/2010/main">
-                <a:solidFill>
-                  <a:srgbClr val="FFFFFF"/>
-                </a:solidFill>
-              </a14:hiddenFill>
-            </a:ext>
-          </a:extLst>
-        </p:spPr>
-      </p:pic>
     </p:spTree>
   </p:cSld>
   <p:clrMapOvr>
@@ -6582,11 +6530,11 @@
           <a:p>
             <a:r>
               <a:rPr lang="en-US" dirty="0" smtClean="0"/>
-              <a:t>Trainers </a:t>
+              <a:t>Trainers Team </a:t>
             </a:r>
             <a:r>
               <a:rPr lang="en-US" dirty="0" smtClean="0"/>
-              <a:t>Team (3)</a:t>
+              <a:t>(2)</a:t>
             </a:r>
             <a:endParaRPr lang="en-US" dirty="0"/>
           </a:p>
@@ -6621,7 +6569,6 @@
               <a:rPr lang="en-US" dirty="0" smtClean="0"/>
               <a:t>Vesko Kolev</a:t>
             </a:r>
-            <a:endParaRPr lang="en-US" dirty="0" smtClean="0"/>
           </a:p>
           <a:p>
             <a:pPr lvl="1">
@@ -6829,8 +6776,16 @@
         </p:nvPicPr>
         <p:blipFill>
           <a:blip r:embed="rId4">
-            <a:lum/>
             <a:extLst>
+              <a:ext uri="{BEBA8EAE-BF5A-486C-A8C5-ECC9F3942E4B}">
+                <a14:imgProps xmlns:a14="http://schemas.microsoft.com/office/drawing/2010/main">
+                  <a14:imgLayer r:embed="rId5">
+                    <a14:imgEffect>
+                      <a14:brightnessContrast bright="20000"/>
+                    </a14:imgEffect>
+                  </a14:imgLayer>
+                </a14:imgProps>
+              </a:ext>
               <a:ext uri="{28A0092B-C50C-407E-A947-70E740481C1C}">
                 <a14:useLocalDpi xmlns:a14="http://schemas.microsoft.com/office/drawing/2010/main"/>
               </a:ext>
@@ -6925,7 +6880,11 @@
           <a:p>
             <a:r>
               <a:rPr lang="en-US" dirty="0" smtClean="0"/>
-              <a:t>Trainers Team (4)</a:t>
+              <a:t>Trainers Team </a:t>
+            </a:r>
+            <a:r>
+              <a:rPr lang="en-US" dirty="0" smtClean="0"/>
+              <a:t>(3)</a:t>
             </a:r>
             <a:endParaRPr lang="en-US" dirty="0"/>
           </a:p>
@@ -6944,7 +6903,7 @@
         <p:spPr>
           <a:xfrm>
             <a:off x="228600" y="1066800"/>
-            <a:ext cx="5486400" cy="2438400"/>
+            <a:ext cx="6477000" cy="2438400"/>
           </a:xfrm>
         </p:spPr>
         <p:txBody>
@@ -6958,9 +6917,8 @@
             </a:pPr>
             <a:r>
               <a:rPr lang="en-US" dirty="0" smtClean="0"/>
-              <a:t>Doncho Minkov</a:t>
-            </a:r>
-            <a:endParaRPr lang="en-US" dirty="0" smtClean="0"/>
+              <a:t>Ventsislav Popov</a:t>
+            </a:r>
           </a:p>
           <a:p>
             <a:pPr lvl="1">
@@ -6970,47 +6928,15 @@
             </a:pPr>
             <a:r>
               <a:rPr lang="en-US" dirty="0" smtClean="0"/>
-              <a:t>Junior </a:t>
-            </a:r>
-            <a:r>
-              <a:rPr lang="en-US" dirty="0"/>
-              <a:t>Technical Trainer</a:t>
-            </a:r>
-            <a:r>
-              <a:rPr lang="bg-BG" dirty="0"/>
-              <a:t>, </a:t>
-            </a:r>
-            <a:r>
-              <a:rPr lang="en-US" dirty="0" smtClean="0"/>
-              <a:t>             </a:t>
+              <a:t>Developer,		 	         Crossroad,		 </a:t>
             </a:r>
             <a:r>
               <a:rPr lang="en-US" dirty="0" smtClean="0">
                 <a:hlinkClick r:id="rId2"/>
               </a:rPr>
-              <a:t>Telerik </a:t>
-            </a:r>
-            <a:r>
-              <a:rPr lang="en-US" dirty="0">
-                <a:hlinkClick r:id="rId2"/>
-              </a:rPr>
-              <a:t>Corporation</a:t>
-            </a:r>
-            <a:r>
-              <a:rPr lang="bg-BG" dirty="0"/>
-              <a:t>, </a:t>
-            </a:r>
-            <a:r>
-              <a:rPr lang="en-US" dirty="0" smtClean="0"/>
-              <a:t>               </a:t>
-            </a:r>
-            <a:r>
-              <a:rPr lang="bg-BG" dirty="0" smtClean="0">
-                <a:hlinkClick r:id="rId3"/>
-              </a:rPr>
-              <a:t>Telerik Academy</a:t>
-            </a:r>
-            <a:endParaRPr lang="en-US" dirty="0"/>
+              <a:t>www.crossroad.bg</a:t>
+            </a:r>
+            <a:endParaRPr lang="en-US" dirty="0" smtClean="0"/>
           </a:p>
         </p:txBody>
       </p:sp>
@@ -7051,8 +6977,8 @@
         </p:nvSpPr>
         <p:spPr>
           <a:xfrm>
-            <a:off x="609600" y="3200400"/>
-            <a:ext cx="7086600" cy="553998"/>
+            <a:off x="228600" y="3429000"/>
+            <a:ext cx="8610600" cy="553998"/>
           </a:xfrm>
           <a:prstGeom prst="rect">
             <a:avLst/>
@@ -7064,7 +6990,7 @@
           </a:bodyPr>
           <a:lstStyle/>
           <a:p>
-            <a:pPr marL="173038" indent="-273050">
+            <a:pPr marL="630238" lvl="1" indent="-273050">
               <a:spcBef>
                 <a:spcPts val="600"/>
               </a:spcBef>
@@ -7078,12 +7004,12 @@
               <a:buChar char=""/>
             </a:pPr>
             <a:r>
-              <a:rPr lang="en-US" sz="3000" b="1" dirty="0">
+              <a:rPr lang="en-US" sz="3000" b="1" dirty="0" smtClean="0">
                 <a:solidFill>
-                  <a:schemeClr val="tx1">
+                  <a:srgbClr val="CCFF66">
                     <a:lumMod val="40000"/>
                     <a:lumOff val="60000"/>
-                  </a:schemeClr>
+                  </a:srgbClr>
                 </a:solidFill>
                 <a:effectLst>
                   <a:outerShdw blurRad="38100" dist="38100" dir="2700000" algn="tl">
@@ -7092,17 +7018,17 @@
                     </a:srgbClr>
                   </a:outerShdw>
                 </a:effectLst>
-                <a:latin typeface="+mn-lt"/>
+                <a:latin typeface="Corbel"/>
               </a:rPr>
-              <a:t>Email: </a:t>
-            </a:r>
-            <a:r>
-              <a:rPr lang="en-US" sz="3000" b="1" dirty="0">
+              <a:t>E-mail: </a:t>
+            </a:r>
+            <a:r>
+              <a:rPr lang="en-US" sz="3000" b="1" noProof="1" smtClean="0">
                 <a:solidFill>
-                  <a:schemeClr val="tx1">
+                  <a:srgbClr val="CCFF66">
                     <a:lumMod val="40000"/>
                     <a:lumOff val="60000"/>
-                  </a:schemeClr>
+                  </a:srgbClr>
                 </a:solidFill>
                 <a:effectLst>
                   <a:outerShdw blurRad="38100" dist="38100" dir="2700000" algn="tl">
@@ -7111,17 +7037,17 @@
                     </a:srgbClr>
                   </a:outerShdw>
                 </a:effectLst>
-                <a:latin typeface="+mn-lt"/>
+                <a:latin typeface="Corbel"/>
               </a:rPr>
-              <a:t>doncho.minkov [at] </a:t>
-            </a:r>
-            <a:r>
-              <a:rPr lang="en-US" sz="3000" b="1" dirty="0">
+              <a:t>ventsy.popov </a:t>
+            </a:r>
+            <a:r>
+              <a:rPr lang="en-US" sz="3000" b="1" dirty="0" smtClean="0">
                 <a:solidFill>
-                  <a:schemeClr val="tx1">
+                  <a:srgbClr val="CCFF66">
                     <a:lumMod val="40000"/>
                     <a:lumOff val="60000"/>
-                  </a:schemeClr>
+                  </a:srgbClr>
                 </a:solidFill>
                 <a:effectLst>
                   <a:outerShdw blurRad="38100" dist="38100" dir="2700000" algn="tl">
@@ -7130,19 +7056,72 @@
                     </a:srgbClr>
                   </a:outerShdw>
                 </a:effectLst>
-                <a:latin typeface="+mn-lt"/>
+                <a:latin typeface="Corbel"/>
               </a:rPr>
-              <a:t>telerik.com</a:t>
+              <a:t>[at] gmail.com</a:t>
             </a:r>
           </a:p>
         </p:txBody>
       </p:sp>
+      <p:pic>
+        <p:nvPicPr>
+          <p:cNvPr id="4098" name="Picture 2" descr="C:\Telerik Academy\ASP.NET Cource\2010\lectures\lecturers-photos\venci.jpg"/>
+          <p:cNvPicPr>
+            <a:picLocks noChangeAspect="1" noChangeArrowheads="1"/>
+          </p:cNvPicPr>
+          <p:nvPr/>
+        </p:nvPicPr>
+        <p:blipFill rotWithShape="1">
+          <a:blip r:embed="rId3" cstate="screen">
+            <a:extLst>
+              <a:ext uri="{BEBA8EAE-BF5A-486C-A8C5-ECC9F3942E4B}">
+                <a14:imgProps xmlns:a14="http://schemas.microsoft.com/office/drawing/2010/main">
+                  <a14:imgLayer r:embed="rId4">
+                    <a14:imgEffect>
+                      <a14:brightnessContrast bright="20000" contrast="-20000"/>
+                    </a14:imgEffect>
+                  </a14:imgLayer>
+                </a14:imgProps>
+              </a:ext>
+              <a:ext uri="{28A0092B-C50C-407E-A947-70E740481C1C}">
+                <a14:useLocalDpi xmlns:a14="http://schemas.microsoft.com/office/drawing/2010/main"/>
+              </a:ext>
+            </a:extLst>
+          </a:blip>
+          <a:srcRect/>
+          <a:stretch/>
+        </p:blipFill>
+        <p:spPr bwMode="auto">
+          <a:xfrm>
+            <a:off x="6850677" y="1143000"/>
+            <a:ext cx="1607523" cy="2190749"/>
+          </a:xfrm>
+          <a:prstGeom prst="rect">
+            <a:avLst/>
+          </a:prstGeom>
+          <a:noFill/>
+          <a:ln w="3175">
+            <a:solidFill>
+              <a:schemeClr val="accent5">
+                <a:lumMod val="75000"/>
+              </a:schemeClr>
+            </a:solidFill>
+            <a:miter lim="800000"/>
+            <a:headEnd/>
+            <a:tailEnd/>
+          </a:ln>
+          <a:extLst>
+            <a:ext uri="{909E8E84-426E-40DD-AFC4-6F175D3DCCD1}">
+              <a14:hiddenFill xmlns:a14="http://schemas.microsoft.com/office/drawing/2010/main">
+                <a:solidFill>
+                  <a:srgbClr val="FFFFFF"/>
+                </a:solidFill>
+              </a14:hiddenFill>
+            </a:ext>
+          </a:extLst>
+        </p:spPr>
+      </p:pic>
     </p:spTree>
-    <p:extLst>
-      <p:ext uri="{BB962C8B-B14F-4D97-AF65-F5344CB8AC3E}">
-        <p14:creationId xmlns:p14="http://schemas.microsoft.com/office/powerpoint/2010/main" val="4028452447"/>
-      </p:ext>
-    </p:extLst>
   </p:cSld>
   <p:clrMapOvr>
     <a:masterClrMapping/>
@@ -7191,11 +7170,7 @@
           <a:p>
             <a:r>
               <a:rPr lang="en-US" dirty="0" smtClean="0"/>
-              <a:t>Trainers </a:t>
-            </a:r>
-            <a:r>
-              <a:rPr lang="en-US" dirty="0" smtClean="0"/>
-              <a:t>Team (5)</a:t>
+              <a:t>Trainers Team (4)</a:t>
             </a:r>
             <a:endParaRPr lang="en-US" dirty="0"/>
           </a:p>
@@ -7213,8 +7188,8 @@
         </p:nvSpPr>
         <p:spPr>
           <a:xfrm>
-            <a:off x="228600" y="1295400"/>
-            <a:ext cx="5181600" cy="1828800"/>
+            <a:off x="228600" y="1274802"/>
+            <a:ext cx="5486400" cy="2438400"/>
           </a:xfrm>
         </p:spPr>
         <p:txBody>
@@ -7227,10 +7202,9 @@
               </a:lnSpc>
             </a:pPr>
             <a:r>
-              <a:rPr lang="en-US" dirty="0"/>
-              <a:t>Momchil Mitev </a:t>
-            </a:r>
-            <a:endParaRPr lang="en-US" dirty="0" smtClean="0"/>
+              <a:rPr lang="en-US" dirty="0" smtClean="0"/>
+              <a:t>Doncho Minkov</a:t>
+            </a:r>
           </a:p>
           <a:p>
             <a:pPr lvl="1">
@@ -7240,27 +7214,45 @@
             </a:pPr>
             <a:r>
               <a:rPr lang="en-US" dirty="0" smtClean="0"/>
-              <a:t>Software </a:t>
+              <a:t>Junior </a:t>
             </a:r>
             <a:r>
               <a:rPr lang="en-US" dirty="0"/>
-              <a:t>Developer</a:t>
+              <a:t>Technical Trainer</a:t>
             </a:r>
             <a:r>
               <a:rPr lang="bg-BG" dirty="0"/>
               <a:t>, </a:t>
+            </a:r>
+            <a:r>
+              <a:rPr lang="en-US" dirty="0" smtClean="0"/>
+              <a:t>             </a:t>
+            </a:r>
+            <a:r>
+              <a:rPr lang="en-US" dirty="0" smtClean="0">
+                <a:hlinkClick r:id="rId2"/>
+              </a:rPr>
+              <a:t>Telerik </a:t>
             </a:r>
             <a:r>
               <a:rPr lang="en-US" dirty="0">
                 <a:hlinkClick r:id="rId2"/>
               </a:rPr>
-              <a:t>Telerik </a:t>
-            </a:r>
-            <a:r>
-              <a:rPr lang="en-US" dirty="0" smtClean="0">
-                <a:hlinkClick r:id="rId2"/>
+              <a:t>Corporation</a:t>
+            </a:r>
+            <a:r>
+              <a:rPr lang="bg-BG" dirty="0"/>
+              <a:t>, </a:t>
+            </a:r>
+            <a:r>
+              <a:rPr lang="en-US" dirty="0" smtClean="0"/>
+              <a:t>               </a:t>
+            </a:r>
+            <a:r>
+              <a:rPr lang="bg-BG" dirty="0" smtClean="0">
+                <a:hlinkClick r:id="rId3"/>
               </a:rPr>
-              <a:t>Corporation</a:t>
+              <a:t>Telerik Academy</a:t>
             </a:r>
             <a:endParaRPr lang="en-US" dirty="0"/>
           </a:p>
@@ -7303,7 +7295,273 @@
         </p:nvSpPr>
         <p:spPr>
           <a:xfrm>
-            <a:off x="228600" y="3027402"/>
+            <a:off x="609600" y="3408402"/>
+            <a:ext cx="7086600" cy="553998"/>
+          </a:xfrm>
+          <a:prstGeom prst="rect">
+            <a:avLst/>
+          </a:prstGeom>
+        </p:spPr>
+        <p:txBody>
+          <a:bodyPr wrap="square">
+            <a:spAutoFit/>
+          </a:bodyPr>
+          <a:lstStyle/>
+          <a:p>
+            <a:pPr marL="173038" indent="-273050">
+              <a:spcBef>
+                <a:spcPts val="600"/>
+              </a:spcBef>
+              <a:spcAft>
+                <a:spcPts val="600"/>
+              </a:spcAft>
+              <a:buClr>
+                <a:srgbClr val="8FD600"/>
+              </a:buClr>
+              <a:buFont typeface="Wingdings 2" pitchFamily="18" charset="2"/>
+              <a:buChar char=""/>
+            </a:pPr>
+            <a:r>
+              <a:rPr lang="en-US" sz="3000" b="1" dirty="0">
+                <a:solidFill>
+                  <a:schemeClr val="tx1">
+                    <a:lumMod val="40000"/>
+                    <a:lumOff val="60000"/>
+                  </a:schemeClr>
+                </a:solidFill>
+                <a:effectLst>
+                  <a:outerShdw blurRad="38100" dist="38100" dir="2700000" algn="tl">
+                    <a:srgbClr val="000000">
+                      <a:alpha val="43137"/>
+                    </a:srgbClr>
+                  </a:outerShdw>
+                </a:effectLst>
+                <a:latin typeface="+mn-lt"/>
+              </a:rPr>
+              <a:t>Email: doncho.minkov [at] telerik.com</a:t>
+            </a:r>
+          </a:p>
+        </p:txBody>
+      </p:sp>
+      <p:pic>
+        <p:nvPicPr>
+          <p:cNvPr id="1026" name="Picture 2" descr="C:\NAKOV\Web-Application-Development-with-DotNet-Framework-and-ASP.NET\2010\lectures\lecturers-photos\Doncho.jpg"/>
+          <p:cNvPicPr>
+            <a:picLocks noChangeAspect="1" noChangeArrowheads="1"/>
+          </p:cNvPicPr>
+          <p:nvPr/>
+        </p:nvPicPr>
+        <p:blipFill rotWithShape="1">
+          <a:blip r:embed="rId4" cstate="screen">
+            <a:extLst>
+              <a:ext uri="{BEBA8EAE-BF5A-486C-A8C5-ECC9F3942E4B}">
+                <a14:imgProps xmlns:a14="http://schemas.microsoft.com/office/drawing/2010/main">
+                  <a14:imgLayer r:embed="rId5">
+                    <a14:imgEffect>
+                      <a14:brightnessContrast bright="20000" contrast="-20000"/>
+                    </a14:imgEffect>
+                  </a14:imgLayer>
+                </a14:imgProps>
+              </a:ext>
+              <a:ext uri="{28A0092B-C50C-407E-A947-70E740481C1C}">
+                <a14:useLocalDpi xmlns:a14="http://schemas.microsoft.com/office/drawing/2010/main"/>
+              </a:ext>
+            </a:extLst>
+          </a:blip>
+          <a:srcRect/>
+          <a:stretch/>
+        </p:blipFill>
+        <p:spPr bwMode="auto">
+          <a:xfrm>
+            <a:off x="6858000" y="1136650"/>
+            <a:ext cx="1651000" cy="2063750"/>
+          </a:xfrm>
+          <a:prstGeom prst="rect">
+            <a:avLst/>
+          </a:prstGeom>
+          <a:noFill/>
+          <a:ln>
+            <a:solidFill>
+              <a:schemeClr val="accent5">
+                <a:lumMod val="20000"/>
+                <a:lumOff val="80000"/>
+              </a:schemeClr>
+            </a:solidFill>
+          </a:ln>
+          <a:extLst>
+            <a:ext uri="{909E8E84-426E-40DD-AFC4-6F175D3DCCD1}">
+              <a14:hiddenFill xmlns:a14="http://schemas.microsoft.com/office/drawing/2010/main">
+                <a:solidFill>
+                  <a:srgbClr val="FFFFFF"/>
+                </a:solidFill>
+              </a14:hiddenFill>
+            </a:ext>
+          </a:extLst>
+        </p:spPr>
+      </p:pic>
+    </p:spTree>
+    <p:extLst>
+      <p:ext uri="{BB962C8B-B14F-4D97-AF65-F5344CB8AC3E}">
+        <p14:creationId xmlns:p14="http://schemas.microsoft.com/office/powerpoint/2010/main" val="4028452447"/>
+      </p:ext>
+    </p:extLst>
+  </p:cSld>
+  <p:clrMapOvr>
+    <a:masterClrMapping/>
+  </p:clrMapOvr>
+  <p:timing>
+    <p:tnLst>
+      <p:par>
+        <p:cTn id="1" dur="indefinite" restart="never" nodeType="tmRoot"/>
+      </p:par>
+    </p:tnLst>
+  </p:timing>
+</p:sld>
+</file>
+
+<file path=ppt/slides/slide16.xml><?xml version="1.0" encoding="utf-8"?>
+<p:sld xmlns:a="http://schemas.openxmlformats.org/drawingml/2006/main" xmlns:r="http://schemas.openxmlformats.org/officeDocument/2006/relationships" xmlns:p="http://schemas.openxmlformats.org/presentationml/2006/main">
+  <p:cSld>
+    <p:spTree>
+      <p:nvGrpSpPr>
+        <p:cNvPr id="1" name=""/>
+        <p:cNvGrpSpPr/>
+        <p:nvPr/>
+      </p:nvGrpSpPr>
+      <p:grpSpPr>
+        <a:xfrm>
+          <a:off x="0" y="0"/>
+          <a:ext cx="0" cy="0"/>
+          <a:chOff x="0" y="0"/>
+          <a:chExt cx="0" cy="0"/>
+        </a:xfrm>
+      </p:grpSpPr>
+      <p:sp>
+        <p:nvSpPr>
+          <p:cNvPr id="4" name="Title 3"/>
+          <p:cNvSpPr>
+            <a:spLocks noGrp="1"/>
+          </p:cNvSpPr>
+          <p:nvPr>
+            <p:ph type="title"/>
+          </p:nvPr>
+        </p:nvSpPr>
+        <p:spPr/>
+        <p:txBody>
+          <a:bodyPr/>
+          <a:lstStyle/>
+          <a:p>
+            <a:r>
+              <a:rPr lang="en-US" dirty="0" smtClean="0"/>
+              <a:t>Trainers Team (5)</a:t>
+            </a:r>
+            <a:endParaRPr lang="en-US" dirty="0"/>
+          </a:p>
+        </p:txBody>
+      </p:sp>
+      <p:sp>
+        <p:nvSpPr>
+          <p:cNvPr id="5" name="Content Placeholder 4"/>
+          <p:cNvSpPr>
+            <a:spLocks noGrp="1"/>
+          </p:cNvSpPr>
+          <p:nvPr>
+            <p:ph idx="1"/>
+          </p:nvPr>
+        </p:nvSpPr>
+        <p:spPr>
+          <a:xfrm>
+            <a:off x="228600" y="1447800"/>
+            <a:ext cx="5181600" cy="1828800"/>
+          </a:xfrm>
+        </p:spPr>
+        <p:txBody>
+          <a:bodyPr/>
+          <a:lstStyle/>
+          <a:p>
+            <a:pPr>
+              <a:lnSpc>
+                <a:spcPct val="100000"/>
+              </a:lnSpc>
+            </a:pPr>
+            <a:r>
+              <a:rPr lang="en-US" dirty="0"/>
+              <a:t>Momchil Mitev </a:t>
+            </a:r>
+            <a:endParaRPr lang="en-US" dirty="0" smtClean="0"/>
+          </a:p>
+          <a:p>
+            <a:pPr lvl="1">
+              <a:lnSpc>
+                <a:spcPct val="100000"/>
+              </a:lnSpc>
+            </a:pPr>
+            <a:r>
+              <a:rPr lang="en-US" dirty="0" smtClean="0"/>
+              <a:t>Software </a:t>
+            </a:r>
+            <a:r>
+              <a:rPr lang="en-US" dirty="0"/>
+              <a:t>Developer</a:t>
+            </a:r>
+            <a:r>
+              <a:rPr lang="bg-BG" dirty="0"/>
+              <a:t>, </a:t>
+            </a:r>
+            <a:r>
+              <a:rPr lang="en-US" dirty="0">
+                <a:hlinkClick r:id="rId2"/>
+              </a:rPr>
+              <a:t>Telerik </a:t>
+            </a:r>
+            <a:r>
+              <a:rPr lang="en-US" dirty="0" smtClean="0">
+                <a:hlinkClick r:id="rId2"/>
+              </a:rPr>
+              <a:t>Corporation</a:t>
+            </a:r>
+            <a:endParaRPr lang="en-US" dirty="0"/>
+          </a:p>
+        </p:txBody>
+      </p:sp>
+      <p:sp>
+        <p:nvSpPr>
+          <p:cNvPr id="7" name="Slide Number Placeholder 3"/>
+          <p:cNvSpPr>
+            <a:spLocks noGrp="1"/>
+          </p:cNvSpPr>
+          <p:nvPr>
+            <p:ph type="sldNum" sz="quarter" idx="10"/>
+          </p:nvPr>
+        </p:nvSpPr>
+        <p:spPr/>
+        <p:txBody>
+          <a:bodyPr/>
+          <a:lstStyle/>
+          <a:p>
+            <a:pPr>
+              <a:defRPr/>
+            </a:pPr>
+            <a:fld id="{58452FF4-89E3-4D1B-9927-2DBDC00E58D7}" type="slidenum">
+              <a:rPr lang="en-US" smtClean="0"/>
+              <a:pPr>
+                <a:defRPr/>
+              </a:pPr>
+              <a:t>16</a:t>
+            </a:fld>
+            <a:endParaRPr lang="en-US" dirty="0"/>
+          </a:p>
+        </p:txBody>
+      </p:sp>
+      <p:sp>
+        <p:nvSpPr>
+          <p:cNvPr id="8" name="Rectangle 7"/>
+          <p:cNvSpPr/>
+          <p:nvPr/>
+        </p:nvSpPr>
+        <p:spPr>
+          <a:xfrm>
+            <a:off x="228600" y="3179802"/>
             <a:ext cx="8610600" cy="553998"/>
           </a:xfrm>
           <a:prstGeom prst="rect">
@@ -7378,8 +7636,16 @@
         </p:nvPicPr>
         <p:blipFill rotWithShape="1">
           <a:blip r:embed="rId3" cstate="screen">
-            <a:lum/>
             <a:extLst>
+              <a:ext uri="{BEBA8EAE-BF5A-486C-A8C5-ECC9F3942E4B}">
+                <a14:imgProps xmlns:a14="http://schemas.microsoft.com/office/drawing/2010/main">
+                  <a14:imgLayer r:embed="rId4">
+                    <a14:imgEffect>
+                      <a14:brightnessContrast bright="40000" contrast="-20000"/>
+                    </a14:imgEffect>
+                  </a14:imgLayer>
+                </a14:imgProps>
+              </a:ext>
               <a:ext uri="{28A0092B-C50C-407E-A947-70E740481C1C}">
                 <a14:useLocalDpi xmlns:a14="http://schemas.microsoft.com/office/drawing/2010/main"/>
               </a:ext>
@@ -7390,7 +7656,7 @@
         </p:blipFill>
         <p:spPr bwMode="auto">
           <a:xfrm>
-            <a:off x="6534149" y="1143000"/>
+            <a:off x="7067549" y="1143000"/>
             <a:ext cx="1390651" cy="1790700"/>
           </a:xfrm>
           <a:prstGeom prst="rect">
@@ -7438,311 +7704,6 @@
 </p:sld>
 </file>
 
-<file path=ppt/slides/slide16.xml><?xml version="1.0" encoding="utf-8"?>
-<p:sld xmlns:a="http://schemas.openxmlformats.org/drawingml/2006/main" xmlns:r="http://schemas.openxmlformats.org/officeDocument/2006/relationships" xmlns:p="http://schemas.openxmlformats.org/presentationml/2006/main">
-  <p:cSld>
-    <p:spTree>
-      <p:nvGrpSpPr>
-        <p:cNvPr id="1" name=""/>
-        <p:cNvGrpSpPr/>
-        <p:nvPr/>
-      </p:nvGrpSpPr>
-      <p:grpSpPr>
-        <a:xfrm>
-          <a:off x="0" y="0"/>
-          <a:ext cx="0" cy="0"/>
-          <a:chOff x="0" y="0"/>
-          <a:chExt cx="0" cy="0"/>
-        </a:xfrm>
-      </p:grpSpPr>
-      <p:sp>
-        <p:nvSpPr>
-          <p:cNvPr id="4" name="Title 3"/>
-          <p:cNvSpPr>
-            <a:spLocks noGrp="1"/>
-          </p:cNvSpPr>
-          <p:nvPr>
-            <p:ph type="title"/>
-          </p:nvPr>
-        </p:nvSpPr>
-        <p:spPr/>
-        <p:txBody>
-          <a:bodyPr/>
-          <a:lstStyle/>
-          <a:p>
-            <a:r>
-              <a:rPr lang="en-US" dirty="0" smtClean="0"/>
-              <a:t>Trainers Team </a:t>
-            </a:r>
-            <a:r>
-              <a:rPr lang="en-US" dirty="0" smtClean="0"/>
-              <a:t>(6)</a:t>
-            </a:r>
-            <a:endParaRPr lang="en-US" dirty="0"/>
-          </a:p>
-        </p:txBody>
-      </p:sp>
-      <p:sp>
-        <p:nvSpPr>
-          <p:cNvPr id="5" name="Content Placeholder 4"/>
-          <p:cNvSpPr>
-            <a:spLocks noGrp="1"/>
-          </p:cNvSpPr>
-          <p:nvPr>
-            <p:ph idx="1"/>
-          </p:nvPr>
-        </p:nvSpPr>
-        <p:spPr>
-          <a:xfrm>
-            <a:off x="228600" y="1252498"/>
-            <a:ext cx="5562600" cy="2438400"/>
-          </a:xfrm>
-        </p:spPr>
-        <p:txBody>
-          <a:bodyPr/>
-          <a:lstStyle/>
-          <a:p>
-            <a:pPr>
-              <a:lnSpc>
-                <a:spcPct val="100000"/>
-              </a:lnSpc>
-            </a:pPr>
-            <a:r>
-              <a:rPr lang="en-US" dirty="0"/>
-              <a:t>Veronica </a:t>
-            </a:r>
-            <a:r>
-              <a:rPr lang="en-US" dirty="0" smtClean="0"/>
-              <a:t>Milcheva </a:t>
-            </a:r>
-            <a:endParaRPr lang="en-US" dirty="0" smtClean="0"/>
-          </a:p>
-          <a:p>
-            <a:pPr lvl="1">
-              <a:lnSpc>
-                <a:spcPct val="100000"/>
-              </a:lnSpc>
-            </a:pPr>
-            <a:r>
-              <a:rPr lang="en-US" dirty="0"/>
-              <a:t>Junior Software Developer</a:t>
-            </a:r>
-            <a:r>
-              <a:rPr lang="bg-BG" dirty="0"/>
-              <a:t>, </a:t>
-            </a:r>
-            <a:r>
-              <a:rPr lang="en-US" dirty="0">
-                <a:hlinkClick r:id="rId2"/>
-              </a:rPr>
-              <a:t>Telerik</a:t>
-            </a:r>
-            <a:r>
-              <a:rPr lang="en-US" u="sng" dirty="0">
-                <a:hlinkClick r:id="rId2"/>
-              </a:rPr>
-              <a:t> </a:t>
-            </a:r>
-            <a:r>
-              <a:rPr lang="en-US" dirty="0" smtClean="0">
-                <a:hlinkClick r:id="rId2"/>
-              </a:rPr>
-              <a:t>Corporation</a:t>
-            </a:r>
-            <a:endParaRPr lang="en-US" dirty="0"/>
-          </a:p>
-        </p:txBody>
-      </p:sp>
-      <p:sp>
-        <p:nvSpPr>
-          <p:cNvPr id="7" name="Slide Number Placeholder 3"/>
-          <p:cNvSpPr>
-            <a:spLocks noGrp="1"/>
-          </p:cNvSpPr>
-          <p:nvPr>
-            <p:ph type="sldNum" sz="quarter" idx="10"/>
-          </p:nvPr>
-        </p:nvSpPr>
-        <p:spPr/>
-        <p:txBody>
-          <a:bodyPr/>
-          <a:lstStyle/>
-          <a:p>
-            <a:pPr>
-              <a:defRPr/>
-            </a:pPr>
-            <a:fld id="{58452FF4-89E3-4D1B-9927-2DBDC00E58D7}" type="slidenum">
-              <a:rPr lang="en-US" smtClean="0"/>
-              <a:pPr>
-                <a:defRPr/>
-              </a:pPr>
-              <a:t>16</a:t>
-            </a:fld>
-            <a:endParaRPr lang="en-US" dirty="0"/>
-          </a:p>
-        </p:txBody>
-      </p:sp>
-      <p:sp>
-        <p:nvSpPr>
-          <p:cNvPr id="8" name="Rectangle 7"/>
-          <p:cNvSpPr/>
-          <p:nvPr/>
-        </p:nvSpPr>
-        <p:spPr>
-          <a:xfrm>
-            <a:off x="228600" y="3124200"/>
-            <a:ext cx="8610600" cy="553998"/>
-          </a:xfrm>
-          <a:prstGeom prst="rect">
-            <a:avLst/>
-          </a:prstGeom>
-        </p:spPr>
-        <p:txBody>
-          <a:bodyPr wrap="square">
-            <a:spAutoFit/>
-          </a:bodyPr>
-          <a:lstStyle/>
-          <a:p>
-            <a:pPr marL="630238" lvl="1" indent="-273050">
-              <a:spcBef>
-                <a:spcPts val="600"/>
-              </a:spcBef>
-              <a:spcAft>
-                <a:spcPts val="600"/>
-              </a:spcAft>
-              <a:buClr>
-                <a:srgbClr val="8FD600"/>
-              </a:buClr>
-              <a:buFont typeface="Wingdings 2" pitchFamily="18" charset="2"/>
-              <a:buChar char=""/>
-            </a:pPr>
-            <a:r>
-              <a:rPr lang="en-US" sz="3000" b="1" dirty="0">
-                <a:effectLst>
-                  <a:outerShdw blurRad="38100" dist="38100" dir="2700000" algn="tl">
-                    <a:srgbClr val="000000">
-                      <a:alpha val="43137"/>
-                    </a:srgbClr>
-                  </a:outerShdw>
-                </a:effectLst>
-              </a:rPr>
-              <a:t>Email: </a:t>
-            </a:r>
-            <a:r>
-              <a:rPr lang="en-US" sz="3000" b="1" dirty="0" smtClean="0">
-                <a:effectLst>
-                  <a:outerShdw blurRad="38100" dist="38100" dir="2700000" algn="tl">
-                    <a:srgbClr val="000000">
-                      <a:alpha val="43137"/>
-                    </a:srgbClr>
-                  </a:outerShdw>
-                </a:effectLst>
-              </a:rPr>
-              <a:t>veronica.milcheva [at] </a:t>
-            </a:r>
-            <a:r>
-              <a:rPr lang="en-US" sz="3000" b="1" dirty="0">
-                <a:effectLst>
-                  <a:outerShdw blurRad="38100" dist="38100" dir="2700000" algn="tl">
-                    <a:srgbClr val="000000">
-                      <a:alpha val="43137"/>
-                    </a:srgbClr>
-                  </a:outerShdw>
-                </a:effectLst>
-              </a:rPr>
-              <a:t>telerik.com</a:t>
-            </a:r>
-            <a:endParaRPr lang="en-US" sz="3000" b="1" dirty="0" smtClean="0">
-              <a:solidFill>
-                <a:srgbClr val="CCFF66">
-                  <a:lumMod val="40000"/>
-                  <a:lumOff val="60000"/>
-                </a:srgbClr>
-              </a:solidFill>
-              <a:effectLst>
-                <a:outerShdw blurRad="38100" dist="38100" dir="2700000" algn="tl">
-                  <a:srgbClr val="000000">
-                    <a:alpha val="43137"/>
-                  </a:srgbClr>
-                </a:outerShdw>
-              </a:effectLst>
-              <a:latin typeface="Corbel"/>
-            </a:endParaRPr>
-          </a:p>
-        </p:txBody>
-      </p:sp>
-      <p:pic>
-        <p:nvPicPr>
-          <p:cNvPr id="3074" name="Picture 2" descr="C:\Telerik Academy\ASP.NET Cource\2010\lectures\lecturers-photos\veronica.jpg"/>
-          <p:cNvPicPr>
-            <a:picLocks noChangeAspect="1" noChangeArrowheads="1"/>
-          </p:cNvPicPr>
-          <p:nvPr/>
-        </p:nvPicPr>
-        <p:blipFill>
-          <a:blip r:embed="rId3">
-            <a:lum/>
-            <a:extLst>
-              <a:ext uri="{28A0092B-C50C-407E-A947-70E740481C1C}">
-                <a14:useLocalDpi xmlns:a14="http://schemas.microsoft.com/office/drawing/2010/main"/>
-              </a:ext>
-            </a:extLst>
-          </a:blip>
-          <a:srcRect/>
-          <a:stretch>
-            <a:fillRect/>
-          </a:stretch>
-        </p:blipFill>
-        <p:spPr bwMode="auto">
-          <a:xfrm>
-            <a:off x="6400800" y="914400"/>
-            <a:ext cx="1809750" cy="2120900"/>
-          </a:xfrm>
-          <a:prstGeom prst="rect">
-            <a:avLst/>
-          </a:prstGeom>
-          <a:noFill/>
-          <a:ln w="3175">
-            <a:solidFill>
-              <a:schemeClr val="accent5">
-                <a:lumMod val="75000"/>
-              </a:schemeClr>
-            </a:solidFill>
-            <a:miter lim="800000"/>
-            <a:headEnd/>
-            <a:tailEnd/>
-          </a:ln>
-          <a:extLst>
-            <a:ext uri="{909E8E84-426E-40DD-AFC4-6F175D3DCCD1}">
-              <a14:hiddenFill xmlns:a14="http://schemas.microsoft.com/office/drawing/2010/main">
-                <a:solidFill>
-                  <a:srgbClr val="FFFFFF"/>
-                </a:solidFill>
-              </a14:hiddenFill>
-            </a:ext>
-          </a:extLst>
-        </p:spPr>
-      </p:pic>
-    </p:spTree>
-    <p:extLst>
-      <p:ext uri="{BB962C8B-B14F-4D97-AF65-F5344CB8AC3E}">
-        <p14:creationId xmlns:p14="http://schemas.microsoft.com/office/powerpoint/2010/main" val="4028452447"/>
-      </p:ext>
-    </p:extLst>
-  </p:cSld>
-  <p:clrMapOvr>
-    <a:masterClrMapping/>
-  </p:clrMapOvr>
-  <p:timing>
-    <p:tnLst>
-      <p:par>
-        <p:cTn id="1" dur="indefinite" restart="never" nodeType="tmRoot"/>
-      </p:par>
-    </p:tnLst>
-  </p:timing>
-</p:sld>
-</file>
-
 <file path=ppt/slides/slide17.xml><?xml version="1.0" encoding="utf-8"?>
 <p:sld xmlns:a="http://schemas.openxmlformats.org/drawingml/2006/main" xmlns:r="http://schemas.openxmlformats.org/officeDocument/2006/relationships" xmlns:p="http://schemas.openxmlformats.org/presentationml/2006/main">
   <p:cSld>
@@ -7777,11 +7738,7 @@
           <a:p>
             <a:r>
               <a:rPr lang="en-US" dirty="0" smtClean="0"/>
-              <a:t>Trainers </a:t>
-            </a:r>
-            <a:r>
-              <a:rPr lang="en-US" dirty="0" smtClean="0"/>
-              <a:t>Team (7)</a:t>
+              <a:t>Trainers Team (6)</a:t>
             </a:r>
             <a:endParaRPr lang="en-US" dirty="0"/>
           </a:p>
@@ -7799,8 +7756,8 @@
         </p:nvSpPr>
         <p:spPr>
           <a:xfrm>
-            <a:off x="228600" y="1492581"/>
-            <a:ext cx="5486400" cy="2286000"/>
+            <a:off x="228600" y="1447800"/>
+            <a:ext cx="5562600" cy="2438400"/>
           </a:xfrm>
         </p:spPr>
         <p:txBody>
@@ -7814,13 +7771,12 @@
             </a:pPr>
             <a:r>
               <a:rPr lang="en-US" dirty="0"/>
-              <a:t>Alexander Vakrilov</a:t>
-            </a:r>
-            <a:r>
-              <a:rPr lang="bg-BG" dirty="0"/>
-              <a:t> </a:t>
-            </a:r>
-            <a:endParaRPr lang="en-US" dirty="0" smtClean="0"/>
+              <a:t>Veronica </a:t>
+            </a:r>
+            <a:r>
+              <a:rPr lang="en-US" dirty="0" smtClean="0"/>
+              <a:t>Milcheva </a:t>
+            </a:r>
           </a:p>
           <a:p>
             <a:pPr lvl="1">
@@ -7829,25 +7785,27 @@
               </a:lnSpc>
             </a:pPr>
             <a:r>
-              <a:rPr lang="en-US" dirty="0" smtClean="0"/>
-              <a:t>Junior </a:t>
-            </a:r>
-            <a:r>
               <a:rPr lang="en-US" dirty="0"/>
-              <a:t>Software Engineer</a:t>
+              <a:t>Junior Software Developer</a:t>
             </a:r>
             <a:r>
               <a:rPr lang="bg-BG" dirty="0"/>
               <a:t>, </a:t>
+            </a:r>
+            <a:r>
+              <a:rPr lang="en-US" dirty="0">
+                <a:hlinkClick r:id="rId2"/>
+              </a:rPr>
+              <a:t>Telerik</a:t>
             </a:r>
             <a:r>
               <a:rPr lang="en-US" u="sng" dirty="0">
                 <a:hlinkClick r:id="rId2"/>
               </a:rPr>
-              <a:t>Telerik </a:t>
-            </a:r>
-            <a:r>
-              <a:rPr lang="en-US" u="sng" dirty="0" smtClean="0">
+              <a:t> </a:t>
+            </a:r>
+            <a:r>
+              <a:rPr lang="en-US" dirty="0" smtClean="0">
                 <a:hlinkClick r:id="rId2"/>
               </a:rPr>
               <a:t>Corporation</a:t>
@@ -7893,7 +7851,7 @@
         </p:nvSpPr>
         <p:spPr>
           <a:xfrm>
-            <a:off x="228600" y="3224583"/>
+            <a:off x="228600" y="3319502"/>
             <a:ext cx="8610600" cy="553998"/>
           </a:xfrm>
           <a:prstGeom prst="rect">
@@ -7920,6 +7878,18 @@
               <a:buChar char=""/>
             </a:pPr>
             <a:r>
+              <a:rPr lang="en-US" sz="3000" b="1" dirty="0">
+                <a:effectLst>
+                  <a:outerShdw blurRad="38100" dist="38100" dir="2700000" algn="tl">
+                    <a:srgbClr val="000000">
+                      <a:alpha val="43137"/>
+                    </a:srgbClr>
+                  </a:outerShdw>
+                </a:effectLst>
+              </a:rPr>
+              <a:t>Email: </a:t>
+            </a:r>
+            <a:r>
               <a:rPr lang="en-US" sz="3000" b="1" dirty="0" smtClean="0">
                 <a:effectLst>
                   <a:outerShdw blurRad="38100" dist="38100" dir="2700000" algn="tl">
@@ -7929,7 +7899,7 @@
                   </a:outerShdw>
                 </a:effectLst>
               </a:rPr>
-              <a:t>Email</a:t>
+              <a:t>veronica.milcheva [at] </a:t>
             </a:r>
             <a:r>
               <a:rPr lang="en-US" sz="3000" b="1" dirty="0">
@@ -7941,21 +7911,9 @@
                   </a:outerShdw>
                 </a:effectLst>
               </a:rPr>
-              <a:t>: </a:t>
-            </a:r>
-            <a:r>
-              <a:rPr lang="en-US" sz="3000" b="1" dirty="0" smtClean="0">
-                <a:effectLst>
-                  <a:outerShdw blurRad="38100" dist="38100" dir="2700000" algn="tl">
-                    <a:srgbClr val="000000">
-                      <a:alpha val="43137"/>
-                    </a:srgbClr>
-                  </a:outerShdw>
-                </a:effectLst>
-              </a:rPr>
-              <a:t>alexander.vakrilov [at] telerik.com</a:t>
-            </a:r>
-            <a:endParaRPr lang="en-US" sz="3000" b="1" dirty="0">
+              <a:t>telerik.com</a:t>
+            </a:r>
+            <a:endParaRPr lang="en-US" sz="3000" b="1" dirty="0" smtClean="0">
               <a:solidFill>
                 <a:srgbClr val="CCFF66">
                   <a:lumMod val="40000"/>
@@ -7976,7 +7934,7 @@
       </p:sp>
       <p:pic>
         <p:nvPicPr>
-          <p:cNvPr id="5122" name="Picture 2" descr="C:\Telerik Academy\ASP.NET Cource\2010\lectures\lecturers-photos\Alexander Vakrilov.png"/>
+          <p:cNvPr id="3074" name="Picture 2" descr="C:\Telerik Academy\ASP.NET Cource\2010\lectures\lecturers-photos\veronica.jpg"/>
           <p:cNvPicPr>
             <a:picLocks noChangeAspect="1" noChangeArrowheads="1"/>
           </p:cNvPicPr>
@@ -7998,8 +7956,8 @@
         </p:blipFill>
         <p:spPr bwMode="auto">
           <a:xfrm>
-            <a:off x="6400800" y="914400"/>
-            <a:ext cx="1714500" cy="2286000"/>
+            <a:off x="6705942" y="1143000"/>
+            <a:ext cx="1625524" cy="1905000"/>
           </a:xfrm>
           <a:prstGeom prst="rect">
             <a:avLst/>
@@ -8029,7 +7987,7 @@
     </p:spTree>
     <p:extLst>
       <p:ext uri="{BB962C8B-B14F-4D97-AF65-F5344CB8AC3E}">
-        <p14:creationId xmlns:p14="http://schemas.microsoft.com/office/powerpoint/2010/main" val="3089033343"/>
+        <p14:creationId xmlns:p14="http://schemas.microsoft.com/office/powerpoint/2010/main" val="4028452447"/>
       </p:ext>
     </p:extLst>
   </p:cSld>
@@ -8080,11 +8038,305 @@
           <a:p>
             <a:r>
               <a:rPr lang="en-US" dirty="0" smtClean="0"/>
-              <a:t>Trainers Team </a:t>
-            </a:r>
+              <a:t>Trainers Team (7)</a:t>
+            </a:r>
+            <a:endParaRPr lang="en-US" dirty="0"/>
+          </a:p>
+        </p:txBody>
+      </p:sp>
+      <p:sp>
+        <p:nvSpPr>
+          <p:cNvPr id="5" name="Content Placeholder 4"/>
+          <p:cNvSpPr>
+            <a:spLocks noGrp="1"/>
+          </p:cNvSpPr>
+          <p:nvPr>
+            <p:ph idx="1"/>
+          </p:nvPr>
+        </p:nvSpPr>
+        <p:spPr>
+          <a:xfrm>
+            <a:off x="228600" y="1555419"/>
+            <a:ext cx="5486400" cy="2286000"/>
+          </a:xfrm>
+        </p:spPr>
+        <p:txBody>
+          <a:bodyPr/>
+          <a:lstStyle/>
+          <a:p>
+            <a:pPr>
+              <a:lnSpc>
+                <a:spcPct val="100000"/>
+              </a:lnSpc>
+            </a:pPr>
+            <a:r>
+              <a:rPr lang="en-US" dirty="0"/>
+              <a:t>Alexander Vakrilov</a:t>
+            </a:r>
+            <a:r>
+              <a:rPr lang="bg-BG" dirty="0"/>
+              <a:t> </a:t>
+            </a:r>
+            <a:endParaRPr lang="en-US" dirty="0" smtClean="0"/>
+          </a:p>
+          <a:p>
+            <a:pPr lvl="1">
+              <a:lnSpc>
+                <a:spcPct val="100000"/>
+              </a:lnSpc>
+            </a:pPr>
             <a:r>
               <a:rPr lang="en-US" dirty="0" smtClean="0"/>
-              <a:t>(8)</a:t>
+              <a:t>Junior </a:t>
+            </a:r>
+            <a:r>
+              <a:rPr lang="en-US" dirty="0"/>
+              <a:t>Software Engineer</a:t>
+            </a:r>
+            <a:r>
+              <a:rPr lang="bg-BG" dirty="0"/>
+              <a:t>, </a:t>
+            </a:r>
+            <a:r>
+              <a:rPr lang="en-US" u="sng" dirty="0">
+                <a:hlinkClick r:id="rId2"/>
+              </a:rPr>
+              <a:t>Telerik </a:t>
+            </a:r>
+            <a:r>
+              <a:rPr lang="en-US" u="sng" dirty="0" smtClean="0">
+                <a:hlinkClick r:id="rId2"/>
+              </a:rPr>
+              <a:t>Corporation</a:t>
+            </a:r>
+            <a:endParaRPr lang="en-US" dirty="0"/>
+          </a:p>
+        </p:txBody>
+      </p:sp>
+      <p:sp>
+        <p:nvSpPr>
+          <p:cNvPr id="7" name="Slide Number Placeholder 3"/>
+          <p:cNvSpPr>
+            <a:spLocks noGrp="1"/>
+          </p:cNvSpPr>
+          <p:nvPr>
+            <p:ph type="sldNum" sz="quarter" idx="10"/>
+          </p:nvPr>
+        </p:nvSpPr>
+        <p:spPr/>
+        <p:txBody>
+          <a:bodyPr/>
+          <a:lstStyle/>
+          <a:p>
+            <a:pPr>
+              <a:defRPr/>
+            </a:pPr>
+            <a:fld id="{58452FF4-89E3-4D1B-9927-2DBDC00E58D7}" type="slidenum">
+              <a:rPr lang="en-US" smtClean="0"/>
+              <a:pPr>
+                <a:defRPr/>
+              </a:pPr>
+              <a:t>18</a:t>
+            </a:fld>
+            <a:endParaRPr lang="en-US" dirty="0"/>
+          </a:p>
+        </p:txBody>
+      </p:sp>
+      <p:sp>
+        <p:nvSpPr>
+          <p:cNvPr id="8" name="Rectangle 7"/>
+          <p:cNvSpPr/>
+          <p:nvPr/>
+        </p:nvSpPr>
+        <p:spPr>
+          <a:xfrm>
+            <a:off x="228600" y="3332202"/>
+            <a:ext cx="8610600" cy="553998"/>
+          </a:xfrm>
+          <a:prstGeom prst="rect">
+            <a:avLst/>
+          </a:prstGeom>
+        </p:spPr>
+        <p:txBody>
+          <a:bodyPr wrap="square">
+            <a:spAutoFit/>
+          </a:bodyPr>
+          <a:lstStyle/>
+          <a:p>
+            <a:pPr marL="630238" lvl="1" indent="-273050">
+              <a:spcBef>
+                <a:spcPts val="600"/>
+              </a:spcBef>
+              <a:spcAft>
+                <a:spcPts val="600"/>
+              </a:spcAft>
+              <a:buClr>
+                <a:srgbClr val="8FD600"/>
+              </a:buClr>
+              <a:buFont typeface="Wingdings 2" pitchFamily="18" charset="2"/>
+              <a:buChar char=""/>
+            </a:pPr>
+            <a:r>
+              <a:rPr lang="en-US" sz="3000" b="1" dirty="0" smtClean="0">
+                <a:effectLst>
+                  <a:outerShdw blurRad="38100" dist="38100" dir="2700000" algn="tl">
+                    <a:srgbClr val="000000">
+                      <a:alpha val="43137"/>
+                    </a:srgbClr>
+                  </a:outerShdw>
+                </a:effectLst>
+              </a:rPr>
+              <a:t>Email</a:t>
+            </a:r>
+            <a:r>
+              <a:rPr lang="en-US" sz="3000" b="1" dirty="0">
+                <a:effectLst>
+                  <a:outerShdw blurRad="38100" dist="38100" dir="2700000" algn="tl">
+                    <a:srgbClr val="000000">
+                      <a:alpha val="43137"/>
+                    </a:srgbClr>
+                  </a:outerShdw>
+                </a:effectLst>
+              </a:rPr>
+              <a:t>: </a:t>
+            </a:r>
+            <a:r>
+              <a:rPr lang="en-US" sz="3000" b="1" dirty="0" smtClean="0">
+                <a:effectLst>
+                  <a:outerShdw blurRad="38100" dist="38100" dir="2700000" algn="tl">
+                    <a:srgbClr val="000000">
+                      <a:alpha val="43137"/>
+                    </a:srgbClr>
+                  </a:outerShdw>
+                </a:effectLst>
+              </a:rPr>
+              <a:t>alexander.vakrilov [at] telerik.com</a:t>
+            </a:r>
+            <a:endParaRPr lang="en-US" sz="3000" b="1" dirty="0">
+              <a:solidFill>
+                <a:srgbClr val="CCFF66">
+                  <a:lumMod val="40000"/>
+                  <a:lumOff val="60000"/>
+                </a:srgbClr>
+              </a:solidFill>
+              <a:effectLst>
+                <a:outerShdw blurRad="38100" dist="38100" dir="2700000" algn="tl">
+                  <a:srgbClr val="000000">
+                    <a:alpha val="43137"/>
+                  </a:srgbClr>
+                </a:outerShdw>
+              </a:effectLst>
+              <a:latin typeface="Corbel"/>
+            </a:endParaRPr>
+          </a:p>
+        </p:txBody>
+      </p:sp>
+      <p:pic>
+        <p:nvPicPr>
+          <p:cNvPr id="2050" name="Picture 2" descr="C:\NAKOV\Web-Application-Development-with-DotNet-Framework-and-ASP.NET\2010\lectures\lecturers-photos\Alexander_vakrilov.jpg"/>
+          <p:cNvPicPr>
+            <a:picLocks noChangeAspect="1" noChangeArrowheads="1"/>
+          </p:cNvPicPr>
+          <p:nvPr/>
+        </p:nvPicPr>
+        <p:blipFill>
+          <a:blip r:embed="rId3">
+            <a:extLst>
+              <a:ext uri="{28A0092B-C50C-407E-A947-70E740481C1C}">
+                <a14:useLocalDpi xmlns:a14="http://schemas.microsoft.com/office/drawing/2010/main"/>
+              </a:ext>
+            </a:extLst>
+          </a:blip>
+          <a:srcRect/>
+          <a:stretch>
+            <a:fillRect/>
+          </a:stretch>
+        </p:blipFill>
+        <p:spPr bwMode="auto">
+          <a:xfrm>
+            <a:off x="6858000" y="1208957"/>
+            <a:ext cx="1494069" cy="1762843"/>
+          </a:xfrm>
+          <a:prstGeom prst="rect">
+            <a:avLst/>
+          </a:prstGeom>
+          <a:noFill/>
+          <a:ln w="3175">
+            <a:solidFill>
+              <a:schemeClr val="accent5">
+                <a:lumMod val="75000"/>
+              </a:schemeClr>
+            </a:solidFill>
+            <a:miter lim="800000"/>
+            <a:headEnd/>
+            <a:tailEnd/>
+          </a:ln>
+          <a:extLst>
+            <a:ext uri="{909E8E84-426E-40DD-AFC4-6F175D3DCCD1}">
+              <a14:hiddenFill xmlns:a14="http://schemas.microsoft.com/office/drawing/2010/main">
+                <a:solidFill>
+                  <a:srgbClr val="FFFFFF"/>
+                </a:solidFill>
+              </a14:hiddenFill>
+            </a:ext>
+          </a:extLst>
+        </p:spPr>
+      </p:pic>
+    </p:spTree>
+    <p:extLst>
+      <p:ext uri="{BB962C8B-B14F-4D97-AF65-F5344CB8AC3E}">
+        <p14:creationId xmlns:p14="http://schemas.microsoft.com/office/powerpoint/2010/main" val="3089033343"/>
+      </p:ext>
+    </p:extLst>
+  </p:cSld>
+  <p:clrMapOvr>
+    <a:masterClrMapping/>
+  </p:clrMapOvr>
+  <p:timing>
+    <p:tnLst>
+      <p:par>
+        <p:cTn id="1" dur="indefinite" restart="never" nodeType="tmRoot"/>
+      </p:par>
+    </p:tnLst>
+  </p:timing>
+</p:sld>
+</file>
+
+<file path=ppt/slides/slide19.xml><?xml version="1.0" encoding="utf-8"?>
+<p:sld xmlns:a="http://schemas.openxmlformats.org/drawingml/2006/main" xmlns:r="http://schemas.openxmlformats.org/officeDocument/2006/relationships" xmlns:p="http://schemas.openxmlformats.org/presentationml/2006/main">
+  <p:cSld>
+    <p:spTree>
+      <p:nvGrpSpPr>
+        <p:cNvPr id="1" name=""/>
+        <p:cNvGrpSpPr/>
+        <p:nvPr/>
+      </p:nvGrpSpPr>
+      <p:grpSpPr>
+        <a:xfrm>
+          <a:off x="0" y="0"/>
+          <a:ext cx="0" cy="0"/>
+          <a:chOff x="0" y="0"/>
+          <a:chExt cx="0" cy="0"/>
+        </a:xfrm>
+      </p:grpSpPr>
+      <p:sp>
+        <p:nvSpPr>
+          <p:cNvPr id="4" name="Title 3"/>
+          <p:cNvSpPr>
+            <a:spLocks noGrp="1"/>
+          </p:cNvSpPr>
+          <p:nvPr>
+            <p:ph type="title"/>
+          </p:nvPr>
+        </p:nvSpPr>
+        <p:spPr/>
+        <p:txBody>
+          <a:bodyPr/>
+          <a:lstStyle/>
+          <a:p>
+            <a:r>
+              <a:rPr lang="en-US" dirty="0" smtClean="0"/>
+              <a:t>Trainers Team (8)</a:t>
             </a:r>
             <a:endParaRPr lang="en-US" dirty="0"/>
           </a:p>
@@ -8182,7 +8434,7 @@
               <a:pPr>
                 <a:defRPr/>
               </a:pPr>
-              <a:t>18</a:t>
+              <a:t>19</a:t>
             </a:fld>
             <a:endParaRPr lang="en-US" dirty="0"/>
           </a:p>
@@ -8278,24 +8530,30 @@
           </p:cNvPicPr>
           <p:nvPr/>
         </p:nvPicPr>
-        <p:blipFill>
+        <p:blipFill rotWithShape="1">
           <a:blip r:embed="rId3" cstate="screen">
-            <a:lum/>
             <a:extLst>
+              <a:ext uri="{BEBA8EAE-BF5A-486C-A8C5-ECC9F3942E4B}">
+                <a14:imgProps xmlns:a14="http://schemas.microsoft.com/office/drawing/2010/main">
+                  <a14:imgLayer r:embed="rId4">
+                    <a14:imgEffect>
+                      <a14:brightnessContrast bright="20000" contrast="-20000"/>
+                    </a14:imgEffect>
+                  </a14:imgLayer>
+                </a14:imgProps>
+              </a:ext>
               <a:ext uri="{28A0092B-C50C-407E-A947-70E740481C1C}">
                 <a14:useLocalDpi xmlns:a14="http://schemas.microsoft.com/office/drawing/2010/main"/>
               </a:ext>
             </a:extLst>
           </a:blip>
           <a:srcRect/>
-          <a:stretch>
-            <a:fillRect/>
-          </a:stretch>
+          <a:stretch/>
         </p:blipFill>
         <p:spPr bwMode="auto">
           <a:xfrm>
-            <a:off x="6581774" y="1054100"/>
-            <a:ext cx="1724026" cy="2298700"/>
+            <a:off x="6663732" y="1219200"/>
+            <a:ext cx="1809775" cy="2057400"/>
           </a:xfrm>
           <a:prstGeom prst="rect">
             <a:avLst/>
@@ -8342,7 +8600,207 @@
 </p:sld>
 </file>
 
-<file path=ppt/slides/slide19.xml><?xml version="1.0" encoding="utf-8"?>
+<file path=ppt/slides/slide2.xml><?xml version="1.0" encoding="utf-8"?>
+<p:sld xmlns:a="http://schemas.openxmlformats.org/drawingml/2006/main" xmlns:r="http://schemas.openxmlformats.org/officeDocument/2006/relationships" xmlns:p="http://schemas.openxmlformats.org/presentationml/2006/main">
+  <p:cSld>
+    <p:spTree>
+      <p:nvGrpSpPr>
+        <p:cNvPr id="1" name=""/>
+        <p:cNvGrpSpPr/>
+        <p:nvPr/>
+      </p:nvGrpSpPr>
+      <p:grpSpPr>
+        <a:xfrm>
+          <a:off x="0" y="0"/>
+          <a:ext cx="0" cy="0"/>
+          <a:chOff x="0" y="0"/>
+          <a:chExt cx="0" cy="0"/>
+        </a:xfrm>
+      </p:grpSpPr>
+      <p:sp>
+        <p:nvSpPr>
+          <p:cNvPr id="2" name="Title 1"/>
+          <p:cNvSpPr>
+            <a:spLocks noGrp="1"/>
+          </p:cNvSpPr>
+          <p:nvPr>
+            <p:ph type="title"/>
+          </p:nvPr>
+        </p:nvSpPr>
+        <p:spPr/>
+        <p:txBody>
+          <a:bodyPr/>
+          <a:lstStyle/>
+          <a:p>
+            <a:r>
+              <a:rPr lang="en-US" dirty="0" smtClean="0"/>
+              <a:t>About the Course</a:t>
+            </a:r>
+            <a:endParaRPr lang="en-US" dirty="0"/>
+          </a:p>
+        </p:txBody>
+      </p:sp>
+      <p:sp>
+        <p:nvSpPr>
+          <p:cNvPr id="3" name="Content Placeholder 2"/>
+          <p:cNvSpPr>
+            <a:spLocks noGrp="1"/>
+          </p:cNvSpPr>
+          <p:nvPr>
+            <p:ph idx="1"/>
+          </p:nvPr>
+        </p:nvSpPr>
+        <p:spPr/>
+        <p:txBody>
+          <a:bodyPr/>
+          <a:lstStyle/>
+          <a:p>
+            <a:pPr>
+              <a:lnSpc>
+                <a:spcPct val="100000"/>
+              </a:lnSpc>
+            </a:pPr>
+            <a:r>
+              <a:rPr lang="en-US" dirty="0" smtClean="0"/>
+              <a:t>Web Applications Development with .NET Framework and ASP.NET objectives</a:t>
+            </a:r>
+          </a:p>
+          <a:p>
+            <a:pPr lvl="1">
+              <a:lnSpc>
+                <a:spcPct val="100000"/>
+              </a:lnSpc>
+            </a:pPr>
+            <a:r>
+              <a:rPr lang="en-US" dirty="0" smtClean="0"/>
+              <a:t>Provides basic skills for development of dynamic data-driven ASP.NET Web applications</a:t>
+            </a:r>
+          </a:p>
+          <a:p>
+            <a:pPr lvl="1">
+              <a:lnSpc>
+                <a:spcPct val="100000"/>
+              </a:lnSpc>
+            </a:pPr>
+            <a:r>
+              <a:rPr lang="en-US" dirty="0" smtClean="0"/>
+              <a:t>C# language fundamentals</a:t>
+            </a:r>
+          </a:p>
+          <a:p>
+            <a:pPr lvl="1">
+              <a:lnSpc>
+                <a:spcPct val="100000"/>
+              </a:lnSpc>
+            </a:pPr>
+            <a:r>
+              <a:rPr lang="en-US" dirty="0" smtClean="0"/>
+              <a:t>Databases and SQL Server</a:t>
+            </a:r>
+          </a:p>
+          <a:p>
+            <a:pPr lvl="1">
+              <a:lnSpc>
+                <a:spcPct val="100000"/>
+              </a:lnSpc>
+            </a:pPr>
+            <a:r>
+              <a:rPr lang="en-US" dirty="0" smtClean="0"/>
+              <a:t>LINQ and LINQ-to-SQL</a:t>
+            </a:r>
+          </a:p>
+          <a:p>
+            <a:pPr lvl="1">
+              <a:lnSpc>
+                <a:spcPct val="100000"/>
+              </a:lnSpc>
+            </a:pPr>
+            <a:r>
+              <a:rPr lang="en-US" dirty="0" smtClean="0"/>
+              <a:t>ASP.NET and AJAX</a:t>
+            </a:r>
+          </a:p>
+        </p:txBody>
+      </p:sp>
+      <p:sp>
+        <p:nvSpPr>
+          <p:cNvPr id="4" name="Slide Number Placeholder 3"/>
+          <p:cNvSpPr>
+            <a:spLocks noGrp="1"/>
+          </p:cNvSpPr>
+          <p:nvPr>
+            <p:ph type="sldNum" sz="quarter" idx="10"/>
+          </p:nvPr>
+        </p:nvSpPr>
+        <p:spPr/>
+        <p:txBody>
+          <a:bodyPr/>
+          <a:lstStyle/>
+          <a:p>
+            <a:pPr>
+              <a:defRPr/>
+            </a:pPr>
+            <a:fld id="{58452FF4-89E3-4D1B-9927-2DBDC00E58D7}" type="slidenum">
+              <a:rPr lang="en-US" smtClean="0"/>
+              <a:pPr>
+                <a:defRPr/>
+              </a:pPr>
+              <a:t>2</a:t>
+            </a:fld>
+            <a:endParaRPr lang="en-US" dirty="0"/>
+          </a:p>
+        </p:txBody>
+      </p:sp>
+      <p:pic>
+        <p:nvPicPr>
+          <p:cNvPr id="25604" name="Picture 4" descr="http://www.artegraficas.com.br/img/web_sites/web_sites.jpg"/>
+          <p:cNvPicPr>
+            <a:picLocks noChangeAspect="1" noChangeArrowheads="1"/>
+          </p:cNvPicPr>
+          <p:nvPr/>
+        </p:nvPicPr>
+        <p:blipFill>
+          <a:blip r:embed="rId2" cstate="screen">
+            <a:extLst>
+              <a:ext uri="{28A0092B-C50C-407E-A947-70E740481C1C}">
+                <a14:useLocalDpi xmlns:a14="http://schemas.microsoft.com/office/drawing/2010/main"/>
+              </a:ext>
+            </a:extLst>
+          </a:blip>
+          <a:srcRect/>
+          <a:stretch>
+            <a:fillRect/>
+          </a:stretch>
+        </p:blipFill>
+        <p:spPr bwMode="auto">
+          <a:xfrm>
+            <a:off x="5562600" y="3886200"/>
+            <a:ext cx="2950185" cy="2362200"/>
+          </a:xfrm>
+          <a:prstGeom prst="roundRect">
+            <a:avLst>
+              <a:gd name="adj" fmla="val 8046"/>
+            </a:avLst>
+          </a:prstGeom>
+          <a:noFill/>
+        </p:spPr>
+      </p:pic>
+    </p:spTree>
+  </p:cSld>
+  <p:clrMapOvr>
+    <a:masterClrMapping/>
+  </p:clrMapOvr>
+  <p:timing>
+    <p:tnLst>
+      <p:par>
+        <p:cTn id="1" dur="indefinite" restart="never" nodeType="tmRoot"/>
+      </p:par>
+    </p:tnLst>
+  </p:timing>
+</p:sld>
+</file>
+
+<file path=ppt/slides/slide20.xml><?xml version="1.0" encoding="utf-8"?>
 <p:sld xmlns:a="http://schemas.openxmlformats.org/drawingml/2006/main" xmlns:r="http://schemas.openxmlformats.org/officeDocument/2006/relationships" xmlns:p="http://schemas.openxmlformats.org/presentationml/2006/main">
   <p:cSld>
     <p:spTree>
@@ -8496,7 +8954,7 @@
 </p:sld>
 </file>
 
-<file path=ppt/slides/slide2.xml><?xml version="1.0" encoding="utf-8"?>
+<file path=ppt/slides/slide21.xml><?xml version="1.0" encoding="utf-8"?>
 <p:sld xmlns:a="http://schemas.openxmlformats.org/drawingml/2006/main" xmlns:r="http://schemas.openxmlformats.org/officeDocument/2006/relationships" xmlns:p="http://schemas.openxmlformats.org/presentationml/2006/main">
   <p:cSld>
     <p:spTree>
@@ -8530,206 +8988,6 @@
           <a:p>
             <a:r>
               <a:rPr lang="en-US" dirty="0" smtClean="0"/>
-              <a:t>About the Course</a:t>
-            </a:r>
-            <a:endParaRPr lang="en-US" dirty="0"/>
-          </a:p>
-        </p:txBody>
-      </p:sp>
-      <p:sp>
-        <p:nvSpPr>
-          <p:cNvPr id="3" name="Content Placeholder 2"/>
-          <p:cNvSpPr>
-            <a:spLocks noGrp="1"/>
-          </p:cNvSpPr>
-          <p:nvPr>
-            <p:ph idx="1"/>
-          </p:nvPr>
-        </p:nvSpPr>
-        <p:spPr/>
-        <p:txBody>
-          <a:bodyPr/>
-          <a:lstStyle/>
-          <a:p>
-            <a:pPr>
-              <a:lnSpc>
-                <a:spcPct val="100000"/>
-              </a:lnSpc>
-            </a:pPr>
-            <a:r>
-              <a:rPr lang="en-US" dirty="0" smtClean="0"/>
-              <a:t>Web Applications Development with .NET Framework and ASP.NET objectives</a:t>
-            </a:r>
-          </a:p>
-          <a:p>
-            <a:pPr lvl="1">
-              <a:lnSpc>
-                <a:spcPct val="100000"/>
-              </a:lnSpc>
-            </a:pPr>
-            <a:r>
-              <a:rPr lang="en-US" dirty="0" smtClean="0"/>
-              <a:t>Provides basic skills for development of dynamic data-driven ASP.NET Web applications</a:t>
-            </a:r>
-          </a:p>
-          <a:p>
-            <a:pPr lvl="1">
-              <a:lnSpc>
-                <a:spcPct val="100000"/>
-              </a:lnSpc>
-            </a:pPr>
-            <a:r>
-              <a:rPr lang="en-US" dirty="0" smtClean="0"/>
-              <a:t>C# language fundamentals</a:t>
-            </a:r>
-          </a:p>
-          <a:p>
-            <a:pPr lvl="1">
-              <a:lnSpc>
-                <a:spcPct val="100000"/>
-              </a:lnSpc>
-            </a:pPr>
-            <a:r>
-              <a:rPr lang="en-US" dirty="0" smtClean="0"/>
-              <a:t>Databases and SQL Server</a:t>
-            </a:r>
-          </a:p>
-          <a:p>
-            <a:pPr lvl="1">
-              <a:lnSpc>
-                <a:spcPct val="100000"/>
-              </a:lnSpc>
-            </a:pPr>
-            <a:r>
-              <a:rPr lang="en-US" dirty="0" smtClean="0"/>
-              <a:t>LINQ and LINQ-to-SQL</a:t>
-            </a:r>
-          </a:p>
-          <a:p>
-            <a:pPr lvl="1">
-              <a:lnSpc>
-                <a:spcPct val="100000"/>
-              </a:lnSpc>
-            </a:pPr>
-            <a:r>
-              <a:rPr lang="en-US" dirty="0" smtClean="0"/>
-              <a:t>ASP.NET and AJAX</a:t>
-            </a:r>
-          </a:p>
-        </p:txBody>
-      </p:sp>
-      <p:sp>
-        <p:nvSpPr>
-          <p:cNvPr id="4" name="Slide Number Placeholder 3"/>
-          <p:cNvSpPr>
-            <a:spLocks noGrp="1"/>
-          </p:cNvSpPr>
-          <p:nvPr>
-            <p:ph type="sldNum" sz="quarter" idx="10"/>
-          </p:nvPr>
-        </p:nvSpPr>
-        <p:spPr/>
-        <p:txBody>
-          <a:bodyPr/>
-          <a:lstStyle/>
-          <a:p>
-            <a:pPr>
-              <a:defRPr/>
-            </a:pPr>
-            <a:fld id="{58452FF4-89E3-4D1B-9927-2DBDC00E58D7}" type="slidenum">
-              <a:rPr lang="en-US" smtClean="0"/>
-              <a:pPr>
-                <a:defRPr/>
-              </a:pPr>
-              <a:t>2</a:t>
-            </a:fld>
-            <a:endParaRPr lang="en-US" dirty="0"/>
-          </a:p>
-        </p:txBody>
-      </p:sp>
-      <p:pic>
-        <p:nvPicPr>
-          <p:cNvPr id="25604" name="Picture 4" descr="http://www.artegraficas.com.br/img/web_sites/web_sites.jpg"/>
-          <p:cNvPicPr>
-            <a:picLocks noChangeAspect="1" noChangeArrowheads="1"/>
-          </p:cNvPicPr>
-          <p:nvPr/>
-        </p:nvPicPr>
-        <p:blipFill>
-          <a:blip r:embed="rId2" cstate="screen">
-            <a:extLst>
-              <a:ext uri="{28A0092B-C50C-407E-A947-70E740481C1C}">
-                <a14:useLocalDpi xmlns:a14="http://schemas.microsoft.com/office/drawing/2010/main"/>
-              </a:ext>
-            </a:extLst>
-          </a:blip>
-          <a:srcRect/>
-          <a:stretch>
-            <a:fillRect/>
-          </a:stretch>
-        </p:blipFill>
-        <p:spPr bwMode="auto">
-          <a:xfrm>
-            <a:off x="5562600" y="3886200"/>
-            <a:ext cx="2950185" cy="2362200"/>
-          </a:xfrm>
-          <a:prstGeom prst="roundRect">
-            <a:avLst>
-              <a:gd name="adj" fmla="val 8046"/>
-            </a:avLst>
-          </a:prstGeom>
-          <a:noFill/>
-        </p:spPr>
-      </p:pic>
-    </p:spTree>
-  </p:cSld>
-  <p:clrMapOvr>
-    <a:masterClrMapping/>
-  </p:clrMapOvr>
-  <p:timing>
-    <p:tnLst>
-      <p:par>
-        <p:cTn id="1" dur="indefinite" restart="never" nodeType="tmRoot"/>
-      </p:par>
-    </p:tnLst>
-  </p:timing>
-</p:sld>
-</file>
-
-<file path=ppt/slides/slide20.xml><?xml version="1.0" encoding="utf-8"?>
-<p:sld xmlns:a="http://schemas.openxmlformats.org/drawingml/2006/main" xmlns:r="http://schemas.openxmlformats.org/officeDocument/2006/relationships" xmlns:p="http://schemas.openxmlformats.org/presentationml/2006/main">
-  <p:cSld>
-    <p:spTree>
-      <p:nvGrpSpPr>
-        <p:cNvPr id="1" name=""/>
-        <p:cNvGrpSpPr/>
-        <p:nvPr/>
-      </p:nvGrpSpPr>
-      <p:grpSpPr>
-        <a:xfrm>
-          <a:off x="0" y="0"/>
-          <a:ext cx="0" cy="0"/>
-          <a:chOff x="0" y="0"/>
-          <a:chExt cx="0" cy="0"/>
-        </a:xfrm>
-      </p:grpSpPr>
-      <p:sp>
-        <p:nvSpPr>
-          <p:cNvPr id="2" name="Title 1"/>
-          <p:cNvSpPr>
-            <a:spLocks noGrp="1"/>
-          </p:cNvSpPr>
-          <p:nvPr>
-            <p:ph type="title"/>
-          </p:nvPr>
-        </p:nvSpPr>
-        <p:spPr/>
-        <p:txBody>
-          <a:bodyPr/>
-          <a:lstStyle/>
-          <a:p>
-            <a:r>
-              <a:rPr lang="en-US" dirty="0" smtClean="0"/>
               <a:t>Assessment</a:t>
             </a:r>
             <a:endParaRPr lang="en-US" dirty="0"/>
@@ -8763,52 +9021,48 @@
             </a:pPr>
             <a:r>
               <a:rPr lang="en-US" dirty="0" smtClean="0"/>
-              <a:t>Practical </a:t>
-            </a:r>
-            <a:r>
-              <a:rPr lang="en-US" dirty="0" smtClean="0"/>
-              <a:t>project</a:t>
-            </a:r>
-          </a:p>
-          <a:p>
-            <a:pPr marL="457200" lvl="1" indent="-100013">
+              <a:t>Practical project</a:t>
+            </a:r>
+          </a:p>
+          <a:p>
+            <a:pPr marL="622300" lvl="1" indent="-265113">
               <a:lnSpc>
                 <a:spcPct val="100000"/>
               </a:lnSpc>
             </a:pPr>
             <a:r>
               <a:rPr lang="en-US" dirty="0" smtClean="0"/>
-              <a:t>The practical project will consist of two parts</a:t>
-            </a:r>
-          </a:p>
-          <a:p>
-            <a:pPr marL="749300" lvl="2" indent="-100013">
+              <a:t>The practical project will consist of two parts:</a:t>
+            </a:r>
+          </a:p>
+          <a:p>
+            <a:pPr marL="1074738" lvl="2" indent="-427038">
               <a:lnSpc>
                 <a:spcPct val="100000"/>
               </a:lnSpc>
+              <a:buFont typeface="+mj-lt"/>
+              <a:buAutoNum type="arabicPeriod"/>
             </a:pPr>
             <a:r>
               <a:rPr lang="en-US" dirty="0" smtClean="0"/>
-              <a:t>Data Access Layer and GUI</a:t>
-            </a:r>
-          </a:p>
-          <a:p>
-            <a:pPr marL="457200" lvl="1" indent="-100013">
+              <a:t>Data Access Layer and Web UI prototype</a:t>
+            </a:r>
+          </a:p>
+          <a:p>
+            <a:pPr marL="1074738" lvl="2" indent="-427038">
               <a:lnSpc>
                 <a:spcPct val="100000"/>
               </a:lnSpc>
+              <a:buFont typeface="+mj-lt"/>
+              <a:buAutoNum type="arabicPeriod"/>
             </a:pPr>
             <a:r>
               <a:rPr lang="en-US" dirty="0" smtClean="0"/>
-              <a:t>Dynamic </a:t>
-            </a:r>
-            <a:r>
-              <a:rPr lang="en-US" dirty="0" smtClean="0"/>
-              <a:t>Web application – developed at home</a:t>
-            </a:r>
-          </a:p>
-          <a:p>
-            <a:pPr marL="457200" lvl="1" indent="-100013">
+              <a:t>Dynamic Web application – developed at home</a:t>
+            </a:r>
+          </a:p>
+          <a:p>
+            <a:pPr marL="622300" lvl="1" indent="-265113">
               <a:lnSpc>
                 <a:spcPct val="100000"/>
               </a:lnSpc>
@@ -8830,7 +9084,7 @@
             </a:r>
           </a:p>
           <a:p>
-            <a:pPr marL="457200" lvl="1" indent="-100013">
+            <a:pPr marL="622300" lvl="1" indent="-265113">
               <a:lnSpc>
                 <a:spcPct val="100000"/>
               </a:lnSpc>
@@ -8841,7 +9095,7 @@
             </a:r>
           </a:p>
           <a:p>
-            <a:pPr marL="457200" lvl="1" indent="-100013">
+            <a:pPr marL="622300" lvl="1" indent="-265113">
               <a:lnSpc>
                 <a:spcPct val="100000"/>
               </a:lnSpc>
@@ -8852,20 +9106,15 @@
             </a:r>
           </a:p>
           <a:p>
-            <a:pPr marL="457200" lvl="1" indent="-100013">
+            <a:pPr marL="622300" lvl="1" indent="-265113">
               <a:lnSpc>
                 <a:spcPct val="100000"/>
               </a:lnSpc>
             </a:pPr>
             <a:r>
               <a:rPr lang="en-US" dirty="0" smtClean="0"/>
-              <a:t>Blog </a:t>
-            </a:r>
-            <a:r>
-              <a:rPr lang="en-US" dirty="0" smtClean="0"/>
-              <a:t>system</a:t>
-            </a:r>
-            <a:endParaRPr lang="en-US" dirty="0" smtClean="0"/>
+              <a:t>Blog system</a:t>
+            </a:r>
           </a:p>
         </p:txBody>
       </p:sp>
@@ -8892,7 +9141,7 @@
               <a:pPr>
                 <a:defRPr/>
               </a:pPr>
-              <a:t>20</a:t>
+              <a:t>21</a:t>
             </a:fld>
             <a:endParaRPr lang="en-US" dirty="0"/>
           </a:p>
@@ -8915,8 +9164,8 @@
         </p:blipFill>
         <p:spPr bwMode="auto">
           <a:xfrm>
-            <a:off x="4863240" y="4191000"/>
-            <a:ext cx="3671160" cy="2441321"/>
+            <a:off x="5334000" y="4357966"/>
+            <a:ext cx="3216310" cy="2138846"/>
           </a:xfrm>
           <a:prstGeom prst="roundRect">
             <a:avLst>
@@ -8949,7 +9198,7 @@
 </p:sld>
 </file>
 
-<file path=ppt/slides/slide21.xml><?xml version="1.0" encoding="utf-8"?>
+<file path=ppt/slides/slide22.xml><?xml version="1.0" encoding="utf-8"?>
 <p:sld xmlns:a="http://schemas.openxmlformats.org/drawingml/2006/main" xmlns:r="http://schemas.openxmlformats.org/officeDocument/2006/relationships" xmlns:p="http://schemas.openxmlformats.org/presentationml/2006/main">
   <p:cSld>
     <p:spTree>
@@ -9001,8 +9250,8 @@
         </p:nvSpPr>
         <p:spPr>
           <a:xfrm>
-            <a:off x="228600" y="990600"/>
-            <a:ext cx="8686800" cy="5715000"/>
+            <a:off x="228600" y="914400"/>
+            <a:ext cx="8686800" cy="5791200"/>
           </a:xfrm>
         </p:spPr>
         <p:txBody>
@@ -9013,6 +9262,9 @@
               <a:lnSpc>
                 <a:spcPct val="100000"/>
               </a:lnSpc>
+              <a:spcBef>
+                <a:spcPts val="400"/>
+              </a:spcBef>
             </a:pPr>
             <a:r>
               <a:rPr lang="en-US" sz="3000" dirty="0" smtClean="0"/>
@@ -9024,6 +9276,9 @@
               <a:lnSpc>
                 <a:spcPct val="100000"/>
               </a:lnSpc>
+              <a:spcBef>
+                <a:spcPts val="400"/>
+              </a:spcBef>
             </a:pPr>
             <a:r>
               <a:rPr lang="en-US" sz="2800" dirty="0" smtClean="0"/>
@@ -9035,6 +9290,9 @@
               <a:lnSpc>
                 <a:spcPct val="100000"/>
               </a:lnSpc>
+              <a:spcBef>
+                <a:spcPts val="400"/>
+              </a:spcBef>
             </a:pPr>
             <a:r>
               <a:rPr lang="en-US" sz="2800" dirty="0" smtClean="0"/>
@@ -9046,6 +9304,9 @@
               <a:lnSpc>
                 <a:spcPct val="100000"/>
               </a:lnSpc>
+              <a:spcBef>
+                <a:spcPts val="400"/>
+              </a:spcBef>
             </a:pPr>
             <a:r>
               <a:rPr lang="en-US" sz="2800" dirty="0" smtClean="0"/>
@@ -9057,21 +9318,31 @@
               <a:lnSpc>
                 <a:spcPct val="100000"/>
               </a:lnSpc>
+              <a:spcBef>
+                <a:spcPts val="400"/>
+              </a:spcBef>
             </a:pPr>
             <a:r>
               <a:rPr lang="en-US" sz="2800" dirty="0" smtClean="0"/>
-              <a:t>Each project gets </a:t>
+              <a:t>The first project gives </a:t>
             </a:r>
             <a:r>
               <a:rPr lang="en-US" sz="2800" dirty="0" smtClean="0">
                 <a:latin typeface="Consolas" pitchFamily="49" charset="0"/>
                 <a:cs typeface="Consolas" pitchFamily="49" charset="0"/>
               </a:rPr>
-              <a:t>0…60</a:t>
+              <a:t>0…20</a:t>
             </a:r>
             <a:r>
               <a:rPr lang="en-US" sz="2800" dirty="0" smtClean="0"/>
-              <a:t> scores</a:t>
+              <a:t> scores,</a:t>
+            </a:r>
+            <a:br>
+              <a:rPr lang="en-US" sz="2800" dirty="0" smtClean="0"/>
+            </a:br>
+            <a:r>
+              <a:rPr lang="en-US" sz="2800" dirty="0" smtClean="0"/>
+              <a:t>the second – 0..40 scores</a:t>
             </a:r>
             <a:endParaRPr lang="en-US" sz="3000" dirty="0" smtClean="0">
               <a:latin typeface="Consolas" pitchFamily="49" charset="0"/>
@@ -9103,7 +9374,7 @@
               <a:pPr>
                 <a:defRPr/>
               </a:pPr>
-              <a:t>21</a:t>
+              <a:t>22</a:t>
             </a:fld>
             <a:endParaRPr lang="en-US" dirty="0"/>
           </a:p>
@@ -9115,10 +9386,16 @@
           <p:cNvGraphicFramePr>
             <a:graphicFrameLocks/>
           </p:cNvGraphicFramePr>
-          <p:nvPr/>
+          <p:nvPr>
+            <p:extLst>
+              <p:ext uri="{D42A27DB-BD31-4B8C-83A1-F6EECF244321}">
+                <p14:modId xmlns:p14="http://schemas.microsoft.com/office/powerpoint/2010/main" val="1921737319"/>
+              </p:ext>
+            </p:extLst>
+          </p:nvPr>
         </p:nvGraphicFramePr>
         <p:xfrm>
-          <a:off x="2362200" y="4206240"/>
+          <a:off x="2362200" y="4282440"/>
           <a:ext cx="4191000" cy="2194560"/>
         </p:xfrm>
         <a:graphic>
@@ -10502,7 +10779,7 @@
         </p:blipFill>
         <p:spPr bwMode="auto">
           <a:xfrm rot="21149242">
-            <a:off x="7254693" y="3470739"/>
+            <a:off x="7254692" y="3121034"/>
             <a:ext cx="1214719" cy="1485427"/>
           </a:xfrm>
           <a:prstGeom prst="rect">
@@ -10553,7 +10830,7 @@
 </p:sld>
 </file>
 
-<file path=ppt/slides/slide22.xml><?xml version="1.0" encoding="utf-8"?>
+<file path=ppt/slides/slide23.xml><?xml version="1.0" encoding="utf-8"?>
 <p:sld xmlns:a="http://schemas.openxmlformats.org/drawingml/2006/main" xmlns:r="http://schemas.openxmlformats.org/officeDocument/2006/relationships" xmlns:p="http://schemas.openxmlformats.org/presentationml/2006/main">
   <p:cSld>
     <p:spTree>
@@ -10648,7 +10925,7 @@
             </a:r>
             <a:r>
               <a:rPr lang="en-US" dirty="0" smtClean="0"/>
-              <a:t> score from the practical project</a:t>
+              <a:t> score from the practical projects</a:t>
             </a:r>
           </a:p>
           <a:p>
@@ -10659,7 +10936,7 @@
             </a:pPr>
             <a:r>
               <a:rPr lang="en-US" dirty="0" smtClean="0"/>
-              <a:t>Issued by Telerik Academy</a:t>
+              <a:t>Issued by Telerik</a:t>
             </a:r>
           </a:p>
           <a:p>
@@ -10682,6 +10959,17 @@
             <a:r>
               <a:rPr lang="en-US" dirty="0" smtClean="0"/>
               <a:t>Awards</a:t>
+            </a:r>
+          </a:p>
+          <a:p>
+            <a:pPr lvl="1">
+              <a:lnSpc>
+                <a:spcPct val="100000"/>
+              </a:lnSpc>
+            </a:pPr>
+            <a:r>
+              <a:rPr lang="en-US" dirty="0" smtClean="0"/>
+              <a:t>E.g. DevReach free pass</a:t>
             </a:r>
           </a:p>
           <a:p>
@@ -10742,138 +11030,153 @@
               <a:pPr>
                 <a:defRPr/>
               </a:pPr>
-              <a:t>22</a:t>
+              <a:t>23</a:t>
             </a:fld>
             <a:endParaRPr lang="en-US" dirty="0"/>
           </a:p>
         </p:txBody>
       </p:sp>
-      <p:sp>
-        <p:nvSpPr>
-          <p:cNvPr id="8" name="Rounded Rectangle 7"/>
-          <p:cNvSpPr/>
+      <p:grpSp>
+        <p:nvGrpSpPr>
+          <p:cNvPr id="2" name="Group 1"/>
+          <p:cNvGrpSpPr/>
           <p:nvPr/>
-        </p:nvSpPr>
-        <p:spPr>
+        </p:nvGrpSpPr>
+        <p:grpSpPr>
           <a:xfrm>
-            <a:off x="4800600" y="4267200"/>
-            <a:ext cx="4038600" cy="2266950"/>
+            <a:off x="5105400" y="4419600"/>
+            <a:ext cx="3600450" cy="1981200"/>
+            <a:chOff x="5019675" y="4459792"/>
+            <a:chExt cx="3600450" cy="1981200"/>
           </a:xfrm>
-          <a:prstGeom prst="roundRect">
-            <a:avLst>
-              <a:gd name="adj" fmla="val 5953"/>
-            </a:avLst>
-          </a:prstGeom>
-          <a:solidFill>
-            <a:schemeClr val="accent5">
-              <a:lumMod val="60000"/>
-              <a:lumOff val="40000"/>
-              <a:alpha val="25000"/>
-            </a:schemeClr>
-          </a:solidFill>
-          <a:ln w="6350" algn="ctr">
+        </p:grpSpPr>
+        <p:sp>
+          <p:nvSpPr>
+            <p:cNvPr id="8" name="Rounded Rectangle 7"/>
+            <p:cNvSpPr/>
+            <p:nvPr/>
+          </p:nvSpPr>
+          <p:spPr>
+            <a:xfrm>
+              <a:off x="5019675" y="4459792"/>
+              <a:ext cx="3600450" cy="1981200"/>
+            </a:xfrm>
+            <a:prstGeom prst="roundRect">
+              <a:avLst>
+                <a:gd name="adj" fmla="val 5953"/>
+              </a:avLst>
+            </a:prstGeom>
             <a:solidFill>
               <a:schemeClr val="accent5">
                 <a:lumMod val="60000"/>
                 <a:lumOff val="40000"/>
-                <a:alpha val="70000"/>
+                <a:alpha val="25000"/>
               </a:schemeClr>
             </a:solidFill>
-            <a:round/>
-            <a:headEnd/>
-            <a:tailEnd/>
-          </a:ln>
-          <a:effectLst/>
-        </p:spPr>
-        <p:txBody>
-          <a:bodyPr lIns="36000" rIns="36000" anchor="ctr"/>
-          <a:lstStyle/>
-          <a:p>
-            <a:endParaRPr lang="en-US" sz="2000" b="1" dirty="0" smtClean="0">
+            <a:ln w="6350" algn="ctr">
               <a:solidFill>
-                <a:schemeClr val="tx1">
-                  <a:lumMod val="40000"/>
-                  <a:lumOff val="60000"/>
+                <a:schemeClr val="accent5">
+                  <a:lumMod val="60000"/>
+                  <a:lumOff val="40000"/>
+                  <a:alpha val="70000"/>
                 </a:schemeClr>
               </a:solidFill>
-              <a:effectLst>
-                <a:outerShdw blurRad="38100" dist="38100" dir="2700000" algn="tl">
-                  <a:srgbClr val="000000">
-                    <a:alpha val="43137"/>
-                  </a:srgbClr>
-                </a:outerShdw>
-              </a:effectLst>
-              <a:latin typeface="Consolas" pitchFamily="49" charset="0"/>
-              <a:cs typeface="Consolas" pitchFamily="49" charset="0"/>
-            </a:endParaRPr>
-          </a:p>
-        </p:txBody>
-      </p:sp>
-      <p:pic>
-        <p:nvPicPr>
-          <p:cNvPr id="38914" name="Picture 2" descr="C:\NAKOV\Telerik-templates\Telerik-Logos\Telerik-logo-large-with-text.png"/>
-          <p:cNvPicPr>
-            <a:picLocks noChangeAspect="1" noChangeArrowheads="1"/>
-          </p:cNvPicPr>
-          <p:nvPr/>
-        </p:nvPicPr>
-        <p:blipFill>
-          <a:blip r:embed="rId2" cstate="screen">
-            <a:extLst>
-              <a:ext uri="{28A0092B-C50C-407E-A947-70E740481C1C}">
-                <a14:useLocalDpi xmlns:a14="http://schemas.microsoft.com/office/drawing/2010/main"/>
-              </a:ext>
-            </a:extLst>
-          </a:blip>
-          <a:srcRect l="-4348" t="-12756" r="-4348" b="-8419"/>
-          <a:stretch>
-            <a:fillRect/>
-          </a:stretch>
-        </p:blipFill>
-        <p:spPr bwMode="auto">
-          <a:xfrm>
-            <a:off x="5019675" y="4953000"/>
-            <a:ext cx="3609474" cy="1371600"/>
-          </a:xfrm>
-          <a:prstGeom prst="roundRect">
-            <a:avLst>
-              <a:gd name="adj" fmla="val 4167"/>
-            </a:avLst>
-          </a:prstGeom>
-          <a:solidFill>
-            <a:srgbClr val="FFFFFF"/>
-          </a:solidFill>
-        </p:spPr>
-      </p:pic>
-      <p:sp>
-        <p:nvSpPr>
-          <p:cNvPr id="6" name="Rectangle 5"/>
-          <p:cNvSpPr/>
-          <p:nvPr/>
-        </p:nvSpPr>
-        <p:spPr>
-          <a:xfrm>
-            <a:off x="6113693" y="4343400"/>
-            <a:ext cx="1420582" cy="477054"/>
-          </a:xfrm>
-          <a:prstGeom prst="rect">
-            <a:avLst/>
-          </a:prstGeom>
-        </p:spPr>
-        <p:txBody>
-          <a:bodyPr wrap="none">
-            <a:spAutoFit/>
-          </a:bodyPr>
-          <a:lstStyle/>
-          <a:p>
-            <a:r>
-              <a:rPr lang="en-US" b="1" dirty="0" smtClean="0"/>
-              <a:t>Sponsor:</a:t>
-            </a:r>
-            <a:endParaRPr lang="en-US" b="1" dirty="0"/>
-          </a:p>
-        </p:txBody>
-      </p:sp>
+              <a:round/>
+              <a:headEnd/>
+              <a:tailEnd/>
+            </a:ln>
+            <a:effectLst/>
+          </p:spPr>
+          <p:txBody>
+            <a:bodyPr lIns="36000" rIns="36000" anchor="ctr"/>
+            <a:lstStyle/>
+            <a:p>
+              <a:endParaRPr lang="en-US" sz="2000" b="1" dirty="0" smtClean="0">
+                <a:solidFill>
+                  <a:schemeClr val="tx1">
+                    <a:lumMod val="40000"/>
+                    <a:lumOff val="60000"/>
+                  </a:schemeClr>
+                </a:solidFill>
+                <a:effectLst>
+                  <a:outerShdw blurRad="38100" dist="38100" dir="2700000" algn="tl">
+                    <a:srgbClr val="000000">
+                      <a:alpha val="43137"/>
+                    </a:srgbClr>
+                  </a:outerShdw>
+                </a:effectLst>
+                <a:latin typeface="Consolas" pitchFamily="49" charset="0"/>
+                <a:cs typeface="Consolas" pitchFamily="49" charset="0"/>
+              </a:endParaRPr>
+            </a:p>
+          </p:txBody>
+        </p:sp>
+        <p:pic>
+          <p:nvPicPr>
+            <p:cNvPr id="38914" name="Picture 2" descr="C:\NAKOV\Telerik-templates\Telerik-Logos\Telerik-logo-large-with-text.png"/>
+            <p:cNvPicPr>
+              <a:picLocks noChangeAspect="1" noChangeArrowheads="1"/>
+            </p:cNvPicPr>
+            <p:nvPr/>
+          </p:nvPicPr>
+          <p:blipFill>
+            <a:blip r:embed="rId2" cstate="screen">
+              <a:extLst>
+                <a:ext uri="{28A0092B-C50C-407E-A947-70E740481C1C}">
+                  <a14:useLocalDpi xmlns:a14="http://schemas.microsoft.com/office/drawing/2010/main"/>
+                </a:ext>
+              </a:extLst>
+            </a:blip>
+            <a:srcRect l="-4348" t="-12756" r="-4348" b="-8419"/>
+            <a:stretch>
+              <a:fillRect/>
+            </a:stretch>
+          </p:blipFill>
+          <p:spPr bwMode="auto">
+            <a:xfrm>
+              <a:off x="5215472" y="5027403"/>
+              <a:ext cx="3217880" cy="1222794"/>
+            </a:xfrm>
+            <a:prstGeom prst="roundRect">
+              <a:avLst>
+                <a:gd name="adj" fmla="val 4167"/>
+              </a:avLst>
+            </a:prstGeom>
+            <a:solidFill>
+              <a:srgbClr val="FFFFFF"/>
+            </a:solidFill>
+          </p:spPr>
+        </p:pic>
+        <p:sp>
+          <p:nvSpPr>
+            <p:cNvPr id="6" name="Rectangle 5"/>
+            <p:cNvSpPr/>
+            <p:nvPr/>
+          </p:nvSpPr>
+          <p:spPr>
+            <a:xfrm>
+              <a:off x="6113693" y="4475946"/>
+              <a:ext cx="1420582" cy="477054"/>
+            </a:xfrm>
+            <a:prstGeom prst="rect">
+              <a:avLst/>
+            </a:prstGeom>
+          </p:spPr>
+          <p:txBody>
+            <a:bodyPr wrap="none">
+              <a:spAutoFit/>
+            </a:bodyPr>
+            <a:lstStyle/>
+            <a:p>
+              <a:r>
+                <a:rPr lang="en-US" b="1" dirty="0" smtClean="0"/>
+                <a:t>Sponsor:</a:t>
+              </a:r>
+              <a:endParaRPr lang="en-US" b="1" dirty="0"/>
+            </a:p>
+          </p:txBody>
+        </p:sp>
+      </p:grpSp>
     </p:spTree>
   </p:cSld>
   <p:clrMapOvr>
@@ -10889,7 +11192,7 @@
 </p:sld>
 </file>
 
-<file path=ppt/slides/slide23.xml><?xml version="1.0" encoding="utf-8"?>
+<file path=ppt/slides/slide24.xml><?xml version="1.0" encoding="utf-8"?>
 <p:sld xmlns:a="http://schemas.openxmlformats.org/drawingml/2006/main" xmlns:r="http://schemas.openxmlformats.org/officeDocument/2006/relationships" xmlns:p="http://schemas.openxmlformats.org/presentationml/2006/main">
   <p:cSld>
     <p:spTree>
@@ -10989,7 +11292,7 @@
 </p:sld>
 </file>
 
-<file path=ppt/slides/slide24.xml><?xml version="1.0" encoding="utf-8"?>
+<file path=ppt/slides/slide25.xml><?xml version="1.0" encoding="utf-8"?>
 <p:sld xmlns:a="http://schemas.openxmlformats.org/drawingml/2006/main" xmlns:r="http://schemas.openxmlformats.org/officeDocument/2006/relationships" xmlns:p="http://schemas.openxmlformats.org/presentationml/2006/main">
   <p:cSld>
     <p:spTree>
@@ -11049,6 +11352,31 @@
           <a:bodyPr/>
           <a:lstStyle/>
           <a:p>
+            <a:pPr marL="0" indent="0">
+              <a:spcBef>
+                <a:spcPts val="1800"/>
+              </a:spcBef>
+              <a:buNone/>
+              <a:tabLst/>
+            </a:pPr>
+            <a:r>
+              <a:rPr lang="en-US" sz="3000" dirty="0">
+                <a:effectLst/>
+              </a:rPr>
+              <a:t>MacDonald M., Beginning ASP.NET 4 in C# 2010, 981 pages, Apress, Inc., 2010, ISBN 978-1-4302-2608-6 – </a:t>
+            </a:r>
+            <a:r>
+              <a:rPr lang="en-US" sz="3000" u="sng" dirty="0">
+                <a:effectLst/>
+                <a:hlinkClick r:id="rId2"/>
+              </a:rPr>
+              <a:t>http://apress.com/book/view/1430226080</a:t>
+            </a:r>
+            <a:endParaRPr lang="en-US" sz="3000" dirty="0">
+              <a:effectLst/>
+            </a:endParaRPr>
+          </a:p>
+          <a:p>
             <a:pPr marL="0" lvl="0" indent="0">
               <a:spcBef>
                 <a:spcPts val="1800"/>
@@ -11093,7 +11421,7 @@
             <a:r>
               <a:rPr lang="en-US" sz="3000" u="sng" dirty="0" smtClean="0">
                 <a:effectLst/>
-                <a:hlinkClick r:id="rId2"/>
+                <a:hlinkClick r:id="rId3"/>
               </a:rPr>
               <a:t>www.devbg.org/dotnetbook/</a:t>
             </a:r>
@@ -11146,53 +11474,11 @@
             <a:r>
               <a:rPr lang="en-US" sz="3000" u="sng" dirty="0" smtClean="0">
                 <a:effectLst/>
-                <a:hlinkClick r:id="rId2"/>
+                <a:hlinkClick r:id="rId3"/>
               </a:rPr>
               <a:t>www.devbg.org/dotnetbook/</a:t>
             </a:r>
             <a:endParaRPr lang="en-US" sz="3000" dirty="0" smtClean="0">
-              <a:effectLst/>
-            </a:endParaRPr>
-          </a:p>
-          <a:p>
-            <a:pPr marL="0" lvl="0" indent="0">
-              <a:spcBef>
-                <a:spcPts val="3600"/>
-              </a:spcBef>
-              <a:buNone/>
-            </a:pPr>
-            <a:r>
-              <a:rPr lang="en-US" sz="3000" dirty="0" smtClean="0">
-                <a:effectLst/>
-              </a:rPr>
-              <a:t>MacDonald </a:t>
-            </a:r>
-            <a:r>
-              <a:rPr lang="en-US" sz="3000" dirty="0">
-                <a:effectLst/>
-              </a:rPr>
-              <a:t>M., Beginning ASP.NET 4 in C# 2010, 981 pages, </a:t>
-            </a:r>
-            <a:r>
-              <a:rPr lang="en-US" sz="3000" dirty="0" err="1">
-                <a:effectLst/>
-              </a:rPr>
-              <a:t>Apress</a:t>
-            </a:r>
-            <a:r>
-              <a:rPr lang="en-US" sz="3000" dirty="0">
-                <a:effectLst/>
-              </a:rPr>
-              <a:t>, Inc., 2010, ISBN 978-1-4302-2608-6 – </a:t>
-            </a:r>
-            <a:r>
-              <a:rPr lang="en-US" sz="3000" u="sng" dirty="0">
-                <a:effectLst/>
-                <a:hlinkClick r:id="rId3"/>
-              </a:rPr>
-              <a:t>http://apress.com/book/view/1430226080</a:t>
-            </a:r>
-            <a:endParaRPr lang="en-US" sz="3000" dirty="0">
               <a:effectLst/>
             </a:endParaRPr>
           </a:p>
@@ -11221,7 +11507,7 @@
               <a:pPr>
                 <a:defRPr/>
               </a:pPr>
-              <a:t>24</a:t>
+              <a:t>25</a:t>
             </a:fld>
             <a:endParaRPr lang="en-US" dirty="0"/>
           </a:p>
@@ -11246,7 +11532,7 @@
         </p:blipFill>
         <p:spPr bwMode="auto">
           <a:xfrm>
-            <a:off x="304800" y="1020744"/>
+            <a:off x="304800" y="3001944"/>
             <a:ext cx="1234225" cy="1676400"/>
           </a:xfrm>
           <a:prstGeom prst="rect">
@@ -11293,7 +11579,7 @@
         </p:blipFill>
         <p:spPr bwMode="auto">
           <a:xfrm>
-            <a:off x="304800" y="2895600"/>
+            <a:off x="304800" y="4876800"/>
             <a:ext cx="1234225" cy="1676400"/>
           </a:xfrm>
           <a:prstGeom prst="rect">
@@ -11333,7 +11619,7 @@
           <a:blip r:embed="rId6">
             <a:extLst>
               <a:ext uri="{28A0092B-C50C-407E-A947-70E740481C1C}">
-                <a14:useLocalDpi xmlns:a14="http://schemas.microsoft.com/office/drawing/2010/main" val="0"/>
+                <a14:useLocalDpi xmlns:a14="http://schemas.microsoft.com/office/drawing/2010/main"/>
               </a:ext>
             </a:extLst>
           </a:blip>
@@ -11344,13 +11630,18 @@
         </p:blipFill>
         <p:spPr bwMode="auto">
           <a:xfrm>
-            <a:off x="348400" y="4911725"/>
-            <a:ext cx="1190625" cy="1571625"/>
+            <a:off x="304800" y="1066801"/>
+            <a:ext cx="1234226" cy="1676400"/>
           </a:xfrm>
           <a:prstGeom prst="rect">
             <a:avLst/>
           </a:prstGeom>
           <a:noFill/>
+          <a:ln>
+            <a:solidFill>
+              <a:srgbClr val="FFFFFF"/>
+            </a:solidFill>
+          </a:ln>
           <a:extLst>
             <a:ext uri="{909E8E84-426E-40DD-AFC4-6F175D3DCCD1}">
               <a14:hiddenFill xmlns:a14="http://schemas.microsoft.com/office/drawing/2010/main">
@@ -11377,7 +11668,7 @@
 </p:sld>
 </file>
 
-<file path=ppt/slides/slide25.xml><?xml version="1.0" encoding="utf-8"?>
+<file path=ppt/slides/slide26.xml><?xml version="1.0" encoding="utf-8"?>
 <p:sld xmlns:a="http://schemas.openxmlformats.org/drawingml/2006/main" xmlns:r="http://schemas.openxmlformats.org/officeDocument/2006/relationships" xmlns:p="http://schemas.openxmlformats.org/presentationml/2006/main">
   <p:cSld>
     <p:spTree>
@@ -12434,6 +12725,173 @@
       </p:grpSpPr>
       <p:sp>
         <p:nvSpPr>
+          <p:cNvPr id="2" name="Title 1"/>
+          <p:cNvSpPr>
+            <a:spLocks noGrp="1"/>
+          </p:cNvSpPr>
+          <p:nvPr>
+            <p:ph type="title"/>
+          </p:nvPr>
+        </p:nvSpPr>
+        <p:spPr/>
+        <p:txBody>
+          <a:bodyPr/>
+          <a:lstStyle/>
+          <a:p>
+            <a:r>
+              <a:rPr lang="en-US" dirty="0" smtClean="0"/>
+              <a:t>Registration</a:t>
+            </a:r>
+            <a:endParaRPr lang="en-US" dirty="0"/>
+          </a:p>
+        </p:txBody>
+      </p:sp>
+      <p:sp>
+        <p:nvSpPr>
+          <p:cNvPr id="3" name="Content Placeholder 2"/>
+          <p:cNvSpPr>
+            <a:spLocks noGrp="1"/>
+          </p:cNvSpPr>
+          <p:nvPr>
+            <p:ph idx="1"/>
+          </p:nvPr>
+        </p:nvSpPr>
+        <p:spPr/>
+        <p:txBody>
+          <a:bodyPr/>
+          <a:lstStyle/>
+          <a:p>
+            <a:r>
+              <a:rPr lang="en-US" dirty="0" smtClean="0"/>
+              <a:t>All students should register for the course at:</a:t>
+            </a:r>
+          </a:p>
+          <a:p>
+            <a:endParaRPr lang="en-US" dirty="0"/>
+          </a:p>
+          <a:p>
+            <a:pPr marL="0" indent="0" algn="ctr">
+              <a:buNone/>
+            </a:pPr>
+            <a:r>
+              <a:rPr lang="en-US" sz="4400" dirty="0" smtClean="0">
+                <a:hlinkClick r:id="rId2"/>
+              </a:rPr>
+              <a:t>http://aspnetcourse.telerik.com</a:t>
+            </a:r>
+            <a:endParaRPr lang="en-US" sz="4400" dirty="0" smtClean="0"/>
+          </a:p>
+          <a:p>
+            <a:pPr marL="0" indent="0" algn="ctr">
+              <a:buNone/>
+            </a:pPr>
+            <a:endParaRPr lang="en-US" sz="4400" dirty="0"/>
+          </a:p>
+          <a:p>
+            <a:pPr lvl="0">
+              <a:buClr>
+                <a:srgbClr val="46A6BD">
+                  <a:lumMod val="40000"/>
+                  <a:lumOff val="60000"/>
+                </a:srgbClr>
+              </a:buClr>
+            </a:pPr>
+            <a:r>
+              <a:rPr lang="en-US" dirty="0" smtClean="0"/>
+              <a:t>Registration is important!</a:t>
+            </a:r>
+          </a:p>
+          <a:p>
+            <a:pPr lvl="1">
+              <a:buClr>
+                <a:srgbClr val="46A6BD">
+                  <a:lumMod val="40000"/>
+                  <a:lumOff val="60000"/>
+                </a:srgbClr>
+              </a:buClr>
+            </a:pPr>
+            <a:r>
+              <a:rPr lang="en-US" dirty="0" smtClean="0"/>
+              <a:t>Registration allows the trainers contact you regarding the course projects, exams, etc.</a:t>
+            </a:r>
+          </a:p>
+          <a:p>
+            <a:pPr lvl="1">
+              <a:buClr>
+                <a:srgbClr val="46A6BD">
+                  <a:lumMod val="40000"/>
+                  <a:lumOff val="60000"/>
+                </a:srgbClr>
+              </a:buClr>
+            </a:pPr>
+            <a:r>
+              <a:rPr lang="en-US" dirty="0" smtClean="0"/>
+              <a:t>Registered students are assigned to work on one of the course projects</a:t>
+            </a:r>
+          </a:p>
+        </p:txBody>
+      </p:sp>
+      <p:sp>
+        <p:nvSpPr>
+          <p:cNvPr id="4" name="Slide Number Placeholder 3"/>
+          <p:cNvSpPr>
+            <a:spLocks noGrp="1"/>
+          </p:cNvSpPr>
+          <p:nvPr>
+            <p:ph type="sldNum" sz="quarter" idx="10"/>
+          </p:nvPr>
+        </p:nvSpPr>
+        <p:spPr/>
+        <p:txBody>
+          <a:bodyPr/>
+          <a:lstStyle/>
+          <a:p>
+            <a:pPr>
+              <a:defRPr/>
+            </a:pPr>
+            <a:fld id="{58452FF4-89E3-4D1B-9927-2DBDC00E58D7}" type="slidenum">
+              <a:rPr lang="en-US" smtClean="0"/>
+              <a:pPr>
+                <a:defRPr/>
+              </a:pPr>
+              <a:t>4</a:t>
+            </a:fld>
+            <a:endParaRPr lang="en-US" dirty="0"/>
+          </a:p>
+        </p:txBody>
+      </p:sp>
+    </p:spTree>
+    <p:extLst>
+      <p:ext uri="{BB962C8B-B14F-4D97-AF65-F5344CB8AC3E}">
+        <p14:creationId xmlns:p14="http://schemas.microsoft.com/office/powerpoint/2010/main" val="652486721"/>
+      </p:ext>
+    </p:extLst>
+  </p:cSld>
+  <p:clrMapOvr>
+    <a:masterClrMapping/>
+  </p:clrMapOvr>
+</p:sld>
+</file>
+
+<file path=ppt/slides/slide5.xml><?xml version="1.0" encoding="utf-8"?>
+<p:sld xmlns:a="http://schemas.openxmlformats.org/drawingml/2006/main" xmlns:r="http://schemas.openxmlformats.org/officeDocument/2006/relationships" xmlns:p="http://schemas.openxmlformats.org/presentationml/2006/main">
+  <p:cSld>
+    <p:spTree>
+      <p:nvGrpSpPr>
+        <p:cNvPr id="1" name=""/>
+        <p:cNvGrpSpPr/>
+        <p:nvPr/>
+      </p:nvGrpSpPr>
+      <p:grpSpPr>
+        <a:xfrm>
+          <a:off x="0" y="0"/>
+          <a:ext cx="0" cy="0"/>
+          <a:chOff x="0" y="0"/>
+          <a:chExt cx="0" cy="0"/>
+        </a:xfrm>
+      </p:grpSpPr>
+      <p:sp>
+        <p:nvSpPr>
           <p:cNvPr id="4" name="Title 3"/>
           <p:cNvSpPr>
             <a:spLocks noGrp="1"/>
@@ -12560,7 +13018,7 @@
               <a:pPr>
                 <a:defRPr/>
               </a:pPr>
-              <a:t>4</a:t>
+              <a:t>5</a:t>
             </a:fld>
             <a:endParaRPr lang="en-US" dirty="0"/>
           </a:p>
@@ -12628,7 +13086,7 @@
 </p:sld>
 </file>
 
-<file path=ppt/slides/slide5.xml><?xml version="1.0" encoding="utf-8"?>
+<file path=ppt/slides/slide6.xml><?xml version="1.0" encoding="utf-8"?>
 <p:sld xmlns:a="http://schemas.openxmlformats.org/drawingml/2006/main" xmlns:r="http://schemas.openxmlformats.org/officeDocument/2006/relationships" xmlns:p="http://schemas.openxmlformats.org/presentationml/2006/main">
   <p:cSld>
     <p:spTree>
@@ -12727,211 +13185,6 @@
 </p:sld>
 </file>
 
-<file path=ppt/slides/slide6.xml><?xml version="1.0" encoding="utf-8"?>
-<p:sld xmlns:a="http://schemas.openxmlformats.org/drawingml/2006/main" xmlns:r="http://schemas.openxmlformats.org/officeDocument/2006/relationships" xmlns:p="http://schemas.openxmlformats.org/presentationml/2006/main">
-  <p:cSld>
-    <p:spTree>
-      <p:nvGrpSpPr>
-        <p:cNvPr id="1" name=""/>
-        <p:cNvGrpSpPr/>
-        <p:nvPr/>
-      </p:nvGrpSpPr>
-      <p:grpSpPr>
-        <a:xfrm>
-          <a:off x="0" y="0"/>
-          <a:ext cx="0" cy="0"/>
-          <a:chOff x="0" y="0"/>
-          <a:chExt cx="0" cy="0"/>
-        </a:xfrm>
-      </p:grpSpPr>
-      <p:sp>
-        <p:nvSpPr>
-          <p:cNvPr id="2" name="Title 1"/>
-          <p:cNvSpPr>
-            <a:spLocks noGrp="1"/>
-          </p:cNvSpPr>
-          <p:nvPr>
-            <p:ph type="title"/>
-          </p:nvPr>
-        </p:nvSpPr>
-        <p:spPr/>
-        <p:txBody>
-          <a:bodyPr/>
-          <a:lstStyle/>
-          <a:p>
-            <a:r>
-              <a:rPr lang="en-US" dirty="0" smtClean="0"/>
-              <a:t>Curriculum</a:t>
-            </a:r>
-            <a:endParaRPr lang="en-US" dirty="0"/>
-          </a:p>
-        </p:txBody>
-      </p:sp>
-      <p:sp>
-        <p:nvSpPr>
-          <p:cNvPr id="3" name="Content Placeholder 2"/>
-          <p:cNvSpPr>
-            <a:spLocks noGrp="1"/>
-          </p:cNvSpPr>
-          <p:nvPr>
-            <p:ph idx="1"/>
-          </p:nvPr>
-        </p:nvSpPr>
-        <p:spPr>
-          <a:xfrm>
-            <a:off x="76200" y="838200"/>
-            <a:ext cx="8991600" cy="5791200"/>
-          </a:xfrm>
-        </p:spPr>
-        <p:txBody>
-          <a:bodyPr/>
-          <a:lstStyle/>
-          <a:p>
-            <a:pPr marL="361950" lvl="0" indent="-361950">
-              <a:lnSpc>
-                <a:spcPct val="95000"/>
-              </a:lnSpc>
-              <a:buFont typeface="+mj-lt"/>
-              <a:buAutoNum type="arabicPeriod"/>
-              <a:tabLst/>
-            </a:pPr>
-            <a:r>
-              <a:rPr lang="en-US" sz="3000" dirty="0" smtClean="0"/>
-              <a:t>.NET Framework Overview</a:t>
-            </a:r>
-          </a:p>
-          <a:p>
-            <a:pPr marL="520700" lvl="1" indent="-228600">
-              <a:lnSpc>
-                <a:spcPct val="95000"/>
-              </a:lnSpc>
-            </a:pPr>
-            <a:r>
-              <a:rPr lang="en-US" sz="2800" dirty="0" smtClean="0"/>
-              <a:t>.NET, CLR, MSIL, Assemblies, CTS, .NET languages </a:t>
-            </a:r>
-          </a:p>
-          <a:p>
-            <a:pPr marL="361950" lvl="0" indent="-361950">
-              <a:lnSpc>
-                <a:spcPct val="95000"/>
-              </a:lnSpc>
-              <a:buFont typeface="+mj-lt"/>
-              <a:buAutoNum type="arabicPeriod"/>
-              <a:tabLst/>
-            </a:pPr>
-            <a:r>
-              <a:rPr lang="en-US" sz="3000" dirty="0" smtClean="0"/>
-              <a:t>C# Language Overview – Part I</a:t>
-            </a:r>
-          </a:p>
-          <a:p>
-            <a:pPr marL="520700" lvl="1" indent="-228600">
-              <a:lnSpc>
-                <a:spcPct val="95000"/>
-              </a:lnSpc>
-            </a:pPr>
-            <a:r>
-              <a:rPr lang="en-US" sz="2800" dirty="0" smtClean="0"/>
-              <a:t>Data Types, Operators, Expressions, Statements, Console I/O, if / switch / case, Loops, Arrays, Methods</a:t>
-            </a:r>
-          </a:p>
-          <a:p>
-            <a:pPr marL="361950" lvl="0" indent="-361950">
-              <a:lnSpc>
-                <a:spcPct val="95000"/>
-              </a:lnSpc>
-              <a:buFont typeface="+mj-lt"/>
-              <a:buAutoNum type="arabicPeriod"/>
-              <a:tabLst/>
-            </a:pPr>
-            <a:r>
-              <a:rPr lang="en-US" sz="3000" dirty="0" smtClean="0"/>
-              <a:t>C# Language Overview – Part II</a:t>
-            </a:r>
-          </a:p>
-          <a:p>
-            <a:pPr marL="520700" lvl="1" indent="-228600">
-              <a:lnSpc>
-                <a:spcPct val="95000"/>
-              </a:lnSpc>
-            </a:pPr>
-            <a:r>
-              <a:rPr lang="en-US" sz="2800" dirty="0" smtClean="0"/>
-              <a:t>Creating and Using Objects, Exceptions, Strings, Generics, Collections, Attributes</a:t>
-            </a:r>
-          </a:p>
-          <a:p>
-            <a:pPr marL="361950" lvl="0" indent="-361950">
-              <a:lnSpc>
-                <a:spcPct val="95000"/>
-              </a:lnSpc>
-              <a:buFont typeface="+mj-lt"/>
-              <a:buAutoNum type="arabicPeriod"/>
-              <a:tabLst/>
-            </a:pPr>
-            <a:r>
-              <a:rPr lang="en-US" sz="3000" dirty="0" smtClean="0"/>
-              <a:t>Object-Oriented Programming with C#</a:t>
-            </a:r>
-          </a:p>
-          <a:p>
-            <a:pPr marL="520700" lvl="1" indent="-228600">
-              <a:lnSpc>
-                <a:spcPct val="95000"/>
-              </a:lnSpc>
-            </a:pPr>
-            <a:r>
-              <a:rPr lang="en-US" sz="2800" dirty="0" smtClean="0"/>
-              <a:t>Defining Classes, Constructors, Properties, Methods, Events, Interfaces, Inheritance, Polymorphism</a:t>
-            </a:r>
-          </a:p>
-        </p:txBody>
-      </p:sp>
-      <p:sp>
-        <p:nvSpPr>
-          <p:cNvPr id="4" name="Slide Number Placeholder 3"/>
-          <p:cNvSpPr>
-            <a:spLocks noGrp="1"/>
-          </p:cNvSpPr>
-          <p:nvPr>
-            <p:ph type="sldNum" sz="quarter" idx="10"/>
-          </p:nvPr>
-        </p:nvSpPr>
-        <p:spPr/>
-        <p:txBody>
-          <a:bodyPr/>
-          <a:lstStyle/>
-          <a:p>
-            <a:pPr>
-              <a:defRPr/>
-            </a:pPr>
-            <a:fld id="{58452FF4-89E3-4D1B-9927-2DBDC00E58D7}" type="slidenum">
-              <a:rPr lang="en-US" smtClean="0"/>
-              <a:pPr>
-                <a:defRPr/>
-              </a:pPr>
-              <a:t>6</a:t>
-            </a:fld>
-            <a:endParaRPr lang="en-US" dirty="0"/>
-          </a:p>
-        </p:txBody>
-      </p:sp>
-    </p:spTree>
-  </p:cSld>
-  <p:clrMapOvr>
-    <a:masterClrMapping/>
-  </p:clrMapOvr>
-  <p:timing>
-    <p:tnLst>
-      <p:par>
-        <p:cTn id="1" dur="indefinite" restart="never" nodeType="tmRoot"/>
-      </p:par>
-    </p:tnLst>
-  </p:timing>
-</p:sld>
-</file>
-
 <file path=ppt/slides/slide7.xml><?xml version="1.0" encoding="utf-8"?>
 <p:sld xmlns:a="http://schemas.openxmlformats.org/drawingml/2006/main" xmlns:r="http://schemas.openxmlformats.org/officeDocument/2006/relationships" xmlns:p="http://schemas.openxmlformats.org/presentationml/2006/main">
   <p:cSld>
@@ -12966,7 +13219,7 @@
           <a:p>
             <a:r>
               <a:rPr lang="en-US" dirty="0" smtClean="0"/>
-              <a:t>Curriculum (2)</a:t>
+              <a:t>Curriculum</a:t>
             </a:r>
             <a:endParaRPr lang="en-US" dirty="0"/>
           </a:p>
@@ -12984,61 +13237,36 @@
         </p:nvSpPr>
         <p:spPr>
           <a:xfrm>
-            <a:off x="228600" y="990600"/>
-            <a:ext cx="8686800" cy="5715000"/>
+            <a:off x="76200" y="838200"/>
+            <a:ext cx="8991600" cy="5791200"/>
           </a:xfrm>
         </p:spPr>
         <p:txBody>
           <a:bodyPr/>
           <a:lstStyle/>
           <a:p>
-            <a:pPr marL="360363" lvl="0" indent="-360363">
-              <a:lnSpc>
-                <a:spcPct val="95000"/>
-              </a:lnSpc>
-              <a:buFont typeface="+mj-lt"/>
-              <a:buAutoNum type="arabicPeriod" startAt="5"/>
-              <a:tabLst/>
-            </a:pPr>
-            <a:r>
-              <a:rPr lang="en-US" sz="3000" dirty="0" smtClean="0"/>
-              <a:t>Databases, SQL and MS SQL Server</a:t>
-            </a:r>
-          </a:p>
-          <a:p>
-            <a:pPr marL="457200" lvl="1" indent="-228600">
-              <a:lnSpc>
-                <a:spcPct val="95000"/>
-              </a:lnSpc>
-            </a:pPr>
-            <a:r>
-              <a:rPr lang="en-US" sz="2800" dirty="0" smtClean="0"/>
-              <a:t>RDBMS, SQL Language, SQL SELECT, Joins, Grouping, SQL INSERT, SQL UPDATE, SQL DELETE, MS SQL Server, SQL Server Management Studio </a:t>
-            </a:r>
-          </a:p>
-          <a:p>
             <a:pPr marL="361950" lvl="0" indent="-361950">
               <a:lnSpc>
                 <a:spcPct val="95000"/>
               </a:lnSpc>
               <a:buFont typeface="+mj-lt"/>
-              <a:buAutoNum type="arabicPeriod" startAt="5"/>
+              <a:buAutoNum type="arabicPeriod"/>
               <a:tabLst/>
             </a:pPr>
             <a:r>
               <a:rPr lang="en-US" sz="3000" dirty="0" smtClean="0"/>
-              <a:t>LINQ and LINQ-to-SQL</a:t>
-            </a:r>
-          </a:p>
-          <a:p>
-            <a:pPr marL="457200" lvl="1" indent="-228600">
+              <a:t>.NET Framework Overview</a:t>
+            </a:r>
+          </a:p>
+          <a:p>
+            <a:pPr marL="520700" lvl="1" indent="-228600">
               <a:lnSpc>
                 <a:spcPct val="95000"/>
               </a:lnSpc>
             </a:pPr>
             <a:r>
               <a:rPr lang="en-US" sz="2800" dirty="0" smtClean="0"/>
-              <a:t>LINQ Operators and Expressions, Projections, Conversions, Aggregations, LINQ-to-SQL, Using DataContext to Read / Create / Update / Delete Data</a:t>
+              <a:t>.NET, CLR, MSIL, Assemblies, CTS, .NET languages </a:t>
             </a:r>
           </a:p>
           <a:p>
@@ -13047,23 +13275,73 @@
                 <a:spcPct val="95000"/>
               </a:lnSpc>
               <a:buFont typeface="+mj-lt"/>
-              <a:buAutoNum type="arabicPeriod" startAt="5"/>
+              <a:buAutoNum type="arabicPeriod"/>
               <a:tabLst/>
             </a:pPr>
             <a:r>
               <a:rPr lang="en-US" sz="3000" dirty="0" smtClean="0"/>
-              <a:t>Web Technologies Basics</a:t>
-            </a:r>
-          </a:p>
-          <a:p>
-            <a:pPr marL="457200" lvl="1" indent="-228600">
+              <a:t>C# Language Overview – Part I</a:t>
+            </a:r>
+          </a:p>
+          <a:p>
+            <a:pPr marL="520700" lvl="1" indent="-228600">
               <a:lnSpc>
                 <a:spcPct val="95000"/>
               </a:lnSpc>
             </a:pPr>
             <a:r>
               <a:rPr lang="en-US" sz="2800" dirty="0" smtClean="0"/>
-              <a:t>HTTP, HTML, Text, Images, Tables, Forms, CSS, JavaScript</a:t>
+              <a:t>Data Types, Operators, Expressions, Statements, Console I/O, if / switch / case, Loops, Arrays, Methods</a:t>
+            </a:r>
+          </a:p>
+          <a:p>
+            <a:pPr marL="361950" lvl="0" indent="-361950">
+              <a:lnSpc>
+                <a:spcPct val="95000"/>
+              </a:lnSpc>
+              <a:buFont typeface="+mj-lt"/>
+              <a:buAutoNum type="arabicPeriod"/>
+              <a:tabLst/>
+            </a:pPr>
+            <a:r>
+              <a:rPr lang="en-US" sz="3000" dirty="0" smtClean="0"/>
+              <a:t>C# Language Overview – Part II</a:t>
+            </a:r>
+          </a:p>
+          <a:p>
+            <a:pPr marL="520700" lvl="1" indent="-228600">
+              <a:lnSpc>
+                <a:spcPct val="95000"/>
+              </a:lnSpc>
+            </a:pPr>
+            <a:r>
+              <a:rPr lang="en-US" sz="2800" dirty="0" smtClean="0"/>
+              <a:t>Creating and Using Objects, Exceptions, Strings, Generics, Collections, Attributes</a:t>
+            </a:r>
+          </a:p>
+          <a:p>
+            <a:pPr marL="361950" lvl="0" indent="-361950">
+              <a:lnSpc>
+                <a:spcPct val="95000"/>
+              </a:lnSpc>
+              <a:buFont typeface="+mj-lt"/>
+              <a:buAutoNum type="arabicPeriod"/>
+              <a:tabLst/>
+            </a:pPr>
+            <a:r>
+              <a:rPr lang="en-US" sz="3000" dirty="0" smtClean="0"/>
+              <a:t>Object-Oriented Programming with C#</a:t>
+            </a:r>
+          </a:p>
+          <a:p>
+            <a:pPr marL="520700" lvl="1" indent="-228600">
+              <a:lnSpc>
+                <a:spcPct val="95000"/>
+              </a:lnSpc>
+            </a:pPr>
+            <a:r>
+              <a:rPr lang="en-US" sz="2800" dirty="0" smtClean="0"/>
+              <a:t>Defining Classes, Constructors, Properties, Methods, Events, Interfaces, Inheritance, Polymorphism</a:t>
             </a:r>
           </a:p>
         </p:txBody>
@@ -13146,7 +13424,7 @@
           <a:p>
             <a:r>
               <a:rPr lang="en-US" dirty="0" smtClean="0"/>
-              <a:t>Curriculum (3)</a:t>
+              <a:t>Curriculum (2)</a:t>
             </a:r>
             <a:endParaRPr lang="en-US" dirty="0"/>
           </a:p>
@@ -13164,27 +13442,26 @@
         </p:nvSpPr>
         <p:spPr>
           <a:xfrm>
-            <a:off x="152400" y="838200"/>
-            <a:ext cx="8839200" cy="5715000"/>
+            <a:off x="228600" y="990600"/>
+            <a:ext cx="8686800" cy="5715000"/>
           </a:xfrm>
         </p:spPr>
         <p:txBody>
           <a:bodyPr/>
           <a:lstStyle/>
           <a:p>
-            <a:pPr marL="514350" indent="-514350">
+            <a:pPr marL="360363" lvl="0" indent="-360363">
               <a:lnSpc>
                 <a:spcPct val="95000"/>
               </a:lnSpc>
               <a:buFont typeface="+mj-lt"/>
-              <a:buAutoNum type="arabicPeriod" startAt="8"/>
+              <a:buAutoNum type="arabicPeriod" startAt="5"/>
               <a:tabLst/>
             </a:pPr>
             <a:r>
-              <a:rPr lang="en-US" sz="3000" dirty="0"/>
-              <a:t>ASP.NET Basics</a:t>
-            </a:r>
-            <a:endParaRPr lang="en-US" sz="3000" dirty="0"/>
+              <a:rPr lang="en-US" sz="3000" dirty="0" smtClean="0"/>
+              <a:t>Databases, SQL and MS SQL Server</a:t>
+            </a:r>
           </a:p>
           <a:p>
             <a:pPr marL="457200" lvl="1" indent="-228600">
@@ -13193,24 +13470,23 @@
               </a:lnSpc>
             </a:pPr>
             <a:r>
-              <a:rPr lang="en-US" sz="2800" dirty="0"/>
-              <a:t>ASP.NET Web Forms, Web Server Controls, HTML Server Controls, Creating Simple Web Applications</a:t>
-            </a:r>
-          </a:p>
-          <a:p>
-            <a:pPr marL="514350" indent="-514350">
+              <a:rPr lang="en-US" sz="2800" dirty="0" smtClean="0"/>
+              <a:t>RDBMS, SQL Language, SQL SELECT, Joins, Grouping, SQL INSERT, SQL UPDATE, SQL DELETE, MS SQL Server, SQL Server Management Studio </a:t>
+            </a:r>
+          </a:p>
+          <a:p>
+            <a:pPr marL="361950" lvl="0" indent="-361950">
               <a:lnSpc>
                 <a:spcPct val="95000"/>
               </a:lnSpc>
               <a:buFont typeface="+mj-lt"/>
-              <a:buAutoNum type="arabicPeriod" startAt="8"/>
+              <a:buAutoNum type="arabicPeriod" startAt="5"/>
               <a:tabLst/>
             </a:pPr>
             <a:r>
-              <a:rPr lang="en-US" sz="3000" dirty="0"/>
-              <a:t>ASP.NET Data Binding</a:t>
-            </a:r>
-            <a:endParaRPr lang="en-US" sz="3000" dirty="0"/>
+              <a:rPr lang="en-US" sz="3000" dirty="0" smtClean="0"/>
+              <a:t>LINQ and LINQ-to-SQL</a:t>
+            </a:r>
           </a:p>
           <a:p>
             <a:pPr marL="457200" lvl="1" indent="-228600">
@@ -13219,28 +13495,23 @@
               </a:lnSpc>
             </a:pPr>
             <a:r>
-              <a:rPr lang="en-US" sz="2800" dirty="0"/>
-              <a:t>Data-Bound Controls: Data Sources, </a:t>
-            </a:r>
-            <a:r>
-              <a:rPr lang="en-US" sz="2800" noProof="1"/>
-              <a:t>GridView, FormView, DetailsView, DataList, Repeater, ListView</a:t>
-            </a:r>
-          </a:p>
-          <a:p>
-            <a:pPr marL="514350" indent="-514350">
+              <a:rPr lang="en-US" sz="2800" dirty="0" smtClean="0"/>
+              <a:t>LINQ Operators and Expressions, Projections, Conversions, Aggregations, LINQ-to-SQL, Using DataContext to Read / Create / Update / Delete Data</a:t>
+            </a:r>
+          </a:p>
+          <a:p>
+            <a:pPr marL="361950" lvl="0" indent="-361950">
               <a:lnSpc>
                 <a:spcPct val="95000"/>
               </a:lnSpc>
               <a:buFont typeface="+mj-lt"/>
-              <a:buAutoNum type="arabicPeriod" startAt="8"/>
+              <a:buAutoNum type="arabicPeriod" startAt="5"/>
               <a:tabLst/>
             </a:pPr>
             <a:r>
-              <a:rPr lang="en-US" sz="3000" dirty="0"/>
-              <a:t>ASP.NET and Databases</a:t>
-            </a:r>
-            <a:endParaRPr lang="en-US" sz="3000" dirty="0"/>
+              <a:rPr lang="en-US" sz="3000" dirty="0" smtClean="0"/>
+              <a:t>Web Technologies Basics</a:t>
+            </a:r>
           </a:p>
           <a:p>
             <a:pPr marL="457200" lvl="1" indent="-228600">
@@ -13249,66 +13520,8 @@
               </a:lnSpc>
             </a:pPr>
             <a:r>
-              <a:rPr lang="en-US" sz="2800" dirty="0"/>
-              <a:t>Integrating LINQ-to-SQL with ASP.NET, Using Data Sources </a:t>
-            </a:r>
-            <a:r>
-              <a:rPr lang="en-US" sz="2800" dirty="0"/>
-              <a:t>(</a:t>
-            </a:r>
-            <a:r>
-              <a:rPr lang="en-US" sz="2800" noProof="1"/>
-              <a:t>LinqDataSource</a:t>
-            </a:r>
-            <a:r>
-              <a:rPr lang="en-US" sz="2800" dirty="0"/>
-              <a:t> </a:t>
-            </a:r>
-            <a:r>
-              <a:rPr lang="en-US" sz="2800" dirty="0"/>
-              <a:t>and </a:t>
-            </a:r>
-            <a:r>
-              <a:rPr lang="en-US" sz="2800" noProof="1"/>
-              <a:t>ObjectDataSource</a:t>
-            </a:r>
-            <a:r>
-              <a:rPr lang="en-US" sz="2800" dirty="0"/>
-              <a:t>)</a:t>
-            </a:r>
-          </a:p>
-          <a:p>
-            <a:pPr marL="514350" indent="-514350">
-              <a:lnSpc>
-                <a:spcPct val="95000"/>
-              </a:lnSpc>
-              <a:buFont typeface="+mj-lt"/>
-              <a:buAutoNum type="arabicPeriod" startAt="8"/>
-              <a:tabLst/>
-            </a:pPr>
-            <a:r>
-              <a:rPr lang="en-US" sz="3000" dirty="0"/>
-              <a:t>ASP.NET State Management</a:t>
-            </a:r>
-            <a:endParaRPr lang="en-US" sz="3000" dirty="0"/>
-          </a:p>
-          <a:p>
-            <a:pPr marL="457200" lvl="1" indent="-228600">
-              <a:lnSpc>
-                <a:spcPct val="95000"/>
-              </a:lnSpc>
-            </a:pPr>
-            <a:r>
-              <a:rPr lang="en-US" sz="2800" dirty="0"/>
-              <a:t>View </a:t>
-            </a:r>
-            <a:r>
-              <a:rPr lang="en-US" sz="2800" dirty="0"/>
-              <a:t>State, Application State, Session </a:t>
-            </a:r>
-            <a:r>
-              <a:rPr lang="en-US" sz="2800" dirty="0"/>
-              <a:t>State</a:t>
+              <a:rPr lang="en-US" sz="2800" dirty="0" smtClean="0"/>
+              <a:t>HTTP, HTML, Text, Images, Tables, Forms, CSS, JavaScript</a:t>
             </a:r>
           </a:p>
         </p:txBody>
@@ -13391,7 +13604,7 @@
           <a:p>
             <a:r>
               <a:rPr lang="en-US" dirty="0" smtClean="0"/>
-              <a:t>Curriculum (4)</a:t>
+              <a:t>Curriculum (3)</a:t>
             </a:r>
             <a:endParaRPr lang="en-US" dirty="0"/>
           </a:p>
@@ -13409,8 +13622,8 @@
         </p:nvSpPr>
         <p:spPr>
           <a:xfrm>
-            <a:off x="228600" y="685800"/>
-            <a:ext cx="8686800" cy="5943600"/>
+            <a:off x="152400" y="838200"/>
+            <a:ext cx="8839200" cy="5715000"/>
           </a:xfrm>
         </p:spPr>
         <p:txBody>
@@ -13419,128 +13632,122 @@
           <a:p>
             <a:pPr marL="514350" indent="-514350">
               <a:lnSpc>
-                <a:spcPct val="90000"/>
+                <a:spcPct val="95000"/>
               </a:lnSpc>
               <a:buFont typeface="+mj-lt"/>
-              <a:buAutoNum type="arabicPeriod" startAt="12"/>
+              <a:buAutoNum type="arabicPeriod" startAt="8"/>
               <a:tabLst/>
             </a:pPr>
             <a:r>
               <a:rPr lang="en-US" sz="3000" dirty="0"/>
-              <a:t>ASP.NET Advanced Topics</a:t>
+              <a:t>ASP.NET Basics</a:t>
             </a:r>
           </a:p>
           <a:p>
             <a:pPr marL="457200" lvl="1" indent="-228600">
               <a:lnSpc>
-                <a:spcPct val="90000"/>
+                <a:spcPct val="95000"/>
               </a:lnSpc>
             </a:pPr>
             <a:r>
               <a:rPr lang="en-US" sz="2800" dirty="0"/>
-              <a:t>Master Pages, User Controls, Site Maps, Localization, Validation Controls, </a:t>
-            </a:r>
-            <a:r>
-              <a:rPr lang="en-US" sz="2800" noProof="1"/>
-              <a:t>Web.config</a:t>
-            </a:r>
-            <a:r>
-              <a:rPr lang="en-US" sz="2800" dirty="0"/>
-              <a:t>, IIS and Deployment</a:t>
+              <a:t>ASP.NET Web Forms, Web Server Controls, HTML Server Controls, Creating Simple Web Applications</a:t>
             </a:r>
           </a:p>
           <a:p>
             <a:pPr marL="514350" indent="-514350">
               <a:lnSpc>
-                <a:spcPct val="90000"/>
+                <a:spcPct val="95000"/>
               </a:lnSpc>
               <a:buFont typeface="+mj-lt"/>
-              <a:buAutoNum type="arabicPeriod" startAt="12"/>
+              <a:buAutoNum type="arabicPeriod" startAt="8"/>
               <a:tabLst/>
             </a:pPr>
             <a:r>
               <a:rPr lang="en-US" sz="3000" dirty="0"/>
-              <a:t>ASP.NET Membership</a:t>
+              <a:t>ASP.NET Data Binding</a:t>
             </a:r>
           </a:p>
           <a:p>
             <a:pPr marL="457200" lvl="1" indent="-228600">
               <a:lnSpc>
-                <a:spcPct val="90000"/>
+                <a:spcPct val="95000"/>
               </a:lnSpc>
             </a:pPr>
             <a:r>
               <a:rPr lang="en-US" sz="2800" dirty="0"/>
-              <a:t>Authentication and Authorization, Windows and Forms Authentication, Users, Roles, Membership and Providers, Login Controls</a:t>
-            </a:r>
-            <a:endParaRPr lang="en-US" sz="2800" noProof="1"/>
+              <a:t>Data-Bound Controls: Data Sources, </a:t>
+            </a:r>
+            <a:r>
+              <a:rPr lang="en-US" sz="2800" noProof="1"/>
+              <a:t>GridView, FormView, DetailsView, DataList, Repeater, ListView</a:t>
+            </a:r>
+          </a:p>
+          <a:p>
+            <a:pPr marL="514350" indent="-514350">
+              <a:lnSpc>
+                <a:spcPct val="95000"/>
+              </a:lnSpc>
+              <a:buFont typeface="+mj-lt"/>
+              <a:buAutoNum type="arabicPeriod" startAt="8"/>
+              <a:tabLst/>
+            </a:pPr>
+            <a:r>
+              <a:rPr lang="en-US" sz="3000" dirty="0"/>
+              <a:t>ASP.NET and Databases</a:t>
+            </a:r>
           </a:p>
           <a:p>
             <a:pPr marL="457200" lvl="1" indent="-228600">
               <a:lnSpc>
-                <a:spcPct val="90000"/>
+                <a:spcPct val="95000"/>
               </a:lnSpc>
             </a:pPr>
             <a:r>
               <a:rPr lang="en-US" sz="2800" dirty="0"/>
-              <a:t>ASP.NET AJAX</a:t>
+              <a:t>Integrating LINQ-to-SQL with ASP.NET, Using Data Sources (</a:t>
+            </a:r>
+            <a:r>
+              <a:rPr lang="en-US" sz="2800" noProof="1"/>
+              <a:t>LinqDataSource</a:t>
+            </a:r>
+            <a:r>
+              <a:rPr lang="en-US" sz="2800" dirty="0"/>
+              <a:t> and </a:t>
+            </a:r>
+            <a:r>
+              <a:rPr lang="en-US" sz="2800" noProof="1"/>
+              <a:t>ObjectDataSource</a:t>
+            </a:r>
+            <a:r>
+              <a:rPr lang="en-US" sz="2800" dirty="0"/>
+              <a:t>)</a:t>
+            </a:r>
+          </a:p>
+          <a:p>
+            <a:pPr marL="514350" indent="-514350">
+              <a:lnSpc>
+                <a:spcPct val="95000"/>
+              </a:lnSpc>
+              <a:buFont typeface="+mj-lt"/>
+              <a:buAutoNum type="arabicPeriod" startAt="8"/>
+              <a:tabLst/>
+            </a:pPr>
+            <a:r>
+              <a:rPr lang="en-US" sz="3000" dirty="0"/>
+              <a:t>ASP.NET State Management</a:t>
             </a:r>
           </a:p>
           <a:p>
             <a:pPr marL="457200" lvl="1" indent="-228600">
               <a:lnSpc>
-                <a:spcPct val="90000"/>
+                <a:spcPct val="95000"/>
               </a:lnSpc>
             </a:pPr>
             <a:r>
-              <a:rPr lang="en-US" sz="2800" noProof="1"/>
-              <a:t>ScriptManager</a:t>
-            </a:r>
-            <a:r>
               <a:rPr lang="en-US" sz="2800" dirty="0"/>
-              <a:t>, </a:t>
-            </a:r>
-            <a:r>
-              <a:rPr lang="en-US" sz="2800" noProof="1"/>
-              <a:t>UpdatePanel</a:t>
-            </a:r>
-            <a:r>
-              <a:rPr lang="en-US" sz="2800" dirty="0"/>
-              <a:t>, AJAX Control Toolkit</a:t>
-            </a:r>
-          </a:p>
-          <a:p>
-            <a:pPr marL="514350" indent="-514350">
-              <a:lnSpc>
-                <a:spcPct val="90000"/>
-              </a:lnSpc>
-              <a:buFont typeface="+mj-lt"/>
-              <a:buAutoNum type="arabicPeriod" startAt="12"/>
-              <a:tabLst/>
-            </a:pPr>
-            <a:r>
-              <a:rPr lang="en-US" sz="3000" dirty="0"/>
-              <a:t>Practical Project Live Demo – Blog System</a:t>
-            </a:r>
-          </a:p>
-          <a:p>
-            <a:pPr marL="514350" indent="-514350">
-              <a:lnSpc>
-                <a:spcPct val="90000"/>
-              </a:lnSpc>
-              <a:buFont typeface="+mj-lt"/>
-              <a:buAutoNum type="arabicPeriod" startAt="12"/>
-              <a:tabLst/>
-            </a:pPr>
-            <a:r>
-              <a:rPr lang="en-US" sz="3000" dirty="0"/>
-              <a:t>Practical Projects Defense (Certification </a:t>
-            </a:r>
-            <a:r>
-              <a:rPr lang="en-US" sz="3000" dirty="0" smtClean="0"/>
-              <a:t>Exam)</a:t>
-            </a:r>
-            <a:endParaRPr lang="en-US" sz="3000" dirty="0"/>
+              <a:t>View State, Application State, Session State</a:t>
+            </a:r>
           </a:p>
         </p:txBody>
       </p:sp>

</xml_diff>